<commit_message>
added presentation material, added H2 presentation, added basicdataset intro in presentation
</commit_message>
<xml_diff>
--- a/poster-template/prj01-poster-template.pptx
+++ b/poster-template/prj01-poster-template.pptx
@@ -558,6 +558,33 @@
 </pc:chgInfo>
 </file>
 
+<file path=ppt/ink/ink1.xml><?xml version="1.0" encoding="utf-8"?>
+<inkml:ink xmlns:inkml="http://www.w3.org/2003/InkML">
+  <inkml:definitions>
+    <inkml:context xml:id="ctx0">
+      <inkml:inkSource xml:id="inkSrc0">
+        <inkml:traceFormat>
+          <inkml:channel name="X" type="integer" min="-2.14748E9" max="2.14748E9" units="cm"/>
+          <inkml:channel name="Y" type="integer" min="-2.14748E9" max="2.14748E9" units="cm"/>
+          <inkml:channel name="F" type="integer" max="32767" units="dev"/>
+        </inkml:traceFormat>
+        <inkml:channelProperties>
+          <inkml:channelProperty channel="X" name="resolution" value="1000" units="1/cm"/>
+          <inkml:channelProperty channel="Y" name="resolution" value="1000" units="1/cm"/>
+          <inkml:channelProperty channel="F" name="resolution" value="0" units="1/dev"/>
+        </inkml:channelProperties>
+      </inkml:inkSource>
+      <inkml:timestamp xml:id="ts0" timeString="2024-10-13T19:00:10.352"/>
+    </inkml:context>
+    <inkml:brush xml:id="br0">
+      <inkml:brushProperty name="width" value="0.025" units="cm"/>
+      <inkml:brushProperty name="height" value="0.025" units="cm"/>
+    </inkml:brush>
+  </inkml:definitions>
+  <inkml:trace contextRef="#ctx0" brushRef="#br0">1 0 24575</inkml:trace>
+</inkml:ink>
+</file>
+
 <file path=ppt/notesMasters/notesMaster1.xml><?xml version="1.0" encoding="utf-8"?>
 <p:notesMaster xmlns:a="http://schemas.openxmlformats.org/drawingml/2006/main" xmlns:r="http://schemas.openxmlformats.org/officeDocument/2006/relationships" xmlns:p="http://schemas.openxmlformats.org/presentationml/2006/main">
   <p:cSld>
@@ -640,7 +667,7 @@
           <a:p>
             <a:fld id="{F1518A84-A489-4C9B-B420-2A77C4B50547}" type="datetimeFigureOut">
               <a:rPr lang="de-AT" smtClean="0"/>
-              <a:t>13.09.2024</a:t>
+              <a:t>13.10.2024</a:t>
             </a:fld>
             <a:endParaRPr lang="de-AT"/>
           </a:p>
@@ -1527,7 +1554,7 @@
           <a:p>
             <a:r>
               <a:rPr lang="en-US" sz="6000" dirty="0"/>
-              <a:t>Title such as Victims of Homicides and Non-Fatal Shootings</a:t>
+              <a:t>Dogs in Vienna – an Exploration</a:t>
             </a:r>
             <a:endParaRPr lang="de-AT" sz="4800" i="1" dirty="0">
               <a:latin typeface="Arial" panose="020B0604020202020204" pitchFamily="34" charset="0"/>
@@ -1617,49 +1644,43 @@
               <a:rPr lang="en-US" sz="4800" i="1" dirty="0">
                 <a:latin typeface="Arial" panose="020B0604020202020204" pitchFamily="34" charset="0"/>
               </a:rPr>
-              <a:t>Mira Musterfrau</a:t>
-            </a:r>
-            <a:r>
-              <a:rPr lang="en-US" sz="4800" i="1" baseline="30000" dirty="0">
+              <a:t>Anna Marie </a:t>
+            </a:r>
+            <a:r>
+              <a:rPr lang="en-US" sz="4800" i="1" dirty="0" err="1">
                 <a:latin typeface="Arial" panose="020B0604020202020204" pitchFamily="34" charset="0"/>
               </a:rPr>
-              <a:t>1</a:t>
+              <a:t>Punzengruber</a:t>
             </a:r>
             <a:r>
               <a:rPr lang="en-US" sz="4800" i="1" dirty="0">
                 <a:latin typeface="Arial" panose="020B0604020202020204" pitchFamily="34" charset="0"/>
               </a:rPr>
-              <a:t>, Max Mustermann</a:t>
-            </a:r>
-            <a:r>
-              <a:rPr lang="en-US" sz="4800" i="1" baseline="30000" dirty="0">
+              <a:t>, Martin </a:t>
+            </a:r>
+            <a:r>
+              <a:rPr lang="en-US" sz="4800" i="1" dirty="0" err="1">
                 <a:latin typeface="Arial" panose="020B0604020202020204" pitchFamily="34" charset="0"/>
               </a:rPr>
-              <a:t>1</a:t>
+              <a:t>Stasek</a:t>
             </a:r>
             <a:r>
               <a:rPr lang="en-US" sz="4800" i="1" dirty="0">
                 <a:latin typeface="Arial" panose="020B0604020202020204" pitchFamily="34" charset="0"/>
               </a:rPr>
-              <a:t>, Mee Too</a:t>
-            </a:r>
-            <a:r>
-              <a:rPr lang="en-US" sz="4800" i="1" baseline="30000" dirty="0">
+              <a:t>, Theresa Spiel, Carlos Eduardo </a:t>
+            </a:r>
+            <a:r>
+              <a:rPr lang="en-US" sz="4800" i="1" dirty="0" err="1">
                 <a:latin typeface="Arial" panose="020B0604020202020204" pitchFamily="34" charset="0"/>
               </a:rPr>
-              <a:t>1</a:t>
+              <a:t>Tichy</a:t>
             </a:r>
             <a:r>
               <a:rPr lang="en-US" sz="4800" i="1" dirty="0">
                 <a:latin typeface="Arial" panose="020B0604020202020204" pitchFamily="34" charset="0"/>
               </a:rPr>
-              <a:t>, … Last Author</a:t>
-            </a:r>
-            <a:r>
-              <a:rPr lang="en-US" sz="4800" i="1" baseline="30000" dirty="0">
-                <a:latin typeface="Arial" panose="020B0604020202020204" pitchFamily="34" charset="0"/>
-              </a:rPr>
-              <a:t>1</a:t>
+              <a:t>, Anna Till</a:t>
             </a:r>
             <a:endParaRPr lang="de-AT" sz="4800" i="1" dirty="0">
               <a:latin typeface="Arial" panose="020B0604020202020204" pitchFamily="34" charset="0"/>
@@ -1713,12 +1734,6 @@
           </a:lstStyle>
           <a:p>
             <a:r>
-              <a:rPr lang="en-US" sz="3600" i="1" baseline="30000" dirty="0">
-                <a:latin typeface="Arial" panose="020B0604020202020204" pitchFamily="34" charset="0"/>
-              </a:rPr>
-              <a:t>1</a:t>
-            </a:r>
-            <a:r>
               <a:rPr lang="en-US" sz="3600" i="1" dirty="0">
                 <a:latin typeface="Arial" panose="020B0604020202020204" pitchFamily="34" charset="0"/>
               </a:rPr>
@@ -1756,8 +1771,8 @@
         </p:nvSpPr>
         <p:spPr>
           <a:xfrm rot="16200000">
-            <a:off x="7512685" y="3332481"/>
-            <a:ext cx="683260" cy="12600305"/>
+            <a:off x="7585510" y="2320947"/>
+            <a:ext cx="709053" cy="12863200"/>
           </a:xfrm>
           <a:prstGeom prst="snip2DiagRect">
             <a:avLst/>
@@ -1801,7 +1816,7 @@
           <a:lstStyle/>
           <a:p>
             <a:pPr algn="ctr"/>
-            <a:endParaRPr lang="zh-CN" altLang="en-US"/>
+            <a:endParaRPr lang="zh-CN" altLang="en-US" dirty="0"/>
           </a:p>
         </p:txBody>
       </p:sp>
@@ -1819,8 +1834,8 @@
         </p:nvSpPr>
         <p:spPr>
           <a:xfrm>
-            <a:off x="1554481" y="10072372"/>
-            <a:ext cx="12600305" cy="8410367"/>
+            <a:off x="1605519" y="9225673"/>
+            <a:ext cx="12547356" cy="3931692"/>
           </a:xfrm>
           <a:prstGeom prst="roundRect">
             <a:avLst>
@@ -1877,8 +1892,8 @@
         </p:nvSpPr>
         <p:spPr>
           <a:xfrm>
-            <a:off x="1823086" y="10345809"/>
-            <a:ext cx="12099925" cy="3550740"/>
+            <a:off x="1822451" y="9405252"/>
+            <a:ext cx="11963398" cy="3550740"/>
           </a:xfrm>
           <a:prstGeom prst="rect">
             <a:avLst/>
@@ -1890,6 +1905,22 @@
             <a:noAutofit/>
           </a:bodyPr>
           <a:lstStyle/>
+          <a:p>
+            <a:pPr algn="just">
+              <a:spcAft>
+                <a:spcPts val="1200"/>
+              </a:spcAft>
+            </a:pPr>
+            <a:r>
+              <a:rPr lang="en-US" sz="2400" b="1" dirty="0">
+                <a:latin typeface="Arial" panose="020B0604020202020204" pitchFamily="34" charset="0"/>
+                <a:ea typeface="思源黑体 CN Regular" panose="020B0500000000000000" charset="-122"/>
+                <a:cs typeface="Arial" panose="020B0604020202020204" pitchFamily="34" charset="0"/>
+                <a:sym typeface="+mn-ea"/>
+              </a:rPr>
+              <a:t>Dataset 1:</a:t>
+            </a:r>
+          </a:p>
           <a:p>
             <a:pPr algn="just">
               <a:spcAft>
@@ -1903,16 +1934,66 @@
                 <a:cs typeface="Arial" panose="020B0604020202020204" pitchFamily="34" charset="0"/>
                 <a:sym typeface="+mn-ea"/>
               </a:rPr>
-              <a:t>The Dataset [1]</a:t>
-            </a:r>
-          </a:p>
-          <a:p>
-            <a:pPr marL="457192" indent="-457192" algn="just">
+              <a:t>Structure description</a:t>
+            </a:r>
+          </a:p>
+          <a:p>
+            <a:pPr algn="just">
               <a:spcAft>
                 <a:spcPts val="1200"/>
               </a:spcAft>
-              <a:buFont typeface="Arial" panose="020B0604020202020204" pitchFamily="34" charset="0"/>
-              <a:buChar char="•"/>
+            </a:pPr>
+            <a:endParaRPr lang="en-US" sz="2400" dirty="0">
+              <a:latin typeface="Arial" panose="020B0604020202020204" pitchFamily="34" charset="0"/>
+              <a:ea typeface="思源黑体 CN Regular" panose="020B0500000000000000" charset="-122"/>
+              <a:cs typeface="Arial" panose="020B0604020202020204" pitchFamily="34" charset="0"/>
+              <a:sym typeface="+mn-ea"/>
+            </a:endParaRPr>
+          </a:p>
+          <a:p>
+            <a:pPr algn="just">
+              <a:spcAft>
+                <a:spcPts val="1200"/>
+              </a:spcAft>
+            </a:pPr>
+            <a:endParaRPr lang="en-US" sz="2400" dirty="0">
+              <a:latin typeface="Arial" panose="020B0604020202020204" pitchFamily="34" charset="0"/>
+              <a:ea typeface="思源黑体 CN Regular" panose="020B0500000000000000" charset="-122"/>
+              <a:cs typeface="Arial" panose="020B0604020202020204" pitchFamily="34" charset="0"/>
+              <a:sym typeface="+mn-ea"/>
+            </a:endParaRPr>
+          </a:p>
+          <a:p>
+            <a:pPr algn="just">
+              <a:spcAft>
+                <a:spcPts val="1200"/>
+              </a:spcAft>
+            </a:pPr>
+            <a:endParaRPr lang="en-US" sz="2400" dirty="0">
+              <a:latin typeface="Arial" panose="020B0604020202020204" pitchFamily="34" charset="0"/>
+              <a:ea typeface="思源黑体 CN Regular" panose="020B0500000000000000" charset="-122"/>
+              <a:cs typeface="Arial" panose="020B0604020202020204" pitchFamily="34" charset="0"/>
+              <a:sym typeface="+mn-ea"/>
+            </a:endParaRPr>
+          </a:p>
+          <a:p>
+            <a:pPr algn="just">
+              <a:spcAft>
+                <a:spcPts val="1200"/>
+              </a:spcAft>
+            </a:pPr>
+            <a:endParaRPr lang="en-US" sz="2400" dirty="0">
+              <a:latin typeface="Arial" panose="020B0604020202020204" pitchFamily="34" charset="0"/>
+              <a:ea typeface="思源黑体 CN Regular" panose="020B0500000000000000" charset="-122"/>
+              <a:cs typeface="Arial" panose="020B0604020202020204" pitchFamily="34" charset="0"/>
+              <a:sym typeface="+mn-ea"/>
+            </a:endParaRPr>
+          </a:p>
+          <a:p>
+            <a:pPr algn="just">
+              <a:spcAft>
+                <a:spcPts val="1200"/>
+              </a:spcAft>
             </a:pPr>
             <a:r>
               <a:rPr lang="en-US" sz="2400" dirty="0">
@@ -1921,43 +2002,7 @@
                 <a:cs typeface="Arial" panose="020B0604020202020204" pitchFamily="34" charset="0"/>
                 <a:sym typeface="+mn-ea"/>
               </a:rPr>
-              <a:t>Many real-world problems have multiple conflicting objectives, which cannot be optimal at the same time. Therefore, single RL policy must trade-off between different objectives. </a:t>
-            </a:r>
-          </a:p>
-          <a:p>
-            <a:pPr marL="457192" indent="-457192" algn="just">
-              <a:spcAft>
-                <a:spcPts val="1200"/>
-              </a:spcAft>
-              <a:buFont typeface="Arial" panose="020B0604020202020204" pitchFamily="34" charset="0"/>
-              <a:buChar char="•"/>
-            </a:pPr>
-            <a:r>
-              <a:rPr lang="en-US" sz="2400" dirty="0">
-                <a:latin typeface="Arial" panose="020B0604020202020204" pitchFamily="34" charset="0"/>
-                <a:ea typeface="思源黑体 CN Regular" panose="020B0500000000000000" charset="-122"/>
-                <a:cs typeface="Arial" panose="020B0604020202020204" pitchFamily="34" charset="0"/>
-                <a:sym typeface="+mn-ea"/>
-              </a:rPr>
-              <a:t>Several research has been conducted in the field of single-agent multi-objective RL, but existing approaches cannot solve the multi-agent </a:t>
-            </a:r>
-            <a:r>
-              <a:rPr lang="en-US" altLang="zh-CN" sz="2400" dirty="0">
-                <a:latin typeface="Arial" panose="020B0604020202020204" pitchFamily="34" charset="0"/>
-                <a:ea typeface="思源黑体 CN Regular" panose="020B0500000000000000" charset="-122"/>
-                <a:cs typeface="Arial" panose="020B0604020202020204" pitchFamily="34" charset="0"/>
-                <a:sym typeface="+mn-ea"/>
-              </a:rPr>
-              <a:t>multi-objective</a:t>
-            </a:r>
-            <a:r>
-              <a:rPr lang="en-US" sz="2400" dirty="0">
-                <a:latin typeface="Arial" panose="020B0604020202020204" pitchFamily="34" charset="0"/>
-                <a:ea typeface="思源黑体 CN Regular" panose="020B0500000000000000" charset="-122"/>
-                <a:cs typeface="Arial" panose="020B0604020202020204" pitchFamily="34" charset="0"/>
-                <a:sym typeface="+mn-ea"/>
-              </a:rPr>
-              <a:t> decision-making problem. </a:t>
+              <a:t>		Dog distribution (absolute) </a:t>
             </a:r>
           </a:p>
         </p:txBody>
@@ -1980,7 +2025,7 @@
         </p:nvSpPr>
         <p:spPr>
           <a:xfrm>
-            <a:off x="1800226" y="9208136"/>
+            <a:off x="1668299" y="8414920"/>
             <a:ext cx="8517255" cy="830997"/>
           </a:xfrm>
           <a:prstGeom prst="rect">
@@ -2004,7 +2049,7 @@
                 <a:ea typeface="思源黑体 CN Medium" panose="020B0600000000000000" charset="-122"/>
                 <a:cs typeface="Arial" panose="020B0604020202020204" pitchFamily="34" charset="0"/>
               </a:rPr>
-              <a:t>Dataset Description</a:t>
+              <a:t>Datasets Description</a:t>
             </a:r>
           </a:p>
         </p:txBody>
@@ -2023,7 +2068,7 @@
         </p:nvSpPr>
         <p:spPr>
           <a:xfrm rot="16200000">
-            <a:off x="34804508" y="16978533"/>
+            <a:off x="34804827" y="16598293"/>
             <a:ext cx="683260" cy="12600305"/>
           </a:xfrm>
           <a:prstGeom prst="snip2DiagRect">
@@ -2086,8 +2131,8 @@
         </p:nvSpPr>
         <p:spPr>
           <a:xfrm>
-            <a:off x="28846304" y="23718425"/>
-            <a:ext cx="12600305" cy="5205370"/>
+            <a:off x="28776619" y="23545112"/>
+            <a:ext cx="12600305" cy="4919009"/>
           </a:xfrm>
           <a:prstGeom prst="roundRect">
             <a:avLst>
@@ -2144,7 +2189,7 @@
         </p:nvSpPr>
         <p:spPr>
           <a:xfrm>
-            <a:off x="29114909" y="23991862"/>
+            <a:off x="29114909" y="23620782"/>
             <a:ext cx="12099925" cy="4472262"/>
           </a:xfrm>
           <a:prstGeom prst="rect">
@@ -2279,7 +2324,7 @@
         </p:nvSpPr>
         <p:spPr>
           <a:xfrm>
-            <a:off x="29092049" y="22854050"/>
+            <a:off x="29092049" y="22409079"/>
             <a:ext cx="8517255" cy="830997"/>
           </a:xfrm>
           <a:prstGeom prst="rect">
@@ -2322,8 +2367,8 @@
         </p:nvSpPr>
         <p:spPr>
           <a:xfrm rot="16200000">
-            <a:off x="7512366" y="-1563369"/>
-            <a:ext cx="683260" cy="12600305"/>
+            <a:off x="7666955" y="-1717957"/>
+            <a:ext cx="636977" cy="12863199"/>
           </a:xfrm>
           <a:prstGeom prst="snip2DiagRect">
             <a:avLst/>
@@ -2385,8 +2430,8 @@
         </p:nvSpPr>
         <p:spPr>
           <a:xfrm>
-            <a:off x="1554162" y="5176522"/>
-            <a:ext cx="12600305" cy="3726068"/>
+            <a:off x="1554163" y="5176522"/>
+            <a:ext cx="12598712" cy="3045139"/>
           </a:xfrm>
           <a:prstGeom prst="roundRect">
             <a:avLst>
@@ -2443,8 +2488,8 @@
         </p:nvSpPr>
         <p:spPr>
           <a:xfrm>
-            <a:off x="1822767" y="5449959"/>
-            <a:ext cx="12099925" cy="3452631"/>
+            <a:off x="1822768" y="5449960"/>
+            <a:ext cx="12099608" cy="2518472"/>
           </a:xfrm>
           <a:prstGeom prst="rect">
             <a:avLst/>
@@ -2469,7 +2514,7 @@
                 <a:cs typeface="Arial" panose="020B0604020202020204" pitchFamily="34" charset="0"/>
                 <a:sym typeface="+mn-ea"/>
               </a:rPr>
-              <a:t>Crime victimization data in Chicago serves as a critical window into urban safety dynamics. Several research has been conducted in …</a:t>
+              <a:t>Dog ownership in Vienna is very popular. In order to explore this Group’s several hypotheses, three Datasets were explored: One containing the aggregated density of dogs per district as well as absolute number since 2002, the other two containing the count of individual dog breeds per district. The latter were combined to one dataset, since it contained the same info for different reference years. </a:t>
             </a:r>
           </a:p>
         </p:txBody>
@@ -2535,7 +2580,7 @@
         </p:nvSpPr>
         <p:spPr>
           <a:xfrm rot="16200000">
-            <a:off x="34804508" y="8273941"/>
+            <a:off x="34590673" y="7024843"/>
             <a:ext cx="683260" cy="12600305"/>
           </a:xfrm>
           <a:prstGeom prst="snip2DiagRect">
@@ -2598,8 +2643,8 @@
         </p:nvSpPr>
         <p:spPr>
           <a:xfrm>
-            <a:off x="28846304" y="15013832"/>
-            <a:ext cx="12600305" cy="7424188"/>
+            <a:off x="28790491" y="14040380"/>
+            <a:ext cx="12734777" cy="8063662"/>
           </a:xfrm>
           <a:prstGeom prst="roundRect">
             <a:avLst>
@@ -2656,7 +2701,7 @@
         </p:nvSpPr>
         <p:spPr>
           <a:xfrm>
-            <a:off x="29114909" y="15287269"/>
+            <a:off x="29092049" y="14620568"/>
             <a:ext cx="12099925" cy="7208766"/>
           </a:xfrm>
           <a:prstGeom prst="rect">
@@ -2702,83 +2747,6 @@
       </p:sp>
       <p:sp>
         <p:nvSpPr>
-          <p:cNvPr id="32" name="文本框 28">
-            <a:extLst>
-              <a:ext uri="{FF2B5EF4-FFF2-40B4-BE49-F238E27FC236}">
-                <a16:creationId xmlns:a16="http://schemas.microsoft.com/office/drawing/2014/main" id="{B3826FFE-D7E5-0EE2-B873-74E2BD108522}"/>
-              </a:ext>
-            </a:extLst>
-          </p:cNvPr>
-          <p:cNvSpPr txBox="1"/>
-          <p:nvPr>
-            <p:custDataLst>
-              <p:tags r:id="rId8"/>
-            </p:custDataLst>
-          </p:nvPr>
-        </p:nvSpPr>
-        <p:spPr>
-          <a:xfrm>
-            <a:off x="29092049" y="14063871"/>
-            <a:ext cx="8517255" cy="830997"/>
-          </a:xfrm>
-          <a:prstGeom prst="rect">
-            <a:avLst/>
-          </a:prstGeom>
-          <a:noFill/>
-        </p:spPr>
-        <p:txBody>
-          <a:bodyPr wrap="square" rtlCol="0">
-            <a:spAutoFit/>
-          </a:bodyPr>
-          <a:lstStyle/>
-          <a:p>
-            <a:pPr algn="l"/>
-            <a:r>
-              <a:rPr lang="en-US" sz="4800" dirty="0">
-                <a:solidFill>
-                  <a:schemeClr val="bg1"/>
-                </a:solidFill>
-                <a:latin typeface="Arial" panose="020B0604020202020204" pitchFamily="34" charset="0"/>
-                <a:ea typeface="思源黑体 CN Medium" panose="020B0600000000000000" charset="-122"/>
-                <a:cs typeface="Arial" panose="020B0604020202020204" pitchFamily="34" charset="0"/>
-              </a:rPr>
-              <a:t>Hypothesis N</a:t>
-            </a:r>
-          </a:p>
-        </p:txBody>
-      </p:sp>
-      <p:pic>
-        <p:nvPicPr>
-          <p:cNvPr id="34" name="Picture 33">
-            <a:extLst>
-              <a:ext uri="{FF2B5EF4-FFF2-40B4-BE49-F238E27FC236}">
-                <a16:creationId xmlns:a16="http://schemas.microsoft.com/office/drawing/2014/main" id="{1C2FE3F8-2FD1-0F62-3010-AE1015258737}"/>
-              </a:ext>
-            </a:extLst>
-          </p:cNvPr>
-          <p:cNvPicPr>
-            <a:picLocks noChangeAspect="1"/>
-          </p:cNvPicPr>
-          <p:nvPr/>
-        </p:nvPicPr>
-        <p:blipFill>
-          <a:blip r:embed="rId14"/>
-          <a:stretch>
-            <a:fillRect/>
-          </a:stretch>
-        </p:blipFill>
-        <p:spPr>
-          <a:xfrm>
-            <a:off x="1707038" y="12696115"/>
-            <a:ext cx="12163907" cy="5607475"/>
-          </a:xfrm>
-          <a:prstGeom prst="rect">
-            <a:avLst/>
-          </a:prstGeom>
-        </p:spPr>
-      </p:pic>
-      <p:sp>
-        <p:nvSpPr>
           <p:cNvPr id="35" name="剪去对角的矩形 9">
             <a:extLst>
               <a:ext uri="{FF2B5EF4-FFF2-40B4-BE49-F238E27FC236}">
@@ -2791,8 +2759,8 @@
         </p:nvSpPr>
         <p:spPr>
           <a:xfrm rot="16200000">
-            <a:off x="7512049" y="13065421"/>
-            <a:ext cx="683260" cy="12600305"/>
+            <a:off x="21139485" y="12463281"/>
+            <a:ext cx="770023" cy="13735814"/>
           </a:xfrm>
           <a:prstGeom prst="snip2DiagRect">
             <a:avLst/>
@@ -2860,8 +2828,8 @@
         </p:nvSpPr>
         <p:spPr>
           <a:xfrm>
-            <a:off x="1553845" y="19805311"/>
-            <a:ext cx="12600305" cy="8286072"/>
+            <a:off x="1625441" y="24174634"/>
+            <a:ext cx="12527433" cy="4250575"/>
           </a:xfrm>
           <a:prstGeom prst="roundRect">
             <a:avLst>
@@ -2912,13 +2880,13 @@
           <p:cNvSpPr txBox="1"/>
           <p:nvPr>
             <p:custDataLst>
-              <p:tags r:id="rId9"/>
+              <p:tags r:id="rId8"/>
             </p:custDataLst>
           </p:nvPr>
         </p:nvSpPr>
         <p:spPr>
           <a:xfrm>
-            <a:off x="1822450" y="20078749"/>
+            <a:off x="14938106" y="20235517"/>
             <a:ext cx="12099925" cy="6994231"/>
           </a:xfrm>
           <a:prstGeom prst="rect">
@@ -2961,13 +2929,13 @@
           <p:cNvSpPr txBox="1"/>
           <p:nvPr>
             <p:custDataLst>
-              <p:tags r:id="rId10"/>
+              <p:tags r:id="rId9"/>
             </p:custDataLst>
           </p:nvPr>
         </p:nvSpPr>
         <p:spPr>
           <a:xfrm>
-            <a:off x="1822450" y="18950074"/>
+            <a:off x="14828204" y="18885204"/>
             <a:ext cx="10744836" cy="830997"/>
           </a:xfrm>
           <a:prstGeom prst="rect">
@@ -2991,41 +2959,11 @@
                 <a:ea typeface="思源黑体 CN Medium" panose="020B0600000000000000" charset="-122"/>
                 <a:cs typeface="Arial" panose="020B0604020202020204" pitchFamily="34" charset="0"/>
               </a:rPr>
-              <a:t>Demographics and Incident Severity</a:t>
+              <a:t>Hypothesis 3</a:t>
             </a:r>
           </a:p>
         </p:txBody>
       </p:sp>
-      <p:pic>
-        <p:nvPicPr>
-          <p:cNvPr id="40" name="Picture 39">
-            <a:extLst>
-              <a:ext uri="{FF2B5EF4-FFF2-40B4-BE49-F238E27FC236}">
-                <a16:creationId xmlns:a16="http://schemas.microsoft.com/office/drawing/2014/main" id="{059E9E9B-7D64-7F1C-7DE8-93BA98CA32D7}"/>
-              </a:ext>
-            </a:extLst>
-          </p:cNvPr>
-          <p:cNvPicPr>
-            <a:picLocks noChangeAspect="1"/>
-          </p:cNvPicPr>
-          <p:nvPr/>
-        </p:nvPicPr>
-        <p:blipFill>
-          <a:blip r:embed="rId15"/>
-          <a:stretch>
-            <a:fillRect/>
-          </a:stretch>
-        </p:blipFill>
-        <p:spPr>
-          <a:xfrm>
-            <a:off x="1973764" y="23719747"/>
-            <a:ext cx="6477904" cy="3162741"/>
-          </a:xfrm>
-          <a:prstGeom prst="rect">
-            <a:avLst/>
-          </a:prstGeom>
-        </p:spPr>
-      </p:pic>
       <p:sp>
         <p:nvSpPr>
           <p:cNvPr id="41" name="剪去对角的矩形 9">
@@ -3040,8 +2978,8 @@
         </p:nvSpPr>
         <p:spPr>
           <a:xfrm rot="16200000">
-            <a:off x="21157641" y="-1563368"/>
-            <a:ext cx="683260" cy="12600305"/>
+            <a:off x="21169245" y="3359386"/>
+            <a:ext cx="830997" cy="13803830"/>
           </a:xfrm>
           <a:prstGeom prst="snip2DiagRect">
             <a:avLst/>
@@ -3103,8 +3041,8 @@
         </p:nvSpPr>
         <p:spPr>
           <a:xfrm>
-            <a:off x="15199437" y="5176522"/>
-            <a:ext cx="12600305" cy="11094200"/>
+            <a:off x="14962000" y="10997441"/>
+            <a:ext cx="13227993" cy="7697606"/>
           </a:xfrm>
           <a:prstGeom prst="roundRect">
             <a:avLst>
@@ -3155,14 +3093,14 @@
           <p:cNvSpPr txBox="1"/>
           <p:nvPr>
             <p:custDataLst>
-              <p:tags r:id="rId11"/>
+              <p:tags r:id="rId10"/>
             </p:custDataLst>
           </p:nvPr>
         </p:nvSpPr>
         <p:spPr>
           <a:xfrm>
-            <a:off x="15468042" y="5449960"/>
-            <a:ext cx="12099925" cy="6994231"/>
+            <a:off x="15123631" y="11169795"/>
+            <a:ext cx="12793588" cy="7464283"/>
           </a:xfrm>
           <a:prstGeom prst="rect">
             <a:avLst/>
@@ -3181,13 +3119,186 @@
               </a:spcAft>
             </a:pPr>
             <a:r>
-              <a:rPr lang="en-US" sz="2400" dirty="0">
+              <a:rPr lang="en-GB" sz="2400" b="1" dirty="0">
                 <a:latin typeface="Arial" panose="020B0604020202020204" pitchFamily="34" charset="0"/>
                 <a:ea typeface="思源黑体 CN Regular" panose="020B0500000000000000" charset="-122"/>
                 <a:cs typeface="Arial" panose="020B0604020202020204" pitchFamily="34" charset="0"/>
                 <a:sym typeface="+mn-ea"/>
               </a:rPr>
-              <a:t>We design an outer-loop multi-objective approach for comparison. It uses an outer loop to search for preferences and uses QMIX to learn policies. To ensure a fair comparison, both the baseline method and our proposed method are tested and compared in the same environment settings. </a:t>
+              <a:t>There is a positive correlation between the ownership of </a:t>
+            </a:r>
+            <a:r>
+              <a:rPr lang="en-GB" sz="2400" b="1" dirty="0" err="1">
+                <a:latin typeface="Arial" panose="020B0604020202020204" pitchFamily="34" charset="0"/>
+                <a:ea typeface="思源黑体 CN Regular" panose="020B0500000000000000" charset="-122"/>
+                <a:cs typeface="Arial" panose="020B0604020202020204" pitchFamily="34" charset="0"/>
+                <a:sym typeface="+mn-ea"/>
+              </a:rPr>
+              <a:t>Listenhunde</a:t>
+            </a:r>
+            <a:r>
+              <a:rPr lang="en-GB" sz="2400" b="1" dirty="0">
+                <a:latin typeface="Arial" panose="020B0604020202020204" pitchFamily="34" charset="0"/>
+                <a:ea typeface="思源黑体 CN Regular" panose="020B0500000000000000" charset="-122"/>
+                <a:cs typeface="Arial" panose="020B0604020202020204" pitchFamily="34" charset="0"/>
+                <a:sym typeface="+mn-ea"/>
+              </a:rPr>
+              <a:t> and district, with a higher prevalence of </a:t>
+            </a:r>
+            <a:r>
+              <a:rPr lang="en-GB" sz="2400" b="1" dirty="0" err="1">
+                <a:latin typeface="Arial" panose="020B0604020202020204" pitchFamily="34" charset="0"/>
+                <a:ea typeface="思源黑体 CN Regular" panose="020B0500000000000000" charset="-122"/>
+                <a:cs typeface="Arial" panose="020B0604020202020204" pitchFamily="34" charset="0"/>
+                <a:sym typeface="+mn-ea"/>
+              </a:rPr>
+              <a:t>Listenhunde</a:t>
+            </a:r>
+            <a:r>
+              <a:rPr lang="en-GB" sz="2400" b="1" dirty="0">
+                <a:latin typeface="Arial" panose="020B0604020202020204" pitchFamily="34" charset="0"/>
+                <a:ea typeface="思源黑体 CN Regular" panose="020B0500000000000000" charset="-122"/>
+                <a:cs typeface="Arial" panose="020B0604020202020204" pitchFamily="34" charset="0"/>
+                <a:sym typeface="+mn-ea"/>
+              </a:rPr>
+              <a:t> ownership in outer </a:t>
+            </a:r>
+            <a:r>
+              <a:rPr lang="en-GB" sz="2400" b="1" dirty="0" err="1">
+                <a:latin typeface="Arial" panose="020B0604020202020204" pitchFamily="34" charset="0"/>
+                <a:ea typeface="思源黑体 CN Regular" panose="020B0500000000000000" charset="-122"/>
+                <a:cs typeface="Arial" panose="020B0604020202020204" pitchFamily="34" charset="0"/>
+                <a:sym typeface="+mn-ea"/>
+              </a:rPr>
+              <a:t>viennese</a:t>
+            </a:r>
+            <a:r>
+              <a:rPr lang="en-GB" sz="2400" b="1" dirty="0">
+                <a:latin typeface="Arial" panose="020B0604020202020204" pitchFamily="34" charset="0"/>
+                <a:ea typeface="思源黑体 CN Regular" panose="020B0500000000000000" charset="-122"/>
+                <a:cs typeface="Arial" panose="020B0604020202020204" pitchFamily="34" charset="0"/>
+                <a:sym typeface="+mn-ea"/>
+              </a:rPr>
+              <a:t> districts compared to inner districts.			</a:t>
+            </a:r>
+          </a:p>
+          <a:p>
+            <a:pPr algn="just">
+              <a:spcAft>
+                <a:spcPts val="1200"/>
+              </a:spcAft>
+            </a:pPr>
+            <a:r>
+              <a:rPr lang="en-US" sz="2400" b="1" dirty="0">
+                <a:latin typeface="Times New Roman" panose="02020603050405020304" pitchFamily="18" charset="0"/>
+                <a:ea typeface="思源黑体 CN Regular" panose="020B0500000000000000" charset="-122"/>
+                <a:cs typeface="Times New Roman" panose="02020603050405020304" pitchFamily="18" charset="0"/>
+                <a:sym typeface="+mn-ea"/>
+              </a:rPr>
+              <a:t>			            </a:t>
+            </a:r>
+            <a:r>
+              <a:rPr lang="en-US" sz="1200" b="1" dirty="0">
+                <a:latin typeface="Times New Roman" panose="02020603050405020304" pitchFamily="18" charset="0"/>
+                <a:ea typeface="思源黑体 CN Regular" panose="020B0500000000000000" charset="-122"/>
+                <a:cs typeface="Times New Roman" panose="02020603050405020304" pitchFamily="18" charset="0"/>
+                <a:sym typeface="+mn-ea"/>
+              </a:rPr>
+              <a:t>maybe there is a 			                        correlation? </a:t>
+            </a:r>
+          </a:p>
+          <a:p>
+            <a:pPr algn="just">
+              <a:spcAft>
+                <a:spcPts val="1200"/>
+              </a:spcAft>
+            </a:pPr>
+            <a:endParaRPr lang="en-US" sz="2400" b="1" dirty="0">
+              <a:latin typeface="Times New Roman" panose="02020603050405020304" pitchFamily="18" charset="0"/>
+              <a:ea typeface="思源黑体 CN Regular" panose="020B0500000000000000" charset="-122"/>
+              <a:cs typeface="Times New Roman" panose="02020603050405020304" pitchFamily="18" charset="0"/>
+              <a:sym typeface="+mn-ea"/>
+            </a:endParaRPr>
+          </a:p>
+          <a:p>
+            <a:pPr algn="just">
+              <a:spcAft>
+                <a:spcPts val="1200"/>
+              </a:spcAft>
+            </a:pPr>
+            <a:endParaRPr lang="en-US" sz="2400" b="1" dirty="0">
+              <a:latin typeface="Times New Roman" panose="02020603050405020304" pitchFamily="18" charset="0"/>
+              <a:ea typeface="思源黑体 CN Regular" panose="020B0500000000000000" charset="-122"/>
+              <a:cs typeface="Times New Roman" panose="02020603050405020304" pitchFamily="18" charset="0"/>
+              <a:sym typeface="+mn-ea"/>
+            </a:endParaRPr>
+          </a:p>
+          <a:p>
+            <a:pPr algn="just">
+              <a:spcAft>
+                <a:spcPts val="1200"/>
+              </a:spcAft>
+            </a:pPr>
+            <a:endParaRPr lang="en-US" sz="2400" b="1" dirty="0">
+              <a:latin typeface="Times New Roman" panose="02020603050405020304" pitchFamily="18" charset="0"/>
+              <a:ea typeface="思源黑体 CN Regular" panose="020B0500000000000000" charset="-122"/>
+              <a:cs typeface="Times New Roman" panose="02020603050405020304" pitchFamily="18" charset="0"/>
+              <a:sym typeface="+mn-ea"/>
+            </a:endParaRPr>
+          </a:p>
+          <a:p>
+            <a:pPr algn="just">
+              <a:spcAft>
+                <a:spcPts val="1200"/>
+              </a:spcAft>
+            </a:pPr>
+            <a:endParaRPr lang="en-US" sz="2400" b="1" dirty="0">
+              <a:latin typeface="Times New Roman" panose="02020603050405020304" pitchFamily="18" charset="0"/>
+              <a:ea typeface="思源黑体 CN Regular" panose="020B0500000000000000" charset="-122"/>
+              <a:cs typeface="Times New Roman" panose="02020603050405020304" pitchFamily="18" charset="0"/>
+              <a:sym typeface="+mn-ea"/>
+            </a:endParaRPr>
+          </a:p>
+          <a:p>
+            <a:pPr algn="just">
+              <a:spcAft>
+                <a:spcPts val="1200"/>
+              </a:spcAft>
+            </a:pPr>
+            <a:endParaRPr lang="en-US" sz="2400" b="1" dirty="0">
+              <a:latin typeface="Times New Roman" panose="02020603050405020304" pitchFamily="18" charset="0"/>
+              <a:ea typeface="思源黑体 CN Regular" panose="020B0500000000000000" charset="-122"/>
+              <a:cs typeface="Times New Roman" panose="02020603050405020304" pitchFamily="18" charset="0"/>
+              <a:sym typeface="+mn-ea"/>
+            </a:endParaRPr>
+          </a:p>
+          <a:p>
+            <a:pPr algn="just">
+              <a:spcAft>
+                <a:spcPts val="1200"/>
+              </a:spcAft>
+            </a:pPr>
+            <a:endParaRPr lang="en-US" sz="2400" b="1" dirty="0">
+              <a:latin typeface="Times New Roman" panose="02020603050405020304" pitchFamily="18" charset="0"/>
+              <a:ea typeface="思源黑体 CN Regular" panose="020B0500000000000000" charset="-122"/>
+              <a:cs typeface="Times New Roman" panose="02020603050405020304" pitchFamily="18" charset="0"/>
+              <a:sym typeface="+mn-ea"/>
+            </a:endParaRPr>
+          </a:p>
+          <a:p>
+            <a:pPr algn="just">
+              <a:spcAft>
+                <a:spcPts val="1200"/>
+              </a:spcAft>
+            </a:pPr>
+            <a:r>
+              <a:rPr lang="en-US" sz="2400" b="1" dirty="0">
+                <a:latin typeface="Times New Roman" panose="02020603050405020304" pitchFamily="18" charset="0"/>
+                <a:ea typeface="思源黑体 CN Regular" panose="020B0500000000000000" charset="-122"/>
+                <a:cs typeface="Times New Roman" panose="02020603050405020304" pitchFamily="18" charset="0"/>
+                <a:sym typeface="+mn-ea"/>
+              </a:rPr>
+              <a:t>		          </a:t>
             </a:r>
           </a:p>
           <a:p>
@@ -3223,22 +3334,9 @@
               </a:spcAft>
             </a:pPr>
             <a:endParaRPr lang="en-US" sz="2400" dirty="0">
-              <a:latin typeface="Times New Roman" panose="02020603050405020304" pitchFamily="18" charset="0"/>
+              <a:latin typeface="Arial" panose="020B0604020202020204" pitchFamily="34" charset="0"/>
               <a:ea typeface="思源黑体 CN Regular" panose="020B0500000000000000" charset="-122"/>
-              <a:cs typeface="Times New Roman" panose="02020603050405020304" pitchFamily="18" charset="0"/>
-              <a:sym typeface="+mn-ea"/>
-            </a:endParaRPr>
-          </a:p>
-          <a:p>
-            <a:pPr algn="just">
-              <a:spcAft>
-                <a:spcPts val="1200"/>
-              </a:spcAft>
-            </a:pPr>
-            <a:endParaRPr lang="en-US" sz="2400" dirty="0">
-              <a:latin typeface="Times New Roman" panose="02020603050405020304" pitchFamily="18" charset="0"/>
-              <a:ea typeface="思源黑体 CN Regular" panose="020B0500000000000000" charset="-122"/>
-              <a:cs typeface="Times New Roman" panose="02020603050405020304" pitchFamily="18" charset="0"/>
+              <a:cs typeface="Arial" panose="020B0604020202020204" pitchFamily="34" charset="0"/>
               <a:sym typeface="+mn-ea"/>
             </a:endParaRPr>
           </a:p>
@@ -3255,48 +3353,6 @@
               <a:sym typeface="+mn-ea"/>
             </a:endParaRPr>
           </a:p>
-          <a:p>
-            <a:pPr algn="just">
-              <a:spcAft>
-                <a:spcPts val="1200"/>
-              </a:spcAft>
-            </a:pPr>
-            <a:endParaRPr lang="en-US" sz="2400" dirty="0">
-              <a:latin typeface="Arial" panose="020B0604020202020204" pitchFamily="34" charset="0"/>
-              <a:ea typeface="思源黑体 CN Regular" panose="020B0500000000000000" charset="-122"/>
-              <a:cs typeface="Arial" panose="020B0604020202020204" pitchFamily="34" charset="0"/>
-              <a:sym typeface="+mn-ea"/>
-            </a:endParaRPr>
-          </a:p>
-          <a:p>
-            <a:pPr algn="just">
-              <a:spcAft>
-                <a:spcPts val="1200"/>
-              </a:spcAft>
-            </a:pPr>
-            <a:r>
-              <a:rPr lang="en-US" sz="2400" dirty="0">
-                <a:latin typeface="Arial" panose="020B0604020202020204" pitchFamily="34" charset="0"/>
-                <a:ea typeface="思源黑体 CN Regular" panose="020B0500000000000000" charset="-122"/>
-                <a:cs typeface="Arial" panose="020B0604020202020204" pitchFamily="34" charset="0"/>
-                <a:sym typeface="+mn-ea"/>
-              </a:rPr>
-              <a:t>The movement of the non-dominated set during the entire training process. The figure shows the non-dominated set for episodes 5,000, 10,000, 20,000, 40,000, and 75,000 respectively.</a:t>
-            </a:r>
-          </a:p>
-          <a:p>
-            <a:pPr algn="just">
-              <a:spcAft>
-                <a:spcPts val="1200"/>
-              </a:spcAft>
-            </a:pPr>
-            <a:endParaRPr lang="en-US" sz="2400" dirty="0">
-              <a:latin typeface="Arial" panose="020B0604020202020204" pitchFamily="34" charset="0"/>
-              <a:ea typeface="思源黑体 CN Regular" panose="020B0500000000000000" charset="-122"/>
-              <a:cs typeface="Arial" panose="020B0604020202020204" pitchFamily="34" charset="0"/>
-              <a:sym typeface="+mn-ea"/>
-            </a:endParaRPr>
-          </a:p>
         </p:txBody>
       </p:sp>
       <p:sp>
@@ -3311,13 +3367,13 @@
           <p:cNvSpPr txBox="1"/>
           <p:nvPr>
             <p:custDataLst>
-              <p:tags r:id="rId12"/>
+              <p:tags r:id="rId11"/>
             </p:custDataLst>
           </p:nvPr>
         </p:nvSpPr>
         <p:spPr>
           <a:xfrm>
-            <a:off x="15445182" y="4226562"/>
+            <a:off x="15116685" y="9920071"/>
             <a:ext cx="8517255" cy="830997"/>
           </a:xfrm>
           <a:prstGeom prst="rect">
@@ -3341,7 +3397,7 @@
                 <a:ea typeface="思源黑体 CN Medium" panose="020B0600000000000000" charset="-122"/>
                 <a:cs typeface="Arial" panose="020B0604020202020204" pitchFamily="34" charset="0"/>
               </a:rPr>
-              <a:t>Title of Hypothesis 2</a:t>
+              <a:t>Hypothesis 2</a:t>
             </a:r>
           </a:p>
         </p:txBody>
@@ -3361,7 +3417,7 @@
           <p:nvPr/>
         </p:nvPicPr>
         <p:blipFill rotWithShape="1">
-          <a:blip r:embed="rId16"/>
+          <a:blip r:embed="rId17"/>
           <a:srcRect b="11944"/>
           <a:stretch/>
         </p:blipFill>
@@ -3369,78 +3425,6 @@
           <a:xfrm>
             <a:off x="30386220" y="17785852"/>
             <a:ext cx="7727209" cy="4220081"/>
-          </a:xfrm>
-          <a:prstGeom prst="rect">
-            <a:avLst/>
-          </a:prstGeom>
-        </p:spPr>
-      </p:pic>
-      <p:pic>
-        <p:nvPicPr>
-          <p:cNvPr id="54" name="图片 37">
-            <a:extLst>
-              <a:ext uri="{FF2B5EF4-FFF2-40B4-BE49-F238E27FC236}">
-                <a16:creationId xmlns:a16="http://schemas.microsoft.com/office/drawing/2014/main" id="{E9581D1A-86E5-26D5-6EC3-C0F539693D90}"/>
-              </a:ext>
-            </a:extLst>
-          </p:cNvPr>
-          <p:cNvPicPr>
-            <a:picLocks noChangeAspect="1"/>
-          </p:cNvPicPr>
-          <p:nvPr/>
-        </p:nvPicPr>
-        <p:blipFill>
-          <a:blip r:embed="rId17">
-            <a:extLst>
-              <a:ext uri="{28A0092B-C50C-407E-A947-70E740481C1C}">
-                <a14:useLocalDpi xmlns:a14="http://schemas.microsoft.com/office/drawing/2010/main" val="0"/>
-              </a:ext>
-            </a:extLst>
-          </a:blip>
-          <a:stretch>
-            <a:fillRect/>
-          </a:stretch>
-        </p:blipFill>
-        <p:spPr>
-          <a:xfrm>
-            <a:off x="15468041" y="11362436"/>
-            <a:ext cx="10649509" cy="4524293"/>
-          </a:xfrm>
-          <a:prstGeom prst="rect">
-            <a:avLst/>
-          </a:prstGeom>
-        </p:spPr>
-      </p:pic>
-      <p:pic>
-        <p:nvPicPr>
-          <p:cNvPr id="55" name="图片 39" descr="bla">
-            <a:extLst>
-              <a:ext uri="{FF2B5EF4-FFF2-40B4-BE49-F238E27FC236}">
-                <a16:creationId xmlns:a16="http://schemas.microsoft.com/office/drawing/2014/main" id="{07DDEFD8-9E67-465A-6964-0B39110B49A4}"/>
-              </a:ext>
-            </a:extLst>
-          </p:cNvPr>
-          <p:cNvPicPr>
-            <a:picLocks noChangeAspect="1"/>
-          </p:cNvPicPr>
-          <p:nvPr/>
-        </p:nvPicPr>
-        <p:blipFill>
-          <a:blip r:embed="rId18">
-            <a:extLst>
-              <a:ext uri="{28A0092B-C50C-407E-A947-70E740481C1C}">
-                <a14:useLocalDpi xmlns:a14="http://schemas.microsoft.com/office/drawing/2010/main" val="0"/>
-              </a:ext>
-            </a:extLst>
-          </a:blip>
-          <a:stretch>
-            <a:fillRect/>
-          </a:stretch>
-        </p:blipFill>
-        <p:spPr>
-          <a:xfrm>
-            <a:off x="15446759" y="7114598"/>
-            <a:ext cx="11946754" cy="2983250"/>
           </a:xfrm>
           <a:prstGeom prst="rect">
             <a:avLst/>
@@ -3495,7 +3479,7 @@
             </a:r>
             <a:r>
               <a:rPr lang="en-US" sz="2800" dirty="0">
-                <a:hlinkClick r:id="rId19"/>
+                <a:hlinkClick r:id="rId18"/>
               </a:rPr>
               <a:t>https://ec.europa.eu/eurostat/databrowser/view/HLTH_HLYE/default/table?lang=en</a:t>
             </a:r>
@@ -3560,12 +3544,1919 @@
             <a:pPr algn="ctr"/>
             <a:r>
               <a:rPr lang="de-AT" altLang="zh-CN" sz="6600" dirty="0"/>
-              <a:t>Group 0</a:t>
+              <a:t>Group 4</a:t>
             </a:r>
             <a:endParaRPr lang="zh-CN" altLang="en-US" sz="6600" dirty="0"/>
           </a:p>
         </p:txBody>
       </p:sp>
+      <p:pic>
+        <p:nvPicPr>
+          <p:cNvPr id="11" name="Picture 10" descr="A graph of a graph&#10;&#10;Description automatically generated with medium confidence">
+            <a:extLst>
+              <a:ext uri="{FF2B5EF4-FFF2-40B4-BE49-F238E27FC236}">
+                <a16:creationId xmlns:a16="http://schemas.microsoft.com/office/drawing/2014/main" id="{2E0DAF3B-BF39-A6EB-AB9C-DAC51B797167}"/>
+              </a:ext>
+            </a:extLst>
+          </p:cNvPr>
+          <p:cNvPicPr>
+            <a:picLocks noChangeAspect="1"/>
+          </p:cNvPicPr>
+          <p:nvPr/>
+        </p:nvPicPr>
+        <p:blipFill>
+          <a:blip r:embed="rId19">
+            <a:extLst>
+              <a:ext uri="{28A0092B-C50C-407E-A947-70E740481C1C}">
+                <a14:useLocalDpi xmlns:a14="http://schemas.microsoft.com/office/drawing/2010/main" val="0"/>
+              </a:ext>
+            </a:extLst>
+          </a:blip>
+          <a:srcRect l="4902" r="6687" b="5073"/>
+          <a:stretch/>
+        </p:blipFill>
+        <p:spPr>
+          <a:xfrm>
+            <a:off x="7798201" y="9510869"/>
+            <a:ext cx="6285294" cy="2699416"/>
+          </a:xfrm>
+          <a:prstGeom prst="rect">
+            <a:avLst/>
+          </a:prstGeom>
+        </p:spPr>
+      </p:pic>
+      <p:sp>
+        <p:nvSpPr>
+          <p:cNvPr id="16" name="圆角矩形 5">
+            <a:extLst>
+              <a:ext uri="{FF2B5EF4-FFF2-40B4-BE49-F238E27FC236}">
+                <a16:creationId xmlns:a16="http://schemas.microsoft.com/office/drawing/2014/main" id="{EC4C388A-4516-1D97-C707-BA1BC15FA982}"/>
+              </a:ext>
+            </a:extLst>
+          </p:cNvPr>
+          <p:cNvSpPr/>
+          <p:nvPr/>
+        </p:nvSpPr>
+        <p:spPr>
+          <a:xfrm>
+            <a:off x="1605519" y="13372261"/>
+            <a:ext cx="12547355" cy="9399714"/>
+          </a:xfrm>
+          <a:prstGeom prst="roundRect">
+            <a:avLst>
+              <a:gd name="adj" fmla="val 1517"/>
+            </a:avLst>
+          </a:prstGeom>
+          <a:noFill/>
+          <a:ln w="41275">
+            <a:solidFill>
+              <a:srgbClr val="00649C"/>
+            </a:solidFill>
+          </a:ln>
+        </p:spPr>
+        <p:style>
+          <a:lnRef idx="2">
+            <a:schemeClr val="accent1">
+              <a:shade val="50000"/>
+            </a:schemeClr>
+          </a:lnRef>
+          <a:fillRef idx="1">
+            <a:schemeClr val="accent1"/>
+          </a:fillRef>
+          <a:effectRef idx="0">
+            <a:schemeClr val="accent1"/>
+          </a:effectRef>
+          <a:fontRef idx="minor">
+            <a:schemeClr val="lt1"/>
+          </a:fontRef>
+        </p:style>
+        <p:txBody>
+          <a:bodyPr rtlCol="0" anchor="ctr"/>
+          <a:lstStyle/>
+          <a:p>
+            <a:pPr algn="ctr"/>
+            <a:endParaRPr lang="en-US" altLang="zh-CN" dirty="0"/>
+          </a:p>
+        </p:txBody>
+      </p:sp>
+      <p:sp>
+        <p:nvSpPr>
+          <p:cNvPr id="18" name="文本框 12">
+            <a:extLst>
+              <a:ext uri="{FF2B5EF4-FFF2-40B4-BE49-F238E27FC236}">
+                <a16:creationId xmlns:a16="http://schemas.microsoft.com/office/drawing/2014/main" id="{5EB90210-6FB6-4307-CBDA-CDA53E89F885}"/>
+              </a:ext>
+            </a:extLst>
+          </p:cNvPr>
+          <p:cNvSpPr txBox="1"/>
+          <p:nvPr>
+            <p:custDataLst>
+              <p:tags r:id="rId12"/>
+            </p:custDataLst>
+          </p:nvPr>
+        </p:nvSpPr>
+        <p:spPr>
+          <a:xfrm>
+            <a:off x="1799907" y="13410665"/>
+            <a:ext cx="12099925" cy="9002323"/>
+          </a:xfrm>
+          <a:prstGeom prst="rect">
+            <a:avLst/>
+          </a:prstGeom>
+          <a:noFill/>
+        </p:spPr>
+        <p:txBody>
+          <a:bodyPr wrap="square" rtlCol="0">
+            <a:noAutofit/>
+          </a:bodyPr>
+          <a:lstStyle/>
+          <a:p>
+            <a:pPr algn="just">
+              <a:spcAft>
+                <a:spcPts val="1200"/>
+              </a:spcAft>
+            </a:pPr>
+            <a:r>
+              <a:rPr lang="en-US" sz="2400" b="1" dirty="0">
+                <a:latin typeface="Arial" panose="020B0604020202020204" pitchFamily="34" charset="0"/>
+                <a:ea typeface="思源黑体 CN Regular" panose="020B0500000000000000" charset="-122"/>
+                <a:cs typeface="Arial" panose="020B0604020202020204" pitchFamily="34" charset="0"/>
+                <a:sym typeface="+mn-ea"/>
+              </a:rPr>
+              <a:t>Dataset 2 &amp; 3</a:t>
+            </a:r>
+          </a:p>
+          <a:p>
+            <a:pPr algn="just">
+              <a:spcAft>
+                <a:spcPts val="1200"/>
+              </a:spcAft>
+            </a:pPr>
+            <a:endParaRPr lang="en-US" sz="2400" b="1" dirty="0">
+              <a:latin typeface="Arial" panose="020B0604020202020204" pitchFamily="34" charset="0"/>
+              <a:ea typeface="思源黑体 CN Regular" panose="020B0500000000000000" charset="-122"/>
+              <a:cs typeface="Arial" panose="020B0604020202020204" pitchFamily="34" charset="0"/>
+              <a:sym typeface="+mn-ea"/>
+            </a:endParaRPr>
+          </a:p>
+          <a:p>
+            <a:pPr algn="just">
+              <a:spcAft>
+                <a:spcPts val="1200"/>
+              </a:spcAft>
+            </a:pPr>
+            <a:endParaRPr lang="en-US" sz="2400" b="1" dirty="0">
+              <a:latin typeface="Arial" panose="020B0604020202020204" pitchFamily="34" charset="0"/>
+              <a:ea typeface="思源黑体 CN Regular" panose="020B0500000000000000" charset="-122"/>
+              <a:cs typeface="Arial" panose="020B0604020202020204" pitchFamily="34" charset="0"/>
+              <a:sym typeface="+mn-ea"/>
+            </a:endParaRPr>
+          </a:p>
+          <a:p>
+            <a:pPr algn="just">
+              <a:spcAft>
+                <a:spcPts val="1200"/>
+              </a:spcAft>
+            </a:pPr>
+            <a:endParaRPr lang="en-US" sz="2400" b="1" dirty="0">
+              <a:latin typeface="Arial" panose="020B0604020202020204" pitchFamily="34" charset="0"/>
+              <a:ea typeface="思源黑体 CN Regular" panose="020B0500000000000000" charset="-122"/>
+              <a:cs typeface="Arial" panose="020B0604020202020204" pitchFamily="34" charset="0"/>
+              <a:sym typeface="+mn-ea"/>
+            </a:endParaRPr>
+          </a:p>
+          <a:p>
+            <a:pPr algn="just">
+              <a:spcAft>
+                <a:spcPts val="1200"/>
+              </a:spcAft>
+            </a:pPr>
+            <a:endParaRPr lang="en-US" sz="2400" b="1" dirty="0">
+              <a:latin typeface="Arial" panose="020B0604020202020204" pitchFamily="34" charset="0"/>
+              <a:ea typeface="思源黑体 CN Regular" panose="020B0500000000000000" charset="-122"/>
+              <a:cs typeface="Arial" panose="020B0604020202020204" pitchFamily="34" charset="0"/>
+              <a:sym typeface="+mn-ea"/>
+            </a:endParaRPr>
+          </a:p>
+          <a:p>
+            <a:pPr algn="just">
+              <a:spcAft>
+                <a:spcPts val="1200"/>
+              </a:spcAft>
+            </a:pPr>
+            <a:endParaRPr lang="en-US" sz="2400" b="1" dirty="0">
+              <a:latin typeface="Arial" panose="020B0604020202020204" pitchFamily="34" charset="0"/>
+              <a:ea typeface="思源黑体 CN Regular" panose="020B0500000000000000" charset="-122"/>
+              <a:cs typeface="Arial" panose="020B0604020202020204" pitchFamily="34" charset="0"/>
+              <a:sym typeface="+mn-ea"/>
+            </a:endParaRPr>
+          </a:p>
+          <a:p>
+            <a:pPr algn="just">
+              <a:spcAft>
+                <a:spcPts val="1200"/>
+              </a:spcAft>
+            </a:pPr>
+            <a:endParaRPr lang="en-US" sz="2400" b="1" dirty="0">
+              <a:latin typeface="Arial" panose="020B0604020202020204" pitchFamily="34" charset="0"/>
+              <a:ea typeface="思源黑体 CN Regular" panose="020B0500000000000000" charset="-122"/>
+              <a:cs typeface="Arial" panose="020B0604020202020204" pitchFamily="34" charset="0"/>
+              <a:sym typeface="+mn-ea"/>
+            </a:endParaRPr>
+          </a:p>
+          <a:p>
+            <a:pPr algn="just">
+              <a:spcAft>
+                <a:spcPts val="1200"/>
+              </a:spcAft>
+            </a:pPr>
+            <a:endParaRPr lang="en-US" sz="2400" b="1" dirty="0">
+              <a:latin typeface="Arial" panose="020B0604020202020204" pitchFamily="34" charset="0"/>
+              <a:ea typeface="思源黑体 CN Regular" panose="020B0500000000000000" charset="-122"/>
+              <a:cs typeface="Arial" panose="020B0604020202020204" pitchFamily="34" charset="0"/>
+              <a:sym typeface="+mn-ea"/>
+            </a:endParaRPr>
+          </a:p>
+          <a:p>
+            <a:pPr algn="just">
+              <a:spcAft>
+                <a:spcPts val="1200"/>
+              </a:spcAft>
+            </a:pPr>
+            <a:endParaRPr lang="en-US" sz="2400" b="1" dirty="0">
+              <a:latin typeface="Arial" panose="020B0604020202020204" pitchFamily="34" charset="0"/>
+              <a:ea typeface="思源黑体 CN Regular" panose="020B0500000000000000" charset="-122"/>
+              <a:cs typeface="Arial" panose="020B0604020202020204" pitchFamily="34" charset="0"/>
+              <a:sym typeface="+mn-ea"/>
+            </a:endParaRPr>
+          </a:p>
+          <a:p>
+            <a:pPr algn="just">
+              <a:spcAft>
+                <a:spcPts val="1200"/>
+              </a:spcAft>
+            </a:pPr>
+            <a:endParaRPr lang="en-US" sz="2400" b="1" dirty="0">
+              <a:latin typeface="Arial" panose="020B0604020202020204" pitchFamily="34" charset="0"/>
+              <a:ea typeface="思源黑体 CN Regular" panose="020B0500000000000000" charset="-122"/>
+              <a:cs typeface="Arial" panose="020B0604020202020204" pitchFamily="34" charset="0"/>
+              <a:sym typeface="+mn-ea"/>
+            </a:endParaRPr>
+          </a:p>
+        </p:txBody>
+      </p:sp>
+      <p:pic>
+        <p:nvPicPr>
+          <p:cNvPr id="39" name="Picture 38">
+            <a:extLst>
+              <a:ext uri="{FF2B5EF4-FFF2-40B4-BE49-F238E27FC236}">
+                <a16:creationId xmlns:a16="http://schemas.microsoft.com/office/drawing/2014/main" id="{3E213F57-246B-BA3F-1190-57E310ED064C}"/>
+              </a:ext>
+            </a:extLst>
+          </p:cNvPr>
+          <p:cNvPicPr>
+            <a:picLocks noChangeAspect="1"/>
+          </p:cNvPicPr>
+          <p:nvPr/>
+        </p:nvPicPr>
+        <p:blipFill>
+          <a:blip r:embed="rId20"/>
+          <a:stretch>
+            <a:fillRect/>
+          </a:stretch>
+        </p:blipFill>
+        <p:spPr>
+          <a:xfrm>
+            <a:off x="1799907" y="10444315"/>
+            <a:ext cx="6179211" cy="2475285"/>
+          </a:xfrm>
+          <a:prstGeom prst="rect">
+            <a:avLst/>
+          </a:prstGeom>
+        </p:spPr>
+      </p:pic>
+      <p:pic>
+        <p:nvPicPr>
+          <p:cNvPr id="46" name="Picture 45">
+            <a:extLst>
+              <a:ext uri="{FF2B5EF4-FFF2-40B4-BE49-F238E27FC236}">
+                <a16:creationId xmlns:a16="http://schemas.microsoft.com/office/drawing/2014/main" id="{E0C40BF2-9C40-937D-7BA7-0DD9DA57B4D2}"/>
+              </a:ext>
+            </a:extLst>
+          </p:cNvPr>
+          <p:cNvPicPr>
+            <a:picLocks noChangeAspect="1"/>
+          </p:cNvPicPr>
+          <p:nvPr/>
+        </p:nvPicPr>
+        <p:blipFill>
+          <a:blip r:embed="rId21"/>
+          <a:stretch>
+            <a:fillRect/>
+          </a:stretch>
+        </p:blipFill>
+        <p:spPr>
+          <a:xfrm>
+            <a:off x="7805184" y="13756985"/>
+            <a:ext cx="5852245" cy="1577080"/>
+          </a:xfrm>
+          <a:prstGeom prst="rect">
+            <a:avLst/>
+          </a:prstGeom>
+        </p:spPr>
+      </p:pic>
+      <p:pic>
+        <p:nvPicPr>
+          <p:cNvPr id="59" name="Picture 58" descr="A screenshot of a graph&#10;&#10;Description automatically generated">
+            <a:extLst>
+              <a:ext uri="{FF2B5EF4-FFF2-40B4-BE49-F238E27FC236}">
+                <a16:creationId xmlns:a16="http://schemas.microsoft.com/office/drawing/2014/main" id="{D56AB122-B29C-BD48-BDD5-3E880B6A0DC9}"/>
+              </a:ext>
+            </a:extLst>
+          </p:cNvPr>
+          <p:cNvPicPr>
+            <a:picLocks noChangeAspect="1"/>
+          </p:cNvPicPr>
+          <p:nvPr/>
+        </p:nvPicPr>
+        <p:blipFill>
+          <a:blip r:embed="rId22">
+            <a:extLst>
+              <a:ext uri="{28A0092B-C50C-407E-A947-70E740481C1C}">
+                <a14:useLocalDpi xmlns:a14="http://schemas.microsoft.com/office/drawing/2010/main" val="0"/>
+              </a:ext>
+            </a:extLst>
+          </a:blip>
+          <a:srcRect r="2487" b="31334"/>
+          <a:stretch/>
+        </p:blipFill>
+        <p:spPr>
+          <a:xfrm>
+            <a:off x="8269995" y="15535565"/>
+            <a:ext cx="4644073" cy="3270234"/>
+          </a:xfrm>
+          <a:prstGeom prst="rect">
+            <a:avLst/>
+          </a:prstGeom>
+        </p:spPr>
+      </p:pic>
+      <p:sp>
+        <p:nvSpPr>
+          <p:cNvPr id="62" name="Rectangle 1">
+            <a:extLst>
+              <a:ext uri="{FF2B5EF4-FFF2-40B4-BE49-F238E27FC236}">
+                <a16:creationId xmlns:a16="http://schemas.microsoft.com/office/drawing/2014/main" id="{B2B86F2B-9578-3D8A-554E-73B47C504C58}"/>
+              </a:ext>
+            </a:extLst>
+          </p:cNvPr>
+          <p:cNvSpPr>
+            <a:spLocks noChangeArrowheads="1"/>
+          </p:cNvSpPr>
+          <p:nvPr/>
+        </p:nvSpPr>
+        <p:spPr bwMode="auto">
+          <a:xfrm>
+            <a:off x="0" y="0"/>
+            <a:ext cx="42840275" cy="457200"/>
+          </a:xfrm>
+          <a:prstGeom prst="rect">
+            <a:avLst/>
+          </a:prstGeom>
+          <a:noFill/>
+          <a:ln>
+            <a:noFill/>
+          </a:ln>
+          <a:effectLst/>
+          <a:extLst>
+            <a:ext uri="{909E8E84-426E-40DD-AFC4-6F175D3DCCD1}">
+              <a14:hiddenFill xmlns:a14="http://schemas.microsoft.com/office/drawing/2010/main">
+                <a:solidFill>
+                  <a:schemeClr val="accent1"/>
+                </a:solidFill>
+              </a14:hiddenFill>
+            </a:ext>
+            <a:ext uri="{91240B29-F687-4F45-9708-019B960494DF}">
+              <a14:hiddenLine xmlns:a14="http://schemas.microsoft.com/office/drawing/2010/main" w="9525">
+                <a:solidFill>
+                  <a:schemeClr val="tx1"/>
+                </a:solidFill>
+                <a:miter lim="800000"/>
+                <a:headEnd/>
+                <a:tailEnd/>
+              </a14:hiddenLine>
+            </a:ext>
+            <a:ext uri="{AF507438-7753-43E0-B8FC-AC1667EBCBE1}">
+              <a14:hiddenEffects xmlns:a14="http://schemas.microsoft.com/office/drawing/2010/main">
+                <a:effectLst>
+                  <a:outerShdw dist="35921" dir="2700000" algn="ctr" rotWithShape="0">
+                    <a:schemeClr val="bg2"/>
+                  </a:outerShdw>
+                </a:effectLst>
+              </a14:hiddenEffects>
+            </a:ext>
+          </a:extLst>
+        </p:spPr>
+        <p:txBody>
+          <a:bodyPr vert="horz" wrap="none" lIns="91440" tIns="45720" rIns="91440" bIns="45720" numCol="1" anchor="ctr" anchorCtr="0" compatLnSpc="1">
+            <a:prstTxWarp prst="textNoShape">
+              <a:avLst/>
+            </a:prstTxWarp>
+            <a:spAutoFit/>
+          </a:bodyPr>
+          <a:lstStyle/>
+          <a:p>
+            <a:pPr marL="0" marR="0" lvl="0" indent="0" algn="r" defTabSz="914400" rtl="0" eaLnBrk="0" fontAlgn="base" latinLnBrk="0" hangingPunct="0">
+              <a:lnSpc>
+                <a:spcPct val="100000"/>
+              </a:lnSpc>
+              <a:spcBef>
+                <a:spcPct val="0"/>
+              </a:spcBef>
+              <a:spcAft>
+                <a:spcPct val="0"/>
+              </a:spcAft>
+              <a:buClrTx/>
+              <a:buSzTx/>
+              <a:buFontTx/>
+              <a:buNone/>
+              <a:tabLst/>
+            </a:pPr>
+            <a:r>
+              <a:rPr kumimoji="0" lang="en-US" altLang="en-US" sz="1000" b="0" i="0" u="none" strike="noStrike" cap="none" normalizeH="0" baseline="0">
+                <a:ln>
+                  <a:noFill/>
+                </a:ln>
+                <a:solidFill>
+                  <a:srgbClr val="C5C8C6"/>
+                </a:solidFill>
+                <a:effectLst/>
+                <a:latin typeface="inherit"/>
+              </a:rPr>
+              <a:t>g.fig.suptitle(</a:t>
+            </a:r>
+            <a:r>
+              <a:rPr kumimoji="0" lang="en-US" altLang="en-US" sz="1000" b="0" i="0" u="none" strike="noStrike" cap="none" normalizeH="0" baseline="0">
+                <a:ln>
+                  <a:noFill/>
+                </a:ln>
+                <a:solidFill>
+                  <a:srgbClr val="B5BD68"/>
+                </a:solidFill>
+                <a:effectLst/>
+                <a:latin typeface="inherit"/>
+              </a:rPr>
+              <a:t>'Distribution of dog breeds over districts'</a:t>
+            </a:r>
+            <a:r>
+              <a:rPr kumimoji="0" lang="en-US" altLang="en-US" sz="1000" b="0" i="0" u="none" strike="noStrike" cap="none" normalizeH="0" baseline="0">
+                <a:ln>
+                  <a:noFill/>
+                </a:ln>
+                <a:solidFill>
+                  <a:srgbClr val="C5C8C6"/>
+                </a:solidFill>
+                <a:effectLst/>
+                <a:latin typeface="inherit"/>
+              </a:rPr>
+              <a:t>, fontsize=</a:t>
+            </a:r>
+            <a:r>
+              <a:rPr kumimoji="0" lang="en-US" altLang="en-US" sz="1000" b="0" i="0" u="none" strike="noStrike" cap="none" normalizeH="0" baseline="0">
+                <a:ln>
+                  <a:noFill/>
+                </a:ln>
+                <a:solidFill>
+                  <a:srgbClr val="DE935F"/>
+                </a:solidFill>
+                <a:effectLst/>
+                <a:latin typeface="inherit"/>
+              </a:rPr>
+              <a:t>18</a:t>
+            </a:r>
+            <a:r>
+              <a:rPr kumimoji="0" lang="en-US" altLang="en-US" sz="1000" b="0" i="0" u="none" strike="noStrike" cap="none" normalizeH="0" baseline="0">
+                <a:ln>
+                  <a:noFill/>
+                </a:ln>
+                <a:solidFill>
+                  <a:srgbClr val="C5C8C6"/>
+                </a:solidFill>
+                <a:effectLst/>
+                <a:latin typeface="inherit"/>
+              </a:rPr>
+              <a:t>, x=</a:t>
+            </a:r>
+            <a:r>
+              <a:rPr kumimoji="0" lang="en-US" altLang="en-US" sz="1000" b="0" i="0" u="none" strike="noStrike" cap="none" normalizeH="0" baseline="0">
+                <a:ln>
+                  <a:noFill/>
+                </a:ln>
+                <a:solidFill>
+                  <a:srgbClr val="DE935F"/>
+                </a:solidFill>
+                <a:effectLst/>
+                <a:latin typeface="inherit"/>
+              </a:rPr>
+              <a:t>0.95</a:t>
+            </a:r>
+            <a:r>
+              <a:rPr kumimoji="0" lang="en-US" altLang="en-US" sz="1000" b="0" i="0" u="none" strike="noStrike" cap="none" normalizeH="0" baseline="0">
+                <a:ln>
+                  <a:noFill/>
+                </a:ln>
+                <a:solidFill>
+                  <a:srgbClr val="C5C8C6"/>
+                </a:solidFill>
+                <a:effectLst/>
+                <a:latin typeface="inherit"/>
+              </a:rPr>
+              <a:t>, y=</a:t>
+            </a:r>
+            <a:r>
+              <a:rPr kumimoji="0" lang="en-US" altLang="en-US" sz="1000" b="0" i="0" u="none" strike="noStrike" cap="none" normalizeH="0" baseline="0">
+                <a:ln>
+                  <a:noFill/>
+                </a:ln>
+                <a:solidFill>
+                  <a:srgbClr val="DE935F"/>
+                </a:solidFill>
+                <a:effectLst/>
+                <a:latin typeface="inherit"/>
+              </a:rPr>
+              <a:t>0.01</a:t>
+            </a:r>
+            <a:r>
+              <a:rPr kumimoji="0" lang="en-US" altLang="en-US" sz="1000" b="0" i="0" u="none" strike="noStrike" cap="none" normalizeH="0" baseline="0">
+                <a:ln>
+                  <a:noFill/>
+                </a:ln>
+                <a:solidFill>
+                  <a:srgbClr val="C5C8C6"/>
+                </a:solidFill>
+                <a:effectLst/>
+                <a:latin typeface="inherit"/>
+              </a:rPr>
+              <a:t>, ha=</a:t>
+            </a:r>
+            <a:r>
+              <a:rPr kumimoji="0" lang="en-US" altLang="en-US" sz="1000" b="0" i="0" u="none" strike="noStrike" cap="none" normalizeH="0" baseline="0">
+                <a:ln>
+                  <a:noFill/>
+                </a:ln>
+                <a:solidFill>
+                  <a:srgbClr val="B5BD68"/>
+                </a:solidFill>
+                <a:effectLst/>
+                <a:latin typeface="inherit"/>
+              </a:rPr>
+              <a:t>'right'</a:t>
+            </a:r>
+            <a:r>
+              <a:rPr kumimoji="0" lang="en-US" altLang="en-US" sz="1000" b="0" i="0" u="none" strike="noStrike" cap="none" normalizeH="0" baseline="0">
+                <a:ln>
+                  <a:noFill/>
+                </a:ln>
+                <a:solidFill>
+                  <a:srgbClr val="C5C8C6"/>
+                </a:solidFill>
+                <a:effectLst/>
+                <a:latin typeface="inherit"/>
+              </a:rPr>
+              <a:t>)</a:t>
+            </a:r>
+            <a:r>
+              <a:rPr kumimoji="0" lang="en-US" altLang="en-US" sz="2800" b="0" i="0" u="none" strike="noStrike" cap="none" normalizeH="0" baseline="0">
+                <a:ln>
+                  <a:noFill/>
+                </a:ln>
+                <a:solidFill>
+                  <a:schemeClr val="tx1"/>
+                </a:solidFill>
+                <a:effectLst/>
+              </a:rPr>
+              <a:t> </a:t>
+            </a:r>
+            <a:endParaRPr kumimoji="0" lang="en-US" altLang="en-US" sz="1800" b="0" i="0" u="none" strike="noStrike" cap="none" normalizeH="0" baseline="0">
+              <a:ln>
+                <a:noFill/>
+              </a:ln>
+              <a:solidFill>
+                <a:schemeClr val="tx1"/>
+              </a:solidFill>
+              <a:effectLst/>
+              <a:latin typeface="Arial" panose="020B0604020202020204" pitchFamily="34" charset="0"/>
+            </a:endParaRPr>
+          </a:p>
+        </p:txBody>
+      </p:sp>
+      <p:pic>
+        <p:nvPicPr>
+          <p:cNvPr id="64" name="Picture 63" descr="A group of blue and white bars&#10;&#10;Description automatically generated">
+            <a:extLst>
+              <a:ext uri="{FF2B5EF4-FFF2-40B4-BE49-F238E27FC236}">
+                <a16:creationId xmlns:a16="http://schemas.microsoft.com/office/drawing/2014/main" id="{8DBE783A-7580-30B1-1814-452FAE141650}"/>
+              </a:ext>
+            </a:extLst>
+          </p:cNvPr>
+          <p:cNvPicPr>
+            <a:picLocks noChangeAspect="1"/>
+          </p:cNvPicPr>
+          <p:nvPr/>
+        </p:nvPicPr>
+        <p:blipFill>
+          <a:blip r:embed="rId23" cstate="print">
+            <a:extLst>
+              <a:ext uri="{28A0092B-C50C-407E-A947-70E740481C1C}">
+                <a14:useLocalDpi xmlns:a14="http://schemas.microsoft.com/office/drawing/2010/main" val="0"/>
+              </a:ext>
+            </a:extLst>
+          </a:blip>
+          <a:stretch>
+            <a:fillRect/>
+          </a:stretch>
+        </p:blipFill>
+        <p:spPr>
+          <a:xfrm>
+            <a:off x="1822451" y="14297030"/>
+            <a:ext cx="5650463" cy="5609328"/>
+          </a:xfrm>
+          <a:prstGeom prst="rect">
+            <a:avLst/>
+          </a:prstGeom>
+        </p:spPr>
+      </p:pic>
+      <p:pic>
+        <p:nvPicPr>
+          <p:cNvPr id="57" name="Picture 56" descr="A graph of different colored squares&#10;&#10;Description automatically generated">
+            <a:extLst>
+              <a:ext uri="{FF2B5EF4-FFF2-40B4-BE49-F238E27FC236}">
+                <a16:creationId xmlns:a16="http://schemas.microsoft.com/office/drawing/2014/main" id="{D87B35BC-720C-EC80-6161-894D8F6EB9BB}"/>
+              </a:ext>
+            </a:extLst>
+          </p:cNvPr>
+          <p:cNvPicPr>
+            <a:picLocks noChangeAspect="1"/>
+          </p:cNvPicPr>
+          <p:nvPr/>
+        </p:nvPicPr>
+        <p:blipFill>
+          <a:blip r:embed="rId24">
+            <a:extLst>
+              <a:ext uri="{28A0092B-C50C-407E-A947-70E740481C1C}">
+                <a14:useLocalDpi xmlns:a14="http://schemas.microsoft.com/office/drawing/2010/main" val="0"/>
+              </a:ext>
+            </a:extLst>
+          </a:blip>
+          <a:srcRect t="6834" r="10545" b="6229"/>
+          <a:stretch/>
+        </p:blipFill>
+        <p:spPr>
+          <a:xfrm>
+            <a:off x="4293808" y="19132952"/>
+            <a:ext cx="8188444" cy="2981093"/>
+          </a:xfrm>
+          <a:prstGeom prst="rect">
+            <a:avLst/>
+          </a:prstGeom>
+        </p:spPr>
+      </p:pic>
+      <p:sp>
+        <p:nvSpPr>
+          <p:cNvPr id="66" name="剪去对角的矩形 9">
+            <a:extLst>
+              <a:ext uri="{FF2B5EF4-FFF2-40B4-BE49-F238E27FC236}">
+                <a16:creationId xmlns:a16="http://schemas.microsoft.com/office/drawing/2014/main" id="{246381E5-B3D7-7088-CFBF-3FC01FA0817E}"/>
+              </a:ext>
+            </a:extLst>
+          </p:cNvPr>
+          <p:cNvSpPr/>
+          <p:nvPr/>
+        </p:nvSpPr>
+        <p:spPr>
+          <a:xfrm rot="16200000">
+            <a:off x="7590584" y="17063477"/>
+            <a:ext cx="740187" cy="12821922"/>
+          </a:xfrm>
+          <a:prstGeom prst="snip2DiagRect">
+            <a:avLst/>
+          </a:prstGeom>
+          <a:gradFill>
+            <a:gsLst>
+              <a:gs pos="100000">
+                <a:srgbClr val="1A51C5"/>
+              </a:gs>
+              <a:gs pos="0">
+                <a:schemeClr val="accent2">
+                  <a:lumMod val="60000"/>
+                  <a:lumOff val="40000"/>
+                </a:schemeClr>
+              </a:gs>
+            </a:gsLst>
+            <a:lin ang="5400000" scaled="0"/>
+          </a:gradFill>
+          <a:ln>
+            <a:noFill/>
+          </a:ln>
+        </p:spPr>
+        <p:style>
+          <a:lnRef idx="2">
+            <a:schemeClr val="accent1">
+              <a:shade val="50000"/>
+            </a:schemeClr>
+          </a:lnRef>
+          <a:fillRef idx="1">
+            <a:schemeClr val="accent1"/>
+          </a:fillRef>
+          <a:effectRef idx="0">
+            <a:schemeClr val="accent1"/>
+          </a:effectRef>
+          <a:fontRef idx="minor">
+            <a:schemeClr val="lt1"/>
+          </a:fontRef>
+        </p:style>
+        <p:txBody>
+          <a:bodyPr rtlCol="0" anchor="ctr"/>
+          <a:lstStyle/>
+          <a:p>
+            <a:pPr algn="ctr"/>
+            <a:endParaRPr lang="zh-CN" altLang="en-US"/>
+          </a:p>
+        </p:txBody>
+      </p:sp>
+      <p:sp>
+        <p:nvSpPr>
+          <p:cNvPr id="65" name="文本框 28">
+            <a:extLst>
+              <a:ext uri="{FF2B5EF4-FFF2-40B4-BE49-F238E27FC236}">
+                <a16:creationId xmlns:a16="http://schemas.microsoft.com/office/drawing/2014/main" id="{E93F51D7-74B5-8AB0-2C97-C44377649A26}"/>
+              </a:ext>
+            </a:extLst>
+          </p:cNvPr>
+          <p:cNvSpPr txBox="1"/>
+          <p:nvPr>
+            <p:custDataLst>
+              <p:tags r:id="rId13"/>
+            </p:custDataLst>
+          </p:nvPr>
+        </p:nvSpPr>
+        <p:spPr>
+          <a:xfrm>
+            <a:off x="1758467" y="23016334"/>
+            <a:ext cx="8517255" cy="830997"/>
+          </a:xfrm>
+          <a:prstGeom prst="rect">
+            <a:avLst/>
+          </a:prstGeom>
+          <a:noFill/>
+        </p:spPr>
+        <p:txBody>
+          <a:bodyPr wrap="square" rtlCol="0">
+            <a:spAutoFit/>
+          </a:bodyPr>
+          <a:lstStyle/>
+          <a:p>
+            <a:pPr algn="l"/>
+            <a:r>
+              <a:rPr lang="en-US" sz="4800" dirty="0">
+                <a:solidFill>
+                  <a:schemeClr val="bg1"/>
+                </a:solidFill>
+                <a:latin typeface="Arial" panose="020B0604020202020204" pitchFamily="34" charset="0"/>
+                <a:ea typeface="思源黑体 CN Medium" panose="020B0600000000000000" charset="-122"/>
+                <a:cs typeface="Arial" panose="020B0604020202020204" pitchFamily="34" charset="0"/>
+              </a:rPr>
+              <a:t>Hypothesis 1</a:t>
+            </a:r>
+          </a:p>
+        </p:txBody>
+      </p:sp>
+      <p:sp>
+        <p:nvSpPr>
+          <p:cNvPr id="67" name="圆角矩形 5">
+            <a:extLst>
+              <a:ext uri="{FF2B5EF4-FFF2-40B4-BE49-F238E27FC236}">
+                <a16:creationId xmlns:a16="http://schemas.microsoft.com/office/drawing/2014/main" id="{AB4832E2-9CB3-B399-2F9B-01E5F42D34D4}"/>
+              </a:ext>
+            </a:extLst>
+          </p:cNvPr>
+          <p:cNvSpPr/>
+          <p:nvPr/>
+        </p:nvSpPr>
+        <p:spPr>
+          <a:xfrm>
+            <a:off x="14938106" y="19906358"/>
+            <a:ext cx="13275782" cy="8557765"/>
+          </a:xfrm>
+          <a:prstGeom prst="roundRect">
+            <a:avLst>
+              <a:gd name="adj" fmla="val 1517"/>
+            </a:avLst>
+          </a:prstGeom>
+          <a:noFill/>
+          <a:ln w="41275">
+            <a:solidFill>
+              <a:srgbClr val="00649C"/>
+            </a:solidFill>
+          </a:ln>
+        </p:spPr>
+        <p:style>
+          <a:lnRef idx="2">
+            <a:schemeClr val="accent1">
+              <a:shade val="50000"/>
+            </a:schemeClr>
+          </a:lnRef>
+          <a:fillRef idx="1">
+            <a:schemeClr val="accent1"/>
+          </a:fillRef>
+          <a:effectRef idx="0">
+            <a:schemeClr val="accent1"/>
+          </a:effectRef>
+          <a:fontRef idx="minor">
+            <a:schemeClr val="lt1"/>
+          </a:fontRef>
+        </p:style>
+        <p:txBody>
+          <a:bodyPr rtlCol="0" anchor="ctr"/>
+          <a:lstStyle/>
+          <a:p>
+            <a:pPr algn="ctr"/>
+            <a:endParaRPr lang="en-US" altLang="zh-CN"/>
+          </a:p>
+        </p:txBody>
+      </p:sp>
+      <p:sp>
+        <p:nvSpPr>
+          <p:cNvPr id="68" name="圆角矩形 5">
+            <a:extLst>
+              <a:ext uri="{FF2B5EF4-FFF2-40B4-BE49-F238E27FC236}">
+                <a16:creationId xmlns:a16="http://schemas.microsoft.com/office/drawing/2014/main" id="{ADE75875-DF1F-C3FF-C284-6FFE4A9061F3}"/>
+              </a:ext>
+            </a:extLst>
+          </p:cNvPr>
+          <p:cNvSpPr/>
+          <p:nvPr/>
+        </p:nvSpPr>
+        <p:spPr>
+          <a:xfrm>
+            <a:off x="14938106" y="4371263"/>
+            <a:ext cx="13275782" cy="5166561"/>
+          </a:xfrm>
+          <a:prstGeom prst="roundRect">
+            <a:avLst>
+              <a:gd name="adj" fmla="val 1517"/>
+            </a:avLst>
+          </a:prstGeom>
+          <a:noFill/>
+          <a:ln w="41275">
+            <a:solidFill>
+              <a:srgbClr val="00649C"/>
+            </a:solidFill>
+          </a:ln>
+        </p:spPr>
+        <p:style>
+          <a:lnRef idx="2">
+            <a:schemeClr val="accent1">
+              <a:shade val="50000"/>
+            </a:schemeClr>
+          </a:lnRef>
+          <a:fillRef idx="1">
+            <a:schemeClr val="accent1"/>
+          </a:fillRef>
+          <a:effectRef idx="0">
+            <a:schemeClr val="accent1"/>
+          </a:effectRef>
+          <a:fontRef idx="minor">
+            <a:schemeClr val="lt1"/>
+          </a:fontRef>
+        </p:style>
+        <p:txBody>
+          <a:bodyPr rtlCol="0" anchor="ctr"/>
+          <a:lstStyle/>
+          <a:p>
+            <a:pPr algn="ctr"/>
+            <a:endParaRPr lang="en-US" altLang="zh-CN"/>
+          </a:p>
+        </p:txBody>
+      </p:sp>
+      <p:sp>
+        <p:nvSpPr>
+          <p:cNvPr id="69" name="剪去对角的矩形 9">
+            <a:extLst>
+              <a:ext uri="{FF2B5EF4-FFF2-40B4-BE49-F238E27FC236}">
+                <a16:creationId xmlns:a16="http://schemas.microsoft.com/office/drawing/2014/main" id="{090A25DB-B7E8-3F21-E834-45F698526073}"/>
+              </a:ext>
+            </a:extLst>
+          </p:cNvPr>
+          <p:cNvSpPr/>
+          <p:nvPr/>
+        </p:nvSpPr>
+        <p:spPr>
+          <a:xfrm rot="16200000">
+            <a:off x="34657572" y="-1698884"/>
+            <a:ext cx="708649" cy="12753380"/>
+          </a:xfrm>
+          <a:prstGeom prst="snip2DiagRect">
+            <a:avLst/>
+          </a:prstGeom>
+          <a:gradFill>
+            <a:gsLst>
+              <a:gs pos="100000">
+                <a:srgbClr val="1A51C5"/>
+              </a:gs>
+              <a:gs pos="0">
+                <a:schemeClr val="accent2">
+                  <a:lumMod val="60000"/>
+                  <a:lumOff val="40000"/>
+                </a:schemeClr>
+              </a:gs>
+            </a:gsLst>
+            <a:lin ang="5400000" scaled="0"/>
+          </a:gradFill>
+          <a:ln>
+            <a:noFill/>
+          </a:ln>
+        </p:spPr>
+        <p:style>
+          <a:lnRef idx="2">
+            <a:schemeClr val="accent1">
+              <a:shade val="50000"/>
+            </a:schemeClr>
+          </a:lnRef>
+          <a:fillRef idx="1">
+            <a:schemeClr val="accent1"/>
+          </a:fillRef>
+          <a:effectRef idx="0">
+            <a:schemeClr val="accent1"/>
+          </a:effectRef>
+          <a:fontRef idx="minor">
+            <a:schemeClr val="lt1"/>
+          </a:fontRef>
+        </p:style>
+        <p:txBody>
+          <a:bodyPr rtlCol="0" anchor="ctr"/>
+          <a:lstStyle/>
+          <a:p>
+            <a:pPr algn="ctr"/>
+            <a:endParaRPr lang="zh-CN" altLang="en-US"/>
+          </a:p>
+        </p:txBody>
+      </p:sp>
+      <p:sp>
+        <p:nvSpPr>
+          <p:cNvPr id="70" name="文本框 28">
+            <a:extLst>
+              <a:ext uri="{FF2B5EF4-FFF2-40B4-BE49-F238E27FC236}">
+                <a16:creationId xmlns:a16="http://schemas.microsoft.com/office/drawing/2014/main" id="{6FF6DB80-1547-F670-AB44-50D6922C7211}"/>
+              </a:ext>
+            </a:extLst>
+          </p:cNvPr>
+          <p:cNvSpPr txBox="1"/>
+          <p:nvPr>
+            <p:custDataLst>
+              <p:tags r:id="rId14"/>
+            </p:custDataLst>
+          </p:nvPr>
+        </p:nvSpPr>
+        <p:spPr>
+          <a:xfrm>
+            <a:off x="28996669" y="12904158"/>
+            <a:ext cx="8517255" cy="830997"/>
+          </a:xfrm>
+          <a:prstGeom prst="rect">
+            <a:avLst/>
+          </a:prstGeom>
+          <a:noFill/>
+        </p:spPr>
+        <p:txBody>
+          <a:bodyPr wrap="square" rtlCol="0">
+            <a:spAutoFit/>
+          </a:bodyPr>
+          <a:lstStyle/>
+          <a:p>
+            <a:pPr algn="l"/>
+            <a:r>
+              <a:rPr lang="en-US" sz="4800" dirty="0">
+                <a:solidFill>
+                  <a:schemeClr val="bg1"/>
+                </a:solidFill>
+                <a:latin typeface="Arial" panose="020B0604020202020204" pitchFamily="34" charset="0"/>
+                <a:ea typeface="思源黑体 CN Medium" panose="020B0600000000000000" charset="-122"/>
+                <a:cs typeface="Arial" panose="020B0604020202020204" pitchFamily="34" charset="0"/>
+              </a:rPr>
+              <a:t>Hypothesis 5</a:t>
+            </a:r>
+          </a:p>
+        </p:txBody>
+      </p:sp>
+      <p:sp>
+        <p:nvSpPr>
+          <p:cNvPr id="32" name="文本框 28">
+            <a:extLst>
+              <a:ext uri="{FF2B5EF4-FFF2-40B4-BE49-F238E27FC236}">
+                <a16:creationId xmlns:a16="http://schemas.microsoft.com/office/drawing/2014/main" id="{B3826FFE-D7E5-0EE2-B873-74E2BD108522}"/>
+              </a:ext>
+            </a:extLst>
+          </p:cNvPr>
+          <p:cNvSpPr txBox="1"/>
+          <p:nvPr>
+            <p:custDataLst>
+              <p:tags r:id="rId15"/>
+            </p:custDataLst>
+          </p:nvPr>
+        </p:nvSpPr>
+        <p:spPr>
+          <a:xfrm>
+            <a:off x="29114909" y="4255214"/>
+            <a:ext cx="8517255" cy="830997"/>
+          </a:xfrm>
+          <a:prstGeom prst="rect">
+            <a:avLst/>
+          </a:prstGeom>
+          <a:noFill/>
+        </p:spPr>
+        <p:txBody>
+          <a:bodyPr wrap="square" rtlCol="0">
+            <a:spAutoFit/>
+          </a:bodyPr>
+          <a:lstStyle/>
+          <a:p>
+            <a:pPr algn="l"/>
+            <a:r>
+              <a:rPr lang="en-US" sz="4800" dirty="0">
+                <a:solidFill>
+                  <a:schemeClr val="bg1"/>
+                </a:solidFill>
+                <a:latin typeface="Arial" panose="020B0604020202020204" pitchFamily="34" charset="0"/>
+                <a:ea typeface="思源黑体 CN Medium" panose="020B0600000000000000" charset="-122"/>
+                <a:cs typeface="Arial" panose="020B0604020202020204" pitchFamily="34" charset="0"/>
+              </a:rPr>
+              <a:t>Hypothesis 4</a:t>
+            </a:r>
+          </a:p>
+        </p:txBody>
+      </p:sp>
+      <p:sp>
+        <p:nvSpPr>
+          <p:cNvPr id="71" name="圆角矩形 5">
+            <a:extLst>
+              <a:ext uri="{FF2B5EF4-FFF2-40B4-BE49-F238E27FC236}">
+                <a16:creationId xmlns:a16="http://schemas.microsoft.com/office/drawing/2014/main" id="{5571A1A3-FAF0-4B6A-CD32-93962B9E53C4}"/>
+              </a:ext>
+            </a:extLst>
+          </p:cNvPr>
+          <p:cNvSpPr/>
+          <p:nvPr/>
+        </p:nvSpPr>
+        <p:spPr>
+          <a:xfrm>
+            <a:off x="28759428" y="5168554"/>
+            <a:ext cx="12600305" cy="7424188"/>
+          </a:xfrm>
+          <a:prstGeom prst="roundRect">
+            <a:avLst>
+              <a:gd name="adj" fmla="val 1517"/>
+            </a:avLst>
+          </a:prstGeom>
+          <a:noFill/>
+          <a:ln w="41275">
+            <a:solidFill>
+              <a:srgbClr val="00649C"/>
+            </a:solidFill>
+          </a:ln>
+        </p:spPr>
+        <p:style>
+          <a:lnRef idx="2">
+            <a:schemeClr val="accent1">
+              <a:shade val="50000"/>
+            </a:schemeClr>
+          </a:lnRef>
+          <a:fillRef idx="1">
+            <a:schemeClr val="accent1"/>
+          </a:fillRef>
+          <a:effectRef idx="0">
+            <a:schemeClr val="accent1"/>
+          </a:effectRef>
+          <a:fontRef idx="minor">
+            <a:schemeClr val="lt1"/>
+          </a:fontRef>
+        </p:style>
+        <p:txBody>
+          <a:bodyPr rtlCol="0" anchor="ctr"/>
+          <a:lstStyle/>
+          <a:p>
+            <a:pPr algn="ctr"/>
+            <a:endParaRPr lang="en-US" altLang="zh-CN"/>
+          </a:p>
+        </p:txBody>
+      </p:sp>
+      <p:pic>
+        <p:nvPicPr>
+          <p:cNvPr id="73" name="Picture 72">
+            <a:extLst>
+              <a:ext uri="{FF2B5EF4-FFF2-40B4-BE49-F238E27FC236}">
+                <a16:creationId xmlns:a16="http://schemas.microsoft.com/office/drawing/2014/main" id="{29ADB6D0-95E9-321A-194A-0CB154BED517}"/>
+              </a:ext>
+            </a:extLst>
+          </p:cNvPr>
+          <p:cNvPicPr>
+            <a:picLocks noChangeAspect="1"/>
+          </p:cNvPicPr>
+          <p:nvPr/>
+        </p:nvPicPr>
+        <p:blipFill>
+          <a:blip r:embed="rId25"/>
+          <a:stretch>
+            <a:fillRect/>
+          </a:stretch>
+        </p:blipFill>
+        <p:spPr>
+          <a:xfrm>
+            <a:off x="15039699" y="12832610"/>
+            <a:ext cx="3981424" cy="1329335"/>
+          </a:xfrm>
+          <a:prstGeom prst="rect">
+            <a:avLst/>
+          </a:prstGeom>
+        </p:spPr>
+      </p:pic>
+      <p:pic>
+        <p:nvPicPr>
+          <p:cNvPr id="80" name="Picture 79" descr="A comparison of a pie chart&#10;&#10;Description automatically generated">
+            <a:extLst>
+              <a:ext uri="{FF2B5EF4-FFF2-40B4-BE49-F238E27FC236}">
+                <a16:creationId xmlns:a16="http://schemas.microsoft.com/office/drawing/2014/main" id="{26DA01BF-2BD3-26D7-345C-2D819B93E89D}"/>
+              </a:ext>
+            </a:extLst>
+          </p:cNvPr>
+          <p:cNvPicPr>
+            <a:picLocks noChangeAspect="1"/>
+          </p:cNvPicPr>
+          <p:nvPr/>
+        </p:nvPicPr>
+        <p:blipFill>
+          <a:blip r:embed="rId26" cstate="print">
+            <a:extLst>
+              <a:ext uri="{28A0092B-C50C-407E-A947-70E740481C1C}">
+                <a14:useLocalDpi xmlns:a14="http://schemas.microsoft.com/office/drawing/2010/main" val="0"/>
+              </a:ext>
+            </a:extLst>
+          </a:blip>
+          <a:stretch>
+            <a:fillRect/>
+          </a:stretch>
+        </p:blipFill>
+        <p:spPr>
+          <a:xfrm>
+            <a:off x="20348455" y="16595121"/>
+            <a:ext cx="3777554" cy="1888778"/>
+          </a:xfrm>
+          <a:prstGeom prst="rect">
+            <a:avLst/>
+          </a:prstGeom>
+        </p:spPr>
+      </p:pic>
+      <p:pic>
+        <p:nvPicPr>
+          <p:cNvPr id="86" name="Picture 85" descr="A screenshot of a graph&#10;&#10;Description automatically generated">
+            <a:extLst>
+              <a:ext uri="{FF2B5EF4-FFF2-40B4-BE49-F238E27FC236}">
+                <a16:creationId xmlns:a16="http://schemas.microsoft.com/office/drawing/2014/main" id="{88832680-CC4A-6123-C961-17782A755A77}"/>
+              </a:ext>
+            </a:extLst>
+          </p:cNvPr>
+          <p:cNvPicPr>
+            <a:picLocks noChangeAspect="1"/>
+          </p:cNvPicPr>
+          <p:nvPr/>
+        </p:nvPicPr>
+        <p:blipFill>
+          <a:blip r:embed="rId27" cstate="print">
+            <a:extLst>
+              <a:ext uri="{28A0092B-C50C-407E-A947-70E740481C1C}">
+                <a14:useLocalDpi xmlns:a14="http://schemas.microsoft.com/office/drawing/2010/main" val="0"/>
+              </a:ext>
+            </a:extLst>
+          </a:blip>
+          <a:srcRect b="9102"/>
+          <a:stretch/>
+        </p:blipFill>
+        <p:spPr>
+          <a:xfrm>
+            <a:off x="21548914" y="11925526"/>
+            <a:ext cx="3838277" cy="3171727"/>
+          </a:xfrm>
+          <a:prstGeom prst="rect">
+            <a:avLst/>
+          </a:prstGeom>
+        </p:spPr>
+      </p:pic>
+      <p:pic>
+        <p:nvPicPr>
+          <p:cNvPr id="88" name="Picture 87" descr="A map with red lines&#10;&#10;Description automatically generated">
+            <a:extLst>
+              <a:ext uri="{FF2B5EF4-FFF2-40B4-BE49-F238E27FC236}">
+                <a16:creationId xmlns:a16="http://schemas.microsoft.com/office/drawing/2014/main" id="{BF640F8C-0962-E9DA-907A-53A1B6D49A4C}"/>
+              </a:ext>
+            </a:extLst>
+          </p:cNvPr>
+          <p:cNvPicPr>
+            <a:picLocks noChangeAspect="1"/>
+          </p:cNvPicPr>
+          <p:nvPr/>
+        </p:nvPicPr>
+        <p:blipFill>
+          <a:blip r:embed="rId28" cstate="print">
+            <a:extLst>
+              <a:ext uri="{28A0092B-C50C-407E-A947-70E740481C1C}">
+                <a14:useLocalDpi xmlns:a14="http://schemas.microsoft.com/office/drawing/2010/main" val="0"/>
+              </a:ext>
+            </a:extLst>
+          </a:blip>
+          <a:stretch>
+            <a:fillRect/>
+          </a:stretch>
+        </p:blipFill>
+        <p:spPr>
+          <a:xfrm>
+            <a:off x="19309424" y="13529791"/>
+            <a:ext cx="1981938" cy="1486454"/>
+          </a:xfrm>
+          <a:prstGeom prst="rect">
+            <a:avLst/>
+          </a:prstGeom>
+        </p:spPr>
+      </p:pic>
+      <p:cxnSp>
+        <p:nvCxnSpPr>
+          <p:cNvPr id="90" name="Straight Arrow Connector 89">
+            <a:extLst>
+              <a:ext uri="{FF2B5EF4-FFF2-40B4-BE49-F238E27FC236}">
+                <a16:creationId xmlns:a16="http://schemas.microsoft.com/office/drawing/2014/main" id="{78337DD3-DB70-9BCF-C5E7-639E9C167514}"/>
+              </a:ext>
+            </a:extLst>
+          </p:cNvPr>
+          <p:cNvCxnSpPr>
+            <a:cxnSpLocks/>
+            <a:stCxn id="73" idx="3"/>
+            <a:endCxn id="86" idx="1"/>
+          </p:cNvCxnSpPr>
+          <p:nvPr/>
+        </p:nvCxnSpPr>
+        <p:spPr>
+          <a:xfrm>
+            <a:off x="19021123" y="13497278"/>
+            <a:ext cx="2527791" cy="14112"/>
+          </a:xfrm>
+          <a:prstGeom prst="straightConnector1">
+            <a:avLst/>
+          </a:prstGeom>
+          <a:ln>
+            <a:tailEnd type="triangle"/>
+          </a:ln>
+        </p:spPr>
+        <p:style>
+          <a:lnRef idx="1">
+            <a:schemeClr val="dk1"/>
+          </a:lnRef>
+          <a:fillRef idx="0">
+            <a:schemeClr val="dk1"/>
+          </a:fillRef>
+          <a:effectRef idx="0">
+            <a:schemeClr val="dk1"/>
+          </a:effectRef>
+          <a:fontRef idx="minor">
+            <a:schemeClr val="tx1"/>
+          </a:fontRef>
+        </p:style>
+      </p:cxnSp>
+      <p:pic>
+        <p:nvPicPr>
+          <p:cNvPr id="84" name="Picture 83" descr="A graph of different colored bars&#10;&#10;Description automatically generated with medium confidence">
+            <a:extLst>
+              <a:ext uri="{FF2B5EF4-FFF2-40B4-BE49-F238E27FC236}">
+                <a16:creationId xmlns:a16="http://schemas.microsoft.com/office/drawing/2014/main" id="{2A03CE3D-09A2-70BB-0A35-5030745E226A}"/>
+              </a:ext>
+            </a:extLst>
+          </p:cNvPr>
+          <p:cNvPicPr>
+            <a:picLocks noChangeAspect="1"/>
+          </p:cNvPicPr>
+          <p:nvPr/>
+        </p:nvPicPr>
+        <p:blipFill>
+          <a:blip r:embed="rId29" cstate="print">
+            <a:extLst>
+              <a:ext uri="{28A0092B-C50C-407E-A947-70E740481C1C}">
+                <a14:useLocalDpi xmlns:a14="http://schemas.microsoft.com/office/drawing/2010/main" val="0"/>
+              </a:ext>
+            </a:extLst>
+          </a:blip>
+          <a:srcRect t="1" r="-819" b="9111"/>
+          <a:stretch/>
+        </p:blipFill>
+        <p:spPr>
+          <a:xfrm>
+            <a:off x="24532435" y="13410665"/>
+            <a:ext cx="3666086" cy="3004502"/>
+          </a:xfrm>
+          <a:prstGeom prst="rect">
+            <a:avLst/>
+          </a:prstGeom>
+        </p:spPr>
+      </p:pic>
+      <mc:AlternateContent xmlns:mc="http://schemas.openxmlformats.org/markup-compatibility/2006">
+        <mc:Choice xmlns:p14="http://schemas.microsoft.com/office/powerpoint/2010/main" Requires="p14">
+          <p:contentPart p14:bwMode="auto" r:id="rId30">
+            <p14:nvContentPartPr>
+              <p14:cNvPr id="111" name="Ink 110">
+                <a:extLst>
+                  <a:ext uri="{FF2B5EF4-FFF2-40B4-BE49-F238E27FC236}">
+                    <a16:creationId xmlns:a16="http://schemas.microsoft.com/office/drawing/2014/main" id="{DE6DE54C-C012-5500-F948-F56A09ECD979}"/>
+                  </a:ext>
+                </a:extLst>
+              </p14:cNvPr>
+              <p14:cNvContentPartPr/>
+              <p14:nvPr/>
+            </p14:nvContentPartPr>
+            <p14:xfrm>
+              <a:off x="20329440" y="17236440"/>
+              <a:ext cx="360" cy="360"/>
+            </p14:xfrm>
+          </p:contentPart>
+        </mc:Choice>
+        <mc:Fallback>
+          <p:pic>
+            <p:nvPicPr>
+              <p:cNvPr id="111" name="Ink 110">
+                <a:extLst>
+                  <a:ext uri="{FF2B5EF4-FFF2-40B4-BE49-F238E27FC236}">
+                    <a16:creationId xmlns:a16="http://schemas.microsoft.com/office/drawing/2014/main" id="{DE6DE54C-C012-5500-F948-F56A09ECD979}"/>
+                  </a:ext>
+                </a:extLst>
+              </p:cNvPr>
+              <p:cNvPicPr/>
+              <p:nvPr/>
+            </p:nvPicPr>
+            <p:blipFill>
+              <a:blip r:embed="rId31"/>
+              <a:stretch>
+                <a:fillRect/>
+              </a:stretch>
+            </p:blipFill>
+            <p:spPr>
+              <a:xfrm>
+                <a:off x="20325120" y="17231760"/>
+                <a:ext cx="9000" cy="9000"/>
+              </a:xfrm>
+              <a:prstGeom prst="rect">
+                <a:avLst/>
+              </a:prstGeom>
+            </p:spPr>
+          </p:pic>
+        </mc:Fallback>
+      </mc:AlternateContent>
+      <p:sp>
+        <p:nvSpPr>
+          <p:cNvPr id="40" name="Kobling: vinkel 39">
+            <a:extLst>
+              <a:ext uri="{FF2B5EF4-FFF2-40B4-BE49-F238E27FC236}">
+                <a16:creationId xmlns:a16="http://schemas.microsoft.com/office/drawing/2014/main" id="{61B87C4E-6B93-40DC-9A3E-EF17FF1B4F5D}"/>
+              </a:ext>
+            </a:extLst>
+          </p:cNvPr>
+          <p:cNvSpPr/>
+          <p:nvPr/>
+        </p:nvSpPr>
+        <p:spPr>
+          <a:xfrm rot="10800000" flipV="1">
+            <a:off x="15453359" y="15198562"/>
+            <a:ext cx="8839287" cy="958322"/>
+          </a:xfrm>
+          <a:prstGeom prst="bentConnector3">
+            <a:avLst>
+              <a:gd name="adj1" fmla="val 103768"/>
+            </a:avLst>
+          </a:prstGeom>
+          <a:solidFill>
+            <a:srgbClr val="000000">
+              <a:alpha val="5000"/>
+            </a:srgbClr>
+          </a:solidFill>
+          <a:ln w="9000">
+            <a:solidFill>
+              <a:srgbClr val="000000"/>
+            </a:solidFill>
+            <a:tailEnd type="arrow"/>
+          </a:ln>
+        </p:spPr>
+        <p:style>
+          <a:lnRef idx="1">
+            <a:schemeClr val="accent1"/>
+          </a:lnRef>
+          <a:fillRef idx="0">
+            <a:schemeClr val="accent1"/>
+          </a:fillRef>
+          <a:effectRef idx="0">
+            <a:schemeClr val="accent1"/>
+          </a:effectRef>
+          <a:fontRef idx="minor">
+            <a:schemeClr val="tx1"/>
+          </a:fontRef>
+        </p:style>
+        <p:txBody>
+          <a:bodyPr wrap="none" rtlCol="0" anchor="ctr" anchorCtr="1"/>
+          <a:lstStyle/>
+          <a:p>
+            <a:endParaRPr lang="fr-FR">
+              <a:solidFill>
+                <a:srgbClr val="000000"/>
+              </a:solidFill>
+            </a:endParaRPr>
+          </a:p>
+        </p:txBody>
+      </p:sp>
+      <p:sp>
+        <p:nvSpPr>
+          <p:cNvPr id="115" name="TextBox 114">
+            <a:extLst>
+              <a:ext uri="{FF2B5EF4-FFF2-40B4-BE49-F238E27FC236}">
+                <a16:creationId xmlns:a16="http://schemas.microsoft.com/office/drawing/2014/main" id="{6004CD4E-6F5C-DF42-3B8F-E04E74AD954E}"/>
+              </a:ext>
+            </a:extLst>
+          </p:cNvPr>
+          <p:cNvSpPr txBox="1"/>
+          <p:nvPr/>
+        </p:nvSpPr>
+        <p:spPr>
+          <a:xfrm>
+            <a:off x="24935134" y="17563564"/>
+            <a:ext cx="2554275" cy="1000274"/>
+          </a:xfrm>
+          <a:prstGeom prst="rect">
+            <a:avLst/>
+          </a:prstGeom>
+          <a:noFill/>
+        </p:spPr>
+        <p:txBody>
+          <a:bodyPr wrap="square" rtlCol="0">
+            <a:spAutoFit/>
+          </a:bodyPr>
+          <a:lstStyle/>
+          <a:p>
+            <a:r>
+              <a:rPr lang="de-DE" sz="1200" b="1" dirty="0"/>
+              <a:t>Final </a:t>
+            </a:r>
+            <a:r>
+              <a:rPr lang="de-DE" sz="1200" b="1" dirty="0" err="1"/>
+              <a:t>answer</a:t>
+            </a:r>
+            <a:r>
+              <a:rPr lang="de-DE" sz="1200" b="1" dirty="0"/>
+              <a:t>: </a:t>
+            </a:r>
+          </a:p>
+          <a:p>
+            <a:r>
+              <a:rPr lang="de-DE" sz="1200" dirty="0" err="1"/>
+              <a:t>There</a:t>
+            </a:r>
+            <a:r>
+              <a:rPr lang="de-DE" sz="1200" dirty="0"/>
+              <a:t> </a:t>
+            </a:r>
+            <a:r>
+              <a:rPr lang="de-DE" sz="1200" dirty="0" err="1"/>
+              <a:t>is</a:t>
+            </a:r>
+            <a:r>
+              <a:rPr lang="de-DE" sz="1200" dirty="0"/>
+              <a:t> </a:t>
+            </a:r>
+            <a:r>
+              <a:rPr lang="de-DE" sz="1200" b="1" dirty="0" err="1"/>
+              <a:t>no</a:t>
+            </a:r>
+            <a:r>
+              <a:rPr lang="de-DE" sz="1200" b="1" dirty="0"/>
+              <a:t> </a:t>
+            </a:r>
+            <a:r>
+              <a:rPr lang="de-DE" sz="1200" dirty="0"/>
+              <a:t>positive </a:t>
+            </a:r>
+            <a:r>
+              <a:rPr lang="de-DE" sz="1200" dirty="0" err="1"/>
+              <a:t>correlation</a:t>
+            </a:r>
+            <a:r>
+              <a:rPr lang="de-DE" sz="1200" dirty="0"/>
+              <a:t> </a:t>
+            </a:r>
+            <a:r>
+              <a:rPr lang="de-DE" sz="1200" dirty="0" err="1"/>
+              <a:t>between</a:t>
+            </a:r>
+            <a:r>
+              <a:rPr lang="de-DE" sz="1200" dirty="0"/>
+              <a:t> </a:t>
+            </a:r>
+            <a:r>
+              <a:rPr lang="de-DE" sz="1200" dirty="0" err="1"/>
+              <a:t>the</a:t>
+            </a:r>
+            <a:r>
+              <a:rPr lang="de-DE" sz="1200" dirty="0"/>
+              <a:t> </a:t>
+            </a:r>
+            <a:r>
+              <a:rPr lang="de-DE" sz="1200" dirty="0" err="1"/>
+              <a:t>ownership</a:t>
+            </a:r>
+            <a:r>
+              <a:rPr lang="de-DE" sz="1200" dirty="0"/>
+              <a:t> </a:t>
+            </a:r>
+            <a:r>
+              <a:rPr lang="de-DE" sz="1200" dirty="0" err="1"/>
+              <a:t>of</a:t>
+            </a:r>
+            <a:r>
+              <a:rPr lang="de-DE" sz="1200" dirty="0"/>
+              <a:t> Listenhunde and </a:t>
+            </a:r>
+            <a:r>
+              <a:rPr lang="de-DE" sz="1200" dirty="0" err="1"/>
+              <a:t>the</a:t>
+            </a:r>
+            <a:r>
+              <a:rPr lang="de-DE" sz="1200" dirty="0"/>
+              <a:t> </a:t>
+            </a:r>
+            <a:r>
+              <a:rPr lang="de-DE" sz="1200" dirty="0" err="1"/>
+              <a:t>district</a:t>
+            </a:r>
+            <a:r>
+              <a:rPr lang="de-DE" sz="1200" dirty="0"/>
+              <a:t>. </a:t>
+            </a:r>
+          </a:p>
+          <a:p>
+            <a:endParaRPr lang="en-GB" sz="1100" dirty="0"/>
+          </a:p>
+        </p:txBody>
+      </p:sp>
+      <p:sp>
+        <p:nvSpPr>
+          <p:cNvPr id="116" name="TextBox 115">
+            <a:extLst>
+              <a:ext uri="{FF2B5EF4-FFF2-40B4-BE49-F238E27FC236}">
+                <a16:creationId xmlns:a16="http://schemas.microsoft.com/office/drawing/2014/main" id="{BC23514B-6B6B-F2FE-A09C-823661277C07}"/>
+              </a:ext>
+            </a:extLst>
+          </p:cNvPr>
+          <p:cNvSpPr txBox="1"/>
+          <p:nvPr/>
+        </p:nvSpPr>
+        <p:spPr>
+          <a:xfrm>
+            <a:off x="20329440" y="15516045"/>
+            <a:ext cx="3063541" cy="830997"/>
+          </a:xfrm>
+          <a:prstGeom prst="rect">
+            <a:avLst/>
+          </a:prstGeom>
+          <a:noFill/>
+        </p:spPr>
+        <p:txBody>
+          <a:bodyPr wrap="square" rtlCol="0">
+            <a:spAutoFit/>
+          </a:bodyPr>
+          <a:lstStyle/>
+          <a:p>
+            <a:r>
+              <a:rPr lang="de-DE" sz="1200" dirty="0" err="1"/>
+              <a:t>According</a:t>
+            </a:r>
+            <a:r>
+              <a:rPr lang="de-DE" sz="1200" dirty="0"/>
+              <a:t> </a:t>
+            </a:r>
+            <a:r>
+              <a:rPr lang="de-DE" sz="1200" dirty="0" err="1"/>
+              <a:t>to</a:t>
+            </a:r>
+            <a:r>
+              <a:rPr lang="de-DE" sz="1200" dirty="0"/>
+              <a:t> </a:t>
+            </a:r>
+            <a:r>
+              <a:rPr lang="de-DE" sz="1200" dirty="0" err="1"/>
+              <a:t>the</a:t>
+            </a:r>
+            <a:r>
+              <a:rPr lang="de-DE" sz="1200" dirty="0"/>
+              <a:t> Pearson </a:t>
+            </a:r>
+            <a:r>
+              <a:rPr lang="de-DE" sz="1200" dirty="0" err="1"/>
+              <a:t>Coefficient</a:t>
+            </a:r>
+            <a:r>
+              <a:rPr lang="de-DE" sz="1200" dirty="0"/>
+              <a:t> </a:t>
+            </a:r>
+            <a:r>
+              <a:rPr lang="de-DE" sz="1200" dirty="0" err="1"/>
+              <a:t>results</a:t>
+            </a:r>
+            <a:r>
+              <a:rPr lang="de-DE" sz="1200" dirty="0"/>
+              <a:t>, </a:t>
+            </a:r>
+            <a:r>
+              <a:rPr lang="de-DE" sz="1200" dirty="0" err="1"/>
+              <a:t>there</a:t>
+            </a:r>
+            <a:r>
+              <a:rPr lang="de-DE" sz="1200" dirty="0"/>
+              <a:t> </a:t>
+            </a:r>
+            <a:r>
+              <a:rPr lang="de-DE" sz="1200" dirty="0" err="1"/>
+              <a:t>is</a:t>
+            </a:r>
+            <a:r>
+              <a:rPr lang="de-DE" sz="1200" dirty="0"/>
+              <a:t> </a:t>
+            </a:r>
+            <a:r>
+              <a:rPr lang="de-DE" sz="1200" b="1" dirty="0" err="1"/>
+              <a:t>only</a:t>
+            </a:r>
+            <a:r>
+              <a:rPr lang="de-DE" sz="1200" b="1" dirty="0"/>
+              <a:t> a </a:t>
+            </a:r>
+            <a:r>
+              <a:rPr lang="de-DE" sz="1200" b="1" dirty="0" err="1"/>
+              <a:t>weak</a:t>
+            </a:r>
+            <a:r>
+              <a:rPr lang="de-DE" sz="1200" b="1" dirty="0"/>
+              <a:t> </a:t>
+            </a:r>
+            <a:r>
+              <a:rPr lang="de-DE" sz="1200" b="1" dirty="0" err="1"/>
+              <a:t>correlation</a:t>
+            </a:r>
+            <a:r>
+              <a:rPr lang="de-DE" sz="1200" b="1" dirty="0"/>
+              <a:t> </a:t>
+            </a:r>
+            <a:r>
+              <a:rPr lang="de-DE" sz="1200" dirty="0" err="1"/>
+              <a:t>between</a:t>
+            </a:r>
+            <a:r>
+              <a:rPr lang="de-DE" sz="1200" dirty="0"/>
+              <a:t> </a:t>
+            </a:r>
+            <a:r>
+              <a:rPr lang="de-DE" sz="1200" dirty="0" err="1"/>
+              <a:t>district</a:t>
+            </a:r>
+            <a:r>
+              <a:rPr lang="de-DE" sz="1200" dirty="0"/>
+              <a:t> and Listenhund </a:t>
+            </a:r>
+            <a:r>
+              <a:rPr lang="de-DE" sz="1200" dirty="0" err="1"/>
+              <a:t>for</a:t>
+            </a:r>
+            <a:r>
+              <a:rPr lang="de-DE" sz="1200" dirty="0"/>
+              <a:t> </a:t>
+            </a:r>
+            <a:r>
+              <a:rPr lang="de-DE" sz="1200" dirty="0" err="1"/>
+              <a:t>three</a:t>
+            </a:r>
+            <a:r>
+              <a:rPr lang="de-DE" sz="1200" dirty="0"/>
+              <a:t> Listenhund </a:t>
+            </a:r>
+            <a:r>
+              <a:rPr lang="de-DE" sz="1200" dirty="0" err="1"/>
+              <a:t>breeds</a:t>
+            </a:r>
+            <a:r>
+              <a:rPr lang="de-DE" sz="1200" dirty="0"/>
+              <a:t> (</a:t>
+            </a:r>
+            <a:r>
+              <a:rPr lang="de-DE" sz="1200" b="1" dirty="0"/>
+              <a:t>0.2 – 0.35</a:t>
+            </a:r>
+            <a:r>
+              <a:rPr lang="de-DE" sz="1200" dirty="0"/>
+              <a:t>) and </a:t>
+            </a:r>
+            <a:r>
+              <a:rPr lang="de-DE" sz="1200" b="1" dirty="0" err="1"/>
+              <a:t>less</a:t>
+            </a:r>
+            <a:r>
+              <a:rPr lang="de-DE" sz="1200" b="1" dirty="0"/>
+              <a:t> </a:t>
+            </a:r>
+            <a:r>
+              <a:rPr lang="de-DE" sz="1200" b="1" dirty="0" err="1"/>
+              <a:t>for</a:t>
+            </a:r>
+            <a:r>
+              <a:rPr lang="de-DE" sz="1200" b="1" dirty="0"/>
+              <a:t> </a:t>
+            </a:r>
+            <a:r>
+              <a:rPr lang="de-DE" sz="1200" b="1" dirty="0" err="1"/>
+              <a:t>the</a:t>
+            </a:r>
+            <a:r>
+              <a:rPr lang="de-DE" sz="1200" b="1" dirty="0"/>
+              <a:t> </a:t>
+            </a:r>
+            <a:r>
+              <a:rPr lang="de-DE" sz="1200" b="1" dirty="0" err="1"/>
+              <a:t>others</a:t>
+            </a:r>
+            <a:r>
+              <a:rPr lang="de-DE" sz="1200" dirty="0"/>
+              <a:t>. </a:t>
+            </a:r>
+          </a:p>
+        </p:txBody>
+      </p:sp>
+      <p:sp>
+        <p:nvSpPr>
+          <p:cNvPr id="117" name="TextBox 116">
+            <a:extLst>
+              <a:ext uri="{FF2B5EF4-FFF2-40B4-BE49-F238E27FC236}">
+                <a16:creationId xmlns:a16="http://schemas.microsoft.com/office/drawing/2014/main" id="{495CF559-A177-7C6B-6851-605DB84D04A3}"/>
+              </a:ext>
+            </a:extLst>
+          </p:cNvPr>
+          <p:cNvSpPr txBox="1"/>
+          <p:nvPr/>
+        </p:nvSpPr>
+        <p:spPr>
+          <a:xfrm>
+            <a:off x="17798939" y="18015350"/>
+            <a:ext cx="2459956" cy="600164"/>
+          </a:xfrm>
+          <a:prstGeom prst="rect">
+            <a:avLst/>
+          </a:prstGeom>
+          <a:noFill/>
+        </p:spPr>
+        <p:txBody>
+          <a:bodyPr wrap="square" rtlCol="0">
+            <a:spAutoFit/>
+          </a:bodyPr>
+          <a:lstStyle/>
+          <a:p>
+            <a:r>
+              <a:rPr lang="de-DE" sz="1100" dirty="0" err="1"/>
+              <a:t>Additionally</a:t>
+            </a:r>
+            <a:r>
+              <a:rPr lang="de-DE" sz="1100" dirty="0"/>
+              <a:t>, </a:t>
+            </a:r>
+            <a:r>
+              <a:rPr lang="de-DE" sz="1100" dirty="0" err="1"/>
+              <a:t>the</a:t>
+            </a:r>
+            <a:r>
+              <a:rPr lang="de-DE" sz="1100" dirty="0"/>
+              <a:t> </a:t>
+            </a:r>
+            <a:r>
+              <a:rPr lang="de-DE" sz="1100" dirty="0" err="1"/>
+              <a:t>difference</a:t>
+            </a:r>
+            <a:r>
+              <a:rPr lang="de-DE" sz="1100" dirty="0"/>
+              <a:t> </a:t>
+            </a:r>
+            <a:r>
+              <a:rPr lang="de-DE" sz="1100" dirty="0" err="1"/>
+              <a:t>of</a:t>
+            </a:r>
+            <a:r>
+              <a:rPr lang="de-DE" sz="1100" dirty="0"/>
+              <a:t> relative </a:t>
+            </a:r>
+            <a:r>
+              <a:rPr lang="de-DE" sz="1100" dirty="0" err="1"/>
+              <a:t>percentage</a:t>
+            </a:r>
+            <a:r>
+              <a:rPr lang="de-DE" sz="1100" dirty="0"/>
+              <a:t> </a:t>
+            </a:r>
+            <a:r>
+              <a:rPr lang="de-DE" sz="1100" dirty="0" err="1"/>
+              <a:t>of</a:t>
+            </a:r>
+            <a:r>
+              <a:rPr lang="de-DE" sz="1100" dirty="0"/>
+              <a:t> Listenhunde in </a:t>
+            </a:r>
+            <a:r>
+              <a:rPr lang="de-DE" sz="1100" dirty="0" err="1"/>
+              <a:t>outer</a:t>
+            </a:r>
+            <a:r>
+              <a:rPr lang="de-DE" sz="1100" dirty="0"/>
+              <a:t> vs. </a:t>
+            </a:r>
+            <a:r>
+              <a:rPr lang="de-DE" sz="1100" dirty="0" err="1"/>
+              <a:t>inner</a:t>
+            </a:r>
+            <a:r>
+              <a:rPr lang="de-DE" sz="1100" dirty="0"/>
+              <a:t> </a:t>
+            </a:r>
+            <a:r>
+              <a:rPr lang="de-DE" sz="1100" dirty="0" err="1"/>
+              <a:t>districts</a:t>
+            </a:r>
+            <a:r>
+              <a:rPr lang="de-DE" sz="1100" dirty="0"/>
+              <a:t> </a:t>
+            </a:r>
+            <a:r>
+              <a:rPr lang="de-DE" sz="1100" dirty="0" err="1"/>
+              <a:t>is</a:t>
+            </a:r>
+            <a:r>
+              <a:rPr lang="de-DE" sz="1100" dirty="0"/>
+              <a:t> </a:t>
+            </a:r>
+            <a:r>
+              <a:rPr lang="de-DE" sz="1100" dirty="0" err="1"/>
+              <a:t>only</a:t>
+            </a:r>
+            <a:r>
+              <a:rPr lang="de-DE" sz="1100" dirty="0"/>
+              <a:t> </a:t>
+            </a:r>
+            <a:r>
+              <a:rPr lang="de-DE" sz="1100" b="1" dirty="0"/>
+              <a:t>~ 0.2 %. </a:t>
+            </a:r>
+          </a:p>
+        </p:txBody>
+      </p:sp>
+      <p:pic>
+        <p:nvPicPr>
+          <p:cNvPr id="78" name="Picture 77" descr="A graph with blue dots and white text&#10;&#10;Description automatically generated">
+            <a:extLst>
+              <a:ext uri="{FF2B5EF4-FFF2-40B4-BE49-F238E27FC236}">
+                <a16:creationId xmlns:a16="http://schemas.microsoft.com/office/drawing/2014/main" id="{8AB06253-B7D4-D811-5EAD-75527F937623}"/>
+              </a:ext>
+            </a:extLst>
+          </p:cNvPr>
+          <p:cNvPicPr>
+            <a:picLocks noChangeAspect="1"/>
+          </p:cNvPicPr>
+          <p:nvPr/>
+        </p:nvPicPr>
+        <p:blipFill>
+          <a:blip r:embed="rId32" cstate="print">
+            <a:extLst>
+              <a:ext uri="{28A0092B-C50C-407E-A947-70E740481C1C}">
+                <a14:useLocalDpi xmlns:a14="http://schemas.microsoft.com/office/drawing/2010/main" val="0"/>
+              </a:ext>
+            </a:extLst>
+          </a:blip>
+          <a:stretch>
+            <a:fillRect/>
+          </a:stretch>
+        </p:blipFill>
+        <p:spPr>
+          <a:xfrm>
+            <a:off x="15457384" y="15334065"/>
+            <a:ext cx="4782496" cy="2391248"/>
+          </a:xfrm>
+          <a:prstGeom prst="rect">
+            <a:avLst/>
+          </a:prstGeom>
+        </p:spPr>
+      </p:pic>
     </p:spTree>
     <p:extLst>
       <p:ext uri="{BB962C8B-B14F-4D97-AF65-F5344CB8AC3E}">
@@ -3598,6 +5489,24 @@
 </file>
 
 <file path=ppt/tags/tag12.xml><?xml version="1.0" encoding="utf-8"?>
+<p:tagLst xmlns:a="http://schemas.openxmlformats.org/drawingml/2006/main" xmlns:r="http://schemas.openxmlformats.org/officeDocument/2006/relationships" xmlns:p="http://schemas.openxmlformats.org/presentationml/2006/main">
+  <p:tag name="KSO_WM_BEAUTIFY_FLAG" val=""/>
+</p:tagLst>
+</file>
+
+<file path=ppt/tags/tag13.xml><?xml version="1.0" encoding="utf-8"?>
+<p:tagLst xmlns:a="http://schemas.openxmlformats.org/drawingml/2006/main" xmlns:r="http://schemas.openxmlformats.org/officeDocument/2006/relationships" xmlns:p="http://schemas.openxmlformats.org/presentationml/2006/main">
+  <p:tag name="KSO_WM_BEAUTIFY_FLAG" val=""/>
+</p:tagLst>
+</file>
+
+<file path=ppt/tags/tag14.xml><?xml version="1.0" encoding="utf-8"?>
+<p:tagLst xmlns:a="http://schemas.openxmlformats.org/drawingml/2006/main" xmlns:r="http://schemas.openxmlformats.org/officeDocument/2006/relationships" xmlns:p="http://schemas.openxmlformats.org/presentationml/2006/main">
+  <p:tag name="KSO_WM_BEAUTIFY_FLAG" val=""/>
+</p:tagLst>
+</file>
+
+<file path=ppt/tags/tag15.xml><?xml version="1.0" encoding="utf-8"?>
 <p:tagLst xmlns:a="http://schemas.openxmlformats.org/drawingml/2006/main" xmlns:r="http://schemas.openxmlformats.org/officeDocument/2006/relationships" xmlns:p="http://schemas.openxmlformats.org/presentationml/2006/main">
   <p:tag name="KSO_WM_BEAUTIFY_FLAG" val=""/>
 </p:tagLst>

</xml_diff>

<commit_message>
Kept changes in hypo1_material and poster-template
</commit_message>
<xml_diff>
--- a/poster-template/prj01-poster-template.pptx
+++ b/poster-template/prj01-poster-template.pptx
@@ -667,7 +667,7 @@
           <a:p>
             <a:fld id="{F1518A84-A489-4C9B-B420-2A77C4B50547}" type="datetimeFigureOut">
               <a:rPr lang="de-AT" smtClean="0"/>
-              <a:t>13.10.2024</a:t>
+              <a:t>14.10.2024</a:t>
             </a:fld>
             <a:endParaRPr lang="de-AT"/>
           </a:p>
@@ -4864,8 +4864,8 @@
           </a:prstGeom>
         </p:spPr>
       </p:pic>
-      <mc:AlternateContent xmlns:mc="http://schemas.openxmlformats.org/markup-compatibility/2006">
-        <mc:Choice xmlns:p14="http://schemas.microsoft.com/office/powerpoint/2010/main" Requires="p14">
+      <mc:AlternateContent xmlns:mc="http://schemas.openxmlformats.org/markup-compatibility/2006" xmlns:p14="http://schemas.microsoft.com/office/powerpoint/2010/main">
+        <mc:Choice Requires="p14">
           <p:contentPart p14:bwMode="auto" r:id="rId30">
             <p14:nvContentPartPr>
               <p14:cNvPr id="111" name="Ink 110">
@@ -4884,7 +4884,7 @@
             </p14:xfrm>
           </p:contentPart>
         </mc:Choice>
-        <mc:Fallback>
+        <mc:Fallback xmlns="">
           <p:pic>
             <p:nvPicPr>
               <p:cNvPr id="111" name="Ink 110">
@@ -5451,6 +5451,380 @@
           <a:xfrm>
             <a:off x="15457384" y="15334065"/>
             <a:ext cx="4782496" cy="2391248"/>
+          </a:xfrm>
+          <a:prstGeom prst="rect">
+            <a:avLst/>
+          </a:prstGeom>
+        </p:spPr>
+      </p:pic>
+      <p:sp>
+        <p:nvSpPr>
+          <p:cNvPr id="10" name="TextBox 9">
+            <a:extLst>
+              <a:ext uri="{FF2B5EF4-FFF2-40B4-BE49-F238E27FC236}">
+                <a16:creationId xmlns:a16="http://schemas.microsoft.com/office/drawing/2014/main" id="{875352A2-0144-4040-A474-23C011913C30}"/>
+              </a:ext>
+            </a:extLst>
+          </p:cNvPr>
+          <p:cNvSpPr txBox="1"/>
+          <p:nvPr/>
+        </p:nvSpPr>
+        <p:spPr>
+          <a:xfrm>
+            <a:off x="1769741" y="24246000"/>
+            <a:ext cx="12238831" cy="830997"/>
+          </a:xfrm>
+          <a:prstGeom prst="rect">
+            <a:avLst/>
+          </a:prstGeom>
+          <a:noFill/>
+        </p:spPr>
+        <p:txBody>
+          <a:bodyPr wrap="square" rtlCol="0">
+            <a:spAutoFit/>
+          </a:bodyPr>
+          <a:lstStyle/>
+          <a:p>
+            <a:r>
+              <a:rPr lang="en-US" sz="2400" dirty="0">
+                <a:latin typeface="Arial" panose="020B0604020202020204" pitchFamily="34" charset="0"/>
+                <a:cs typeface="Arial" panose="020B0604020202020204" pitchFamily="34" charset="0"/>
+              </a:rPr>
+              <a:t>The prevalence of specific dog breeds in Vienna is strongly influenced by real estate prices.</a:t>
+            </a:r>
+          </a:p>
+        </p:txBody>
+      </p:sp>
+      <p:pic>
+        <p:nvPicPr>
+          <p:cNvPr id="33" name="Picture 32">
+            <a:extLst>
+              <a:ext uri="{FF2B5EF4-FFF2-40B4-BE49-F238E27FC236}">
+                <a16:creationId xmlns:a16="http://schemas.microsoft.com/office/drawing/2014/main" id="{1CB550A3-BF1D-416E-852A-B3A91D7530F2}"/>
+              </a:ext>
+            </a:extLst>
+          </p:cNvPr>
+          <p:cNvPicPr>
+            <a:picLocks noChangeAspect="1"/>
+          </p:cNvPicPr>
+          <p:nvPr/>
+        </p:nvPicPr>
+        <p:blipFill>
+          <a:blip r:embed="rId33">
+            <a:extLst>
+              <a:ext uri="{28A0092B-C50C-407E-A947-70E740481C1C}">
+                <a14:useLocalDpi xmlns:a14="http://schemas.microsoft.com/office/drawing/2010/main" val="0"/>
+              </a:ext>
+            </a:extLst>
+          </a:blip>
+          <a:stretch>
+            <a:fillRect/>
+          </a:stretch>
+        </p:blipFill>
+        <p:spPr>
+          <a:xfrm>
+            <a:off x="1799907" y="25077390"/>
+            <a:ext cx="2873225" cy="1327961"/>
+          </a:xfrm>
+          <a:prstGeom prst="rect">
+            <a:avLst/>
+          </a:prstGeom>
+        </p:spPr>
+      </p:pic>
+      <p:pic>
+        <p:nvPicPr>
+          <p:cNvPr id="45" name="Picture 44">
+            <a:extLst>
+              <a:ext uri="{FF2B5EF4-FFF2-40B4-BE49-F238E27FC236}">
+                <a16:creationId xmlns:a16="http://schemas.microsoft.com/office/drawing/2014/main" id="{CF50FE34-8015-49C2-AEB0-37A72E629E1C}"/>
+              </a:ext>
+            </a:extLst>
+          </p:cNvPr>
+          <p:cNvPicPr>
+            <a:picLocks noChangeAspect="1"/>
+          </p:cNvPicPr>
+          <p:nvPr/>
+        </p:nvPicPr>
+        <p:blipFill>
+          <a:blip r:embed="rId34">
+            <a:extLst>
+              <a:ext uri="{28A0092B-C50C-407E-A947-70E740481C1C}">
+                <a14:useLocalDpi xmlns:a14="http://schemas.microsoft.com/office/drawing/2010/main" val="0"/>
+              </a:ext>
+            </a:extLst>
+          </a:blip>
+          <a:stretch>
+            <a:fillRect/>
+          </a:stretch>
+        </p:blipFill>
+        <p:spPr>
+          <a:xfrm>
+            <a:off x="2040790" y="26452878"/>
+            <a:ext cx="2632342" cy="1928789"/>
+          </a:xfrm>
+          <a:prstGeom prst="rect">
+            <a:avLst/>
+          </a:prstGeom>
+        </p:spPr>
+      </p:pic>
+      <p:sp>
+        <p:nvSpPr>
+          <p:cNvPr id="48" name="Arrow: Right 47">
+            <a:extLst>
+              <a:ext uri="{FF2B5EF4-FFF2-40B4-BE49-F238E27FC236}">
+                <a16:creationId xmlns:a16="http://schemas.microsoft.com/office/drawing/2014/main" id="{12C1352C-6EC9-4A61-981B-FD4AF32834BF}"/>
+              </a:ext>
+            </a:extLst>
+          </p:cNvPr>
+          <p:cNvSpPr/>
+          <p:nvPr/>
+        </p:nvSpPr>
+        <p:spPr>
+          <a:xfrm>
+            <a:off x="4889512" y="26299921"/>
+            <a:ext cx="749288" cy="507562"/>
+          </a:xfrm>
+          <a:prstGeom prst="rightArrow">
+            <a:avLst/>
+          </a:prstGeom>
+        </p:spPr>
+        <p:style>
+          <a:lnRef idx="2">
+            <a:schemeClr val="accent1">
+              <a:shade val="50000"/>
+            </a:schemeClr>
+          </a:lnRef>
+          <a:fillRef idx="1">
+            <a:schemeClr val="accent1"/>
+          </a:fillRef>
+          <a:effectRef idx="0">
+            <a:schemeClr val="accent1"/>
+          </a:effectRef>
+          <a:fontRef idx="minor">
+            <a:schemeClr val="lt1"/>
+          </a:fontRef>
+        </p:style>
+        <p:txBody>
+          <a:bodyPr rtlCol="0" anchor="ctr"/>
+          <a:lstStyle/>
+          <a:p>
+            <a:pPr algn="ctr"/>
+            <a:endParaRPr lang="en-US"/>
+          </a:p>
+        </p:txBody>
+      </p:sp>
+      <p:pic>
+        <p:nvPicPr>
+          <p:cNvPr id="55" name="Picture 54">
+            <a:extLst>
+              <a:ext uri="{FF2B5EF4-FFF2-40B4-BE49-F238E27FC236}">
+                <a16:creationId xmlns:a16="http://schemas.microsoft.com/office/drawing/2014/main" id="{24E87566-3811-402E-926C-01150FCAAF25}"/>
+              </a:ext>
+            </a:extLst>
+          </p:cNvPr>
+          <p:cNvPicPr>
+            <a:picLocks noChangeAspect="1"/>
+          </p:cNvPicPr>
+          <p:nvPr/>
+        </p:nvPicPr>
+        <p:blipFill>
+          <a:blip r:embed="rId35">
+            <a:extLst>
+              <a:ext uri="{28A0092B-C50C-407E-A947-70E740481C1C}">
+                <a14:useLocalDpi xmlns:a14="http://schemas.microsoft.com/office/drawing/2010/main" val="0"/>
+              </a:ext>
+            </a:extLst>
+          </a:blip>
+          <a:stretch>
+            <a:fillRect/>
+          </a:stretch>
+        </p:blipFill>
+        <p:spPr>
+          <a:xfrm>
+            <a:off x="5926926" y="24742280"/>
+            <a:ext cx="3762712" cy="3600000"/>
+          </a:xfrm>
+          <a:prstGeom prst="rect">
+            <a:avLst/>
+          </a:prstGeom>
+        </p:spPr>
+      </p:pic>
+      <p:pic>
+        <p:nvPicPr>
+          <p:cNvPr id="58" name="Picture 57">
+            <a:extLst>
+              <a:ext uri="{FF2B5EF4-FFF2-40B4-BE49-F238E27FC236}">
+                <a16:creationId xmlns:a16="http://schemas.microsoft.com/office/drawing/2014/main" id="{DCD5A78C-CAD7-42F9-BACD-659AB24C98AE}"/>
+              </a:ext>
+            </a:extLst>
+          </p:cNvPr>
+          <p:cNvPicPr>
+            <a:picLocks noChangeAspect="1"/>
+          </p:cNvPicPr>
+          <p:nvPr/>
+        </p:nvPicPr>
+        <p:blipFill>
+          <a:blip r:embed="rId36">
+            <a:extLst>
+              <a:ext uri="{28A0092B-C50C-407E-A947-70E740481C1C}">
+                <a14:useLocalDpi xmlns:a14="http://schemas.microsoft.com/office/drawing/2010/main" val="0"/>
+              </a:ext>
+            </a:extLst>
+          </a:blip>
+          <a:stretch>
+            <a:fillRect/>
+          </a:stretch>
+        </p:blipFill>
+        <p:spPr>
+          <a:xfrm>
+            <a:off x="10064727" y="24777551"/>
+            <a:ext cx="3721122" cy="3600000"/>
+          </a:xfrm>
+          <a:prstGeom prst="rect">
+            <a:avLst/>
+          </a:prstGeom>
+        </p:spPr>
+      </p:pic>
+      <p:sp>
+        <p:nvSpPr>
+          <p:cNvPr id="61" name="TextBox 60">
+            <a:extLst>
+              <a:ext uri="{FF2B5EF4-FFF2-40B4-BE49-F238E27FC236}">
+                <a16:creationId xmlns:a16="http://schemas.microsoft.com/office/drawing/2014/main" id="{32D5A727-F187-4238-8933-ECD680D32EFB}"/>
+              </a:ext>
+            </a:extLst>
+          </p:cNvPr>
+          <p:cNvSpPr txBox="1"/>
+          <p:nvPr/>
+        </p:nvSpPr>
+        <p:spPr>
+          <a:xfrm>
+            <a:off x="15089632" y="4562337"/>
+            <a:ext cx="4267515" cy="461665"/>
+          </a:xfrm>
+          <a:prstGeom prst="rect">
+            <a:avLst/>
+          </a:prstGeom>
+          <a:noFill/>
+        </p:spPr>
+        <p:txBody>
+          <a:bodyPr wrap="none" rtlCol="0">
+            <a:spAutoFit/>
+          </a:bodyPr>
+          <a:lstStyle/>
+          <a:p>
+            <a:r>
+              <a:rPr lang="en-US" sz="2400" b="1" dirty="0">
+                <a:latin typeface="Arial" panose="020B0604020202020204" pitchFamily="34" charset="0"/>
+                <a:cs typeface="Arial" panose="020B0604020202020204" pitchFamily="34" charset="0"/>
+              </a:rPr>
+              <a:t>Hypothesis 1 - Continuation</a:t>
+            </a:r>
+          </a:p>
+        </p:txBody>
+      </p:sp>
+      <p:pic>
+        <p:nvPicPr>
+          <p:cNvPr id="74" name="Picture 73">
+            <a:extLst>
+              <a:ext uri="{FF2B5EF4-FFF2-40B4-BE49-F238E27FC236}">
+                <a16:creationId xmlns:a16="http://schemas.microsoft.com/office/drawing/2014/main" id="{A48E352E-0BA9-4328-B248-E0100D4CA5D1}"/>
+              </a:ext>
+            </a:extLst>
+          </p:cNvPr>
+          <p:cNvPicPr>
+            <a:picLocks noChangeAspect="1"/>
+          </p:cNvPicPr>
+          <p:nvPr/>
+        </p:nvPicPr>
+        <p:blipFill>
+          <a:blip r:embed="rId37">
+            <a:extLst>
+              <a:ext uri="{28A0092B-C50C-407E-A947-70E740481C1C}">
+                <a14:useLocalDpi xmlns:a14="http://schemas.microsoft.com/office/drawing/2010/main" val="0"/>
+              </a:ext>
+            </a:extLst>
+          </a:blip>
+          <a:stretch>
+            <a:fillRect/>
+          </a:stretch>
+        </p:blipFill>
+        <p:spPr>
+          <a:xfrm>
+            <a:off x="15051114" y="5106938"/>
+            <a:ext cx="5805916" cy="4325407"/>
+          </a:xfrm>
+          <a:prstGeom prst="rect">
+            <a:avLst/>
+          </a:prstGeom>
+        </p:spPr>
+      </p:pic>
+      <p:pic>
+        <p:nvPicPr>
+          <p:cNvPr id="76" name="Picture 75">
+            <a:extLst>
+              <a:ext uri="{FF2B5EF4-FFF2-40B4-BE49-F238E27FC236}">
+                <a16:creationId xmlns:a16="http://schemas.microsoft.com/office/drawing/2014/main" id="{814673BC-1367-4D63-9171-066D0D70F182}"/>
+              </a:ext>
+            </a:extLst>
+          </p:cNvPr>
+          <p:cNvPicPr>
+            <a:picLocks noChangeAspect="1"/>
+          </p:cNvPicPr>
+          <p:nvPr/>
+        </p:nvPicPr>
+        <p:blipFill>
+          <a:blip r:embed="rId38">
+            <a:extLst>
+              <a:ext uri="{28A0092B-C50C-407E-A947-70E740481C1C}">
+                <a14:useLocalDpi xmlns:a14="http://schemas.microsoft.com/office/drawing/2010/main" val="0"/>
+              </a:ext>
+            </a:extLst>
+          </a:blip>
+          <a:stretch>
+            <a:fillRect/>
+          </a:stretch>
+        </p:blipFill>
+        <p:spPr>
+          <a:xfrm>
+            <a:off x="20988068" y="4472494"/>
+            <a:ext cx="6794065" cy="4047754"/>
+          </a:xfrm>
+          <a:prstGeom prst="rect">
+            <a:avLst/>
+          </a:prstGeom>
+        </p:spPr>
+      </p:pic>
+      <p:pic>
+        <p:nvPicPr>
+          <p:cNvPr id="82" name="Picture 81">
+            <a:extLst>
+              <a:ext uri="{FF2B5EF4-FFF2-40B4-BE49-F238E27FC236}">
+                <a16:creationId xmlns:a16="http://schemas.microsoft.com/office/drawing/2014/main" id="{0AC6B6D1-1445-4128-A82B-230D11E42083}"/>
+              </a:ext>
+            </a:extLst>
+          </p:cNvPr>
+          <p:cNvPicPr>
+            <a:picLocks noChangeAspect="1"/>
+          </p:cNvPicPr>
+          <p:nvPr/>
+        </p:nvPicPr>
+        <p:blipFill>
+          <a:blip r:embed="rId39">
+            <a:extLst>
+              <a:ext uri="{28A0092B-C50C-407E-A947-70E740481C1C}">
+                <a14:useLocalDpi xmlns:a14="http://schemas.microsoft.com/office/drawing/2010/main" val="0"/>
+              </a:ext>
+            </a:extLst>
+          </a:blip>
+          <a:stretch>
+            <a:fillRect/>
+          </a:stretch>
+        </p:blipFill>
+        <p:spPr>
+          <a:xfrm>
+            <a:off x="20857030" y="8735101"/>
+            <a:ext cx="7198961" cy="659415"/>
           </a:xfrm>
           <a:prstGeom prst="rect">
             <a:avLst/>

</xml_diff>

<commit_message>
adapted presentation to timelimit, adapted plots for readability part 2
</commit_message>
<xml_diff>
--- a/poster-template/prj01-poster-template.pptx
+++ b/poster-template/prj01-poster-template.pptx
@@ -667,7 +667,7 @@
           <a:p>
             <a:fld id="{F1518A84-A489-4C9B-B420-2A77C4B50547}" type="datetimeFigureOut">
               <a:rPr lang="de-AT" smtClean="0"/>
-              <a:t>14.10.2024</a:t>
+              <a:t>16.10.2024</a:t>
             </a:fld>
             <a:endParaRPr lang="de-AT"/>
           </a:p>
@@ -3125,61 +3125,7 @@
                 <a:cs typeface="Arial" panose="020B0604020202020204" pitchFamily="34" charset="0"/>
                 <a:sym typeface="+mn-ea"/>
               </a:rPr>
-              <a:t>There is a positive correlation between the ownership of </a:t>
-            </a:r>
-            <a:r>
-              <a:rPr lang="en-GB" sz="2400" b="1" dirty="0" err="1">
-                <a:latin typeface="Arial" panose="020B0604020202020204" pitchFamily="34" charset="0"/>
-                <a:ea typeface="思源黑体 CN Regular" panose="020B0500000000000000" charset="-122"/>
-                <a:cs typeface="Arial" panose="020B0604020202020204" pitchFamily="34" charset="0"/>
-                <a:sym typeface="+mn-ea"/>
-              </a:rPr>
-              <a:t>Listenhunde</a:t>
-            </a:r>
-            <a:r>
-              <a:rPr lang="en-GB" sz="2400" b="1" dirty="0">
-                <a:latin typeface="Arial" panose="020B0604020202020204" pitchFamily="34" charset="0"/>
-                <a:ea typeface="思源黑体 CN Regular" panose="020B0500000000000000" charset="-122"/>
-                <a:cs typeface="Arial" panose="020B0604020202020204" pitchFamily="34" charset="0"/>
-                <a:sym typeface="+mn-ea"/>
-              </a:rPr>
-              <a:t> and district, with a higher prevalence of </a:t>
-            </a:r>
-            <a:r>
-              <a:rPr lang="en-GB" sz="2400" b="1" dirty="0" err="1">
-                <a:latin typeface="Arial" panose="020B0604020202020204" pitchFamily="34" charset="0"/>
-                <a:ea typeface="思源黑体 CN Regular" panose="020B0500000000000000" charset="-122"/>
-                <a:cs typeface="Arial" panose="020B0604020202020204" pitchFamily="34" charset="0"/>
-                <a:sym typeface="+mn-ea"/>
-              </a:rPr>
-              <a:t>Listenhunde</a:t>
-            </a:r>
-            <a:r>
-              <a:rPr lang="en-GB" sz="2400" b="1" dirty="0">
-                <a:latin typeface="Arial" panose="020B0604020202020204" pitchFamily="34" charset="0"/>
-                <a:ea typeface="思源黑体 CN Regular" panose="020B0500000000000000" charset="-122"/>
-                <a:cs typeface="Arial" panose="020B0604020202020204" pitchFamily="34" charset="0"/>
-                <a:sym typeface="+mn-ea"/>
-              </a:rPr>
-              <a:t> ownership in outer </a:t>
-            </a:r>
-            <a:r>
-              <a:rPr lang="en-GB" sz="2400" b="1" dirty="0" err="1">
-                <a:latin typeface="Arial" panose="020B0604020202020204" pitchFamily="34" charset="0"/>
-                <a:ea typeface="思源黑体 CN Regular" panose="020B0500000000000000" charset="-122"/>
-                <a:cs typeface="Arial" panose="020B0604020202020204" pitchFamily="34" charset="0"/>
-                <a:sym typeface="+mn-ea"/>
-              </a:rPr>
-              <a:t>viennese</a:t>
-            </a:r>
-            <a:r>
-              <a:rPr lang="en-GB" sz="2400" b="1" dirty="0">
-                <a:latin typeface="Arial" panose="020B0604020202020204" pitchFamily="34" charset="0"/>
-                <a:ea typeface="思源黑体 CN Regular" panose="020B0500000000000000" charset="-122"/>
-                <a:cs typeface="Arial" panose="020B0604020202020204" pitchFamily="34" charset="0"/>
-                <a:sym typeface="+mn-ea"/>
-              </a:rPr>
-              <a:t> districts compared to inner districts.			</a:t>
+              <a:t>		</a:t>
             </a:r>
           </a:p>
           <a:p>
@@ -3195,17 +3141,73 @@
                 <a:cs typeface="Times New Roman" panose="02020603050405020304" pitchFamily="18" charset="0"/>
                 <a:sym typeface="+mn-ea"/>
               </a:rPr>
-              <a:t>			            </a:t>
-            </a:r>
-            <a:r>
-              <a:rPr lang="en-US" sz="1200" b="1" dirty="0">
-                <a:latin typeface="Times New Roman" panose="02020603050405020304" pitchFamily="18" charset="0"/>
-                <a:ea typeface="思源黑体 CN Regular" panose="020B0500000000000000" charset="-122"/>
-                <a:cs typeface="Times New Roman" panose="02020603050405020304" pitchFamily="18" charset="0"/>
-                <a:sym typeface="+mn-ea"/>
-              </a:rPr>
-              <a:t>maybe there is a 			                        correlation? </a:t>
-            </a:r>
+              <a:t>			           </a:t>
+            </a:r>
+          </a:p>
+          <a:p>
+            <a:pPr algn="just">
+              <a:spcAft>
+                <a:spcPts val="1200"/>
+              </a:spcAft>
+            </a:pPr>
+            <a:endParaRPr lang="en-US" sz="2400" b="1" dirty="0">
+              <a:latin typeface="Times New Roman" panose="02020603050405020304" pitchFamily="18" charset="0"/>
+              <a:ea typeface="思源黑体 CN Regular" panose="020B0500000000000000" charset="-122"/>
+              <a:cs typeface="Times New Roman" panose="02020603050405020304" pitchFamily="18" charset="0"/>
+              <a:sym typeface="+mn-ea"/>
+            </a:endParaRPr>
+          </a:p>
+          <a:p>
+            <a:pPr algn="just">
+              <a:spcAft>
+                <a:spcPts val="1200"/>
+              </a:spcAft>
+            </a:pPr>
+            <a:endParaRPr lang="en-US" sz="2400" b="1" dirty="0">
+              <a:latin typeface="Times New Roman" panose="02020603050405020304" pitchFamily="18" charset="0"/>
+              <a:ea typeface="思源黑体 CN Regular" panose="020B0500000000000000" charset="-122"/>
+              <a:cs typeface="Times New Roman" panose="02020603050405020304" pitchFamily="18" charset="0"/>
+              <a:sym typeface="+mn-ea"/>
+            </a:endParaRPr>
+          </a:p>
+          <a:p>
+            <a:pPr algn="just">
+              <a:spcAft>
+                <a:spcPts val="1200"/>
+              </a:spcAft>
+            </a:pPr>
+            <a:endParaRPr lang="en-US" sz="2400" b="1" dirty="0">
+              <a:latin typeface="Times New Roman" panose="02020603050405020304" pitchFamily="18" charset="0"/>
+              <a:ea typeface="思源黑体 CN Regular" panose="020B0500000000000000" charset="-122"/>
+              <a:cs typeface="Times New Roman" panose="02020603050405020304" pitchFamily="18" charset="0"/>
+              <a:sym typeface="+mn-ea"/>
+            </a:endParaRPr>
+          </a:p>
+          <a:p>
+            <a:pPr algn="just">
+              <a:spcAft>
+                <a:spcPts val="1200"/>
+              </a:spcAft>
+            </a:pPr>
+            <a:endParaRPr lang="en-US" sz="2400" b="1" dirty="0">
+              <a:latin typeface="Times New Roman" panose="02020603050405020304" pitchFamily="18" charset="0"/>
+              <a:ea typeface="思源黑体 CN Regular" panose="020B0500000000000000" charset="-122"/>
+              <a:cs typeface="Times New Roman" panose="02020603050405020304" pitchFamily="18" charset="0"/>
+              <a:sym typeface="+mn-ea"/>
+            </a:endParaRPr>
+          </a:p>
+          <a:p>
+            <a:pPr algn="just">
+              <a:spcAft>
+                <a:spcPts val="1200"/>
+              </a:spcAft>
+            </a:pPr>
+            <a:endParaRPr lang="en-US" sz="2400" b="1" dirty="0">
+              <a:latin typeface="Times New Roman" panose="02020603050405020304" pitchFamily="18" charset="0"/>
+              <a:ea typeface="思源黑体 CN Regular" panose="020B0500000000000000" charset="-122"/>
+              <a:cs typeface="Times New Roman" panose="02020603050405020304" pitchFamily="18" charset="0"/>
+              <a:sym typeface="+mn-ea"/>
+            </a:endParaRPr>
           </a:p>
           <a:p>
             <a:pPr algn="just">
@@ -3857,7 +3859,7 @@
         </p:blipFill>
         <p:spPr>
           <a:xfrm>
-            <a:off x="7805184" y="13756985"/>
+            <a:off x="8191737" y="13893194"/>
             <a:ext cx="5852245" cy="1577080"/>
           </a:xfrm>
           <a:prstGeom prst="rect">
@@ -3892,7 +3894,7 @@
         </p:blipFill>
         <p:spPr>
           <a:xfrm>
-            <a:off x="8269995" y="15535565"/>
+            <a:off x="8494428" y="15944175"/>
             <a:ext cx="4644073" cy="3270234"/>
           </a:xfrm>
           <a:prstGeom prst="rect">
@@ -4149,77 +4151,6 @@
           </a:p>
         </p:txBody>
       </p:sp>
-      <p:pic>
-        <p:nvPicPr>
-          <p:cNvPr id="64" name="Picture 63" descr="A group of blue and white bars&#10;&#10;Description automatically generated">
-            <a:extLst>
-              <a:ext uri="{FF2B5EF4-FFF2-40B4-BE49-F238E27FC236}">
-                <a16:creationId xmlns:a16="http://schemas.microsoft.com/office/drawing/2014/main" id="{8DBE783A-7580-30B1-1814-452FAE141650}"/>
-              </a:ext>
-            </a:extLst>
-          </p:cNvPr>
-          <p:cNvPicPr>
-            <a:picLocks noChangeAspect="1"/>
-          </p:cNvPicPr>
-          <p:nvPr/>
-        </p:nvPicPr>
-        <p:blipFill>
-          <a:blip r:embed="rId23" cstate="print">
-            <a:extLst>
-              <a:ext uri="{28A0092B-C50C-407E-A947-70E740481C1C}">
-                <a14:useLocalDpi xmlns:a14="http://schemas.microsoft.com/office/drawing/2010/main" val="0"/>
-              </a:ext>
-            </a:extLst>
-          </a:blip>
-          <a:stretch>
-            <a:fillRect/>
-          </a:stretch>
-        </p:blipFill>
-        <p:spPr>
-          <a:xfrm>
-            <a:off x="1822451" y="14297030"/>
-            <a:ext cx="5650463" cy="5609328"/>
-          </a:xfrm>
-          <a:prstGeom prst="rect">
-            <a:avLst/>
-          </a:prstGeom>
-        </p:spPr>
-      </p:pic>
-      <p:pic>
-        <p:nvPicPr>
-          <p:cNvPr id="57" name="Picture 56" descr="A graph of different colored squares&#10;&#10;Description automatically generated">
-            <a:extLst>
-              <a:ext uri="{FF2B5EF4-FFF2-40B4-BE49-F238E27FC236}">
-                <a16:creationId xmlns:a16="http://schemas.microsoft.com/office/drawing/2014/main" id="{D87B35BC-720C-EC80-6161-894D8F6EB9BB}"/>
-              </a:ext>
-            </a:extLst>
-          </p:cNvPr>
-          <p:cNvPicPr>
-            <a:picLocks noChangeAspect="1"/>
-          </p:cNvPicPr>
-          <p:nvPr/>
-        </p:nvPicPr>
-        <p:blipFill>
-          <a:blip r:embed="rId24">
-            <a:extLst>
-              <a:ext uri="{28A0092B-C50C-407E-A947-70E740481C1C}">
-                <a14:useLocalDpi xmlns:a14="http://schemas.microsoft.com/office/drawing/2010/main" val="0"/>
-              </a:ext>
-            </a:extLst>
-          </a:blip>
-          <a:srcRect t="6834" r="10545" b="6229"/>
-          <a:stretch/>
-        </p:blipFill>
-        <p:spPr>
-          <a:xfrm>
-            <a:off x="4293808" y="19132952"/>
-            <a:ext cx="8188444" cy="2981093"/>
-          </a:xfrm>
-          <a:prstGeom prst="rect">
-            <a:avLst/>
-          </a:prstGeom>
-        </p:spPr>
-      </p:pic>
       <p:sp>
         <p:nvSpPr>
           <p:cNvPr id="66" name="剪去对角的矩形 9">
@@ -4664,200 +4595,15 @@
           <p:nvPr/>
         </p:nvPicPr>
         <p:blipFill>
-          <a:blip r:embed="rId25"/>
+          <a:blip r:embed="rId23"/>
           <a:stretch>
             <a:fillRect/>
           </a:stretch>
         </p:blipFill>
         <p:spPr>
           <a:xfrm>
-            <a:off x="15039699" y="12832610"/>
-            <a:ext cx="3981424" cy="1329335"/>
-          </a:xfrm>
-          <a:prstGeom prst="rect">
-            <a:avLst/>
-          </a:prstGeom>
-        </p:spPr>
-      </p:pic>
-      <p:pic>
-        <p:nvPicPr>
-          <p:cNvPr id="80" name="Picture 79" descr="A comparison of a pie chart&#10;&#10;Description automatically generated">
-            <a:extLst>
-              <a:ext uri="{FF2B5EF4-FFF2-40B4-BE49-F238E27FC236}">
-                <a16:creationId xmlns:a16="http://schemas.microsoft.com/office/drawing/2014/main" id="{26DA01BF-2BD3-26D7-345C-2D819B93E89D}"/>
-              </a:ext>
-            </a:extLst>
-          </p:cNvPr>
-          <p:cNvPicPr>
-            <a:picLocks noChangeAspect="1"/>
-          </p:cNvPicPr>
-          <p:nvPr/>
-        </p:nvPicPr>
-        <p:blipFill>
-          <a:blip r:embed="rId26" cstate="print">
-            <a:extLst>
-              <a:ext uri="{28A0092B-C50C-407E-A947-70E740481C1C}">
-                <a14:useLocalDpi xmlns:a14="http://schemas.microsoft.com/office/drawing/2010/main" val="0"/>
-              </a:ext>
-            </a:extLst>
-          </a:blip>
-          <a:stretch>
-            <a:fillRect/>
-          </a:stretch>
-        </p:blipFill>
-        <p:spPr>
-          <a:xfrm>
-            <a:off x="20348455" y="16595121"/>
-            <a:ext cx="3777554" cy="1888778"/>
-          </a:xfrm>
-          <a:prstGeom prst="rect">
-            <a:avLst/>
-          </a:prstGeom>
-        </p:spPr>
-      </p:pic>
-      <p:pic>
-        <p:nvPicPr>
-          <p:cNvPr id="86" name="Picture 85" descr="A screenshot of a graph&#10;&#10;Description automatically generated">
-            <a:extLst>
-              <a:ext uri="{FF2B5EF4-FFF2-40B4-BE49-F238E27FC236}">
-                <a16:creationId xmlns:a16="http://schemas.microsoft.com/office/drawing/2014/main" id="{88832680-CC4A-6123-C961-17782A755A77}"/>
-              </a:ext>
-            </a:extLst>
-          </p:cNvPr>
-          <p:cNvPicPr>
-            <a:picLocks noChangeAspect="1"/>
-          </p:cNvPicPr>
-          <p:nvPr/>
-        </p:nvPicPr>
-        <p:blipFill>
-          <a:blip r:embed="rId27" cstate="print">
-            <a:extLst>
-              <a:ext uri="{28A0092B-C50C-407E-A947-70E740481C1C}">
-                <a14:useLocalDpi xmlns:a14="http://schemas.microsoft.com/office/drawing/2010/main" val="0"/>
-              </a:ext>
-            </a:extLst>
-          </a:blip>
-          <a:srcRect b="9102"/>
-          <a:stretch/>
-        </p:blipFill>
-        <p:spPr>
-          <a:xfrm>
-            <a:off x="21548914" y="11925526"/>
-            <a:ext cx="3838277" cy="3171727"/>
-          </a:xfrm>
-          <a:prstGeom prst="rect">
-            <a:avLst/>
-          </a:prstGeom>
-        </p:spPr>
-      </p:pic>
-      <p:pic>
-        <p:nvPicPr>
-          <p:cNvPr id="88" name="Picture 87" descr="A map with red lines&#10;&#10;Description automatically generated">
-            <a:extLst>
-              <a:ext uri="{FF2B5EF4-FFF2-40B4-BE49-F238E27FC236}">
-                <a16:creationId xmlns:a16="http://schemas.microsoft.com/office/drawing/2014/main" id="{BF640F8C-0962-E9DA-907A-53A1B6D49A4C}"/>
-              </a:ext>
-            </a:extLst>
-          </p:cNvPr>
-          <p:cNvPicPr>
-            <a:picLocks noChangeAspect="1"/>
-          </p:cNvPicPr>
-          <p:nvPr/>
-        </p:nvPicPr>
-        <p:blipFill>
-          <a:blip r:embed="rId28" cstate="print">
-            <a:extLst>
-              <a:ext uri="{28A0092B-C50C-407E-A947-70E740481C1C}">
-                <a14:useLocalDpi xmlns:a14="http://schemas.microsoft.com/office/drawing/2010/main" val="0"/>
-              </a:ext>
-            </a:extLst>
-          </a:blip>
-          <a:stretch>
-            <a:fillRect/>
-          </a:stretch>
-        </p:blipFill>
-        <p:spPr>
-          <a:xfrm>
-            <a:off x="19309424" y="13529791"/>
-            <a:ext cx="1981938" cy="1486454"/>
-          </a:xfrm>
-          <a:prstGeom prst="rect">
-            <a:avLst/>
-          </a:prstGeom>
-        </p:spPr>
-      </p:pic>
-      <p:cxnSp>
-        <p:nvCxnSpPr>
-          <p:cNvPr id="90" name="Straight Arrow Connector 89">
-            <a:extLst>
-              <a:ext uri="{FF2B5EF4-FFF2-40B4-BE49-F238E27FC236}">
-                <a16:creationId xmlns:a16="http://schemas.microsoft.com/office/drawing/2014/main" id="{78337DD3-DB70-9BCF-C5E7-639E9C167514}"/>
-              </a:ext>
-            </a:extLst>
-          </p:cNvPr>
-          <p:cNvCxnSpPr>
-            <a:cxnSpLocks/>
-            <a:stCxn id="73" idx="3"/>
-            <a:endCxn id="86" idx="1"/>
-          </p:cNvCxnSpPr>
-          <p:nvPr/>
-        </p:nvCxnSpPr>
-        <p:spPr>
-          <a:xfrm>
-            <a:off x="19021123" y="13497278"/>
-            <a:ext cx="2527791" cy="14112"/>
-          </a:xfrm>
-          <a:prstGeom prst="straightConnector1">
-            <a:avLst/>
-          </a:prstGeom>
-          <a:ln>
-            <a:tailEnd type="triangle"/>
-          </a:ln>
-        </p:spPr>
-        <p:style>
-          <a:lnRef idx="1">
-            <a:schemeClr val="dk1"/>
-          </a:lnRef>
-          <a:fillRef idx="0">
-            <a:schemeClr val="dk1"/>
-          </a:fillRef>
-          <a:effectRef idx="0">
-            <a:schemeClr val="dk1"/>
-          </a:effectRef>
-          <a:fontRef idx="minor">
-            <a:schemeClr val="tx1"/>
-          </a:fontRef>
-        </p:style>
-      </p:cxnSp>
-      <p:pic>
-        <p:nvPicPr>
-          <p:cNvPr id="84" name="Picture 83" descr="A graph of different colored bars&#10;&#10;Description automatically generated with medium confidence">
-            <a:extLst>
-              <a:ext uri="{FF2B5EF4-FFF2-40B4-BE49-F238E27FC236}">
-                <a16:creationId xmlns:a16="http://schemas.microsoft.com/office/drawing/2014/main" id="{2A03CE3D-09A2-70BB-0A35-5030745E226A}"/>
-              </a:ext>
-            </a:extLst>
-          </p:cNvPr>
-          <p:cNvPicPr>
-            <a:picLocks noChangeAspect="1"/>
-          </p:cNvPicPr>
-          <p:nvPr/>
-        </p:nvPicPr>
-        <p:blipFill>
-          <a:blip r:embed="rId29" cstate="print">
-            <a:extLst>
-              <a:ext uri="{28A0092B-C50C-407E-A947-70E740481C1C}">
-                <a14:useLocalDpi xmlns:a14="http://schemas.microsoft.com/office/drawing/2010/main" val="0"/>
-              </a:ext>
-            </a:extLst>
-          </a:blip>
-          <a:srcRect t="1" r="-819" b="9111"/>
-          <a:stretch/>
-        </p:blipFill>
-        <p:spPr>
-          <a:xfrm>
-            <a:off x="24532435" y="13410665"/>
-            <a:ext cx="3666086" cy="3004502"/>
+            <a:off x="22336430" y="11203857"/>
+            <a:ext cx="5508597" cy="1839234"/>
           </a:xfrm>
           <a:prstGeom prst="rect">
             <a:avLst/>
@@ -4866,7 +4612,7 @@
       </p:pic>
       <mc:AlternateContent xmlns:mc="http://schemas.openxmlformats.org/markup-compatibility/2006" xmlns:p14="http://schemas.microsoft.com/office/powerpoint/2010/main">
         <mc:Choice Requires="p14">
-          <p:contentPart p14:bwMode="auto" r:id="rId30">
+          <p:contentPart p14:bwMode="auto" r:id="rId24">
             <p14:nvContentPartPr>
               <p14:cNvPr id="111" name="Ink 110">
                 <a:extLst>
@@ -4917,66 +4663,6 @@
       </mc:AlternateContent>
       <p:sp>
         <p:nvSpPr>
-          <p:cNvPr id="40" name="Kobling: vinkel 39">
-            <a:extLst>
-              <a:ext uri="{FF2B5EF4-FFF2-40B4-BE49-F238E27FC236}">
-                <a16:creationId xmlns:a16="http://schemas.microsoft.com/office/drawing/2014/main" id="{61B87C4E-6B93-40DC-9A3E-EF17FF1B4F5D}"/>
-              </a:ext>
-            </a:extLst>
-          </p:cNvPr>
-          <p:cNvSpPr/>
-          <p:nvPr/>
-        </p:nvSpPr>
-        <p:spPr>
-          <a:xfrm rot="10800000" flipV="1">
-            <a:off x="15453359" y="15198562"/>
-            <a:ext cx="8839287" cy="958322"/>
-          </a:xfrm>
-          <a:prstGeom prst="bentConnector3">
-            <a:avLst>
-              <a:gd name="adj1" fmla="val 103768"/>
-            </a:avLst>
-          </a:prstGeom>
-          <a:solidFill>
-            <a:srgbClr val="000000">
-              <a:alpha val="5000"/>
-            </a:srgbClr>
-          </a:solidFill>
-          <a:ln w="9000">
-            <a:solidFill>
-              <a:srgbClr val="000000"/>
-            </a:solidFill>
-            <a:tailEnd type="arrow"/>
-          </a:ln>
-        </p:spPr>
-        <p:style>
-          <a:lnRef idx="1">
-            <a:schemeClr val="accent1"/>
-          </a:lnRef>
-          <a:fillRef idx="0">
-            <a:schemeClr val="accent1"/>
-          </a:fillRef>
-          <a:effectRef idx="0">
-            <a:schemeClr val="accent1"/>
-          </a:effectRef>
-          <a:fontRef idx="minor">
-            <a:schemeClr val="tx1"/>
-          </a:fontRef>
-        </p:style>
-        <p:txBody>
-          <a:bodyPr wrap="none" rtlCol="0" anchor="ctr" anchorCtr="1"/>
-          <a:lstStyle/>
-          <a:p>
-            <a:endParaRPr lang="fr-FR">
-              <a:solidFill>
-                <a:srgbClr val="000000"/>
-              </a:solidFill>
-            </a:endParaRPr>
-          </a:p>
-        </p:txBody>
-      </p:sp>
-      <p:sp>
-        <p:nvSpPr>
           <p:cNvPr id="115" name="TextBox 114">
             <a:extLst>
               <a:ext uri="{FF2B5EF4-FFF2-40B4-BE49-F238E27FC236}">
@@ -4989,8 +4675,8 @@
         </p:nvSpPr>
         <p:spPr>
           <a:xfrm>
-            <a:off x="24935134" y="17563564"/>
-            <a:ext cx="2554275" cy="1000274"/>
+            <a:off x="20812650" y="17221404"/>
+            <a:ext cx="6356119" cy="1369606"/>
           </a:xfrm>
           <a:prstGeom prst="rect">
             <a:avLst/>
@@ -5004,101 +4690,97 @@
           <a:lstStyle/>
           <a:p>
             <a:r>
-              <a:rPr lang="de-DE" sz="1200" b="1" dirty="0"/>
-              <a:t>Final </a:t>
-            </a:r>
-            <a:r>
-              <a:rPr lang="de-DE" sz="1200" b="1" dirty="0" err="1"/>
-              <a:t>answer</a:t>
-            </a:r>
-            <a:r>
-              <a:rPr lang="de-DE" sz="1200" b="1" dirty="0"/>
+              <a:rPr lang="de-DE" sz="2400" b="1" i="1" u="sng" dirty="0" err="1"/>
+              <a:t>Answer</a:t>
+            </a:r>
+            <a:r>
+              <a:rPr lang="de-DE" sz="2400" b="1" dirty="0"/>
               <a:t>: </a:t>
             </a:r>
           </a:p>
           <a:p>
             <a:r>
-              <a:rPr lang="de-DE" sz="1200" dirty="0" err="1"/>
+              <a:rPr lang="de-DE" sz="2400" dirty="0" err="1"/>
               <a:t>There</a:t>
             </a:r>
             <a:r>
-              <a:rPr lang="de-DE" sz="1200" dirty="0"/>
+              <a:rPr lang="de-DE" sz="2400" dirty="0"/>
               <a:t> </a:t>
             </a:r>
             <a:r>
-              <a:rPr lang="de-DE" sz="1200" dirty="0" err="1"/>
+              <a:rPr lang="de-DE" sz="2400" dirty="0" err="1"/>
               <a:t>is</a:t>
             </a:r>
             <a:r>
-              <a:rPr lang="de-DE" sz="1200" dirty="0"/>
+              <a:rPr lang="de-DE" sz="2400" dirty="0"/>
               <a:t> </a:t>
             </a:r>
             <a:r>
-              <a:rPr lang="de-DE" sz="1200" b="1" dirty="0" err="1"/>
+              <a:rPr lang="de-DE" sz="2400" b="1" dirty="0" err="1"/>
               <a:t>no</a:t>
             </a:r>
             <a:r>
-              <a:rPr lang="de-DE" sz="1200" b="1" dirty="0"/>
+              <a:rPr lang="de-DE" sz="2400" b="1" dirty="0"/>
               <a:t> </a:t>
             </a:r>
             <a:r>
-              <a:rPr lang="de-DE" sz="1200" dirty="0"/>
+              <a:rPr lang="de-DE" sz="2400" dirty="0"/>
               <a:t>positive </a:t>
             </a:r>
             <a:r>
-              <a:rPr lang="de-DE" sz="1200" dirty="0" err="1"/>
+              <a:rPr lang="de-DE" sz="2400" dirty="0" err="1"/>
               <a:t>correlation</a:t>
             </a:r>
             <a:r>
-              <a:rPr lang="de-DE" sz="1200" dirty="0"/>
+              <a:rPr lang="de-DE" sz="2400" dirty="0"/>
               <a:t> </a:t>
             </a:r>
             <a:r>
-              <a:rPr lang="de-DE" sz="1200" dirty="0" err="1"/>
+              <a:rPr lang="de-DE" sz="2400" dirty="0" err="1"/>
               <a:t>between</a:t>
             </a:r>
             <a:r>
-              <a:rPr lang="de-DE" sz="1200" dirty="0"/>
+              <a:rPr lang="de-DE" sz="2400" dirty="0"/>
               <a:t> </a:t>
             </a:r>
             <a:r>
-              <a:rPr lang="de-DE" sz="1200" dirty="0" err="1"/>
+              <a:rPr lang="de-DE" sz="2400" dirty="0" err="1"/>
               <a:t>the</a:t>
             </a:r>
             <a:r>
-              <a:rPr lang="de-DE" sz="1200" dirty="0"/>
+              <a:rPr lang="de-DE" sz="2400" dirty="0"/>
               <a:t> </a:t>
             </a:r>
             <a:r>
-              <a:rPr lang="de-DE" sz="1200" dirty="0" err="1"/>
+              <a:rPr lang="de-DE" sz="2400" dirty="0" err="1"/>
               <a:t>ownership</a:t>
             </a:r>
             <a:r>
-              <a:rPr lang="de-DE" sz="1200" dirty="0"/>
+              <a:rPr lang="de-DE" sz="2400" dirty="0"/>
               <a:t> </a:t>
             </a:r>
             <a:r>
-              <a:rPr lang="de-DE" sz="1200" dirty="0" err="1"/>
+              <a:rPr lang="de-DE" sz="2400" dirty="0" err="1"/>
               <a:t>of</a:t>
             </a:r>
             <a:r>
-              <a:rPr lang="de-DE" sz="1200" dirty="0"/>
+              <a:rPr lang="de-DE" sz="2400" dirty="0"/>
               <a:t> Listenhunde and </a:t>
             </a:r>
             <a:r>
-              <a:rPr lang="de-DE" sz="1200" dirty="0" err="1"/>
+              <a:rPr lang="de-DE" sz="2400" dirty="0" err="1"/>
               <a:t>the</a:t>
             </a:r>
             <a:r>
-              <a:rPr lang="de-DE" sz="1200" dirty="0"/>
+              <a:rPr lang="de-DE" sz="2400" dirty="0"/>
               <a:t> </a:t>
             </a:r>
             <a:r>
-              <a:rPr lang="de-DE" sz="1200" dirty="0" err="1"/>
+              <a:rPr lang="de-DE" sz="2400" dirty="0" err="1"/>
               <a:t>district</a:t>
             </a:r>
             <a:r>
-              <a:rPr lang="de-DE" sz="1200" dirty="0"/>
+              <a:rPr lang="de-DE" sz="2400" dirty="0"/>
               <a:t>. </a:t>
             </a:r>
           </a:p>
@@ -5109,10 +4791,10 @@
       </p:sp>
       <p:sp>
         <p:nvSpPr>
-          <p:cNvPr id="116" name="TextBox 115">
-            <a:extLst>
-              <a:ext uri="{FF2B5EF4-FFF2-40B4-BE49-F238E27FC236}">
-                <a16:creationId xmlns:a16="http://schemas.microsoft.com/office/drawing/2014/main" id="{BC23514B-6B6B-F2FE-A09C-823661277C07}"/>
+          <p:cNvPr id="117" name="TextBox 116">
+            <a:extLst>
+              <a:ext uri="{FF2B5EF4-FFF2-40B4-BE49-F238E27FC236}">
+                <a16:creationId xmlns:a16="http://schemas.microsoft.com/office/drawing/2014/main" id="{495CF559-A177-7C6B-6851-605DB84D04A3}"/>
               </a:ext>
             </a:extLst>
           </p:cNvPr>
@@ -5121,8 +4803,8 @@
         </p:nvSpPr>
         <p:spPr>
           <a:xfrm>
-            <a:off x="20329440" y="15516045"/>
-            <a:ext cx="3063541" cy="830997"/>
+            <a:off x="23680820" y="13804835"/>
+            <a:ext cx="4317390" cy="523220"/>
           </a:xfrm>
           <a:prstGeom prst="rect">
             <a:avLst/>
@@ -5136,174 +4818,98 @@
           <a:lstStyle/>
           <a:p>
             <a:r>
-              <a:rPr lang="de-DE" sz="1200" dirty="0" err="1"/>
-              <a:t>According</a:t>
-            </a:r>
-            <a:r>
-              <a:rPr lang="de-DE" sz="1200" dirty="0"/>
+              <a:rPr lang="de-DE" sz="1400" b="1" dirty="0"/>
+              <a:t>2) </a:t>
+            </a:r>
+            <a:r>
+              <a:rPr lang="de-DE" sz="1400" dirty="0"/>
+              <a:t>The </a:t>
+            </a:r>
+            <a:r>
+              <a:rPr lang="de-DE" sz="1400" dirty="0" err="1"/>
+              <a:t>difference</a:t>
+            </a:r>
+            <a:r>
+              <a:rPr lang="de-DE" sz="1400" dirty="0"/>
               <a:t> </a:t>
             </a:r>
             <a:r>
-              <a:rPr lang="de-DE" sz="1200" dirty="0" err="1"/>
-              <a:t>to</a:t>
-            </a:r>
-            <a:r>
-              <a:rPr lang="de-DE" sz="1200" dirty="0"/>
+              <a:rPr lang="de-DE" sz="1400" dirty="0" err="1"/>
+              <a:t>of</a:t>
+            </a:r>
+            <a:r>
+              <a:rPr lang="de-DE" sz="1400" dirty="0"/>
+              <a:t> relative </a:t>
+            </a:r>
+            <a:r>
+              <a:rPr lang="de-DE" sz="1400" dirty="0" err="1"/>
+              <a:t>percentage</a:t>
+            </a:r>
+            <a:r>
+              <a:rPr lang="de-DE" sz="1400" dirty="0"/>
               <a:t> </a:t>
             </a:r>
             <a:r>
-              <a:rPr lang="de-DE" sz="1200" dirty="0" err="1"/>
-              <a:t>the</a:t>
-            </a:r>
-            <a:r>
-              <a:rPr lang="de-DE" sz="1200" dirty="0"/>
-              <a:t> Pearson </a:t>
-            </a:r>
-            <a:r>
-              <a:rPr lang="de-DE" sz="1200" dirty="0" err="1"/>
-              <a:t>Coefficient</a:t>
-            </a:r>
-            <a:r>
-              <a:rPr lang="de-DE" sz="1200" dirty="0"/>
+              <a:rPr lang="de-DE" sz="1400" dirty="0" err="1"/>
+              <a:t>of</a:t>
+            </a:r>
+            <a:r>
+              <a:rPr lang="de-DE" sz="1400" dirty="0"/>
+              <a:t> Listenhunde in </a:t>
+            </a:r>
+            <a:r>
+              <a:rPr lang="de-DE" sz="1400" b="1" dirty="0" err="1"/>
+              <a:t>outer</a:t>
+            </a:r>
+            <a:r>
+              <a:rPr lang="de-DE" sz="1400" dirty="0"/>
+              <a:t> vs. </a:t>
+            </a:r>
+            <a:r>
+              <a:rPr lang="de-DE" sz="1400" b="1" dirty="0" err="1"/>
+              <a:t>inner</a:t>
+            </a:r>
+            <a:r>
+              <a:rPr lang="de-DE" sz="1400" dirty="0"/>
               <a:t> </a:t>
             </a:r>
             <a:r>
-              <a:rPr lang="de-DE" sz="1200" dirty="0" err="1"/>
-              <a:t>results</a:t>
-            </a:r>
-            <a:r>
-              <a:rPr lang="de-DE" sz="1200" dirty="0"/>
-              <a:t>, </a:t>
-            </a:r>
-            <a:r>
-              <a:rPr lang="de-DE" sz="1200" dirty="0" err="1"/>
-              <a:t>there</a:t>
-            </a:r>
-            <a:r>
-              <a:rPr lang="de-DE" sz="1200" dirty="0"/>
+              <a:rPr lang="de-DE" sz="1400" dirty="0" err="1"/>
+              <a:t>districts</a:t>
+            </a:r>
+            <a:r>
+              <a:rPr lang="de-DE" sz="1400" dirty="0"/>
               <a:t> </a:t>
             </a:r>
             <a:r>
-              <a:rPr lang="de-DE" sz="1200" dirty="0" err="1"/>
+              <a:rPr lang="de-DE" sz="1400" dirty="0" err="1"/>
               <a:t>is</a:t>
             </a:r>
             <a:r>
-              <a:rPr lang="de-DE" sz="1200" dirty="0"/>
+              <a:rPr lang="de-DE" sz="1400" dirty="0"/>
               <a:t> </a:t>
             </a:r>
             <a:r>
-              <a:rPr lang="de-DE" sz="1200" b="1" dirty="0" err="1"/>
+              <a:rPr lang="de-DE" sz="1400" dirty="0" err="1"/>
               <a:t>only</a:t>
             </a:r>
             <a:r>
-              <a:rPr lang="de-DE" sz="1200" b="1" dirty="0"/>
-              <a:t> a </a:t>
-            </a:r>
-            <a:r>
-              <a:rPr lang="de-DE" sz="1200" b="1" dirty="0" err="1"/>
-              <a:t>weak</a:t>
-            </a:r>
-            <a:r>
-              <a:rPr lang="de-DE" sz="1200" b="1" dirty="0"/>
+              <a:rPr lang="de-DE" sz="1400" dirty="0"/>
               <a:t> </a:t>
             </a:r>
             <a:r>
-              <a:rPr lang="de-DE" sz="1200" b="1" dirty="0" err="1"/>
-              <a:t>correlation</a:t>
-            </a:r>
-            <a:r>
-              <a:rPr lang="de-DE" sz="1200" b="1" dirty="0"/>
-              <a:t> </a:t>
-            </a:r>
-            <a:r>
-              <a:rPr lang="de-DE" sz="1200" dirty="0" err="1"/>
-              <a:t>between</a:t>
-            </a:r>
-            <a:r>
-              <a:rPr lang="de-DE" sz="1200" dirty="0"/>
-              <a:t> </a:t>
-            </a:r>
-            <a:r>
-              <a:rPr lang="de-DE" sz="1200" dirty="0" err="1"/>
-              <a:t>district</a:t>
-            </a:r>
-            <a:r>
-              <a:rPr lang="de-DE" sz="1200" dirty="0"/>
-              <a:t> and Listenhund </a:t>
-            </a:r>
-            <a:r>
-              <a:rPr lang="de-DE" sz="1200" dirty="0" err="1"/>
-              <a:t>for</a:t>
-            </a:r>
-            <a:r>
-              <a:rPr lang="de-DE" sz="1200" dirty="0"/>
-              <a:t> </a:t>
-            </a:r>
-            <a:r>
-              <a:rPr lang="de-DE" sz="1200" dirty="0" err="1"/>
-              <a:t>three</a:t>
-            </a:r>
-            <a:r>
-              <a:rPr lang="de-DE" sz="1200" dirty="0"/>
-              <a:t> Listenhund </a:t>
-            </a:r>
-            <a:r>
-              <a:rPr lang="de-DE" sz="1200" dirty="0" err="1"/>
-              <a:t>breeds</a:t>
-            </a:r>
-            <a:r>
-              <a:rPr lang="de-DE" sz="1200" dirty="0"/>
-              <a:t> (</a:t>
-            </a:r>
-            <a:r>
-              <a:rPr lang="de-DE" sz="1200" b="1" dirty="0"/>
-              <a:t>0.2 – 0.35</a:t>
-            </a:r>
-            <a:r>
-              <a:rPr lang="de-DE" sz="1200" dirty="0"/>
-              <a:t>) and </a:t>
-            </a:r>
-            <a:r>
-              <a:rPr lang="de-DE" sz="1200" b="1" dirty="0" err="1"/>
-              <a:t>less</a:t>
-            </a:r>
-            <a:r>
-              <a:rPr lang="de-DE" sz="1200" b="1" dirty="0"/>
-              <a:t> </a:t>
-            </a:r>
-            <a:r>
-              <a:rPr lang="de-DE" sz="1200" b="1" dirty="0" err="1"/>
-              <a:t>for</a:t>
-            </a:r>
-            <a:r>
-              <a:rPr lang="de-DE" sz="1200" b="1" dirty="0"/>
-              <a:t> </a:t>
-            </a:r>
-            <a:r>
-              <a:rPr lang="de-DE" sz="1200" b="1" dirty="0" err="1"/>
-              <a:t>the</a:t>
-            </a:r>
-            <a:r>
-              <a:rPr lang="de-DE" sz="1200" b="1" dirty="0"/>
-              <a:t> </a:t>
-            </a:r>
-            <a:r>
-              <a:rPr lang="de-DE" sz="1200" b="1" dirty="0" err="1"/>
-              <a:t>others</a:t>
-            </a:r>
-            <a:r>
-              <a:rPr lang="de-DE" sz="1200" dirty="0"/>
-              <a:t>. </a:t>
+              <a:rPr lang="de-DE" sz="1400" b="1" dirty="0"/>
+              <a:t>~ 0.2 %. </a:t>
             </a:r>
           </a:p>
         </p:txBody>
       </p:sp>
       <p:sp>
         <p:nvSpPr>
-          <p:cNvPr id="117" name="TextBox 116">
-            <a:extLst>
-              <a:ext uri="{FF2B5EF4-FFF2-40B4-BE49-F238E27FC236}">
-                <a16:creationId xmlns:a16="http://schemas.microsoft.com/office/drawing/2014/main" id="{495CF559-A177-7C6B-6851-605DB84D04A3}"/>
+          <p:cNvPr id="10" name="TextBox 9">
+            <a:extLst>
+              <a:ext uri="{FF2B5EF4-FFF2-40B4-BE49-F238E27FC236}">
+                <a16:creationId xmlns:a16="http://schemas.microsoft.com/office/drawing/2014/main" id="{875352A2-0144-4040-A474-23C011913C30}"/>
               </a:ext>
             </a:extLst>
           </p:cNvPr>
@@ -5312,8 +4918,8 @@
         </p:nvSpPr>
         <p:spPr>
           <a:xfrm>
-            <a:off x="17798939" y="18015350"/>
-            <a:ext cx="2459956" cy="600164"/>
+            <a:off x="1769741" y="24246000"/>
+            <a:ext cx="12238831" cy="830997"/>
           </a:xfrm>
           <a:prstGeom prst="rect">
             <a:avLst/>
@@ -5327,106 +4933,21 @@
           <a:lstStyle/>
           <a:p>
             <a:r>
-              <a:rPr lang="de-DE" sz="1100" dirty="0" err="1"/>
-              <a:t>Additionally</a:t>
-            </a:r>
-            <a:r>
-              <a:rPr lang="de-DE" sz="1100" dirty="0"/>
-              <a:t>, </a:t>
-            </a:r>
-            <a:r>
-              <a:rPr lang="de-DE" sz="1100" dirty="0" err="1"/>
-              <a:t>the</a:t>
-            </a:r>
-            <a:r>
-              <a:rPr lang="de-DE" sz="1100" dirty="0"/>
-              <a:t> </a:t>
-            </a:r>
-            <a:r>
-              <a:rPr lang="de-DE" sz="1100" dirty="0" err="1"/>
-              <a:t>difference</a:t>
-            </a:r>
-            <a:r>
-              <a:rPr lang="de-DE" sz="1100" dirty="0"/>
-              <a:t> </a:t>
-            </a:r>
-            <a:r>
-              <a:rPr lang="de-DE" sz="1100" dirty="0" err="1"/>
-              <a:t>of</a:t>
-            </a:r>
-            <a:r>
-              <a:rPr lang="de-DE" sz="1100" dirty="0"/>
-              <a:t> relative </a:t>
-            </a:r>
-            <a:r>
-              <a:rPr lang="de-DE" sz="1100" dirty="0" err="1"/>
-              <a:t>percentage</a:t>
-            </a:r>
-            <a:r>
-              <a:rPr lang="de-DE" sz="1100" dirty="0"/>
-              <a:t> </a:t>
-            </a:r>
-            <a:r>
-              <a:rPr lang="de-DE" sz="1100" dirty="0" err="1"/>
-              <a:t>of</a:t>
-            </a:r>
-            <a:r>
-              <a:rPr lang="de-DE" sz="1100" dirty="0"/>
-              <a:t> Listenhunde in </a:t>
-            </a:r>
-            <a:r>
-              <a:rPr lang="de-DE" sz="1100" dirty="0" err="1"/>
-              <a:t>outer</a:t>
-            </a:r>
-            <a:r>
-              <a:rPr lang="de-DE" sz="1100" dirty="0"/>
-              <a:t> vs. </a:t>
-            </a:r>
-            <a:r>
-              <a:rPr lang="de-DE" sz="1100" dirty="0" err="1"/>
-              <a:t>inner</a:t>
-            </a:r>
-            <a:r>
-              <a:rPr lang="de-DE" sz="1100" dirty="0"/>
-              <a:t> </a:t>
-            </a:r>
-            <a:r>
-              <a:rPr lang="de-DE" sz="1100" dirty="0" err="1"/>
-              <a:t>districts</a:t>
-            </a:r>
-            <a:r>
-              <a:rPr lang="de-DE" sz="1100" dirty="0"/>
-              <a:t> </a:t>
-            </a:r>
-            <a:r>
-              <a:rPr lang="de-DE" sz="1100" dirty="0" err="1"/>
-              <a:t>is</a:t>
-            </a:r>
-            <a:r>
-              <a:rPr lang="de-DE" sz="1100" dirty="0"/>
-              <a:t> </a:t>
-            </a:r>
-            <a:r>
-              <a:rPr lang="de-DE" sz="1100" dirty="0" err="1"/>
-              <a:t>only</a:t>
-            </a:r>
-            <a:r>
-              <a:rPr lang="de-DE" sz="1100" dirty="0"/>
-              <a:t> </a:t>
-            </a:r>
-            <a:r>
-              <a:rPr lang="de-DE" sz="1100" b="1" dirty="0"/>
-              <a:t>~ 0.2 %. </a:t>
+              <a:rPr lang="en-US" sz="2400" dirty="0">
+                <a:latin typeface="Arial" panose="020B0604020202020204" pitchFamily="34" charset="0"/>
+                <a:cs typeface="Arial" panose="020B0604020202020204" pitchFamily="34" charset="0"/>
+              </a:rPr>
+              <a:t>The prevalence of specific dog breeds in Vienna is strongly influenced by real estate prices.</a:t>
             </a:r>
           </a:p>
         </p:txBody>
       </p:sp>
       <p:pic>
         <p:nvPicPr>
-          <p:cNvPr id="78" name="Picture 77" descr="A graph with blue dots and white text&#10;&#10;Description automatically generated">
-            <a:extLst>
-              <a:ext uri="{FF2B5EF4-FFF2-40B4-BE49-F238E27FC236}">
-                <a16:creationId xmlns:a16="http://schemas.microsoft.com/office/drawing/2014/main" id="{8AB06253-B7D4-D811-5EAD-75527F937623}"/>
+          <p:cNvPr id="33" name="Picture 32">
+            <a:extLst>
+              <a:ext uri="{FF2B5EF4-FFF2-40B4-BE49-F238E27FC236}">
+                <a16:creationId xmlns:a16="http://schemas.microsoft.com/office/drawing/2014/main" id="{1CB550A3-BF1D-416E-852A-B3A91D7530F2}"/>
               </a:ext>
             </a:extLst>
           </p:cNvPr>
@@ -5436,7 +4957,7 @@
           <p:nvPr/>
         </p:nvPicPr>
         <p:blipFill>
-          <a:blip r:embed="rId32" cstate="print">
+          <a:blip r:embed="rId32">
             <a:extLst>
               <a:ext uri="{28A0092B-C50C-407E-A947-70E740481C1C}">
                 <a14:useLocalDpi xmlns:a14="http://schemas.microsoft.com/office/drawing/2010/main" val="0"/>
@@ -5449,58 +4970,20 @@
         </p:blipFill>
         <p:spPr>
           <a:xfrm>
-            <a:off x="15457384" y="15334065"/>
-            <a:ext cx="4782496" cy="2391248"/>
+            <a:off x="1799907" y="25077390"/>
+            <a:ext cx="2873225" cy="1327961"/>
           </a:xfrm>
           <a:prstGeom prst="rect">
             <a:avLst/>
           </a:prstGeom>
         </p:spPr>
       </p:pic>
-      <p:sp>
-        <p:nvSpPr>
-          <p:cNvPr id="10" name="TextBox 9">
-            <a:extLst>
-              <a:ext uri="{FF2B5EF4-FFF2-40B4-BE49-F238E27FC236}">
-                <a16:creationId xmlns:a16="http://schemas.microsoft.com/office/drawing/2014/main" id="{875352A2-0144-4040-A474-23C011913C30}"/>
-              </a:ext>
-            </a:extLst>
-          </p:cNvPr>
-          <p:cNvSpPr txBox="1"/>
-          <p:nvPr/>
-        </p:nvSpPr>
-        <p:spPr>
-          <a:xfrm>
-            <a:off x="1769741" y="24246000"/>
-            <a:ext cx="12238831" cy="830997"/>
-          </a:xfrm>
-          <a:prstGeom prst="rect">
-            <a:avLst/>
-          </a:prstGeom>
-          <a:noFill/>
-        </p:spPr>
-        <p:txBody>
-          <a:bodyPr wrap="square" rtlCol="0">
-            <a:spAutoFit/>
-          </a:bodyPr>
-          <a:lstStyle/>
-          <a:p>
-            <a:r>
-              <a:rPr lang="en-US" sz="2400" dirty="0">
-                <a:latin typeface="Arial" panose="020B0604020202020204" pitchFamily="34" charset="0"/>
-                <a:cs typeface="Arial" panose="020B0604020202020204" pitchFamily="34" charset="0"/>
-              </a:rPr>
-              <a:t>The prevalence of specific dog breeds in Vienna is strongly influenced by real estate prices.</a:t>
-            </a:r>
-          </a:p>
-        </p:txBody>
-      </p:sp>
       <p:pic>
         <p:nvPicPr>
-          <p:cNvPr id="33" name="Picture 32">
-            <a:extLst>
-              <a:ext uri="{FF2B5EF4-FFF2-40B4-BE49-F238E27FC236}">
-                <a16:creationId xmlns:a16="http://schemas.microsoft.com/office/drawing/2014/main" id="{1CB550A3-BF1D-416E-852A-B3A91D7530F2}"/>
+          <p:cNvPr id="45" name="Picture 44">
+            <a:extLst>
+              <a:ext uri="{FF2B5EF4-FFF2-40B4-BE49-F238E27FC236}">
+                <a16:creationId xmlns:a16="http://schemas.microsoft.com/office/drawing/2014/main" id="{CF50FE34-8015-49C2-AEB0-37A72E629E1C}"/>
               </a:ext>
             </a:extLst>
           </p:cNvPr>
@@ -5511,42 +4994,6 @@
         </p:nvPicPr>
         <p:blipFill>
           <a:blip r:embed="rId33">
-            <a:extLst>
-              <a:ext uri="{28A0092B-C50C-407E-A947-70E740481C1C}">
-                <a14:useLocalDpi xmlns:a14="http://schemas.microsoft.com/office/drawing/2010/main" val="0"/>
-              </a:ext>
-            </a:extLst>
-          </a:blip>
-          <a:stretch>
-            <a:fillRect/>
-          </a:stretch>
-        </p:blipFill>
-        <p:spPr>
-          <a:xfrm>
-            <a:off x="1799907" y="25077390"/>
-            <a:ext cx="2873225" cy="1327961"/>
-          </a:xfrm>
-          <a:prstGeom prst="rect">
-            <a:avLst/>
-          </a:prstGeom>
-        </p:spPr>
-      </p:pic>
-      <p:pic>
-        <p:nvPicPr>
-          <p:cNvPr id="45" name="Picture 44">
-            <a:extLst>
-              <a:ext uri="{FF2B5EF4-FFF2-40B4-BE49-F238E27FC236}">
-                <a16:creationId xmlns:a16="http://schemas.microsoft.com/office/drawing/2014/main" id="{CF50FE34-8015-49C2-AEB0-37A72E629E1C}"/>
-              </a:ext>
-            </a:extLst>
-          </p:cNvPr>
-          <p:cNvPicPr>
-            <a:picLocks noChangeAspect="1"/>
-          </p:cNvPicPr>
-          <p:nvPr/>
-        </p:nvPicPr>
-        <p:blipFill>
-          <a:blip r:embed="rId34">
             <a:extLst>
               <a:ext uri="{28A0092B-C50C-407E-A947-70E740481C1C}">
                 <a14:useLocalDpi xmlns:a14="http://schemas.microsoft.com/office/drawing/2010/main" val="0"/>
@@ -5628,7 +5075,7 @@
           <p:nvPr/>
         </p:nvPicPr>
         <p:blipFill>
-          <a:blip r:embed="rId35">
+          <a:blip r:embed="rId34">
             <a:extLst>
               <a:ext uri="{28A0092B-C50C-407E-A947-70E740481C1C}">
                 <a14:useLocalDpi xmlns:a14="http://schemas.microsoft.com/office/drawing/2010/main" val="0"/>
@@ -5655,6 +5102,80 @@
             <a:extLst>
               <a:ext uri="{FF2B5EF4-FFF2-40B4-BE49-F238E27FC236}">
                 <a16:creationId xmlns:a16="http://schemas.microsoft.com/office/drawing/2014/main" id="{DCD5A78C-CAD7-42F9-BACD-659AB24C98AE}"/>
+              </a:ext>
+            </a:extLst>
+          </p:cNvPr>
+          <p:cNvPicPr>
+            <a:picLocks noChangeAspect="1"/>
+          </p:cNvPicPr>
+          <p:nvPr/>
+        </p:nvPicPr>
+        <p:blipFill>
+          <a:blip r:embed="rId35">
+            <a:extLst>
+              <a:ext uri="{28A0092B-C50C-407E-A947-70E740481C1C}">
+                <a14:useLocalDpi xmlns:a14="http://schemas.microsoft.com/office/drawing/2010/main" val="0"/>
+              </a:ext>
+            </a:extLst>
+          </a:blip>
+          <a:stretch>
+            <a:fillRect/>
+          </a:stretch>
+        </p:blipFill>
+        <p:spPr>
+          <a:xfrm>
+            <a:off x="10064727" y="24777551"/>
+            <a:ext cx="3721122" cy="3600000"/>
+          </a:xfrm>
+          <a:prstGeom prst="rect">
+            <a:avLst/>
+          </a:prstGeom>
+        </p:spPr>
+      </p:pic>
+      <p:sp>
+        <p:nvSpPr>
+          <p:cNvPr id="61" name="TextBox 60">
+            <a:extLst>
+              <a:ext uri="{FF2B5EF4-FFF2-40B4-BE49-F238E27FC236}">
+                <a16:creationId xmlns:a16="http://schemas.microsoft.com/office/drawing/2014/main" id="{32D5A727-F187-4238-8933-ECD680D32EFB}"/>
+              </a:ext>
+            </a:extLst>
+          </p:cNvPr>
+          <p:cNvSpPr txBox="1"/>
+          <p:nvPr/>
+        </p:nvSpPr>
+        <p:spPr>
+          <a:xfrm>
+            <a:off x="15089632" y="4562337"/>
+            <a:ext cx="4267515" cy="461665"/>
+          </a:xfrm>
+          <a:prstGeom prst="rect">
+            <a:avLst/>
+          </a:prstGeom>
+          <a:noFill/>
+        </p:spPr>
+        <p:txBody>
+          <a:bodyPr wrap="none" rtlCol="0">
+            <a:spAutoFit/>
+          </a:bodyPr>
+          <a:lstStyle/>
+          <a:p>
+            <a:r>
+              <a:rPr lang="en-US" sz="2400" b="1" dirty="0">
+                <a:latin typeface="Arial" panose="020B0604020202020204" pitchFamily="34" charset="0"/>
+                <a:cs typeface="Arial" panose="020B0604020202020204" pitchFamily="34" charset="0"/>
+              </a:rPr>
+              <a:t>Hypothesis 1 - Continuation</a:t>
+            </a:r>
+          </a:p>
+        </p:txBody>
+      </p:sp>
+      <p:pic>
+        <p:nvPicPr>
+          <p:cNvPr id="74" name="Picture 73">
+            <a:extLst>
+              <a:ext uri="{FF2B5EF4-FFF2-40B4-BE49-F238E27FC236}">
+                <a16:creationId xmlns:a16="http://schemas.microsoft.com/office/drawing/2014/main" id="{A48E352E-0BA9-4328-B248-E0100D4CA5D1}"/>
               </a:ext>
             </a:extLst>
           </p:cNvPr>
@@ -5677,58 +5198,20 @@
         </p:blipFill>
         <p:spPr>
           <a:xfrm>
-            <a:off x="10064727" y="24777551"/>
-            <a:ext cx="3721122" cy="3600000"/>
+            <a:off x="15051114" y="5106938"/>
+            <a:ext cx="5805916" cy="4325407"/>
           </a:xfrm>
           <a:prstGeom prst="rect">
             <a:avLst/>
           </a:prstGeom>
         </p:spPr>
       </p:pic>
-      <p:sp>
-        <p:nvSpPr>
-          <p:cNvPr id="61" name="TextBox 60">
-            <a:extLst>
-              <a:ext uri="{FF2B5EF4-FFF2-40B4-BE49-F238E27FC236}">
-                <a16:creationId xmlns:a16="http://schemas.microsoft.com/office/drawing/2014/main" id="{32D5A727-F187-4238-8933-ECD680D32EFB}"/>
-              </a:ext>
-            </a:extLst>
-          </p:cNvPr>
-          <p:cNvSpPr txBox="1"/>
-          <p:nvPr/>
-        </p:nvSpPr>
-        <p:spPr>
-          <a:xfrm>
-            <a:off x="15089632" y="4562337"/>
-            <a:ext cx="4267515" cy="461665"/>
-          </a:xfrm>
-          <a:prstGeom prst="rect">
-            <a:avLst/>
-          </a:prstGeom>
-          <a:noFill/>
-        </p:spPr>
-        <p:txBody>
-          <a:bodyPr wrap="none" rtlCol="0">
-            <a:spAutoFit/>
-          </a:bodyPr>
-          <a:lstStyle/>
-          <a:p>
-            <a:r>
-              <a:rPr lang="en-US" sz="2400" b="1" dirty="0">
-                <a:latin typeface="Arial" panose="020B0604020202020204" pitchFamily="34" charset="0"/>
-                <a:cs typeface="Arial" panose="020B0604020202020204" pitchFamily="34" charset="0"/>
-              </a:rPr>
-              <a:t>Hypothesis 1 - Continuation</a:t>
-            </a:r>
-          </a:p>
-        </p:txBody>
-      </p:sp>
       <p:pic>
         <p:nvPicPr>
-          <p:cNvPr id="74" name="Picture 73">
-            <a:extLst>
-              <a:ext uri="{FF2B5EF4-FFF2-40B4-BE49-F238E27FC236}">
-                <a16:creationId xmlns:a16="http://schemas.microsoft.com/office/drawing/2014/main" id="{A48E352E-0BA9-4328-B248-E0100D4CA5D1}"/>
+          <p:cNvPr id="76" name="Picture 75">
+            <a:extLst>
+              <a:ext uri="{FF2B5EF4-FFF2-40B4-BE49-F238E27FC236}">
+                <a16:creationId xmlns:a16="http://schemas.microsoft.com/office/drawing/2014/main" id="{814673BC-1367-4D63-9171-066D0D70F182}"/>
               </a:ext>
             </a:extLst>
           </p:cNvPr>
@@ -5751,8 +5234,8 @@
         </p:blipFill>
         <p:spPr>
           <a:xfrm>
-            <a:off x="15051114" y="5106938"/>
-            <a:ext cx="5805916" cy="4325407"/>
+            <a:off x="20988068" y="4472494"/>
+            <a:ext cx="6794065" cy="4047754"/>
           </a:xfrm>
           <a:prstGeom prst="rect">
             <a:avLst/>
@@ -5761,10 +5244,10 @@
       </p:pic>
       <p:pic>
         <p:nvPicPr>
-          <p:cNvPr id="76" name="Picture 75">
-            <a:extLst>
-              <a:ext uri="{FF2B5EF4-FFF2-40B4-BE49-F238E27FC236}">
-                <a16:creationId xmlns:a16="http://schemas.microsoft.com/office/drawing/2014/main" id="{814673BC-1367-4D63-9171-066D0D70F182}"/>
+          <p:cNvPr id="82" name="Picture 81">
+            <a:extLst>
+              <a:ext uri="{FF2B5EF4-FFF2-40B4-BE49-F238E27FC236}">
+                <a16:creationId xmlns:a16="http://schemas.microsoft.com/office/drawing/2014/main" id="{0AC6B6D1-1445-4128-A82B-230D11E42083}"/>
               </a:ext>
             </a:extLst>
           </p:cNvPr>
@@ -5787,8 +5270,8 @@
         </p:blipFill>
         <p:spPr>
           <a:xfrm>
-            <a:off x="20988068" y="4472494"/>
-            <a:ext cx="6794065" cy="4047754"/>
+            <a:off x="20857030" y="8735101"/>
+            <a:ext cx="7198961" cy="659415"/>
           </a:xfrm>
           <a:prstGeom prst="rect">
             <a:avLst/>
@@ -5797,10 +5280,10 @@
       </p:pic>
       <p:pic>
         <p:nvPicPr>
-          <p:cNvPr id="82" name="Picture 81">
-            <a:extLst>
-              <a:ext uri="{FF2B5EF4-FFF2-40B4-BE49-F238E27FC236}">
-                <a16:creationId xmlns:a16="http://schemas.microsoft.com/office/drawing/2014/main" id="{0AC6B6D1-1445-4128-A82B-230D11E42083}"/>
+          <p:cNvPr id="9" name="Picture 8" descr="A graph of different colored lines&#10;&#10;Description automatically generated">
+            <a:extLst>
+              <a:ext uri="{FF2B5EF4-FFF2-40B4-BE49-F238E27FC236}">
+                <a16:creationId xmlns:a16="http://schemas.microsoft.com/office/drawing/2014/main" id="{A674D4AE-AED4-3929-0E3B-C3647834C510}"/>
               </a:ext>
             </a:extLst>
           </p:cNvPr>
@@ -5810,7 +5293,7 @@
           <p:nvPr/>
         </p:nvPicPr>
         <p:blipFill>
-          <a:blip r:embed="rId39">
+          <a:blip r:embed="rId39" cstate="print">
             <a:extLst>
               <a:ext uri="{28A0092B-C50C-407E-A947-70E740481C1C}">
                 <a14:useLocalDpi xmlns:a14="http://schemas.microsoft.com/office/drawing/2010/main" val="0"/>
@@ -5823,8 +5306,373 @@
         </p:blipFill>
         <p:spPr>
           <a:xfrm>
-            <a:off x="20857030" y="8735101"/>
-            <a:ext cx="7198961" cy="659415"/>
+            <a:off x="1624079" y="14539597"/>
+            <a:ext cx="6564910" cy="6166164"/>
+          </a:xfrm>
+          <a:prstGeom prst="rect">
+            <a:avLst/>
+          </a:prstGeom>
+        </p:spPr>
+      </p:pic>
+      <p:pic>
+        <p:nvPicPr>
+          <p:cNvPr id="57" name="Picture 56" descr="A graph of different colored squares&#10;&#10;Description automatically generated">
+            <a:extLst>
+              <a:ext uri="{FF2B5EF4-FFF2-40B4-BE49-F238E27FC236}">
+                <a16:creationId xmlns:a16="http://schemas.microsoft.com/office/drawing/2014/main" id="{D87B35BC-720C-EC80-6161-894D8F6EB9BB}"/>
+              </a:ext>
+            </a:extLst>
+          </p:cNvPr>
+          <p:cNvPicPr>
+            <a:picLocks noChangeAspect="1"/>
+          </p:cNvPicPr>
+          <p:nvPr/>
+        </p:nvPicPr>
+        <p:blipFill>
+          <a:blip r:embed="rId40">
+            <a:extLst>
+              <a:ext uri="{28A0092B-C50C-407E-A947-70E740481C1C}">
+                <a14:useLocalDpi xmlns:a14="http://schemas.microsoft.com/office/drawing/2010/main" val="0"/>
+              </a:ext>
+            </a:extLst>
+          </a:blip>
+          <a:srcRect l="2626" t="6834" r="10545" b="6229"/>
+          <a:stretch/>
+        </p:blipFill>
+        <p:spPr>
+          <a:xfrm>
+            <a:off x="6146133" y="19680544"/>
+            <a:ext cx="7948087" cy="2981093"/>
+          </a:xfrm>
+          <a:prstGeom prst="rect">
+            <a:avLst/>
+          </a:prstGeom>
+        </p:spPr>
+      </p:pic>
+      <p:sp>
+        <p:nvSpPr>
+          <p:cNvPr id="20" name="TextBox 19">
+            <a:extLst>
+              <a:ext uri="{FF2B5EF4-FFF2-40B4-BE49-F238E27FC236}">
+                <a16:creationId xmlns:a16="http://schemas.microsoft.com/office/drawing/2014/main" id="{10E28791-B1C4-869F-FE2D-5955CF99BB6A}"/>
+              </a:ext>
+            </a:extLst>
+          </p:cNvPr>
+          <p:cNvSpPr txBox="1"/>
+          <p:nvPr/>
+        </p:nvSpPr>
+        <p:spPr>
+          <a:xfrm>
+            <a:off x="15114403" y="11210577"/>
+            <a:ext cx="7212198" cy="1938992"/>
+          </a:xfrm>
+          <a:prstGeom prst="rect">
+            <a:avLst/>
+          </a:prstGeom>
+          <a:noFill/>
+        </p:spPr>
+        <p:txBody>
+          <a:bodyPr wrap="square" rtlCol="0">
+            <a:spAutoFit/>
+          </a:bodyPr>
+          <a:lstStyle/>
+          <a:p>
+            <a:r>
+              <a:rPr lang="en-GB" sz="2400" b="1" i="1" u="sng" dirty="0">
+                <a:latin typeface="Arial" panose="020B0604020202020204" pitchFamily="34" charset="0"/>
+                <a:ea typeface="思源黑体 CN Regular" panose="020B0500000000000000" charset="-122"/>
+                <a:cs typeface="Arial" panose="020B0604020202020204" pitchFamily="34" charset="0"/>
+                <a:sym typeface="+mn-ea"/>
+              </a:rPr>
+              <a:t>Assumption</a:t>
+            </a:r>
+            <a:r>
+              <a:rPr lang="en-GB" sz="2400" b="1" dirty="0">
+                <a:latin typeface="Arial" panose="020B0604020202020204" pitchFamily="34" charset="0"/>
+                <a:ea typeface="思源黑体 CN Regular" panose="020B0500000000000000" charset="-122"/>
+                <a:cs typeface="Arial" panose="020B0604020202020204" pitchFamily="34" charset="0"/>
+                <a:sym typeface="+mn-ea"/>
+              </a:rPr>
+              <a:t>: </a:t>
+            </a:r>
+            <a:r>
+              <a:rPr lang="en-GB" sz="2400" dirty="0">
+                <a:latin typeface="Arial" panose="020B0604020202020204" pitchFamily="34" charset="0"/>
+                <a:ea typeface="思源黑体 CN Regular" panose="020B0500000000000000" charset="-122"/>
+                <a:cs typeface="Arial" panose="020B0604020202020204" pitchFamily="34" charset="0"/>
+                <a:sym typeface="+mn-ea"/>
+              </a:rPr>
+              <a:t>There is a positive correlation between the ownership of </a:t>
+            </a:r>
+            <a:r>
+              <a:rPr lang="en-GB" sz="2400" dirty="0" err="1">
+                <a:latin typeface="Arial" panose="020B0604020202020204" pitchFamily="34" charset="0"/>
+                <a:ea typeface="思源黑体 CN Regular" panose="020B0500000000000000" charset="-122"/>
+                <a:cs typeface="Arial" panose="020B0604020202020204" pitchFamily="34" charset="0"/>
+                <a:sym typeface="+mn-ea"/>
+              </a:rPr>
+              <a:t>Listenhunde</a:t>
+            </a:r>
+            <a:r>
+              <a:rPr lang="en-GB" sz="2400" dirty="0">
+                <a:latin typeface="Arial" panose="020B0604020202020204" pitchFamily="34" charset="0"/>
+                <a:ea typeface="思源黑体 CN Regular" panose="020B0500000000000000" charset="-122"/>
+                <a:cs typeface="Arial" panose="020B0604020202020204" pitchFamily="34" charset="0"/>
+                <a:sym typeface="+mn-ea"/>
+              </a:rPr>
+              <a:t> and district, with a higher prevalence of </a:t>
+            </a:r>
+            <a:r>
+              <a:rPr lang="en-GB" sz="2400" dirty="0" err="1">
+                <a:latin typeface="Arial" panose="020B0604020202020204" pitchFamily="34" charset="0"/>
+                <a:ea typeface="思源黑体 CN Regular" panose="020B0500000000000000" charset="-122"/>
+                <a:cs typeface="Arial" panose="020B0604020202020204" pitchFamily="34" charset="0"/>
+                <a:sym typeface="+mn-ea"/>
+              </a:rPr>
+              <a:t>Listenhunde</a:t>
+            </a:r>
+            <a:r>
+              <a:rPr lang="en-GB" sz="2400" dirty="0">
+                <a:latin typeface="Arial" panose="020B0604020202020204" pitchFamily="34" charset="0"/>
+                <a:ea typeface="思源黑体 CN Regular" panose="020B0500000000000000" charset="-122"/>
+                <a:cs typeface="Arial" panose="020B0604020202020204" pitchFamily="34" charset="0"/>
+                <a:sym typeface="+mn-ea"/>
+              </a:rPr>
+              <a:t> ownership in outer Viennese districts compared to inner districts.</a:t>
+            </a:r>
+            <a:r>
+              <a:rPr lang="en-GB" sz="2400" b="1" dirty="0">
+                <a:latin typeface="Arial" panose="020B0604020202020204" pitchFamily="34" charset="0"/>
+                <a:ea typeface="思源黑体 CN Regular" panose="020B0500000000000000" charset="-122"/>
+                <a:cs typeface="Arial" panose="020B0604020202020204" pitchFamily="34" charset="0"/>
+                <a:sym typeface="+mn-ea"/>
+              </a:rPr>
+              <a:t>	</a:t>
+            </a:r>
+            <a:endParaRPr lang="en-GB" sz="2400" dirty="0"/>
+          </a:p>
+        </p:txBody>
+      </p:sp>
+      <p:pic>
+        <p:nvPicPr>
+          <p:cNvPr id="19" name="Picture 18" descr="A graph with red dots and green dots&#10;&#10;Description automatically generated">
+            <a:extLst>
+              <a:ext uri="{FF2B5EF4-FFF2-40B4-BE49-F238E27FC236}">
+                <a16:creationId xmlns:a16="http://schemas.microsoft.com/office/drawing/2014/main" id="{081C592B-0C04-446E-04FC-50103FDEDF0A}"/>
+              </a:ext>
+            </a:extLst>
+          </p:cNvPr>
+          <p:cNvPicPr>
+            <a:picLocks noChangeAspect="1"/>
+          </p:cNvPicPr>
+          <p:nvPr/>
+        </p:nvPicPr>
+        <p:blipFill>
+          <a:blip r:embed="rId41">
+            <a:extLst>
+              <a:ext uri="{28A0092B-C50C-407E-A947-70E740481C1C}">
+                <a14:useLocalDpi xmlns:a14="http://schemas.microsoft.com/office/drawing/2010/main" val="0"/>
+              </a:ext>
+            </a:extLst>
+          </a:blip>
+          <a:stretch>
+            <a:fillRect/>
+          </a:stretch>
+        </p:blipFill>
+        <p:spPr>
+          <a:xfrm>
+            <a:off x="15013442" y="13078976"/>
+            <a:ext cx="8280898" cy="4140449"/>
+          </a:xfrm>
+          <a:prstGeom prst="rect">
+            <a:avLst/>
+          </a:prstGeom>
+        </p:spPr>
+      </p:pic>
+      <p:sp>
+        <p:nvSpPr>
+          <p:cNvPr id="116" name="TextBox 115">
+            <a:extLst>
+              <a:ext uri="{FF2B5EF4-FFF2-40B4-BE49-F238E27FC236}">
+                <a16:creationId xmlns:a16="http://schemas.microsoft.com/office/drawing/2014/main" id="{BC23514B-6B6B-F2FE-A09C-823661277C07}"/>
+              </a:ext>
+            </a:extLst>
+          </p:cNvPr>
+          <p:cNvSpPr txBox="1"/>
+          <p:nvPr/>
+        </p:nvSpPr>
+        <p:spPr>
+          <a:xfrm>
+            <a:off x="15123631" y="17180811"/>
+            <a:ext cx="3316409" cy="1077218"/>
+          </a:xfrm>
+          <a:prstGeom prst="rect">
+            <a:avLst/>
+          </a:prstGeom>
+          <a:noFill/>
+        </p:spPr>
+        <p:txBody>
+          <a:bodyPr wrap="square" rtlCol="0">
+            <a:spAutoFit/>
+          </a:bodyPr>
+          <a:lstStyle/>
+          <a:p>
+            <a:r>
+              <a:rPr lang="de-DE" sz="1600" b="1" dirty="0"/>
+              <a:t>1) </a:t>
+            </a:r>
+            <a:r>
+              <a:rPr lang="de-DE" sz="1600" dirty="0" err="1"/>
+              <a:t>There</a:t>
+            </a:r>
+            <a:r>
+              <a:rPr lang="de-DE" sz="1600" dirty="0"/>
+              <a:t> </a:t>
+            </a:r>
+            <a:r>
+              <a:rPr lang="de-DE" sz="1600" dirty="0" err="1"/>
+              <a:t>is</a:t>
+            </a:r>
+            <a:r>
+              <a:rPr lang="de-DE" sz="1600" dirty="0"/>
+              <a:t> </a:t>
+            </a:r>
+            <a:r>
+              <a:rPr lang="de-DE" sz="1600" b="1" dirty="0" err="1"/>
+              <a:t>only</a:t>
+            </a:r>
+            <a:r>
+              <a:rPr lang="de-DE" sz="1600" b="1" dirty="0"/>
+              <a:t> a </a:t>
+            </a:r>
+            <a:r>
+              <a:rPr lang="de-DE" sz="1600" b="1" dirty="0" err="1"/>
+              <a:t>weak</a:t>
+            </a:r>
+            <a:r>
+              <a:rPr lang="de-DE" sz="1600" b="1" dirty="0"/>
+              <a:t> </a:t>
+            </a:r>
+            <a:r>
+              <a:rPr lang="de-DE" sz="1600" b="1" dirty="0" err="1"/>
+              <a:t>correlation</a:t>
+            </a:r>
+            <a:r>
+              <a:rPr lang="de-DE" sz="1600" b="1" dirty="0"/>
+              <a:t> </a:t>
+            </a:r>
+            <a:r>
+              <a:rPr lang="de-DE" sz="1600" dirty="0" err="1"/>
+              <a:t>between</a:t>
+            </a:r>
+            <a:r>
+              <a:rPr lang="de-DE" sz="1600" dirty="0"/>
+              <a:t> </a:t>
+            </a:r>
+            <a:r>
+              <a:rPr lang="de-DE" sz="1600" dirty="0" err="1"/>
+              <a:t>district</a:t>
+            </a:r>
+            <a:r>
+              <a:rPr lang="de-DE" sz="1600" dirty="0"/>
+              <a:t> and Listenhund </a:t>
+            </a:r>
+            <a:r>
+              <a:rPr lang="de-DE" sz="1600" dirty="0" err="1"/>
+              <a:t>for</a:t>
+            </a:r>
+            <a:r>
+              <a:rPr lang="de-DE" sz="1600" dirty="0"/>
+              <a:t> </a:t>
+            </a:r>
+            <a:r>
+              <a:rPr lang="de-DE" sz="1600" b="1" dirty="0" err="1"/>
+              <a:t>three</a:t>
+            </a:r>
+            <a:r>
+              <a:rPr lang="de-DE" sz="1600" dirty="0"/>
+              <a:t> Listenhund </a:t>
+            </a:r>
+            <a:r>
+              <a:rPr lang="de-DE" sz="1600" dirty="0" err="1"/>
+              <a:t>breeds</a:t>
+            </a:r>
+            <a:r>
+              <a:rPr lang="de-DE" sz="1600" dirty="0"/>
+              <a:t> (</a:t>
+            </a:r>
+            <a:r>
+              <a:rPr lang="de-DE" sz="1600" b="1" dirty="0"/>
+              <a:t>0.2 – 0.35</a:t>
+            </a:r>
+            <a:r>
+              <a:rPr lang="de-DE" sz="1600" dirty="0"/>
+              <a:t>) and </a:t>
+            </a:r>
+            <a:r>
+              <a:rPr lang="de-DE" sz="1600" b="1" dirty="0" err="1"/>
+              <a:t>less</a:t>
+            </a:r>
+            <a:r>
+              <a:rPr lang="de-DE" sz="1600" b="1" dirty="0"/>
+              <a:t> </a:t>
+            </a:r>
+            <a:r>
+              <a:rPr lang="de-DE" sz="1600" b="1" dirty="0" err="1"/>
+              <a:t>for</a:t>
+            </a:r>
+            <a:r>
+              <a:rPr lang="de-DE" sz="1600" b="1" dirty="0"/>
+              <a:t> </a:t>
+            </a:r>
+            <a:r>
+              <a:rPr lang="de-DE" sz="1600" b="1" dirty="0" err="1"/>
+              <a:t>the</a:t>
+            </a:r>
+            <a:r>
+              <a:rPr lang="de-DE" sz="1600" b="1" dirty="0"/>
+              <a:t> </a:t>
+            </a:r>
+            <a:r>
+              <a:rPr lang="de-DE" sz="1600" b="1" dirty="0" err="1"/>
+              <a:t>others</a:t>
+            </a:r>
+            <a:r>
+              <a:rPr lang="de-DE" sz="1600" dirty="0"/>
+              <a:t>. </a:t>
+            </a:r>
+          </a:p>
+        </p:txBody>
+      </p:sp>
+      <p:pic>
+        <p:nvPicPr>
+          <p:cNvPr id="51" name="Picture 50" descr="A yellow circle with a number of percentages&#10;&#10;Description automatically generated with medium confidence">
+            <a:extLst>
+              <a:ext uri="{FF2B5EF4-FFF2-40B4-BE49-F238E27FC236}">
+                <a16:creationId xmlns:a16="http://schemas.microsoft.com/office/drawing/2014/main" id="{D014A30C-7AF6-6E44-9385-73ECE9FB4759}"/>
+              </a:ext>
+            </a:extLst>
+          </p:cNvPr>
+          <p:cNvPicPr>
+            <a:picLocks noChangeAspect="1"/>
+          </p:cNvPicPr>
+          <p:nvPr/>
+        </p:nvPicPr>
+        <p:blipFill>
+          <a:blip r:embed="rId42" cstate="print">
+            <a:extLst>
+              <a:ext uri="{28A0092B-C50C-407E-A947-70E740481C1C}">
+                <a14:useLocalDpi xmlns:a14="http://schemas.microsoft.com/office/drawing/2010/main" val="0"/>
+              </a:ext>
+            </a:extLst>
+          </a:blip>
+          <a:srcRect l="8954" r="9021"/>
+          <a:stretch/>
+        </p:blipFill>
+        <p:spPr>
+          <a:xfrm>
+            <a:off x="23710710" y="14760475"/>
+            <a:ext cx="3967059" cy="2417861"/>
           </a:xfrm>
           <a:prstGeom prst="rect">
             <a:avLst/>

</xml_diff>

<commit_message>
Added H4 to Poster
</commit_message>
<xml_diff>
--- a/poster-template/prj01-poster-template.pptx
+++ b/poster-template/prj01-poster-template.pptx
@@ -132,7 +132,7 @@
 <file path=ppt/revisionInfo.xml><?xml version="1.0" encoding="utf-8"?>
 <p1510:revInfo xmlns:a="http://schemas.openxmlformats.org/drawingml/2006/main" xmlns:r="http://schemas.openxmlformats.org/officeDocument/2006/relationships" xmlns:p1510="http://schemas.microsoft.com/office/powerpoint/2015/10/main">
   <p1510:revLst>
-    <p1510:client id="{57C55CFA-D550-49B7-8965-3A8C4FAAA48A}" v="21" dt="2024-09-13T08:18:32.735"/>
+    <p1510:client id="{E4A5574A-F4D0-4110-B316-2856DF31D961}" v="7" dt="2024-10-19T11:36:18.845"/>
   </p1510:revLst>
 </p1510:revInfo>
 </file>
@@ -555,6 +555,102 @@
       </pc:sldChg>
     </pc:docChg>
   </pc:docChgLst>
+  <pc:docChgLst>
+    <pc:chgData name="Anna Punzengruber" userId="03333175b09bc376" providerId="LiveId" clId="{E4A5574A-F4D0-4110-B316-2856DF31D961}"/>
+    <pc:docChg chg="undo custSel modSld">
+      <pc:chgData name="Anna Punzengruber" userId="03333175b09bc376" providerId="LiveId" clId="{E4A5574A-F4D0-4110-B316-2856DF31D961}" dt="2024-10-19T15:50:47.986" v="396" actId="20577"/>
+      <pc:docMkLst>
+        <pc:docMk/>
+      </pc:docMkLst>
+      <pc:sldChg chg="addSp delSp modSp mod">
+        <pc:chgData name="Anna Punzengruber" userId="03333175b09bc376" providerId="LiveId" clId="{E4A5574A-F4D0-4110-B316-2856DF31D961}" dt="2024-10-19T15:50:47.986" v="396" actId="20577"/>
+        <pc:sldMkLst>
+          <pc:docMk/>
+          <pc:sldMk cId="2274665267" sldId="256"/>
+        </pc:sldMkLst>
+        <pc:spChg chg="add mod">
+          <ac:chgData name="Anna Punzengruber" userId="03333175b09bc376" providerId="LiveId" clId="{E4A5574A-F4D0-4110-B316-2856DF31D961}" dt="2024-10-19T11:14:16.508" v="63" actId="20577"/>
+          <ac:spMkLst>
+            <pc:docMk/>
+            <pc:sldMk cId="2274665267" sldId="256"/>
+            <ac:spMk id="34" creationId="{54FDA58D-1FB2-7A95-020C-F1A4C3656F23}"/>
+          </ac:spMkLst>
+        </pc:spChg>
+        <pc:spChg chg="add mod">
+          <ac:chgData name="Anna Punzengruber" userId="03333175b09bc376" providerId="LiveId" clId="{E4A5574A-F4D0-4110-B316-2856DF31D961}" dt="2024-10-19T15:50:47.986" v="396" actId="20577"/>
+          <ac:spMkLst>
+            <pc:docMk/>
+            <pc:sldMk cId="2274665267" sldId="256"/>
+            <ac:spMk id="50" creationId="{DD6E3136-57A1-C1C2-9B12-54651C3A5B30}"/>
+          </ac:spMkLst>
+        </pc:spChg>
+        <pc:picChg chg="add mod modCrop">
+          <ac:chgData name="Anna Punzengruber" userId="03333175b09bc376" providerId="LiveId" clId="{E4A5574A-F4D0-4110-B316-2856DF31D961}" dt="2024-10-19T11:13:08.080" v="61" actId="14100"/>
+          <ac:picMkLst>
+            <pc:docMk/>
+            <pc:sldMk cId="2274665267" sldId="256"/>
+            <ac:picMk id="17" creationId="{8569264F-73B6-6125-7C59-4A193FC095A5}"/>
+          </ac:picMkLst>
+        </pc:picChg>
+        <pc:picChg chg="add mod modCrop">
+          <ac:chgData name="Anna Punzengruber" userId="03333175b09bc376" providerId="LiveId" clId="{E4A5574A-F4D0-4110-B316-2856DF31D961}" dt="2024-10-19T11:32:42.487" v="345" actId="1076"/>
+          <ac:picMkLst>
+            <pc:docMk/>
+            <pc:sldMk cId="2274665267" sldId="256"/>
+            <ac:picMk id="49" creationId="{5F1745BB-8ED7-4A64-0E00-22E172187E20}"/>
+          </ac:picMkLst>
+        </pc:picChg>
+        <pc:picChg chg="add del mod modCrop">
+          <ac:chgData name="Anna Punzengruber" userId="03333175b09bc376" providerId="LiveId" clId="{E4A5574A-F4D0-4110-B316-2856DF31D961}" dt="2024-10-19T11:34:16.885" v="347" actId="478"/>
+          <ac:picMkLst>
+            <pc:docMk/>
+            <pc:sldMk cId="2274665267" sldId="256"/>
+            <ac:picMk id="53" creationId="{40B00ECD-AEC5-8DAF-B266-856F41AE23CE}"/>
+          </ac:picMkLst>
+        </pc:picChg>
+        <pc:picChg chg="add mod modCrop">
+          <ac:chgData name="Anna Punzengruber" userId="03333175b09bc376" providerId="LiveId" clId="{E4A5574A-F4D0-4110-B316-2856DF31D961}" dt="2024-10-19T15:05:20.205" v="390" actId="14100"/>
+          <ac:picMkLst>
+            <pc:docMk/>
+            <pc:sldMk cId="2274665267" sldId="256"/>
+            <ac:picMk id="56" creationId="{45049E61-8A38-C803-C776-963BF4A57F26}"/>
+          </ac:picMkLst>
+        </pc:picChg>
+        <pc:picChg chg="add mod ord modCrop">
+          <ac:chgData name="Anna Punzengruber" userId="03333175b09bc376" providerId="LiveId" clId="{E4A5574A-F4D0-4110-B316-2856DF31D961}" dt="2024-10-19T14:59:09.806" v="387" actId="1076"/>
+          <ac:picMkLst>
+            <pc:docMk/>
+            <pc:sldMk cId="2274665267" sldId="256"/>
+            <ac:picMk id="63" creationId="{768307A2-261B-9BE3-F3F6-032F1014D798}"/>
+          </ac:picMkLst>
+        </pc:picChg>
+      </pc:sldChg>
+    </pc:docChg>
+  </pc:docChgLst>
+  <pc:docChgLst>
+    <pc:chgData name="Anna Punzengruber" userId="03333175b09bc376" providerId="LiveId" clId="{65E82FBD-09C9-47B7-AEF2-552B5D05FC70}"/>
+    <pc:docChg chg="modSld">
+      <pc:chgData name="Anna Punzengruber" userId="03333175b09bc376" providerId="LiveId" clId="{65E82FBD-09C9-47B7-AEF2-552B5D05FC70}" dt="2024-10-19T15:55:19.185" v="0" actId="1076"/>
+      <pc:docMkLst>
+        <pc:docMk/>
+      </pc:docMkLst>
+      <pc:sldChg chg="modSp mod">
+        <pc:chgData name="Anna Punzengruber" userId="03333175b09bc376" providerId="LiveId" clId="{65E82FBD-09C9-47B7-AEF2-552B5D05FC70}" dt="2024-10-19T15:55:19.185" v="0" actId="1076"/>
+        <pc:sldMkLst>
+          <pc:docMk/>
+          <pc:sldMk cId="2274665267" sldId="256"/>
+        </pc:sldMkLst>
+        <pc:picChg chg="mod">
+          <ac:chgData name="Anna Punzengruber" userId="03333175b09bc376" providerId="LiveId" clId="{65E82FBD-09C9-47B7-AEF2-552B5D05FC70}" dt="2024-10-19T15:55:19.185" v="0" actId="1076"/>
+          <ac:picMkLst>
+            <pc:docMk/>
+            <pc:sldMk cId="2274665267" sldId="256"/>
+            <ac:picMk id="9" creationId="{A674D4AE-AED4-3929-0E3B-C3647834C510}"/>
+          </ac:picMkLst>
+        </pc:picChg>
+      </pc:sldChg>
+    </pc:docChg>
+  </pc:docChgLst>
 </pc:chgInfo>
 </file>
 
@@ -667,7 +763,7 @@
           <a:p>
             <a:fld id="{F1518A84-A489-4C9B-B420-2A77C4B50547}" type="datetimeFigureOut">
               <a:rPr lang="de-AT" smtClean="0"/>
-              <a:t>16.10.2024</a:t>
+              <a:t>19.10.2024</a:t>
             </a:fld>
             <a:endParaRPr lang="de-AT"/>
           </a:p>
@@ -826,7 +922,7 @@
           <a:p>
             <a:fld id="{7C5004FA-9EBD-4581-A657-2BC9CFA6596A}" type="slidenum">
               <a:rPr lang="de-AT" smtClean="0"/>
-              <a:t>‹#›</a:t>
+              <a:t>‹Nr.›</a:t>
             </a:fld>
             <a:endParaRPr lang="de-AT"/>
           </a:p>
@@ -5306,7 +5402,7 @@
         </p:blipFill>
         <p:spPr>
           <a:xfrm>
-            <a:off x="1624079" y="14539597"/>
+            <a:off x="23990709" y="13626525"/>
             <a:ext cx="6564910" cy="6166164"/>
           </a:xfrm>
           <a:prstGeom prst="rect">
@@ -5673,6 +5769,255 @@
           <a:xfrm>
             <a:off x="23710710" y="14760475"/>
             <a:ext cx="3967059" cy="2417861"/>
+          </a:xfrm>
+          <a:prstGeom prst="rect">
+            <a:avLst/>
+          </a:prstGeom>
+        </p:spPr>
+      </p:pic>
+      <p:pic>
+        <p:nvPicPr>
+          <p:cNvPr id="17" name="Grafik 16" descr="Ein Bild, das Text, Screenshot, Diagramm, Reihe enthält.&#10;&#10;Automatisch generierte Beschreibung">
+            <a:extLst>
+              <a:ext uri="{FF2B5EF4-FFF2-40B4-BE49-F238E27FC236}">
+                <a16:creationId xmlns:a16="http://schemas.microsoft.com/office/drawing/2014/main" id="{8569264F-73B6-6125-7C59-4A193FC095A5}"/>
+              </a:ext>
+            </a:extLst>
+          </p:cNvPr>
+          <p:cNvPicPr>
+            <a:picLocks noChangeAspect="1"/>
+          </p:cNvPicPr>
+          <p:nvPr/>
+        </p:nvPicPr>
+        <p:blipFill rotWithShape="1">
+          <a:blip r:embed="rId43">
+            <a:extLst>
+              <a:ext uri="{28A0092B-C50C-407E-A947-70E740481C1C}">
+                <a14:useLocalDpi xmlns:a14="http://schemas.microsoft.com/office/drawing/2010/main" val="0"/>
+              </a:ext>
+            </a:extLst>
+          </a:blip>
+          <a:srcRect l="2674" t="3825" b="4039"/>
+          <a:stretch/>
+        </p:blipFill>
+        <p:spPr>
+          <a:xfrm>
+            <a:off x="29248109" y="6768674"/>
+            <a:ext cx="5793966" cy="4799268"/>
+          </a:xfrm>
+          <a:prstGeom prst="rect">
+            <a:avLst/>
+          </a:prstGeom>
+        </p:spPr>
+      </p:pic>
+      <p:sp>
+        <p:nvSpPr>
+          <p:cNvPr id="34" name="Textfeld 33">
+            <a:extLst>
+              <a:ext uri="{FF2B5EF4-FFF2-40B4-BE49-F238E27FC236}">
+                <a16:creationId xmlns:a16="http://schemas.microsoft.com/office/drawing/2014/main" id="{54FDA58D-1FB2-7A95-020C-F1A4C3656F23}"/>
+              </a:ext>
+            </a:extLst>
+          </p:cNvPr>
+          <p:cNvSpPr txBox="1"/>
+          <p:nvPr/>
+        </p:nvSpPr>
+        <p:spPr>
+          <a:xfrm>
+            <a:off x="29092049" y="5273882"/>
+            <a:ext cx="11902598" cy="954107"/>
+          </a:xfrm>
+          <a:prstGeom prst="rect">
+            <a:avLst/>
+          </a:prstGeom>
+          <a:noFill/>
+        </p:spPr>
+        <p:txBody>
+          <a:bodyPr wrap="square" rtlCol="0">
+            <a:spAutoFit/>
+          </a:bodyPr>
+          <a:lstStyle/>
+          <a:p>
+            <a:r>
+              <a:rPr lang="en-US" sz="2800" b="1" dirty="0">
+                <a:effectLst/>
+                <a:latin typeface="Arial" panose="020B0604020202020204" pitchFamily="34" charset="0"/>
+                <a:cs typeface="Arial" panose="020B0604020202020204" pitchFamily="34" charset="0"/>
+              </a:rPr>
+              <a:t>Dog ownership is inversely correlated with population density </a:t>
+            </a:r>
+            <a:br>
+              <a:rPr lang="en-US" sz="2800" b="1" dirty="0">
+                <a:effectLst/>
+                <a:latin typeface="Arial" panose="020B0604020202020204" pitchFamily="34" charset="0"/>
+                <a:cs typeface="Arial" panose="020B0604020202020204" pitchFamily="34" charset="0"/>
+              </a:rPr>
+            </a:br>
+            <a:r>
+              <a:rPr lang="en-US" sz="2800" b="1" dirty="0">
+                <a:effectLst/>
+                <a:latin typeface="Arial" panose="020B0604020202020204" pitchFamily="34" charset="0"/>
+                <a:cs typeface="Arial" panose="020B0604020202020204" pitchFamily="34" charset="0"/>
+              </a:rPr>
+              <a:t>in Vienna districts</a:t>
+            </a:r>
+          </a:p>
+        </p:txBody>
+      </p:sp>
+      <p:pic>
+        <p:nvPicPr>
+          <p:cNvPr id="49" name="Grafik 48" descr="Ein Bild, das Text, Screenshot, Diagramm, Reihe enthält.&#10;&#10;Automatisch generierte Beschreibung">
+            <a:extLst>
+              <a:ext uri="{FF2B5EF4-FFF2-40B4-BE49-F238E27FC236}">
+                <a16:creationId xmlns:a16="http://schemas.microsoft.com/office/drawing/2014/main" id="{5F1745BB-8ED7-4A64-0E00-22E172187E20}"/>
+              </a:ext>
+            </a:extLst>
+          </p:cNvPr>
+          <p:cNvPicPr>
+            <a:picLocks noChangeAspect="1"/>
+          </p:cNvPicPr>
+          <p:nvPr/>
+        </p:nvPicPr>
+        <p:blipFill rotWithShape="1">
+          <a:blip r:embed="rId44">
+            <a:extLst>
+              <a:ext uri="{28A0092B-C50C-407E-A947-70E740481C1C}">
+                <a14:useLocalDpi xmlns:a14="http://schemas.microsoft.com/office/drawing/2010/main" val="0"/>
+              </a:ext>
+            </a:extLst>
+          </a:blip>
+          <a:srcRect l="2583" t="3679" b="4213"/>
+          <a:stretch/>
+        </p:blipFill>
+        <p:spPr>
+          <a:xfrm>
+            <a:off x="29874754" y="7112560"/>
+            <a:ext cx="6335905" cy="4193401"/>
+          </a:xfrm>
+          <a:prstGeom prst="rect">
+            <a:avLst/>
+          </a:prstGeom>
+        </p:spPr>
+      </p:pic>
+      <p:sp>
+        <p:nvSpPr>
+          <p:cNvPr id="50" name="Textfeld 49">
+            <a:extLst>
+              <a:ext uri="{FF2B5EF4-FFF2-40B4-BE49-F238E27FC236}">
+                <a16:creationId xmlns:a16="http://schemas.microsoft.com/office/drawing/2014/main" id="{DD6E3136-57A1-C1C2-9B12-54651C3A5B30}"/>
+              </a:ext>
+            </a:extLst>
+          </p:cNvPr>
+          <p:cNvSpPr txBox="1"/>
+          <p:nvPr/>
+        </p:nvSpPr>
+        <p:spPr>
+          <a:xfrm>
+            <a:off x="37199653" y="6760912"/>
+            <a:ext cx="3497105" cy="4893647"/>
+          </a:xfrm>
+          <a:prstGeom prst="rect">
+            <a:avLst/>
+          </a:prstGeom>
+          <a:noFill/>
+        </p:spPr>
+        <p:txBody>
+          <a:bodyPr wrap="square" rtlCol="0">
+            <a:spAutoFit/>
+          </a:bodyPr>
+          <a:lstStyle/>
+          <a:p>
+            <a:r>
+              <a:rPr lang="en-US" sz="2400" dirty="0"/>
+              <a:t>To confirm the inverse correlation, the Pearson correlation coefficient was calculated, resulting in a value of -0.61.</a:t>
+            </a:r>
+          </a:p>
+          <a:p>
+            <a:endParaRPr lang="de-AT" sz="2400" b="1" dirty="0"/>
+          </a:p>
+          <a:p>
+            <a:r>
+              <a:rPr lang="de-AT" sz="2400" b="1" dirty="0" err="1"/>
+              <a:t>Conclusion</a:t>
+            </a:r>
+            <a:r>
+              <a:rPr lang="de-AT" sz="2400" b="1" dirty="0"/>
+              <a:t>:</a:t>
+            </a:r>
+          </a:p>
+          <a:p>
+            <a:r>
+              <a:rPr lang="en-US" sz="2400" dirty="0"/>
+              <a:t>The graph shows a negative correlation between the population density and the number of dogs in the districts of Vienna.</a:t>
+            </a:r>
+            <a:endParaRPr lang="de-AT" sz="2400" dirty="0"/>
+          </a:p>
+        </p:txBody>
+      </p:sp>
+      <p:pic>
+        <p:nvPicPr>
+          <p:cNvPr id="63" name="Grafik 62" descr="Ein Bild, das Text, Screenshot, Diagramm, Reihe enthält.&#10;&#10;Automatisch generierte Beschreibung">
+            <a:extLst>
+              <a:ext uri="{FF2B5EF4-FFF2-40B4-BE49-F238E27FC236}">
+                <a16:creationId xmlns:a16="http://schemas.microsoft.com/office/drawing/2014/main" id="{768307A2-261B-9BE3-F3F6-032F1014D798}"/>
+              </a:ext>
+            </a:extLst>
+          </p:cNvPr>
+          <p:cNvPicPr>
+            <a:picLocks noChangeAspect="1"/>
+          </p:cNvPicPr>
+          <p:nvPr/>
+        </p:nvPicPr>
+        <p:blipFill rotWithShape="1">
+          <a:blip r:embed="rId45">
+            <a:extLst>
+              <a:ext uri="{28A0092B-C50C-407E-A947-70E740481C1C}">
+                <a14:useLocalDpi xmlns:a14="http://schemas.microsoft.com/office/drawing/2010/main" val="0"/>
+              </a:ext>
+            </a:extLst>
+          </a:blip>
+          <a:srcRect l="1628" t="2828" r="792" b="2527"/>
+          <a:stretch/>
+        </p:blipFill>
+        <p:spPr>
+          <a:xfrm>
+            <a:off x="29271890" y="6821292"/>
+            <a:ext cx="7002062" cy="5433063"/>
+          </a:xfrm>
+          <a:prstGeom prst="rect">
+            <a:avLst/>
+          </a:prstGeom>
+        </p:spPr>
+      </p:pic>
+      <p:pic>
+        <p:nvPicPr>
+          <p:cNvPr id="56" name="Grafik 55" descr="Ein Bild, das Text, Screenshot, Diagramm, Reihe enthält.&#10;&#10;Automatisch generierte Beschreibung">
+            <a:extLst>
+              <a:ext uri="{FF2B5EF4-FFF2-40B4-BE49-F238E27FC236}">
+                <a16:creationId xmlns:a16="http://schemas.microsoft.com/office/drawing/2014/main" id="{45049E61-8A38-C803-C776-963BF4A57F26}"/>
+              </a:ext>
+            </a:extLst>
+          </p:cNvPr>
+          <p:cNvPicPr>
+            <a:picLocks noChangeAspect="1"/>
+          </p:cNvPicPr>
+          <p:nvPr/>
+        </p:nvPicPr>
+        <p:blipFill rotWithShape="1">
+          <a:blip r:embed="rId46">
+            <a:extLst>
+              <a:ext uri="{28A0092B-C50C-407E-A947-70E740481C1C}">
+                <a14:useLocalDpi xmlns:a14="http://schemas.microsoft.com/office/drawing/2010/main" val="0"/>
+              </a:ext>
+            </a:extLst>
+          </a:blip>
+          <a:srcRect l="1632" t="3529" b="3202"/>
+          <a:stretch/>
+        </p:blipFill>
+        <p:spPr>
+          <a:xfrm>
+            <a:off x="28978190" y="6204917"/>
+            <a:ext cx="8235040" cy="6246468"/>
           </a:xfrm>
           <a:prstGeom prst="rect">
             <a:avLst/>

</xml_diff>

<commit_message>
update the correct poster for H3
</commit_message>
<xml_diff>
--- a/poster-template/prj01-poster-template.pptx
+++ b/poster-template/prj01-poster-template.pptx
@@ -763,7 +763,7 @@
           <a:p>
             <a:fld id="{F1518A84-A489-4C9B-B420-2A77C4B50547}" type="datetimeFigureOut">
               <a:rPr lang="de-AT" smtClean="0"/>
-              <a:t>19.10.2024</a:t>
+              <a:t>20.10.2024</a:t>
             </a:fld>
             <a:endParaRPr lang="de-AT"/>
           </a:p>
@@ -1624,6 +1624,376 @@
       </p:grpSpPr>
       <p:sp>
         <p:nvSpPr>
+          <p:cNvPr id="14" name="文本框 12">
+            <a:extLst>
+              <a:ext uri="{FF2B5EF4-FFF2-40B4-BE49-F238E27FC236}">
+                <a16:creationId xmlns:a16="http://schemas.microsoft.com/office/drawing/2014/main" id="{78CD0678-B7E3-9A3C-C7E2-4ADA3658F2C2}"/>
+              </a:ext>
+            </a:extLst>
+          </p:cNvPr>
+          <p:cNvSpPr txBox="1"/>
+          <p:nvPr>
+            <p:custDataLst>
+              <p:tags r:id="rId1"/>
+            </p:custDataLst>
+          </p:nvPr>
+        </p:nvSpPr>
+        <p:spPr>
+          <a:xfrm>
+            <a:off x="1822451" y="9405252"/>
+            <a:ext cx="11963398" cy="3550740"/>
+          </a:xfrm>
+          <a:prstGeom prst="rect">
+            <a:avLst/>
+          </a:prstGeom>
+          <a:noFill/>
+        </p:spPr>
+        <p:txBody>
+          <a:bodyPr wrap="square" rtlCol="0">
+            <a:noAutofit/>
+          </a:bodyPr>
+          <a:lstStyle/>
+          <a:p>
+            <a:pPr algn="just">
+              <a:spcAft>
+                <a:spcPts val="1200"/>
+              </a:spcAft>
+            </a:pPr>
+            <a:r>
+              <a:rPr lang="en-US" sz="2400" b="1" dirty="0">
+                <a:latin typeface="Arial" panose="020B0604020202020204" pitchFamily="34" charset="0"/>
+                <a:ea typeface="思源黑体 CN Regular" panose="020B0500000000000000" charset="-122"/>
+                <a:cs typeface="Arial" panose="020B0604020202020204" pitchFamily="34" charset="0"/>
+                <a:sym typeface="+mn-ea"/>
+              </a:rPr>
+              <a:t>Dataset 1:</a:t>
+            </a:r>
+          </a:p>
+          <a:p>
+            <a:pPr algn="just">
+              <a:spcAft>
+                <a:spcPts val="1200"/>
+              </a:spcAft>
+            </a:pPr>
+            <a:r>
+              <a:rPr lang="en-US" sz="2400" dirty="0">
+                <a:latin typeface="Arial" panose="020B0604020202020204" pitchFamily="34" charset="0"/>
+                <a:ea typeface="思源黑体 CN Regular" panose="020B0500000000000000" charset="-122"/>
+                <a:cs typeface="Arial" panose="020B0604020202020204" pitchFamily="34" charset="0"/>
+                <a:sym typeface="+mn-ea"/>
+              </a:rPr>
+              <a:t>Structure description</a:t>
+            </a:r>
+          </a:p>
+          <a:p>
+            <a:pPr algn="just">
+              <a:spcAft>
+                <a:spcPts val="1200"/>
+              </a:spcAft>
+            </a:pPr>
+            <a:endParaRPr lang="en-US" sz="2400" dirty="0">
+              <a:latin typeface="Arial" panose="020B0604020202020204" pitchFamily="34" charset="0"/>
+              <a:ea typeface="思源黑体 CN Regular" panose="020B0500000000000000" charset="-122"/>
+              <a:cs typeface="Arial" panose="020B0604020202020204" pitchFamily="34" charset="0"/>
+              <a:sym typeface="+mn-ea"/>
+            </a:endParaRPr>
+          </a:p>
+          <a:p>
+            <a:pPr algn="just">
+              <a:spcAft>
+                <a:spcPts val="1200"/>
+              </a:spcAft>
+            </a:pPr>
+            <a:endParaRPr lang="en-US" sz="2400" dirty="0">
+              <a:latin typeface="Arial" panose="020B0604020202020204" pitchFamily="34" charset="0"/>
+              <a:ea typeface="思源黑体 CN Regular" panose="020B0500000000000000" charset="-122"/>
+              <a:cs typeface="Arial" panose="020B0604020202020204" pitchFamily="34" charset="0"/>
+              <a:sym typeface="+mn-ea"/>
+            </a:endParaRPr>
+          </a:p>
+          <a:p>
+            <a:pPr algn="just">
+              <a:spcAft>
+                <a:spcPts val="1200"/>
+              </a:spcAft>
+            </a:pPr>
+            <a:endParaRPr lang="en-US" sz="2400" dirty="0">
+              <a:latin typeface="Arial" panose="020B0604020202020204" pitchFamily="34" charset="0"/>
+              <a:ea typeface="思源黑体 CN Regular" panose="020B0500000000000000" charset="-122"/>
+              <a:cs typeface="Arial" panose="020B0604020202020204" pitchFamily="34" charset="0"/>
+              <a:sym typeface="+mn-ea"/>
+            </a:endParaRPr>
+          </a:p>
+          <a:p>
+            <a:pPr algn="just">
+              <a:spcAft>
+                <a:spcPts val="1200"/>
+              </a:spcAft>
+            </a:pPr>
+            <a:endParaRPr lang="en-US" sz="2400" dirty="0">
+              <a:latin typeface="Arial" panose="020B0604020202020204" pitchFamily="34" charset="0"/>
+              <a:ea typeface="思源黑体 CN Regular" panose="020B0500000000000000" charset="-122"/>
+              <a:cs typeface="Arial" panose="020B0604020202020204" pitchFamily="34" charset="0"/>
+              <a:sym typeface="+mn-ea"/>
+            </a:endParaRPr>
+          </a:p>
+          <a:p>
+            <a:pPr algn="just">
+              <a:spcAft>
+                <a:spcPts val="1200"/>
+              </a:spcAft>
+            </a:pPr>
+            <a:r>
+              <a:rPr lang="en-US" sz="2400" dirty="0">
+                <a:latin typeface="Arial" panose="020B0604020202020204" pitchFamily="34" charset="0"/>
+                <a:ea typeface="思源黑体 CN Regular" panose="020B0500000000000000" charset="-122"/>
+                <a:cs typeface="Arial" panose="020B0604020202020204" pitchFamily="34" charset="0"/>
+                <a:sym typeface="+mn-ea"/>
+              </a:rPr>
+              <a:t>		Dog distribution (absolute) </a:t>
+            </a:r>
+          </a:p>
+        </p:txBody>
+      </p:sp>
+      <p:pic>
+        <p:nvPicPr>
+          <p:cNvPr id="11" name="Picture 10" descr="A graph of a graph&#10;&#10;Description automatically generated with medium confidence">
+            <a:extLst>
+              <a:ext uri="{FF2B5EF4-FFF2-40B4-BE49-F238E27FC236}">
+                <a16:creationId xmlns:a16="http://schemas.microsoft.com/office/drawing/2014/main" id="{2E0DAF3B-BF39-A6EB-AB9C-DAC51B797167}"/>
+              </a:ext>
+            </a:extLst>
+          </p:cNvPr>
+          <p:cNvPicPr>
+            <a:picLocks noChangeAspect="1"/>
+          </p:cNvPicPr>
+          <p:nvPr/>
+        </p:nvPicPr>
+        <p:blipFill>
+          <a:blip r:embed="rId17">
+            <a:extLst>
+              <a:ext uri="{28A0092B-C50C-407E-A947-70E740481C1C}">
+                <a14:useLocalDpi xmlns:a14="http://schemas.microsoft.com/office/drawing/2010/main" val="0"/>
+              </a:ext>
+            </a:extLst>
+          </a:blip>
+          <a:srcRect l="4902" r="6687" b="5073"/>
+          <a:stretch/>
+        </p:blipFill>
+        <p:spPr>
+          <a:xfrm>
+            <a:off x="7424985" y="9621597"/>
+            <a:ext cx="6669235" cy="2864311"/>
+          </a:xfrm>
+          <a:prstGeom prst="rect">
+            <a:avLst/>
+          </a:prstGeom>
+        </p:spPr>
+      </p:pic>
+      <p:sp>
+        <p:nvSpPr>
+          <p:cNvPr id="18" name="文本框 12">
+            <a:extLst>
+              <a:ext uri="{FF2B5EF4-FFF2-40B4-BE49-F238E27FC236}">
+                <a16:creationId xmlns:a16="http://schemas.microsoft.com/office/drawing/2014/main" id="{5EB90210-6FB6-4307-CBDA-CDA53E89F885}"/>
+              </a:ext>
+            </a:extLst>
+          </p:cNvPr>
+          <p:cNvSpPr txBox="1"/>
+          <p:nvPr>
+            <p:custDataLst>
+              <p:tags r:id="rId2"/>
+            </p:custDataLst>
+          </p:nvPr>
+        </p:nvSpPr>
+        <p:spPr>
+          <a:xfrm>
+            <a:off x="1750408" y="13373938"/>
+            <a:ext cx="12099925" cy="9002323"/>
+          </a:xfrm>
+          <a:prstGeom prst="rect">
+            <a:avLst/>
+          </a:prstGeom>
+          <a:noFill/>
+        </p:spPr>
+        <p:txBody>
+          <a:bodyPr wrap="square" rtlCol="0">
+            <a:noAutofit/>
+          </a:bodyPr>
+          <a:lstStyle/>
+          <a:p>
+            <a:pPr algn="just">
+              <a:spcAft>
+                <a:spcPts val="1200"/>
+              </a:spcAft>
+            </a:pPr>
+            <a:r>
+              <a:rPr lang="en-US" sz="2400" b="1" dirty="0">
+                <a:latin typeface="Arial" panose="020B0604020202020204" pitchFamily="34" charset="0"/>
+                <a:ea typeface="思源黑体 CN Regular" panose="020B0500000000000000" charset="-122"/>
+                <a:cs typeface="Arial" panose="020B0604020202020204" pitchFamily="34" charset="0"/>
+                <a:sym typeface="+mn-ea"/>
+              </a:rPr>
+              <a:t>Dataset 2 &amp; 3</a:t>
+            </a:r>
+          </a:p>
+          <a:p>
+            <a:pPr algn="just">
+              <a:spcAft>
+                <a:spcPts val="1200"/>
+              </a:spcAft>
+            </a:pPr>
+            <a:endParaRPr lang="en-US" sz="2400" b="1" dirty="0">
+              <a:latin typeface="Arial" panose="020B0604020202020204" pitchFamily="34" charset="0"/>
+              <a:ea typeface="思源黑体 CN Regular" panose="020B0500000000000000" charset="-122"/>
+              <a:cs typeface="Arial" panose="020B0604020202020204" pitchFamily="34" charset="0"/>
+              <a:sym typeface="+mn-ea"/>
+            </a:endParaRPr>
+          </a:p>
+          <a:p>
+            <a:pPr algn="just">
+              <a:spcAft>
+                <a:spcPts val="1200"/>
+              </a:spcAft>
+            </a:pPr>
+            <a:endParaRPr lang="en-US" sz="2400" b="1" dirty="0">
+              <a:latin typeface="Arial" panose="020B0604020202020204" pitchFamily="34" charset="0"/>
+              <a:ea typeface="思源黑体 CN Regular" panose="020B0500000000000000" charset="-122"/>
+              <a:cs typeface="Arial" panose="020B0604020202020204" pitchFamily="34" charset="0"/>
+              <a:sym typeface="+mn-ea"/>
+            </a:endParaRPr>
+          </a:p>
+          <a:p>
+            <a:pPr algn="just">
+              <a:spcAft>
+                <a:spcPts val="1200"/>
+              </a:spcAft>
+            </a:pPr>
+            <a:endParaRPr lang="en-US" sz="2400" b="1" dirty="0">
+              <a:latin typeface="Arial" panose="020B0604020202020204" pitchFamily="34" charset="0"/>
+              <a:ea typeface="思源黑体 CN Regular" panose="020B0500000000000000" charset="-122"/>
+              <a:cs typeface="Arial" panose="020B0604020202020204" pitchFamily="34" charset="0"/>
+              <a:sym typeface="+mn-ea"/>
+            </a:endParaRPr>
+          </a:p>
+          <a:p>
+            <a:pPr algn="just">
+              <a:spcAft>
+                <a:spcPts val="1200"/>
+              </a:spcAft>
+            </a:pPr>
+            <a:endParaRPr lang="en-US" sz="2400" b="1" dirty="0">
+              <a:latin typeface="Arial" panose="020B0604020202020204" pitchFamily="34" charset="0"/>
+              <a:ea typeface="思源黑体 CN Regular" panose="020B0500000000000000" charset="-122"/>
+              <a:cs typeface="Arial" panose="020B0604020202020204" pitchFamily="34" charset="0"/>
+              <a:sym typeface="+mn-ea"/>
+            </a:endParaRPr>
+          </a:p>
+          <a:p>
+            <a:pPr algn="just">
+              <a:spcAft>
+                <a:spcPts val="1200"/>
+              </a:spcAft>
+            </a:pPr>
+            <a:endParaRPr lang="en-US" sz="2400" b="1" dirty="0">
+              <a:latin typeface="Arial" panose="020B0604020202020204" pitchFamily="34" charset="0"/>
+              <a:ea typeface="思源黑体 CN Regular" panose="020B0500000000000000" charset="-122"/>
+              <a:cs typeface="Arial" panose="020B0604020202020204" pitchFamily="34" charset="0"/>
+              <a:sym typeface="+mn-ea"/>
+            </a:endParaRPr>
+          </a:p>
+          <a:p>
+            <a:pPr algn="just">
+              <a:spcAft>
+                <a:spcPts val="1200"/>
+              </a:spcAft>
+            </a:pPr>
+            <a:endParaRPr lang="en-US" sz="2400" b="1" dirty="0">
+              <a:latin typeface="Arial" panose="020B0604020202020204" pitchFamily="34" charset="0"/>
+              <a:ea typeface="思源黑体 CN Regular" panose="020B0500000000000000" charset="-122"/>
+              <a:cs typeface="Arial" panose="020B0604020202020204" pitchFamily="34" charset="0"/>
+              <a:sym typeface="+mn-ea"/>
+            </a:endParaRPr>
+          </a:p>
+          <a:p>
+            <a:pPr algn="just">
+              <a:spcAft>
+                <a:spcPts val="1200"/>
+              </a:spcAft>
+            </a:pPr>
+            <a:endParaRPr lang="en-US" sz="2400" b="1" dirty="0">
+              <a:latin typeface="Arial" panose="020B0604020202020204" pitchFamily="34" charset="0"/>
+              <a:ea typeface="思源黑体 CN Regular" panose="020B0500000000000000" charset="-122"/>
+              <a:cs typeface="Arial" panose="020B0604020202020204" pitchFamily="34" charset="0"/>
+              <a:sym typeface="+mn-ea"/>
+            </a:endParaRPr>
+          </a:p>
+          <a:p>
+            <a:pPr algn="just">
+              <a:spcAft>
+                <a:spcPts val="1200"/>
+              </a:spcAft>
+            </a:pPr>
+            <a:endParaRPr lang="en-US" sz="2400" b="1" dirty="0">
+              <a:latin typeface="Arial" panose="020B0604020202020204" pitchFamily="34" charset="0"/>
+              <a:ea typeface="思源黑体 CN Regular" panose="020B0500000000000000" charset="-122"/>
+              <a:cs typeface="Arial" panose="020B0604020202020204" pitchFamily="34" charset="0"/>
+              <a:sym typeface="+mn-ea"/>
+            </a:endParaRPr>
+          </a:p>
+          <a:p>
+            <a:pPr algn="just">
+              <a:spcAft>
+                <a:spcPts val="1200"/>
+              </a:spcAft>
+            </a:pPr>
+            <a:endParaRPr lang="en-US" sz="2400" b="1" dirty="0">
+              <a:latin typeface="Arial" panose="020B0604020202020204" pitchFamily="34" charset="0"/>
+              <a:ea typeface="思源黑体 CN Regular" panose="020B0500000000000000" charset="-122"/>
+              <a:cs typeface="Arial" panose="020B0604020202020204" pitchFamily="34" charset="0"/>
+              <a:sym typeface="+mn-ea"/>
+            </a:endParaRPr>
+          </a:p>
+        </p:txBody>
+      </p:sp>
+      <p:pic>
+        <p:nvPicPr>
+          <p:cNvPr id="9" name="Picture 8" descr="A graph of different colored lines&#10;&#10;Description automatically generated">
+            <a:extLst>
+              <a:ext uri="{FF2B5EF4-FFF2-40B4-BE49-F238E27FC236}">
+                <a16:creationId xmlns:a16="http://schemas.microsoft.com/office/drawing/2014/main" id="{A674D4AE-AED4-3929-0E3B-C3647834C510}"/>
+              </a:ext>
+            </a:extLst>
+          </p:cNvPr>
+          <p:cNvPicPr>
+            <a:picLocks noChangeAspect="1"/>
+          </p:cNvPicPr>
+          <p:nvPr/>
+        </p:nvPicPr>
+        <p:blipFill>
+          <a:blip r:embed="rId18" cstate="print">
+            <a:extLst>
+              <a:ext uri="{28A0092B-C50C-407E-A947-70E740481C1C}">
+                <a14:useLocalDpi xmlns:a14="http://schemas.microsoft.com/office/drawing/2010/main" val="0"/>
+              </a:ext>
+            </a:extLst>
+          </a:blip>
+          <a:stretch>
+            <a:fillRect/>
+          </a:stretch>
+        </p:blipFill>
+        <p:spPr>
+          <a:xfrm>
+            <a:off x="1714347" y="14454470"/>
+            <a:ext cx="6564910" cy="6166164"/>
+          </a:xfrm>
+          <a:prstGeom prst="rect">
+            <a:avLst/>
+          </a:prstGeom>
+        </p:spPr>
+      </p:pic>
+      <p:sp>
+        <p:nvSpPr>
           <p:cNvPr id="2" name="Titel 1">
             <a:extLst>
               <a:ext uri="{FF2B5EF4-FFF2-40B4-BE49-F238E27FC236}">
@@ -1740,37 +2110,25 @@
               <a:rPr lang="en-US" sz="4800" i="1" dirty="0">
                 <a:latin typeface="Arial" panose="020B0604020202020204" pitchFamily="34" charset="0"/>
               </a:rPr>
-              <a:t>Anna Marie </a:t>
+              <a:t>Carlos Eduardo </a:t>
+            </a:r>
+            <a:r>
+              <a:rPr lang="en-US" sz="4800" i="1" dirty="0" err="1">
+                <a:latin typeface="Arial" panose="020B0604020202020204" pitchFamily="34" charset="0"/>
+              </a:rPr>
+              <a:t>Tichy</a:t>
+            </a:r>
+            <a:r>
+              <a:rPr lang="en-US" sz="4800" i="1" dirty="0">
+                <a:latin typeface="Arial" panose="020B0604020202020204" pitchFamily="34" charset="0"/>
+              </a:rPr>
+              <a:t>, Theresa Spiel, Martin Stasek, Anna Marie </a:t>
             </a:r>
             <a:r>
               <a:rPr lang="en-US" sz="4800" i="1" dirty="0" err="1">
                 <a:latin typeface="Arial" panose="020B0604020202020204" pitchFamily="34" charset="0"/>
               </a:rPr>
               <a:t>Punzengruber</a:t>
-            </a:r>
-            <a:r>
-              <a:rPr lang="en-US" sz="4800" i="1" dirty="0">
-                <a:latin typeface="Arial" panose="020B0604020202020204" pitchFamily="34" charset="0"/>
-              </a:rPr>
-              <a:t>, Martin </a:t>
-            </a:r>
-            <a:r>
-              <a:rPr lang="en-US" sz="4800" i="1" dirty="0" err="1">
-                <a:latin typeface="Arial" panose="020B0604020202020204" pitchFamily="34" charset="0"/>
-              </a:rPr>
-              <a:t>Stasek</a:t>
-            </a:r>
-            <a:r>
-              <a:rPr lang="en-US" sz="4800" i="1" dirty="0">
-                <a:latin typeface="Arial" panose="020B0604020202020204" pitchFamily="34" charset="0"/>
-              </a:rPr>
-              <a:t>, Theresa Spiel, Carlos Eduardo </a:t>
-            </a:r>
-            <a:r>
-              <a:rPr lang="en-US" sz="4800" i="1" dirty="0" err="1">
-                <a:latin typeface="Arial" panose="020B0604020202020204" pitchFamily="34" charset="0"/>
-              </a:rPr>
-              <a:t>Tichy</a:t>
             </a:r>
             <a:r>
               <a:rPr lang="en-US" sz="4800" i="1" dirty="0">
@@ -1972,156 +2330,23 @@
       </p:sp>
       <p:sp>
         <p:nvSpPr>
-          <p:cNvPr id="14" name="文本框 12">
-            <a:extLst>
-              <a:ext uri="{FF2B5EF4-FFF2-40B4-BE49-F238E27FC236}">
-                <a16:creationId xmlns:a16="http://schemas.microsoft.com/office/drawing/2014/main" id="{78CD0678-B7E3-9A3C-C7E2-4ADA3658F2C2}"/>
+          <p:cNvPr id="15" name="文本框 28">
+            <a:extLst>
+              <a:ext uri="{FF2B5EF4-FFF2-40B4-BE49-F238E27FC236}">
+                <a16:creationId xmlns:a16="http://schemas.microsoft.com/office/drawing/2014/main" id="{0872D21C-495C-3992-4C19-D725CD3A9340}"/>
               </a:ext>
             </a:extLst>
           </p:cNvPr>
           <p:cNvSpPr txBox="1"/>
           <p:nvPr>
             <p:custDataLst>
-              <p:tags r:id="rId1"/>
+              <p:tags r:id="rId3"/>
             </p:custDataLst>
           </p:nvPr>
         </p:nvSpPr>
         <p:spPr>
           <a:xfrm>
-            <a:off x="1822451" y="9405252"/>
-            <a:ext cx="11963398" cy="3550740"/>
-          </a:xfrm>
-          <a:prstGeom prst="rect">
-            <a:avLst/>
-          </a:prstGeom>
-          <a:noFill/>
-        </p:spPr>
-        <p:txBody>
-          <a:bodyPr wrap="square" rtlCol="0">
-            <a:noAutofit/>
-          </a:bodyPr>
-          <a:lstStyle/>
-          <a:p>
-            <a:pPr algn="just">
-              <a:spcAft>
-                <a:spcPts val="1200"/>
-              </a:spcAft>
-            </a:pPr>
-            <a:r>
-              <a:rPr lang="en-US" sz="2400" b="1" dirty="0">
-                <a:latin typeface="Arial" panose="020B0604020202020204" pitchFamily="34" charset="0"/>
-                <a:ea typeface="思源黑体 CN Regular" panose="020B0500000000000000" charset="-122"/>
-                <a:cs typeface="Arial" panose="020B0604020202020204" pitchFamily="34" charset="0"/>
-                <a:sym typeface="+mn-ea"/>
-              </a:rPr>
-              <a:t>Dataset 1:</a:t>
-            </a:r>
-          </a:p>
-          <a:p>
-            <a:pPr algn="just">
-              <a:spcAft>
-                <a:spcPts val="1200"/>
-              </a:spcAft>
-            </a:pPr>
-            <a:r>
-              <a:rPr lang="en-US" sz="2400" dirty="0">
-                <a:latin typeface="Arial" panose="020B0604020202020204" pitchFamily="34" charset="0"/>
-                <a:ea typeface="思源黑体 CN Regular" panose="020B0500000000000000" charset="-122"/>
-                <a:cs typeface="Arial" panose="020B0604020202020204" pitchFamily="34" charset="0"/>
-                <a:sym typeface="+mn-ea"/>
-              </a:rPr>
-              <a:t>Structure description</a:t>
-            </a:r>
-          </a:p>
-          <a:p>
-            <a:pPr algn="just">
-              <a:spcAft>
-                <a:spcPts val="1200"/>
-              </a:spcAft>
-            </a:pPr>
-            <a:endParaRPr lang="en-US" sz="2400" dirty="0">
-              <a:latin typeface="Arial" panose="020B0604020202020204" pitchFamily="34" charset="0"/>
-              <a:ea typeface="思源黑体 CN Regular" panose="020B0500000000000000" charset="-122"/>
-              <a:cs typeface="Arial" panose="020B0604020202020204" pitchFamily="34" charset="0"/>
-              <a:sym typeface="+mn-ea"/>
-            </a:endParaRPr>
-          </a:p>
-          <a:p>
-            <a:pPr algn="just">
-              <a:spcAft>
-                <a:spcPts val="1200"/>
-              </a:spcAft>
-            </a:pPr>
-            <a:endParaRPr lang="en-US" sz="2400" dirty="0">
-              <a:latin typeface="Arial" panose="020B0604020202020204" pitchFamily="34" charset="0"/>
-              <a:ea typeface="思源黑体 CN Regular" panose="020B0500000000000000" charset="-122"/>
-              <a:cs typeface="Arial" panose="020B0604020202020204" pitchFamily="34" charset="0"/>
-              <a:sym typeface="+mn-ea"/>
-            </a:endParaRPr>
-          </a:p>
-          <a:p>
-            <a:pPr algn="just">
-              <a:spcAft>
-                <a:spcPts val="1200"/>
-              </a:spcAft>
-            </a:pPr>
-            <a:endParaRPr lang="en-US" sz="2400" dirty="0">
-              <a:latin typeface="Arial" panose="020B0604020202020204" pitchFamily="34" charset="0"/>
-              <a:ea typeface="思源黑体 CN Regular" panose="020B0500000000000000" charset="-122"/>
-              <a:cs typeface="Arial" panose="020B0604020202020204" pitchFamily="34" charset="0"/>
-              <a:sym typeface="+mn-ea"/>
-            </a:endParaRPr>
-          </a:p>
-          <a:p>
-            <a:pPr algn="just">
-              <a:spcAft>
-                <a:spcPts val="1200"/>
-              </a:spcAft>
-            </a:pPr>
-            <a:endParaRPr lang="en-US" sz="2400" dirty="0">
-              <a:latin typeface="Arial" panose="020B0604020202020204" pitchFamily="34" charset="0"/>
-              <a:ea typeface="思源黑体 CN Regular" panose="020B0500000000000000" charset="-122"/>
-              <a:cs typeface="Arial" panose="020B0604020202020204" pitchFamily="34" charset="0"/>
-              <a:sym typeface="+mn-ea"/>
-            </a:endParaRPr>
-          </a:p>
-          <a:p>
-            <a:pPr algn="just">
-              <a:spcAft>
-                <a:spcPts val="1200"/>
-              </a:spcAft>
-            </a:pPr>
-            <a:r>
-              <a:rPr lang="en-US" sz="2400" dirty="0">
-                <a:latin typeface="Arial" panose="020B0604020202020204" pitchFamily="34" charset="0"/>
-                <a:ea typeface="思源黑体 CN Regular" panose="020B0500000000000000" charset="-122"/>
-                <a:cs typeface="Arial" panose="020B0604020202020204" pitchFamily="34" charset="0"/>
-                <a:sym typeface="+mn-ea"/>
-              </a:rPr>
-              <a:t>		Dog distribution (absolute) </a:t>
-            </a:r>
-          </a:p>
-        </p:txBody>
-      </p:sp>
-      <p:sp>
-        <p:nvSpPr>
-          <p:cNvPr id="15" name="文本框 28">
-            <a:extLst>
-              <a:ext uri="{FF2B5EF4-FFF2-40B4-BE49-F238E27FC236}">
-                <a16:creationId xmlns:a16="http://schemas.microsoft.com/office/drawing/2014/main" id="{0872D21C-495C-3992-4C19-D725CD3A9340}"/>
-              </a:ext>
-            </a:extLst>
-          </p:cNvPr>
-          <p:cNvSpPr txBox="1"/>
-          <p:nvPr>
-            <p:custDataLst>
-              <p:tags r:id="rId2"/>
-            </p:custDataLst>
-          </p:nvPr>
-        </p:nvSpPr>
-        <p:spPr>
-          <a:xfrm>
-            <a:off x="1668299" y="8414920"/>
+            <a:off x="1668298" y="8325418"/>
             <a:ext cx="8517255" cy="830997"/>
           </a:xfrm>
           <a:prstGeom prst="rect">
@@ -2279,7 +2504,7 @@
           <p:cNvSpPr txBox="1"/>
           <p:nvPr>
             <p:custDataLst>
-              <p:tags r:id="rId3"/>
+              <p:tags r:id="rId4"/>
             </p:custDataLst>
           </p:nvPr>
         </p:nvSpPr>
@@ -2414,7 +2639,7 @@
           <p:cNvSpPr txBox="1"/>
           <p:nvPr>
             <p:custDataLst>
-              <p:tags r:id="rId4"/>
+              <p:tags r:id="rId5"/>
             </p:custDataLst>
           </p:nvPr>
         </p:nvSpPr>
@@ -2578,7 +2803,7 @@
           <p:cNvSpPr txBox="1"/>
           <p:nvPr>
             <p:custDataLst>
-              <p:tags r:id="rId5"/>
+              <p:tags r:id="rId6"/>
             </p:custDataLst>
           </p:nvPr>
         </p:nvSpPr>
@@ -2627,7 +2852,7 @@
           <p:cNvSpPr txBox="1"/>
           <p:nvPr>
             <p:custDataLst>
-              <p:tags r:id="rId6"/>
+              <p:tags r:id="rId7"/>
             </p:custDataLst>
           </p:nvPr>
         </p:nvSpPr>
@@ -2791,7 +3016,7 @@
           <p:cNvSpPr txBox="1"/>
           <p:nvPr>
             <p:custDataLst>
-              <p:tags r:id="rId7"/>
+              <p:tags r:id="rId8"/>
             </p:custDataLst>
           </p:nvPr>
         </p:nvSpPr>
@@ -2976,14 +3201,14 @@
           <p:cNvSpPr txBox="1"/>
           <p:nvPr>
             <p:custDataLst>
-              <p:tags r:id="rId8"/>
+              <p:tags r:id="rId9"/>
             </p:custDataLst>
           </p:nvPr>
         </p:nvSpPr>
         <p:spPr>
           <a:xfrm>
-            <a:off x="14938106" y="20235517"/>
-            <a:ext cx="12099925" cy="6994231"/>
+            <a:off x="14938106" y="21502441"/>
+            <a:ext cx="12099925" cy="5727307"/>
           </a:xfrm>
           <a:prstGeom prst="rect">
             <a:avLst/>
@@ -3001,15 +3226,12 @@
                 <a:spcPts val="1200"/>
               </a:spcAft>
             </a:pPr>
-            <a:r>
-              <a:rPr lang="en-US" sz="2400" dirty="0">
-                <a:latin typeface="Arial" panose="020B0604020202020204" pitchFamily="34" charset="0"/>
-                <a:ea typeface="思源黑体 CN Regular" panose="020B0500000000000000" charset="-122"/>
-                <a:cs typeface="Arial" panose="020B0604020202020204" pitchFamily="34" charset="0"/>
-                <a:sym typeface="+mn-ea"/>
-              </a:rPr>
-              <a:t>Many real-world problems have multiple conflicting objectives, which cannot be optimal at the same time. Therefore, single RL policy must trade-off between different objectives. </a:t>
-            </a:r>
+            <a:endParaRPr lang="en-US" sz="2400" dirty="0">
+              <a:latin typeface="Arial" panose="020B0604020202020204" pitchFamily="34" charset="0"/>
+              <a:ea typeface="思源黑体 CN Regular" panose="020B0500000000000000" charset="-122"/>
+              <a:cs typeface="Arial" panose="020B0604020202020204" pitchFamily="34" charset="0"/>
+              <a:sym typeface="+mn-ea"/>
+            </a:endParaRPr>
           </a:p>
         </p:txBody>
       </p:sp>
@@ -3025,7 +3247,7 @@
           <p:cNvSpPr txBox="1"/>
           <p:nvPr>
             <p:custDataLst>
-              <p:tags r:id="rId9"/>
+              <p:tags r:id="rId10"/>
             </p:custDataLst>
           </p:nvPr>
         </p:nvSpPr>
@@ -3189,7 +3411,7 @@
           <p:cNvSpPr txBox="1"/>
           <p:nvPr>
             <p:custDataLst>
-              <p:tags r:id="rId10"/>
+              <p:tags r:id="rId11"/>
             </p:custDataLst>
           </p:nvPr>
         </p:nvSpPr>
@@ -3465,13 +3687,13 @@
           <p:cNvSpPr txBox="1"/>
           <p:nvPr>
             <p:custDataLst>
-              <p:tags r:id="rId11"/>
+              <p:tags r:id="rId12"/>
             </p:custDataLst>
           </p:nvPr>
         </p:nvSpPr>
         <p:spPr>
           <a:xfrm>
-            <a:off x="15116685" y="9920071"/>
+            <a:off x="15116338" y="9830661"/>
             <a:ext cx="8517255" cy="830997"/>
           </a:xfrm>
           <a:prstGeom prst="rect">
@@ -3515,7 +3737,7 @@
           <p:nvPr/>
         </p:nvPicPr>
         <p:blipFill rotWithShape="1">
-          <a:blip r:embed="rId17"/>
+          <a:blip r:embed="rId19"/>
           <a:srcRect b="11944"/>
           <a:stretch/>
         </p:blipFill>
@@ -3577,7 +3799,7 @@
             </a:r>
             <a:r>
               <a:rPr lang="en-US" sz="2800" dirty="0">
-                <a:hlinkClick r:id="rId18"/>
+                <a:hlinkClick r:id="rId20"/>
               </a:rPr>
               <a:t>https://ec.europa.eu/eurostat/databrowser/view/HLTH_HLYE/default/table?lang=en</a:t>
             </a:r>
@@ -3648,41 +3870,6 @@
           </a:p>
         </p:txBody>
       </p:sp>
-      <p:pic>
-        <p:nvPicPr>
-          <p:cNvPr id="11" name="Picture 10" descr="A graph of a graph&#10;&#10;Description automatically generated with medium confidence">
-            <a:extLst>
-              <a:ext uri="{FF2B5EF4-FFF2-40B4-BE49-F238E27FC236}">
-                <a16:creationId xmlns:a16="http://schemas.microsoft.com/office/drawing/2014/main" id="{2E0DAF3B-BF39-A6EB-AB9C-DAC51B797167}"/>
-              </a:ext>
-            </a:extLst>
-          </p:cNvPr>
-          <p:cNvPicPr>
-            <a:picLocks noChangeAspect="1"/>
-          </p:cNvPicPr>
-          <p:nvPr/>
-        </p:nvPicPr>
-        <p:blipFill>
-          <a:blip r:embed="rId19">
-            <a:extLst>
-              <a:ext uri="{28A0092B-C50C-407E-A947-70E740481C1C}">
-                <a14:useLocalDpi xmlns:a14="http://schemas.microsoft.com/office/drawing/2010/main" val="0"/>
-              </a:ext>
-            </a:extLst>
-          </a:blip>
-          <a:srcRect l="4902" r="6687" b="5073"/>
-          <a:stretch/>
-        </p:blipFill>
-        <p:spPr>
-          <a:xfrm>
-            <a:off x="7798201" y="9510869"/>
-            <a:ext cx="6285294" cy="2699416"/>
-          </a:xfrm>
-          <a:prstGeom prst="rect">
-            <a:avLst/>
-          </a:prstGeom>
-        </p:spPr>
-      </p:pic>
       <p:sp>
         <p:nvSpPr>
           <p:cNvPr id="16" name="圆角矩形 5">
@@ -3737,208 +3924,12 @@
           </a:p>
         </p:txBody>
       </p:sp>
-      <p:sp>
-        <p:nvSpPr>
-          <p:cNvPr id="18" name="文本框 12">
-            <a:extLst>
-              <a:ext uri="{FF2B5EF4-FFF2-40B4-BE49-F238E27FC236}">
-                <a16:creationId xmlns:a16="http://schemas.microsoft.com/office/drawing/2014/main" id="{5EB90210-6FB6-4307-CBDA-CDA53E89F885}"/>
-              </a:ext>
-            </a:extLst>
-          </p:cNvPr>
-          <p:cNvSpPr txBox="1"/>
-          <p:nvPr>
-            <p:custDataLst>
-              <p:tags r:id="rId12"/>
-            </p:custDataLst>
-          </p:nvPr>
-        </p:nvSpPr>
-        <p:spPr>
-          <a:xfrm>
-            <a:off x="1799907" y="13410665"/>
-            <a:ext cx="12099925" cy="9002323"/>
-          </a:xfrm>
-          <a:prstGeom prst="rect">
-            <a:avLst/>
-          </a:prstGeom>
-          <a:noFill/>
-        </p:spPr>
-        <p:txBody>
-          <a:bodyPr wrap="square" rtlCol="0">
-            <a:noAutofit/>
-          </a:bodyPr>
-          <a:lstStyle/>
-          <a:p>
-            <a:pPr algn="just">
-              <a:spcAft>
-                <a:spcPts val="1200"/>
-              </a:spcAft>
-            </a:pPr>
-            <a:r>
-              <a:rPr lang="en-US" sz="2400" b="1" dirty="0">
-                <a:latin typeface="Arial" panose="020B0604020202020204" pitchFamily="34" charset="0"/>
-                <a:ea typeface="思源黑体 CN Regular" panose="020B0500000000000000" charset="-122"/>
-                <a:cs typeface="Arial" panose="020B0604020202020204" pitchFamily="34" charset="0"/>
-                <a:sym typeface="+mn-ea"/>
-              </a:rPr>
-              <a:t>Dataset 2 &amp; 3</a:t>
-            </a:r>
-          </a:p>
-          <a:p>
-            <a:pPr algn="just">
-              <a:spcAft>
-                <a:spcPts val="1200"/>
-              </a:spcAft>
-            </a:pPr>
-            <a:endParaRPr lang="en-US" sz="2400" b="1" dirty="0">
-              <a:latin typeface="Arial" panose="020B0604020202020204" pitchFamily="34" charset="0"/>
-              <a:ea typeface="思源黑体 CN Regular" panose="020B0500000000000000" charset="-122"/>
-              <a:cs typeface="Arial" panose="020B0604020202020204" pitchFamily="34" charset="0"/>
-              <a:sym typeface="+mn-ea"/>
-            </a:endParaRPr>
-          </a:p>
-          <a:p>
-            <a:pPr algn="just">
-              <a:spcAft>
-                <a:spcPts val="1200"/>
-              </a:spcAft>
-            </a:pPr>
-            <a:endParaRPr lang="en-US" sz="2400" b="1" dirty="0">
-              <a:latin typeface="Arial" panose="020B0604020202020204" pitchFamily="34" charset="0"/>
-              <a:ea typeface="思源黑体 CN Regular" panose="020B0500000000000000" charset="-122"/>
-              <a:cs typeface="Arial" panose="020B0604020202020204" pitchFamily="34" charset="0"/>
-              <a:sym typeface="+mn-ea"/>
-            </a:endParaRPr>
-          </a:p>
-          <a:p>
-            <a:pPr algn="just">
-              <a:spcAft>
-                <a:spcPts val="1200"/>
-              </a:spcAft>
-            </a:pPr>
-            <a:endParaRPr lang="en-US" sz="2400" b="1" dirty="0">
-              <a:latin typeface="Arial" panose="020B0604020202020204" pitchFamily="34" charset="0"/>
-              <a:ea typeface="思源黑体 CN Regular" panose="020B0500000000000000" charset="-122"/>
-              <a:cs typeface="Arial" panose="020B0604020202020204" pitchFamily="34" charset="0"/>
-              <a:sym typeface="+mn-ea"/>
-            </a:endParaRPr>
-          </a:p>
-          <a:p>
-            <a:pPr algn="just">
-              <a:spcAft>
-                <a:spcPts val="1200"/>
-              </a:spcAft>
-            </a:pPr>
-            <a:endParaRPr lang="en-US" sz="2400" b="1" dirty="0">
-              <a:latin typeface="Arial" panose="020B0604020202020204" pitchFamily="34" charset="0"/>
-              <a:ea typeface="思源黑体 CN Regular" panose="020B0500000000000000" charset="-122"/>
-              <a:cs typeface="Arial" panose="020B0604020202020204" pitchFamily="34" charset="0"/>
-              <a:sym typeface="+mn-ea"/>
-            </a:endParaRPr>
-          </a:p>
-          <a:p>
-            <a:pPr algn="just">
-              <a:spcAft>
-                <a:spcPts val="1200"/>
-              </a:spcAft>
-            </a:pPr>
-            <a:endParaRPr lang="en-US" sz="2400" b="1" dirty="0">
-              <a:latin typeface="Arial" panose="020B0604020202020204" pitchFamily="34" charset="0"/>
-              <a:ea typeface="思源黑体 CN Regular" panose="020B0500000000000000" charset="-122"/>
-              <a:cs typeface="Arial" panose="020B0604020202020204" pitchFamily="34" charset="0"/>
-              <a:sym typeface="+mn-ea"/>
-            </a:endParaRPr>
-          </a:p>
-          <a:p>
-            <a:pPr algn="just">
-              <a:spcAft>
-                <a:spcPts val="1200"/>
-              </a:spcAft>
-            </a:pPr>
-            <a:endParaRPr lang="en-US" sz="2400" b="1" dirty="0">
-              <a:latin typeface="Arial" panose="020B0604020202020204" pitchFamily="34" charset="0"/>
-              <a:ea typeface="思源黑体 CN Regular" panose="020B0500000000000000" charset="-122"/>
-              <a:cs typeface="Arial" panose="020B0604020202020204" pitchFamily="34" charset="0"/>
-              <a:sym typeface="+mn-ea"/>
-            </a:endParaRPr>
-          </a:p>
-          <a:p>
-            <a:pPr algn="just">
-              <a:spcAft>
-                <a:spcPts val="1200"/>
-              </a:spcAft>
-            </a:pPr>
-            <a:endParaRPr lang="en-US" sz="2400" b="1" dirty="0">
-              <a:latin typeface="Arial" panose="020B0604020202020204" pitchFamily="34" charset="0"/>
-              <a:ea typeface="思源黑体 CN Regular" panose="020B0500000000000000" charset="-122"/>
-              <a:cs typeface="Arial" panose="020B0604020202020204" pitchFamily="34" charset="0"/>
-              <a:sym typeface="+mn-ea"/>
-            </a:endParaRPr>
-          </a:p>
-          <a:p>
-            <a:pPr algn="just">
-              <a:spcAft>
-                <a:spcPts val="1200"/>
-              </a:spcAft>
-            </a:pPr>
-            <a:endParaRPr lang="en-US" sz="2400" b="1" dirty="0">
-              <a:latin typeface="Arial" panose="020B0604020202020204" pitchFamily="34" charset="0"/>
-              <a:ea typeface="思源黑体 CN Regular" panose="020B0500000000000000" charset="-122"/>
-              <a:cs typeface="Arial" panose="020B0604020202020204" pitchFamily="34" charset="0"/>
-              <a:sym typeface="+mn-ea"/>
-            </a:endParaRPr>
-          </a:p>
-          <a:p>
-            <a:pPr algn="just">
-              <a:spcAft>
-                <a:spcPts val="1200"/>
-              </a:spcAft>
-            </a:pPr>
-            <a:endParaRPr lang="en-US" sz="2400" b="1" dirty="0">
-              <a:latin typeface="Arial" panose="020B0604020202020204" pitchFamily="34" charset="0"/>
-              <a:ea typeface="思源黑体 CN Regular" panose="020B0500000000000000" charset="-122"/>
-              <a:cs typeface="Arial" panose="020B0604020202020204" pitchFamily="34" charset="0"/>
-              <a:sym typeface="+mn-ea"/>
-            </a:endParaRPr>
-          </a:p>
-        </p:txBody>
-      </p:sp>
       <p:pic>
         <p:nvPicPr>
           <p:cNvPr id="39" name="Picture 38">
             <a:extLst>
               <a:ext uri="{FF2B5EF4-FFF2-40B4-BE49-F238E27FC236}">
                 <a16:creationId xmlns:a16="http://schemas.microsoft.com/office/drawing/2014/main" id="{3E213F57-246B-BA3F-1190-57E310ED064C}"/>
-              </a:ext>
-            </a:extLst>
-          </p:cNvPr>
-          <p:cNvPicPr>
-            <a:picLocks noChangeAspect="1"/>
-          </p:cNvPicPr>
-          <p:nvPr/>
-        </p:nvPicPr>
-        <p:blipFill>
-          <a:blip r:embed="rId20"/>
-          <a:stretch>
-            <a:fillRect/>
-          </a:stretch>
-        </p:blipFill>
-        <p:spPr>
-          <a:xfrm>
-            <a:off x="1799907" y="10444315"/>
-            <a:ext cx="6179211" cy="2475285"/>
-          </a:xfrm>
-          <a:prstGeom prst="rect">
-            <a:avLst/>
-          </a:prstGeom>
-        </p:spPr>
-      </p:pic>
-      <p:pic>
-        <p:nvPicPr>
-          <p:cNvPr id="46" name="Picture 45">
-            <a:extLst>
-              <a:ext uri="{FF2B5EF4-FFF2-40B4-BE49-F238E27FC236}">
-                <a16:creationId xmlns:a16="http://schemas.microsoft.com/office/drawing/2014/main" id="{E0C40BF2-9C40-937D-7BA7-0DD9DA57B4D2}"/>
               </a:ext>
             </a:extLst>
           </p:cNvPr>
@@ -3955,8 +3946,8 @@
         </p:blipFill>
         <p:spPr>
           <a:xfrm>
-            <a:off x="8191737" y="13893194"/>
-            <a:ext cx="5852245" cy="1577080"/>
+            <a:off x="1693361" y="10578467"/>
+            <a:ext cx="5910452" cy="2367625"/>
           </a:xfrm>
           <a:prstGeom prst="rect">
             <a:avLst/>
@@ -3965,10 +3956,10 @@
       </p:pic>
       <p:pic>
         <p:nvPicPr>
-          <p:cNvPr id="59" name="Picture 58" descr="A screenshot of a graph&#10;&#10;Description automatically generated">
-            <a:extLst>
-              <a:ext uri="{FF2B5EF4-FFF2-40B4-BE49-F238E27FC236}">
-                <a16:creationId xmlns:a16="http://schemas.microsoft.com/office/drawing/2014/main" id="{D56AB122-B29C-BD48-BDD5-3E880B6A0DC9}"/>
+          <p:cNvPr id="46" name="Picture 45">
+            <a:extLst>
+              <a:ext uri="{FF2B5EF4-FFF2-40B4-BE49-F238E27FC236}">
+                <a16:creationId xmlns:a16="http://schemas.microsoft.com/office/drawing/2014/main" id="{E0C40BF2-9C40-937D-7BA7-0DD9DA57B4D2}"/>
               </a:ext>
             </a:extLst>
           </p:cNvPr>
@@ -3978,7 +3969,37 @@
           <p:nvPr/>
         </p:nvPicPr>
         <p:blipFill>
-          <a:blip r:embed="rId22">
+          <a:blip r:embed="rId22"/>
+          <a:stretch>
+            <a:fillRect/>
+          </a:stretch>
+        </p:blipFill>
+        <p:spPr>
+          <a:xfrm>
+            <a:off x="8191737" y="13893194"/>
+            <a:ext cx="5852245" cy="1577080"/>
+          </a:xfrm>
+          <a:prstGeom prst="rect">
+            <a:avLst/>
+          </a:prstGeom>
+        </p:spPr>
+      </p:pic>
+      <p:pic>
+        <p:nvPicPr>
+          <p:cNvPr id="59" name="Picture 58" descr="A screenshot of a graph&#10;&#10;Description automatically generated">
+            <a:extLst>
+              <a:ext uri="{FF2B5EF4-FFF2-40B4-BE49-F238E27FC236}">
+                <a16:creationId xmlns:a16="http://schemas.microsoft.com/office/drawing/2014/main" id="{D56AB122-B29C-BD48-BDD5-3E880B6A0DC9}"/>
+              </a:ext>
+            </a:extLst>
+          </p:cNvPr>
+          <p:cNvPicPr>
+            <a:picLocks noChangeAspect="1"/>
+          </p:cNvPicPr>
+          <p:nvPr/>
+        </p:nvPicPr>
+        <p:blipFill>
+          <a:blip r:embed="rId23">
             <a:extLst>
               <a:ext uri="{28A0092B-C50C-407E-A947-70E740481C1C}">
                 <a14:useLocalDpi xmlns:a14="http://schemas.microsoft.com/office/drawing/2010/main" val="0"/>
@@ -3998,255 +4019,6 @@
           </a:prstGeom>
         </p:spPr>
       </p:pic>
-      <p:sp>
-        <p:nvSpPr>
-          <p:cNvPr id="62" name="Rectangle 1">
-            <a:extLst>
-              <a:ext uri="{FF2B5EF4-FFF2-40B4-BE49-F238E27FC236}">
-                <a16:creationId xmlns:a16="http://schemas.microsoft.com/office/drawing/2014/main" id="{B2B86F2B-9578-3D8A-554E-73B47C504C58}"/>
-              </a:ext>
-            </a:extLst>
-          </p:cNvPr>
-          <p:cNvSpPr>
-            <a:spLocks noChangeArrowheads="1"/>
-          </p:cNvSpPr>
-          <p:nvPr/>
-        </p:nvSpPr>
-        <p:spPr bwMode="auto">
-          <a:xfrm>
-            <a:off x="0" y="0"/>
-            <a:ext cx="42840275" cy="457200"/>
-          </a:xfrm>
-          <a:prstGeom prst="rect">
-            <a:avLst/>
-          </a:prstGeom>
-          <a:noFill/>
-          <a:ln>
-            <a:noFill/>
-          </a:ln>
-          <a:effectLst/>
-          <a:extLst>
-            <a:ext uri="{909E8E84-426E-40DD-AFC4-6F175D3DCCD1}">
-              <a14:hiddenFill xmlns:a14="http://schemas.microsoft.com/office/drawing/2010/main">
-                <a:solidFill>
-                  <a:schemeClr val="accent1"/>
-                </a:solidFill>
-              </a14:hiddenFill>
-            </a:ext>
-            <a:ext uri="{91240B29-F687-4F45-9708-019B960494DF}">
-              <a14:hiddenLine xmlns:a14="http://schemas.microsoft.com/office/drawing/2010/main" w="9525">
-                <a:solidFill>
-                  <a:schemeClr val="tx1"/>
-                </a:solidFill>
-                <a:miter lim="800000"/>
-                <a:headEnd/>
-                <a:tailEnd/>
-              </a14:hiddenLine>
-            </a:ext>
-            <a:ext uri="{AF507438-7753-43E0-B8FC-AC1667EBCBE1}">
-              <a14:hiddenEffects xmlns:a14="http://schemas.microsoft.com/office/drawing/2010/main">
-                <a:effectLst>
-                  <a:outerShdw dist="35921" dir="2700000" algn="ctr" rotWithShape="0">
-                    <a:schemeClr val="bg2"/>
-                  </a:outerShdw>
-                </a:effectLst>
-              </a14:hiddenEffects>
-            </a:ext>
-          </a:extLst>
-        </p:spPr>
-        <p:txBody>
-          <a:bodyPr vert="horz" wrap="none" lIns="91440" tIns="45720" rIns="91440" bIns="45720" numCol="1" anchor="ctr" anchorCtr="0" compatLnSpc="1">
-            <a:prstTxWarp prst="textNoShape">
-              <a:avLst/>
-            </a:prstTxWarp>
-            <a:spAutoFit/>
-          </a:bodyPr>
-          <a:lstStyle/>
-          <a:p>
-            <a:pPr marL="0" marR="0" lvl="0" indent="0" algn="r" defTabSz="914400" rtl="0" eaLnBrk="0" fontAlgn="base" latinLnBrk="0" hangingPunct="0">
-              <a:lnSpc>
-                <a:spcPct val="100000"/>
-              </a:lnSpc>
-              <a:spcBef>
-                <a:spcPct val="0"/>
-              </a:spcBef>
-              <a:spcAft>
-                <a:spcPct val="0"/>
-              </a:spcAft>
-              <a:buClrTx/>
-              <a:buSzTx/>
-              <a:buFontTx/>
-              <a:buNone/>
-              <a:tabLst/>
-            </a:pPr>
-            <a:r>
-              <a:rPr kumimoji="0" lang="en-US" altLang="en-US" sz="1000" b="0" i="0" u="none" strike="noStrike" cap="none" normalizeH="0" baseline="0">
-                <a:ln>
-                  <a:noFill/>
-                </a:ln>
-                <a:solidFill>
-                  <a:srgbClr val="C5C8C6"/>
-                </a:solidFill>
-                <a:effectLst/>
-                <a:latin typeface="inherit"/>
-              </a:rPr>
-              <a:t>g.fig.suptitle(</a:t>
-            </a:r>
-            <a:r>
-              <a:rPr kumimoji="0" lang="en-US" altLang="en-US" sz="1000" b="0" i="0" u="none" strike="noStrike" cap="none" normalizeH="0" baseline="0">
-                <a:ln>
-                  <a:noFill/>
-                </a:ln>
-                <a:solidFill>
-                  <a:srgbClr val="B5BD68"/>
-                </a:solidFill>
-                <a:effectLst/>
-                <a:latin typeface="inherit"/>
-              </a:rPr>
-              <a:t>'Distribution of dog breeds over districts'</a:t>
-            </a:r>
-            <a:r>
-              <a:rPr kumimoji="0" lang="en-US" altLang="en-US" sz="1000" b="0" i="0" u="none" strike="noStrike" cap="none" normalizeH="0" baseline="0">
-                <a:ln>
-                  <a:noFill/>
-                </a:ln>
-                <a:solidFill>
-                  <a:srgbClr val="C5C8C6"/>
-                </a:solidFill>
-                <a:effectLst/>
-                <a:latin typeface="inherit"/>
-              </a:rPr>
-              <a:t>, fontsize=</a:t>
-            </a:r>
-            <a:r>
-              <a:rPr kumimoji="0" lang="en-US" altLang="en-US" sz="1000" b="0" i="0" u="none" strike="noStrike" cap="none" normalizeH="0" baseline="0">
-                <a:ln>
-                  <a:noFill/>
-                </a:ln>
-                <a:solidFill>
-                  <a:srgbClr val="DE935F"/>
-                </a:solidFill>
-                <a:effectLst/>
-                <a:latin typeface="inherit"/>
-              </a:rPr>
-              <a:t>18</a:t>
-            </a:r>
-            <a:r>
-              <a:rPr kumimoji="0" lang="en-US" altLang="en-US" sz="1000" b="0" i="0" u="none" strike="noStrike" cap="none" normalizeH="0" baseline="0">
-                <a:ln>
-                  <a:noFill/>
-                </a:ln>
-                <a:solidFill>
-                  <a:srgbClr val="C5C8C6"/>
-                </a:solidFill>
-                <a:effectLst/>
-                <a:latin typeface="inherit"/>
-              </a:rPr>
-              <a:t>, x=</a:t>
-            </a:r>
-            <a:r>
-              <a:rPr kumimoji="0" lang="en-US" altLang="en-US" sz="1000" b="0" i="0" u="none" strike="noStrike" cap="none" normalizeH="0" baseline="0">
-                <a:ln>
-                  <a:noFill/>
-                </a:ln>
-                <a:solidFill>
-                  <a:srgbClr val="DE935F"/>
-                </a:solidFill>
-                <a:effectLst/>
-                <a:latin typeface="inherit"/>
-              </a:rPr>
-              <a:t>0.95</a:t>
-            </a:r>
-            <a:r>
-              <a:rPr kumimoji="0" lang="en-US" altLang="en-US" sz="1000" b="0" i="0" u="none" strike="noStrike" cap="none" normalizeH="0" baseline="0">
-                <a:ln>
-                  <a:noFill/>
-                </a:ln>
-                <a:solidFill>
-                  <a:srgbClr val="C5C8C6"/>
-                </a:solidFill>
-                <a:effectLst/>
-                <a:latin typeface="inherit"/>
-              </a:rPr>
-              <a:t>, y=</a:t>
-            </a:r>
-            <a:r>
-              <a:rPr kumimoji="0" lang="en-US" altLang="en-US" sz="1000" b="0" i="0" u="none" strike="noStrike" cap="none" normalizeH="0" baseline="0">
-                <a:ln>
-                  <a:noFill/>
-                </a:ln>
-                <a:solidFill>
-                  <a:srgbClr val="DE935F"/>
-                </a:solidFill>
-                <a:effectLst/>
-                <a:latin typeface="inherit"/>
-              </a:rPr>
-              <a:t>0.01</a:t>
-            </a:r>
-            <a:r>
-              <a:rPr kumimoji="0" lang="en-US" altLang="en-US" sz="1000" b="0" i="0" u="none" strike="noStrike" cap="none" normalizeH="0" baseline="0">
-                <a:ln>
-                  <a:noFill/>
-                </a:ln>
-                <a:solidFill>
-                  <a:srgbClr val="C5C8C6"/>
-                </a:solidFill>
-                <a:effectLst/>
-                <a:latin typeface="inherit"/>
-              </a:rPr>
-              <a:t>, ha=</a:t>
-            </a:r>
-            <a:r>
-              <a:rPr kumimoji="0" lang="en-US" altLang="en-US" sz="1000" b="0" i="0" u="none" strike="noStrike" cap="none" normalizeH="0" baseline="0">
-                <a:ln>
-                  <a:noFill/>
-                </a:ln>
-                <a:solidFill>
-                  <a:srgbClr val="B5BD68"/>
-                </a:solidFill>
-                <a:effectLst/>
-                <a:latin typeface="inherit"/>
-              </a:rPr>
-              <a:t>'right'</a:t>
-            </a:r>
-            <a:r>
-              <a:rPr kumimoji="0" lang="en-US" altLang="en-US" sz="1000" b="0" i="0" u="none" strike="noStrike" cap="none" normalizeH="0" baseline="0">
-                <a:ln>
-                  <a:noFill/>
-                </a:ln>
-                <a:solidFill>
-                  <a:srgbClr val="C5C8C6"/>
-                </a:solidFill>
-                <a:effectLst/>
-                <a:latin typeface="inherit"/>
-              </a:rPr>
-              <a:t>)</a:t>
-            </a:r>
-            <a:r>
-              <a:rPr kumimoji="0" lang="en-US" altLang="en-US" sz="2800" b="0" i="0" u="none" strike="noStrike" cap="none" normalizeH="0" baseline="0">
-                <a:ln>
-                  <a:noFill/>
-                </a:ln>
-                <a:solidFill>
-                  <a:schemeClr val="tx1"/>
-                </a:solidFill>
-                <a:effectLst/>
-              </a:rPr>
-              <a:t> </a:t>
-            </a:r>
-            <a:endParaRPr kumimoji="0" lang="en-US" altLang="en-US" sz="1800" b="0" i="0" u="none" strike="noStrike" cap="none" normalizeH="0" baseline="0">
-              <a:ln>
-                <a:noFill/>
-              </a:ln>
-              <a:solidFill>
-                <a:schemeClr val="tx1"/>
-              </a:solidFill>
-              <a:effectLst/>
-              <a:latin typeface="Arial" panose="020B0604020202020204" pitchFamily="34" charset="0"/>
-            </a:endParaRPr>
-          </a:p>
-        </p:txBody>
-      </p:sp>
       <p:sp>
         <p:nvSpPr>
           <p:cNvPr id="66" name="剪去对角的矩形 9">
@@ -4691,7 +4463,7 @@
           <p:nvPr/>
         </p:nvPicPr>
         <p:blipFill>
-          <a:blip r:embed="rId23"/>
+          <a:blip r:embed="rId24"/>
           <a:stretch>
             <a:fillRect/>
           </a:stretch>
@@ -4708,7 +4480,7 @@
       </p:pic>
       <mc:AlternateContent xmlns:mc="http://schemas.openxmlformats.org/markup-compatibility/2006" xmlns:p14="http://schemas.microsoft.com/office/powerpoint/2010/main">
         <mc:Choice Requires="p14">
-          <p:contentPart p14:bwMode="auto" r:id="rId24">
+          <p:contentPart p14:bwMode="auto" r:id="rId25">
             <p14:nvContentPartPr>
               <p14:cNvPr id="111" name="Ink 110">
                 <a:extLst>
@@ -5029,7 +4801,7 @@
           <a:lstStyle/>
           <a:p>
             <a:r>
-              <a:rPr lang="en-US" sz="2400" dirty="0">
+              <a:rPr lang="en-US" sz="2400" b="1" dirty="0">
                 <a:latin typeface="Arial" panose="020B0604020202020204" pitchFamily="34" charset="0"/>
                 <a:cs typeface="Arial" panose="020B0604020202020204" pitchFamily="34" charset="0"/>
               </a:rPr>
@@ -5376,10 +5148,10 @@
       </p:pic>
       <p:pic>
         <p:nvPicPr>
-          <p:cNvPr id="9" name="Picture 8" descr="A graph of different colored lines&#10;&#10;Description automatically generated">
-            <a:extLst>
-              <a:ext uri="{FF2B5EF4-FFF2-40B4-BE49-F238E27FC236}">
-                <a16:creationId xmlns:a16="http://schemas.microsoft.com/office/drawing/2014/main" id="{A674D4AE-AED4-3929-0E3B-C3647834C510}"/>
+          <p:cNvPr id="57" name="Picture 56" descr="A graph of different colored squares&#10;&#10;Description automatically generated">
+            <a:extLst>
+              <a:ext uri="{FF2B5EF4-FFF2-40B4-BE49-F238E27FC236}">
+                <a16:creationId xmlns:a16="http://schemas.microsoft.com/office/drawing/2014/main" id="{D87B35BC-720C-EC80-6161-894D8F6EB9BB}"/>
               </a:ext>
             </a:extLst>
           </p:cNvPr>
@@ -5389,33 +5161,136 @@
           <p:nvPr/>
         </p:nvPicPr>
         <p:blipFill>
-          <a:blip r:embed="rId39" cstate="print">
+          <a:blip r:embed="rId39">
             <a:extLst>
               <a:ext uri="{28A0092B-C50C-407E-A947-70E740481C1C}">
                 <a14:useLocalDpi xmlns:a14="http://schemas.microsoft.com/office/drawing/2010/main" val="0"/>
               </a:ext>
             </a:extLst>
           </a:blip>
-          <a:stretch>
-            <a:fillRect/>
-          </a:stretch>
+          <a:srcRect l="2626" t="6834" r="10545" b="6229"/>
+          <a:stretch/>
         </p:blipFill>
         <p:spPr>
           <a:xfrm>
-            <a:off x="23990709" y="13626525"/>
-            <a:ext cx="6564910" cy="6166164"/>
+            <a:off x="6146133" y="19680544"/>
+            <a:ext cx="7948087" cy="2981093"/>
           </a:xfrm>
           <a:prstGeom prst="rect">
             <a:avLst/>
           </a:prstGeom>
         </p:spPr>
       </p:pic>
+      <p:sp>
+        <p:nvSpPr>
+          <p:cNvPr id="20" name="TextBox 19">
+            <a:extLst>
+              <a:ext uri="{FF2B5EF4-FFF2-40B4-BE49-F238E27FC236}">
+                <a16:creationId xmlns:a16="http://schemas.microsoft.com/office/drawing/2014/main" id="{10E28791-B1C4-869F-FE2D-5955CF99BB6A}"/>
+              </a:ext>
+            </a:extLst>
+          </p:cNvPr>
+          <p:cNvSpPr txBox="1"/>
+          <p:nvPr/>
+        </p:nvSpPr>
+        <p:spPr>
+          <a:xfrm>
+            <a:off x="15114403" y="11210577"/>
+            <a:ext cx="7212198" cy="1938992"/>
+          </a:xfrm>
+          <a:prstGeom prst="rect">
+            <a:avLst/>
+          </a:prstGeom>
+          <a:noFill/>
+        </p:spPr>
+        <p:txBody>
+          <a:bodyPr wrap="square" rtlCol="0">
+            <a:spAutoFit/>
+          </a:bodyPr>
+          <a:lstStyle/>
+          <a:p>
+            <a:r>
+              <a:rPr lang="en-GB" sz="2400" b="1" i="1" u="sng" dirty="0">
+                <a:latin typeface="Arial" panose="020B0604020202020204" pitchFamily="34" charset="0"/>
+                <a:ea typeface="思源黑体 CN Regular" panose="020B0500000000000000" charset="-122"/>
+                <a:cs typeface="Arial" panose="020B0604020202020204" pitchFamily="34" charset="0"/>
+                <a:sym typeface="+mn-ea"/>
+              </a:rPr>
+              <a:t>Assumption</a:t>
+            </a:r>
+            <a:r>
+              <a:rPr lang="en-GB" sz="2400" b="1" dirty="0">
+                <a:latin typeface="Arial" panose="020B0604020202020204" pitchFamily="34" charset="0"/>
+                <a:ea typeface="思源黑体 CN Regular" panose="020B0500000000000000" charset="-122"/>
+                <a:cs typeface="Arial" panose="020B0604020202020204" pitchFamily="34" charset="0"/>
+                <a:sym typeface="+mn-ea"/>
+              </a:rPr>
+              <a:t>: </a:t>
+            </a:r>
+            <a:r>
+              <a:rPr lang="en-GB" sz="2400" dirty="0">
+                <a:latin typeface="Arial" panose="020B0604020202020204" pitchFamily="34" charset="0"/>
+                <a:ea typeface="思源黑体 CN Regular" panose="020B0500000000000000" charset="-122"/>
+                <a:cs typeface="Arial" panose="020B0604020202020204" pitchFamily="34" charset="0"/>
+                <a:sym typeface="+mn-ea"/>
+              </a:rPr>
+              <a:t>There is a positive correlation between the ownership of </a:t>
+            </a:r>
+            <a:r>
+              <a:rPr lang="en-GB" sz="2400" dirty="0" err="1">
+                <a:latin typeface="Arial" panose="020B0604020202020204" pitchFamily="34" charset="0"/>
+                <a:ea typeface="思源黑体 CN Regular" panose="020B0500000000000000" charset="-122"/>
+                <a:cs typeface="Arial" panose="020B0604020202020204" pitchFamily="34" charset="0"/>
+                <a:sym typeface="+mn-ea"/>
+              </a:rPr>
+              <a:t>Listenhunde</a:t>
+            </a:r>
+            <a:r>
+              <a:rPr lang="en-GB" sz="2400" dirty="0">
+                <a:latin typeface="Arial" panose="020B0604020202020204" pitchFamily="34" charset="0"/>
+                <a:ea typeface="思源黑体 CN Regular" panose="020B0500000000000000" charset="-122"/>
+                <a:cs typeface="Arial" panose="020B0604020202020204" pitchFamily="34" charset="0"/>
+                <a:sym typeface="+mn-ea"/>
+              </a:rPr>
+              <a:t> and district, with a higher prevalence of </a:t>
+            </a:r>
+            <a:r>
+              <a:rPr lang="en-GB" sz="2400" dirty="0" err="1">
+                <a:latin typeface="Arial" panose="020B0604020202020204" pitchFamily="34" charset="0"/>
+                <a:ea typeface="思源黑体 CN Regular" panose="020B0500000000000000" charset="-122"/>
+                <a:cs typeface="Arial" panose="020B0604020202020204" pitchFamily="34" charset="0"/>
+                <a:sym typeface="+mn-ea"/>
+              </a:rPr>
+              <a:t>Listenhunde</a:t>
+            </a:r>
+            <a:r>
+              <a:rPr lang="en-GB" sz="2400" dirty="0">
+                <a:latin typeface="Arial" panose="020B0604020202020204" pitchFamily="34" charset="0"/>
+                <a:ea typeface="思源黑体 CN Regular" panose="020B0500000000000000" charset="-122"/>
+                <a:cs typeface="Arial" panose="020B0604020202020204" pitchFamily="34" charset="0"/>
+                <a:sym typeface="+mn-ea"/>
+              </a:rPr>
+              <a:t> ownership in outer Viennese districts compared to inner districts.</a:t>
+            </a:r>
+            <a:r>
+              <a:rPr lang="en-GB" sz="2400" b="1" dirty="0">
+                <a:latin typeface="Arial" panose="020B0604020202020204" pitchFamily="34" charset="0"/>
+                <a:ea typeface="思源黑体 CN Regular" panose="020B0500000000000000" charset="-122"/>
+                <a:cs typeface="Arial" panose="020B0604020202020204" pitchFamily="34" charset="0"/>
+                <a:sym typeface="+mn-ea"/>
+              </a:rPr>
+              <a:t>	</a:t>
+            </a:r>
+            <a:endParaRPr lang="en-GB" sz="2400" dirty="0"/>
+          </a:p>
+        </p:txBody>
+      </p:sp>
       <p:pic>
         <p:nvPicPr>
-          <p:cNvPr id="57" name="Picture 56" descr="A graph of different colored squares&#10;&#10;Description automatically generated">
-            <a:extLst>
-              <a:ext uri="{FF2B5EF4-FFF2-40B4-BE49-F238E27FC236}">
-                <a16:creationId xmlns:a16="http://schemas.microsoft.com/office/drawing/2014/main" id="{D87B35BC-720C-EC80-6161-894D8F6EB9BB}"/>
+          <p:cNvPr id="19" name="Picture 18" descr="A graph with red dots and green dots&#10;&#10;Description automatically generated">
+            <a:extLst>
+              <a:ext uri="{FF2B5EF4-FFF2-40B4-BE49-F238E27FC236}">
+                <a16:creationId xmlns:a16="http://schemas.microsoft.com/office/drawing/2014/main" id="{081C592B-0C04-446E-04FC-50103FDEDF0A}"/>
               </a:ext>
             </a:extLst>
           </p:cNvPr>
@@ -5432,13 +5307,14 @@
               </a:ext>
             </a:extLst>
           </a:blip>
-          <a:srcRect l="2626" t="6834" r="10545" b="6229"/>
-          <a:stretch/>
+          <a:stretch>
+            <a:fillRect/>
+          </a:stretch>
         </p:blipFill>
         <p:spPr>
           <a:xfrm>
-            <a:off x="6146133" y="19680544"/>
-            <a:ext cx="7948087" cy="2981093"/>
+            <a:off x="15013442" y="13078976"/>
+            <a:ext cx="8280898" cy="4140449"/>
           </a:xfrm>
           <a:prstGeom prst="rect">
             <a:avLst/>
@@ -5447,10 +5323,10 @@
       </p:pic>
       <p:sp>
         <p:nvSpPr>
-          <p:cNvPr id="20" name="TextBox 19">
-            <a:extLst>
-              <a:ext uri="{FF2B5EF4-FFF2-40B4-BE49-F238E27FC236}">
-                <a16:creationId xmlns:a16="http://schemas.microsoft.com/office/drawing/2014/main" id="{10E28791-B1C4-869F-FE2D-5955CF99BB6A}"/>
+          <p:cNvPr id="116" name="TextBox 115">
+            <a:extLst>
+              <a:ext uri="{FF2B5EF4-FFF2-40B4-BE49-F238E27FC236}">
+                <a16:creationId xmlns:a16="http://schemas.microsoft.com/office/drawing/2014/main" id="{BC23514B-6B6B-F2FE-A09C-823661277C07}"/>
               </a:ext>
             </a:extLst>
           </p:cNvPr>
@@ -5459,8 +5335,8 @@
         </p:nvSpPr>
         <p:spPr>
           <a:xfrm>
-            <a:off x="15114403" y="11210577"/>
-            <a:ext cx="7212198" cy="1938992"/>
+            <a:off x="15123631" y="17180811"/>
+            <a:ext cx="3316409" cy="1077218"/>
           </a:xfrm>
           <a:prstGeom prst="rect">
             <a:avLst/>
@@ -5474,87 +5350,138 @@
           <a:lstStyle/>
           <a:p>
             <a:r>
-              <a:rPr lang="en-GB" sz="2400" b="1" i="1" u="sng" dirty="0">
-                <a:latin typeface="Arial" panose="020B0604020202020204" pitchFamily="34" charset="0"/>
-                <a:ea typeface="思源黑体 CN Regular" panose="020B0500000000000000" charset="-122"/>
-                <a:cs typeface="Arial" panose="020B0604020202020204" pitchFamily="34" charset="0"/>
-                <a:sym typeface="+mn-ea"/>
-              </a:rPr>
-              <a:t>Assumption</a:t>
-            </a:r>
-            <a:r>
-              <a:rPr lang="en-GB" sz="2400" b="1" dirty="0">
-                <a:latin typeface="Arial" panose="020B0604020202020204" pitchFamily="34" charset="0"/>
-                <a:ea typeface="思源黑体 CN Regular" panose="020B0500000000000000" charset="-122"/>
-                <a:cs typeface="Arial" panose="020B0604020202020204" pitchFamily="34" charset="0"/>
-                <a:sym typeface="+mn-ea"/>
-              </a:rPr>
-              <a:t>: </a:t>
-            </a:r>
-            <a:r>
-              <a:rPr lang="en-GB" sz="2400" dirty="0">
-                <a:latin typeface="Arial" panose="020B0604020202020204" pitchFamily="34" charset="0"/>
-                <a:ea typeface="思源黑体 CN Regular" panose="020B0500000000000000" charset="-122"/>
-                <a:cs typeface="Arial" panose="020B0604020202020204" pitchFamily="34" charset="0"/>
-                <a:sym typeface="+mn-ea"/>
-              </a:rPr>
-              <a:t>There is a positive correlation between the ownership of </a:t>
-            </a:r>
-            <a:r>
-              <a:rPr lang="en-GB" sz="2400" dirty="0" err="1">
-                <a:latin typeface="Arial" panose="020B0604020202020204" pitchFamily="34" charset="0"/>
-                <a:ea typeface="思源黑体 CN Regular" panose="020B0500000000000000" charset="-122"/>
-                <a:cs typeface="Arial" panose="020B0604020202020204" pitchFamily="34" charset="0"/>
-                <a:sym typeface="+mn-ea"/>
-              </a:rPr>
-              <a:t>Listenhunde</a:t>
-            </a:r>
-            <a:r>
-              <a:rPr lang="en-GB" sz="2400" dirty="0">
-                <a:latin typeface="Arial" panose="020B0604020202020204" pitchFamily="34" charset="0"/>
-                <a:ea typeface="思源黑体 CN Regular" panose="020B0500000000000000" charset="-122"/>
-                <a:cs typeface="Arial" panose="020B0604020202020204" pitchFamily="34" charset="0"/>
-                <a:sym typeface="+mn-ea"/>
-              </a:rPr>
-              <a:t> and district, with a higher prevalence of </a:t>
-            </a:r>
-            <a:r>
-              <a:rPr lang="en-GB" sz="2400" dirty="0" err="1">
-                <a:latin typeface="Arial" panose="020B0604020202020204" pitchFamily="34" charset="0"/>
-                <a:ea typeface="思源黑体 CN Regular" panose="020B0500000000000000" charset="-122"/>
-                <a:cs typeface="Arial" panose="020B0604020202020204" pitchFamily="34" charset="0"/>
-                <a:sym typeface="+mn-ea"/>
-              </a:rPr>
-              <a:t>Listenhunde</a:t>
-            </a:r>
-            <a:r>
-              <a:rPr lang="en-GB" sz="2400" dirty="0">
-                <a:latin typeface="Arial" panose="020B0604020202020204" pitchFamily="34" charset="0"/>
-                <a:ea typeface="思源黑体 CN Regular" panose="020B0500000000000000" charset="-122"/>
-                <a:cs typeface="Arial" panose="020B0604020202020204" pitchFamily="34" charset="0"/>
-                <a:sym typeface="+mn-ea"/>
-              </a:rPr>
-              <a:t> ownership in outer Viennese districts compared to inner districts.</a:t>
-            </a:r>
-            <a:r>
-              <a:rPr lang="en-GB" sz="2400" b="1" dirty="0">
-                <a:latin typeface="Arial" panose="020B0604020202020204" pitchFamily="34" charset="0"/>
-                <a:ea typeface="思源黑体 CN Regular" panose="020B0500000000000000" charset="-122"/>
-                <a:cs typeface="Arial" panose="020B0604020202020204" pitchFamily="34" charset="0"/>
-                <a:sym typeface="+mn-ea"/>
-              </a:rPr>
-              <a:t>	</a:t>
-            </a:r>
-            <a:endParaRPr lang="en-GB" sz="2400" dirty="0"/>
+              <a:rPr lang="de-DE" sz="1600" b="1" dirty="0"/>
+              <a:t>1) </a:t>
+            </a:r>
+            <a:r>
+              <a:rPr lang="de-DE" sz="1600" dirty="0" err="1"/>
+              <a:t>There</a:t>
+            </a:r>
+            <a:r>
+              <a:rPr lang="de-DE" sz="1600" dirty="0"/>
+              <a:t> </a:t>
+            </a:r>
+            <a:r>
+              <a:rPr lang="de-DE" sz="1600" dirty="0" err="1"/>
+              <a:t>is</a:t>
+            </a:r>
+            <a:r>
+              <a:rPr lang="de-DE" sz="1600" dirty="0"/>
+              <a:t> </a:t>
+            </a:r>
+            <a:r>
+              <a:rPr lang="de-DE" sz="1600" b="1" dirty="0" err="1"/>
+              <a:t>only</a:t>
+            </a:r>
+            <a:r>
+              <a:rPr lang="de-DE" sz="1600" b="1" dirty="0"/>
+              <a:t> a </a:t>
+            </a:r>
+            <a:r>
+              <a:rPr lang="de-DE" sz="1600" b="1" dirty="0" err="1"/>
+              <a:t>weak</a:t>
+            </a:r>
+            <a:r>
+              <a:rPr lang="de-DE" sz="1600" b="1" dirty="0"/>
+              <a:t> </a:t>
+            </a:r>
+            <a:r>
+              <a:rPr lang="de-DE" sz="1600" b="1" dirty="0" err="1"/>
+              <a:t>correlation</a:t>
+            </a:r>
+            <a:r>
+              <a:rPr lang="de-DE" sz="1600" b="1" dirty="0"/>
+              <a:t> </a:t>
+            </a:r>
+            <a:r>
+              <a:rPr lang="de-DE" sz="1600" dirty="0" err="1"/>
+              <a:t>between</a:t>
+            </a:r>
+            <a:r>
+              <a:rPr lang="de-DE" sz="1600" dirty="0"/>
+              <a:t> </a:t>
+            </a:r>
+            <a:r>
+              <a:rPr lang="de-DE" sz="1600" dirty="0" err="1"/>
+              <a:t>district</a:t>
+            </a:r>
+            <a:r>
+              <a:rPr lang="de-DE" sz="1600" dirty="0"/>
+              <a:t> and Listenhund </a:t>
+            </a:r>
+            <a:r>
+              <a:rPr lang="de-DE" sz="1600" dirty="0" err="1"/>
+              <a:t>for</a:t>
+            </a:r>
+            <a:r>
+              <a:rPr lang="de-DE" sz="1600" dirty="0"/>
+              <a:t> </a:t>
+            </a:r>
+            <a:r>
+              <a:rPr lang="de-DE" sz="1600" b="1" dirty="0" err="1"/>
+              <a:t>three</a:t>
+            </a:r>
+            <a:r>
+              <a:rPr lang="de-DE" sz="1600" dirty="0"/>
+              <a:t> Listenhund </a:t>
+            </a:r>
+            <a:r>
+              <a:rPr lang="de-DE" sz="1600" dirty="0" err="1"/>
+              <a:t>breeds</a:t>
+            </a:r>
+            <a:r>
+              <a:rPr lang="de-DE" sz="1600" dirty="0"/>
+              <a:t> (</a:t>
+            </a:r>
+            <a:r>
+              <a:rPr lang="de-DE" sz="1600" b="1" dirty="0"/>
+              <a:t>0.2 – 0.35</a:t>
+            </a:r>
+            <a:r>
+              <a:rPr lang="de-DE" sz="1600" dirty="0"/>
+              <a:t>) and </a:t>
+            </a:r>
+            <a:r>
+              <a:rPr lang="de-DE" sz="1600" b="1" dirty="0" err="1"/>
+              <a:t>less</a:t>
+            </a:r>
+            <a:r>
+              <a:rPr lang="de-DE" sz="1600" b="1" dirty="0"/>
+              <a:t> </a:t>
+            </a:r>
+            <a:r>
+              <a:rPr lang="de-DE" sz="1600" b="1" dirty="0" err="1"/>
+              <a:t>for</a:t>
+            </a:r>
+            <a:r>
+              <a:rPr lang="de-DE" sz="1600" b="1" dirty="0"/>
+              <a:t> </a:t>
+            </a:r>
+            <a:r>
+              <a:rPr lang="de-DE" sz="1600" b="1" dirty="0" err="1"/>
+              <a:t>the</a:t>
+            </a:r>
+            <a:r>
+              <a:rPr lang="de-DE" sz="1600" b="1" dirty="0"/>
+              <a:t> </a:t>
+            </a:r>
+            <a:r>
+              <a:rPr lang="de-DE" sz="1600" b="1" dirty="0" err="1"/>
+              <a:t>others</a:t>
+            </a:r>
+            <a:r>
+              <a:rPr lang="de-DE" sz="1600" dirty="0"/>
+              <a:t>. </a:t>
+            </a:r>
           </a:p>
         </p:txBody>
       </p:sp>
       <p:pic>
         <p:nvPicPr>
-          <p:cNvPr id="19" name="Picture 18" descr="A graph with red dots and green dots&#10;&#10;Description automatically generated">
-            <a:extLst>
-              <a:ext uri="{FF2B5EF4-FFF2-40B4-BE49-F238E27FC236}">
-                <a16:creationId xmlns:a16="http://schemas.microsoft.com/office/drawing/2014/main" id="{081C592B-0C04-446E-04FC-50103FDEDF0A}"/>
+          <p:cNvPr id="51" name="Picture 50" descr="A yellow circle with a number of percentages&#10;&#10;Description automatically generated with medium confidence">
+            <a:extLst>
+              <a:ext uri="{FF2B5EF4-FFF2-40B4-BE49-F238E27FC236}">
+                <a16:creationId xmlns:a16="http://schemas.microsoft.com/office/drawing/2014/main" id="{D014A30C-7AF6-6E44-9385-73ECE9FB4759}"/>
               </a:ext>
             </a:extLst>
           </p:cNvPr>
@@ -5564,21 +5491,55 @@
           <p:nvPr/>
         </p:nvPicPr>
         <p:blipFill>
-          <a:blip r:embed="rId41">
+          <a:blip r:embed="rId41" cstate="print">
             <a:extLst>
               <a:ext uri="{28A0092B-C50C-407E-A947-70E740481C1C}">
                 <a14:useLocalDpi xmlns:a14="http://schemas.microsoft.com/office/drawing/2010/main" val="0"/>
               </a:ext>
             </a:extLst>
           </a:blip>
-          <a:stretch>
-            <a:fillRect/>
-          </a:stretch>
+          <a:srcRect l="8954" r="9021"/>
+          <a:stretch/>
         </p:blipFill>
         <p:spPr>
           <a:xfrm>
-            <a:off x="15013442" y="13078976"/>
-            <a:ext cx="8280898" cy="4140449"/>
+            <a:off x="23710710" y="14760475"/>
+            <a:ext cx="3967059" cy="2417861"/>
+          </a:xfrm>
+          <a:prstGeom prst="rect">
+            <a:avLst/>
+          </a:prstGeom>
+        </p:spPr>
+      </p:pic>
+      <p:pic>
+        <p:nvPicPr>
+          <p:cNvPr id="17" name="Grafik 16" descr="Ein Bild, das Text, Screenshot, Diagramm, Reihe enthält.&#10;&#10;Automatisch generierte Beschreibung">
+            <a:extLst>
+              <a:ext uri="{FF2B5EF4-FFF2-40B4-BE49-F238E27FC236}">
+                <a16:creationId xmlns:a16="http://schemas.microsoft.com/office/drawing/2014/main" id="{8569264F-73B6-6125-7C59-4A193FC095A5}"/>
+              </a:ext>
+            </a:extLst>
+          </p:cNvPr>
+          <p:cNvPicPr>
+            <a:picLocks noChangeAspect="1"/>
+          </p:cNvPicPr>
+          <p:nvPr/>
+        </p:nvPicPr>
+        <p:blipFill rotWithShape="1">
+          <a:blip r:embed="rId42">
+            <a:extLst>
+              <a:ext uri="{28A0092B-C50C-407E-A947-70E740481C1C}">
+                <a14:useLocalDpi xmlns:a14="http://schemas.microsoft.com/office/drawing/2010/main" val="0"/>
+              </a:ext>
+            </a:extLst>
+          </a:blip>
+          <a:srcRect l="2674" t="3825" b="4039"/>
+          <a:stretch/>
+        </p:blipFill>
+        <p:spPr>
+          <a:xfrm>
+            <a:off x="29248109" y="6768674"/>
+            <a:ext cx="5793966" cy="4799268"/>
           </a:xfrm>
           <a:prstGeom prst="rect">
             <a:avLst/>
@@ -5587,10 +5548,10 @@
       </p:pic>
       <p:sp>
         <p:nvSpPr>
-          <p:cNvPr id="116" name="TextBox 115">
-            <a:extLst>
-              <a:ext uri="{FF2B5EF4-FFF2-40B4-BE49-F238E27FC236}">
-                <a16:creationId xmlns:a16="http://schemas.microsoft.com/office/drawing/2014/main" id="{BC23514B-6B6B-F2FE-A09C-823661277C07}"/>
+          <p:cNvPr id="34" name="Textfeld 33">
+            <a:extLst>
+              <a:ext uri="{FF2B5EF4-FFF2-40B4-BE49-F238E27FC236}">
+                <a16:creationId xmlns:a16="http://schemas.microsoft.com/office/drawing/2014/main" id="{54FDA58D-1FB2-7A95-020C-F1A4C3656F23}"/>
               </a:ext>
             </a:extLst>
           </p:cNvPr>
@@ -5599,8 +5560,8 @@
         </p:nvSpPr>
         <p:spPr>
           <a:xfrm>
-            <a:off x="15123631" y="17180811"/>
-            <a:ext cx="3316409" cy="1077218"/>
+            <a:off x="29092049" y="5273882"/>
+            <a:ext cx="11902598" cy="954107"/>
           </a:xfrm>
           <a:prstGeom prst="rect">
             <a:avLst/>
@@ -5614,173 +5575,37 @@
           <a:lstStyle/>
           <a:p>
             <a:r>
-              <a:rPr lang="de-DE" sz="1600" b="1" dirty="0"/>
-              <a:t>1) </a:t>
-            </a:r>
-            <a:r>
-              <a:rPr lang="de-DE" sz="1600" dirty="0" err="1"/>
-              <a:t>There</a:t>
-            </a:r>
-            <a:r>
-              <a:rPr lang="de-DE" sz="1600" dirty="0"/>
-              <a:t> </a:t>
-            </a:r>
-            <a:r>
-              <a:rPr lang="de-DE" sz="1600" dirty="0" err="1"/>
-              <a:t>is</a:t>
-            </a:r>
-            <a:r>
-              <a:rPr lang="de-DE" sz="1600" dirty="0"/>
-              <a:t> </a:t>
-            </a:r>
-            <a:r>
-              <a:rPr lang="de-DE" sz="1600" b="1" dirty="0" err="1"/>
-              <a:t>only</a:t>
-            </a:r>
-            <a:r>
-              <a:rPr lang="de-DE" sz="1600" b="1" dirty="0"/>
-              <a:t> a </a:t>
-            </a:r>
-            <a:r>
-              <a:rPr lang="de-DE" sz="1600" b="1" dirty="0" err="1"/>
-              <a:t>weak</a:t>
-            </a:r>
-            <a:r>
-              <a:rPr lang="de-DE" sz="1600" b="1" dirty="0"/>
-              <a:t> </a:t>
-            </a:r>
-            <a:r>
-              <a:rPr lang="de-DE" sz="1600" b="1" dirty="0" err="1"/>
-              <a:t>correlation</a:t>
-            </a:r>
-            <a:r>
-              <a:rPr lang="de-DE" sz="1600" b="1" dirty="0"/>
-              <a:t> </a:t>
-            </a:r>
-            <a:r>
-              <a:rPr lang="de-DE" sz="1600" dirty="0" err="1"/>
-              <a:t>between</a:t>
-            </a:r>
-            <a:r>
-              <a:rPr lang="de-DE" sz="1600" dirty="0"/>
-              <a:t> </a:t>
-            </a:r>
-            <a:r>
-              <a:rPr lang="de-DE" sz="1600" dirty="0" err="1"/>
-              <a:t>district</a:t>
-            </a:r>
-            <a:r>
-              <a:rPr lang="de-DE" sz="1600" dirty="0"/>
-              <a:t> and Listenhund </a:t>
-            </a:r>
-            <a:r>
-              <a:rPr lang="de-DE" sz="1600" dirty="0" err="1"/>
-              <a:t>for</a:t>
-            </a:r>
-            <a:r>
-              <a:rPr lang="de-DE" sz="1600" dirty="0"/>
-              <a:t> </a:t>
-            </a:r>
-            <a:r>
-              <a:rPr lang="de-DE" sz="1600" b="1" dirty="0" err="1"/>
-              <a:t>three</a:t>
-            </a:r>
-            <a:r>
-              <a:rPr lang="de-DE" sz="1600" dirty="0"/>
-              <a:t> Listenhund </a:t>
-            </a:r>
-            <a:r>
-              <a:rPr lang="de-DE" sz="1600" dirty="0" err="1"/>
-              <a:t>breeds</a:t>
-            </a:r>
-            <a:r>
-              <a:rPr lang="de-DE" sz="1600" dirty="0"/>
-              <a:t> (</a:t>
-            </a:r>
-            <a:r>
-              <a:rPr lang="de-DE" sz="1600" b="1" dirty="0"/>
-              <a:t>0.2 – 0.35</a:t>
-            </a:r>
-            <a:r>
-              <a:rPr lang="de-DE" sz="1600" dirty="0"/>
-              <a:t>) and </a:t>
-            </a:r>
-            <a:r>
-              <a:rPr lang="de-DE" sz="1600" b="1" dirty="0" err="1"/>
-              <a:t>less</a:t>
-            </a:r>
-            <a:r>
-              <a:rPr lang="de-DE" sz="1600" b="1" dirty="0"/>
-              <a:t> </a:t>
-            </a:r>
-            <a:r>
-              <a:rPr lang="de-DE" sz="1600" b="1" dirty="0" err="1"/>
-              <a:t>for</a:t>
-            </a:r>
-            <a:r>
-              <a:rPr lang="de-DE" sz="1600" b="1" dirty="0"/>
-              <a:t> </a:t>
-            </a:r>
-            <a:r>
-              <a:rPr lang="de-DE" sz="1600" b="1" dirty="0" err="1"/>
-              <a:t>the</a:t>
-            </a:r>
-            <a:r>
-              <a:rPr lang="de-DE" sz="1600" b="1" dirty="0"/>
-              <a:t> </a:t>
-            </a:r>
-            <a:r>
-              <a:rPr lang="de-DE" sz="1600" b="1" dirty="0" err="1"/>
-              <a:t>others</a:t>
-            </a:r>
-            <a:r>
-              <a:rPr lang="de-DE" sz="1600" dirty="0"/>
-              <a:t>. </a:t>
+              <a:rPr lang="en-US" sz="2800" b="1" dirty="0">
+                <a:effectLst/>
+                <a:latin typeface="Arial" panose="020B0604020202020204" pitchFamily="34" charset="0"/>
+                <a:cs typeface="Arial" panose="020B0604020202020204" pitchFamily="34" charset="0"/>
+              </a:rPr>
+              <a:t>Dog ownership is inversely correlated with population density </a:t>
+            </a:r>
+            <a:br>
+              <a:rPr lang="en-US" sz="2800" b="1" dirty="0">
+                <a:effectLst/>
+                <a:latin typeface="Arial" panose="020B0604020202020204" pitchFamily="34" charset="0"/>
+                <a:cs typeface="Arial" panose="020B0604020202020204" pitchFamily="34" charset="0"/>
+              </a:rPr>
+            </a:br>
+            <a:r>
+              <a:rPr lang="en-US" sz="2800" b="1" dirty="0">
+                <a:effectLst/>
+                <a:latin typeface="Arial" panose="020B0604020202020204" pitchFamily="34" charset="0"/>
+                <a:cs typeface="Arial" panose="020B0604020202020204" pitchFamily="34" charset="0"/>
+              </a:rPr>
+              <a:t>in Vienna districts</a:t>
             </a:r>
           </a:p>
         </p:txBody>
       </p:sp>
       <p:pic>
         <p:nvPicPr>
-          <p:cNvPr id="51" name="Picture 50" descr="A yellow circle with a number of percentages&#10;&#10;Description automatically generated with medium confidence">
-            <a:extLst>
-              <a:ext uri="{FF2B5EF4-FFF2-40B4-BE49-F238E27FC236}">
-                <a16:creationId xmlns:a16="http://schemas.microsoft.com/office/drawing/2014/main" id="{D014A30C-7AF6-6E44-9385-73ECE9FB4759}"/>
-              </a:ext>
-            </a:extLst>
-          </p:cNvPr>
-          <p:cNvPicPr>
-            <a:picLocks noChangeAspect="1"/>
-          </p:cNvPicPr>
-          <p:nvPr/>
-        </p:nvPicPr>
-        <p:blipFill>
-          <a:blip r:embed="rId42" cstate="print">
-            <a:extLst>
-              <a:ext uri="{28A0092B-C50C-407E-A947-70E740481C1C}">
-                <a14:useLocalDpi xmlns:a14="http://schemas.microsoft.com/office/drawing/2010/main" val="0"/>
-              </a:ext>
-            </a:extLst>
-          </a:blip>
-          <a:srcRect l="8954" r="9021"/>
-          <a:stretch/>
-        </p:blipFill>
-        <p:spPr>
-          <a:xfrm>
-            <a:off x="23710710" y="14760475"/>
-            <a:ext cx="3967059" cy="2417861"/>
-          </a:xfrm>
-          <a:prstGeom prst="rect">
-            <a:avLst/>
-          </a:prstGeom>
-        </p:spPr>
-      </p:pic>
-      <p:pic>
-        <p:nvPicPr>
-          <p:cNvPr id="17" name="Grafik 16" descr="Ein Bild, das Text, Screenshot, Diagramm, Reihe enthält.&#10;&#10;Automatisch generierte Beschreibung">
-            <a:extLst>
-              <a:ext uri="{FF2B5EF4-FFF2-40B4-BE49-F238E27FC236}">
-                <a16:creationId xmlns:a16="http://schemas.microsoft.com/office/drawing/2014/main" id="{8569264F-73B6-6125-7C59-4A193FC095A5}"/>
+          <p:cNvPr id="49" name="Grafik 48" descr="Ein Bild, das Text, Screenshot, Diagramm, Reihe enthält.&#10;&#10;Automatisch generierte Beschreibung">
+            <a:extLst>
+              <a:ext uri="{FF2B5EF4-FFF2-40B4-BE49-F238E27FC236}">
+                <a16:creationId xmlns:a16="http://schemas.microsoft.com/office/drawing/2014/main" id="{5F1745BB-8ED7-4A64-0E00-22E172187E20}"/>
               </a:ext>
             </a:extLst>
           </p:cNvPr>
@@ -5797,13 +5622,13 @@
               </a:ext>
             </a:extLst>
           </a:blip>
-          <a:srcRect l="2674" t="3825" b="4039"/>
+          <a:srcRect l="2583" t="3679" b="4213"/>
           <a:stretch/>
         </p:blipFill>
         <p:spPr>
           <a:xfrm>
-            <a:off x="29248109" y="6768674"/>
-            <a:ext cx="5793966" cy="4799268"/>
+            <a:off x="29874754" y="7112560"/>
+            <a:ext cx="6335905" cy="4193401"/>
           </a:xfrm>
           <a:prstGeom prst="rect">
             <a:avLst/>
@@ -5812,10 +5637,10 @@
       </p:pic>
       <p:sp>
         <p:nvSpPr>
-          <p:cNvPr id="34" name="Textfeld 33">
-            <a:extLst>
-              <a:ext uri="{FF2B5EF4-FFF2-40B4-BE49-F238E27FC236}">
-                <a16:creationId xmlns:a16="http://schemas.microsoft.com/office/drawing/2014/main" id="{54FDA58D-1FB2-7A95-020C-F1A4C3656F23}"/>
+          <p:cNvPr id="50" name="Textfeld 49">
+            <a:extLst>
+              <a:ext uri="{FF2B5EF4-FFF2-40B4-BE49-F238E27FC236}">
+                <a16:creationId xmlns:a16="http://schemas.microsoft.com/office/drawing/2014/main" id="{DD6E3136-57A1-C1C2-9B12-54651C3A5B30}"/>
               </a:ext>
             </a:extLst>
           </p:cNvPr>
@@ -5824,8 +5649,8 @@
         </p:nvSpPr>
         <p:spPr>
           <a:xfrm>
-            <a:off x="29092049" y="5273882"/>
-            <a:ext cx="11902598" cy="954107"/>
+            <a:off x="37199653" y="6760912"/>
+            <a:ext cx="3497105" cy="4893647"/>
           </a:xfrm>
           <a:prstGeom prst="rect">
             <a:avLst/>
@@ -5839,37 +5664,38 @@
           <a:lstStyle/>
           <a:p>
             <a:r>
-              <a:rPr lang="en-US" sz="2800" b="1" dirty="0">
-                <a:effectLst/>
-                <a:latin typeface="Arial" panose="020B0604020202020204" pitchFamily="34" charset="0"/>
-                <a:cs typeface="Arial" panose="020B0604020202020204" pitchFamily="34" charset="0"/>
-              </a:rPr>
-              <a:t>Dog ownership is inversely correlated with population density </a:t>
-            </a:r>
-            <a:br>
-              <a:rPr lang="en-US" sz="2800" b="1" dirty="0">
-                <a:effectLst/>
-                <a:latin typeface="Arial" panose="020B0604020202020204" pitchFamily="34" charset="0"/>
-                <a:cs typeface="Arial" panose="020B0604020202020204" pitchFamily="34" charset="0"/>
-              </a:rPr>
-            </a:br>
-            <a:r>
-              <a:rPr lang="en-US" sz="2800" b="1" dirty="0">
-                <a:effectLst/>
-                <a:latin typeface="Arial" panose="020B0604020202020204" pitchFamily="34" charset="0"/>
-                <a:cs typeface="Arial" panose="020B0604020202020204" pitchFamily="34" charset="0"/>
-              </a:rPr>
-              <a:t>in Vienna districts</a:t>
-            </a:r>
+              <a:rPr lang="en-US" sz="2400" dirty="0"/>
+              <a:t>To confirm the inverse correlation, the Pearson correlation coefficient was calculated, resulting in a value of -0.61.</a:t>
+            </a:r>
+          </a:p>
+          <a:p>
+            <a:endParaRPr lang="de-AT" sz="2400" b="1" dirty="0"/>
+          </a:p>
+          <a:p>
+            <a:r>
+              <a:rPr lang="de-AT" sz="2400" b="1" dirty="0" err="1"/>
+              <a:t>Conclusion</a:t>
+            </a:r>
+            <a:r>
+              <a:rPr lang="de-AT" sz="2400" b="1" dirty="0"/>
+              <a:t>:</a:t>
+            </a:r>
+          </a:p>
+          <a:p>
+            <a:r>
+              <a:rPr lang="en-US" sz="2400" dirty="0"/>
+              <a:t>The graph shows a negative correlation between the population density and the number of dogs in the districts of Vienna.</a:t>
+            </a:r>
+            <a:endParaRPr lang="de-AT" sz="2400" dirty="0"/>
           </a:p>
         </p:txBody>
       </p:sp>
       <p:pic>
         <p:nvPicPr>
-          <p:cNvPr id="49" name="Grafik 48" descr="Ein Bild, das Text, Screenshot, Diagramm, Reihe enthält.&#10;&#10;Automatisch generierte Beschreibung">
-            <a:extLst>
-              <a:ext uri="{FF2B5EF4-FFF2-40B4-BE49-F238E27FC236}">
-                <a16:creationId xmlns:a16="http://schemas.microsoft.com/office/drawing/2014/main" id="{5F1745BB-8ED7-4A64-0E00-22E172187E20}"/>
+          <p:cNvPr id="63" name="Grafik 62" descr="Ein Bild, das Text, Screenshot, Diagramm, Reihe enthält.&#10;&#10;Automatisch generierte Beschreibung">
+            <a:extLst>
+              <a:ext uri="{FF2B5EF4-FFF2-40B4-BE49-F238E27FC236}">
+                <a16:creationId xmlns:a16="http://schemas.microsoft.com/office/drawing/2014/main" id="{768307A2-261B-9BE3-F3F6-032F1014D798}"/>
               </a:ext>
             </a:extLst>
           </p:cNvPr>
@@ -5886,80 +5712,25 @@
               </a:ext>
             </a:extLst>
           </a:blip>
-          <a:srcRect l="2583" t="3679" b="4213"/>
+          <a:srcRect l="1628" t="2828" r="792" b="2527"/>
           <a:stretch/>
         </p:blipFill>
         <p:spPr>
           <a:xfrm>
-            <a:off x="29874754" y="7112560"/>
-            <a:ext cx="6335905" cy="4193401"/>
+            <a:off x="29271890" y="6821292"/>
+            <a:ext cx="7002062" cy="5433063"/>
           </a:xfrm>
           <a:prstGeom prst="rect">
             <a:avLst/>
           </a:prstGeom>
         </p:spPr>
       </p:pic>
-      <p:sp>
-        <p:nvSpPr>
-          <p:cNvPr id="50" name="Textfeld 49">
-            <a:extLst>
-              <a:ext uri="{FF2B5EF4-FFF2-40B4-BE49-F238E27FC236}">
-                <a16:creationId xmlns:a16="http://schemas.microsoft.com/office/drawing/2014/main" id="{DD6E3136-57A1-C1C2-9B12-54651C3A5B30}"/>
-              </a:ext>
-            </a:extLst>
-          </p:cNvPr>
-          <p:cNvSpPr txBox="1"/>
-          <p:nvPr/>
-        </p:nvSpPr>
-        <p:spPr>
-          <a:xfrm>
-            <a:off x="37199653" y="6760912"/>
-            <a:ext cx="3497105" cy="4893647"/>
-          </a:xfrm>
-          <a:prstGeom prst="rect">
-            <a:avLst/>
-          </a:prstGeom>
-          <a:noFill/>
-        </p:spPr>
-        <p:txBody>
-          <a:bodyPr wrap="square" rtlCol="0">
-            <a:spAutoFit/>
-          </a:bodyPr>
-          <a:lstStyle/>
-          <a:p>
-            <a:r>
-              <a:rPr lang="en-US" sz="2400" dirty="0"/>
-              <a:t>To confirm the inverse correlation, the Pearson correlation coefficient was calculated, resulting in a value of -0.61.</a:t>
-            </a:r>
-          </a:p>
-          <a:p>
-            <a:endParaRPr lang="de-AT" sz="2400" b="1" dirty="0"/>
-          </a:p>
-          <a:p>
-            <a:r>
-              <a:rPr lang="de-AT" sz="2400" b="1" dirty="0" err="1"/>
-              <a:t>Conclusion</a:t>
-            </a:r>
-            <a:r>
-              <a:rPr lang="de-AT" sz="2400" b="1" dirty="0"/>
-              <a:t>:</a:t>
-            </a:r>
-          </a:p>
-          <a:p>
-            <a:r>
-              <a:rPr lang="en-US" sz="2400" dirty="0"/>
-              <a:t>The graph shows a negative correlation between the population density and the number of dogs in the districts of Vienna.</a:t>
-            </a:r>
-            <a:endParaRPr lang="de-AT" sz="2400" dirty="0"/>
-          </a:p>
-        </p:txBody>
-      </p:sp>
       <p:pic>
         <p:nvPicPr>
-          <p:cNvPr id="63" name="Grafik 62" descr="Ein Bild, das Text, Screenshot, Diagramm, Reihe enthält.&#10;&#10;Automatisch generierte Beschreibung">
-            <a:extLst>
-              <a:ext uri="{FF2B5EF4-FFF2-40B4-BE49-F238E27FC236}">
-                <a16:creationId xmlns:a16="http://schemas.microsoft.com/office/drawing/2014/main" id="{768307A2-261B-9BE3-F3F6-032F1014D798}"/>
+          <p:cNvPr id="56" name="Grafik 55" descr="Ein Bild, das Text, Screenshot, Diagramm, Reihe enthält.&#10;&#10;Automatisch generierte Beschreibung">
+            <a:extLst>
+              <a:ext uri="{FF2B5EF4-FFF2-40B4-BE49-F238E27FC236}">
+                <a16:creationId xmlns:a16="http://schemas.microsoft.com/office/drawing/2014/main" id="{45049E61-8A38-C803-C776-963BF4A57F26}"/>
               </a:ext>
             </a:extLst>
           </p:cNvPr>
@@ -5976,25 +5747,214 @@
               </a:ext>
             </a:extLst>
           </a:blip>
-          <a:srcRect l="1628" t="2828" r="792" b="2527"/>
+          <a:srcRect l="1632" t="3529" b="3202"/>
           <a:stretch/>
         </p:blipFill>
         <p:spPr>
           <a:xfrm>
-            <a:off x="29271890" y="6821292"/>
-            <a:ext cx="7002062" cy="5433063"/>
+            <a:off x="28978190" y="6204917"/>
+            <a:ext cx="8235040" cy="6246468"/>
           </a:xfrm>
           <a:prstGeom prst="rect">
             <a:avLst/>
           </a:prstGeom>
         </p:spPr>
       </p:pic>
+      <p:sp>
+        <p:nvSpPr>
+          <p:cNvPr id="8" name="Textfeld 7">
+            <a:extLst>
+              <a:ext uri="{FF2B5EF4-FFF2-40B4-BE49-F238E27FC236}">
+                <a16:creationId xmlns:a16="http://schemas.microsoft.com/office/drawing/2014/main" id="{5EAFA1C9-BF3A-84EB-BF38-8B3A505D7244}"/>
+              </a:ext>
+            </a:extLst>
+          </p:cNvPr>
+          <p:cNvSpPr txBox="1"/>
+          <p:nvPr/>
+        </p:nvSpPr>
+        <p:spPr>
+          <a:xfrm>
+            <a:off x="15151482" y="20007778"/>
+            <a:ext cx="12765736" cy="954107"/>
+          </a:xfrm>
+          <a:prstGeom prst="rect">
+            <a:avLst/>
+          </a:prstGeom>
+          <a:noFill/>
+        </p:spPr>
+        <p:txBody>
+          <a:bodyPr wrap="square" rtlCol="0">
+            <a:spAutoFit/>
+          </a:bodyPr>
+          <a:lstStyle/>
+          <a:p>
+            <a:r>
+              <a:rPr lang="en-US" sz="2800" b="1" dirty="0">
+                <a:effectLst/>
+                <a:latin typeface="Arial" panose="020B0604020202020204" pitchFamily="34" charset="0"/>
+                <a:cs typeface="Arial" panose="020B0604020202020204" pitchFamily="34" charset="0"/>
+              </a:rPr>
+              <a:t>The height of registered dogs correlates positively with the ratio of green</a:t>
+            </a:r>
+          </a:p>
+          <a:p>
+            <a:r>
+              <a:rPr lang="en-US" sz="2800" b="1" dirty="0">
+                <a:effectLst/>
+                <a:latin typeface="Arial" panose="020B0604020202020204" pitchFamily="34" charset="0"/>
+                <a:cs typeface="Arial" panose="020B0604020202020204" pitchFamily="34" charset="0"/>
+              </a:rPr>
+              <a:t>space in a d</a:t>
+            </a:r>
+            <a:r>
+              <a:rPr lang="en-US" sz="2800" b="1" dirty="0">
+                <a:latin typeface="Arial" panose="020B0604020202020204" pitchFamily="34" charset="0"/>
+                <a:cs typeface="Arial" panose="020B0604020202020204" pitchFamily="34" charset="0"/>
+              </a:rPr>
+              <a:t>istrict.</a:t>
+            </a:r>
+            <a:endParaRPr lang="en-US" sz="2800" b="1" dirty="0">
+              <a:effectLst/>
+              <a:latin typeface="Arial" panose="020B0604020202020204" pitchFamily="34" charset="0"/>
+              <a:cs typeface="Arial" panose="020B0604020202020204" pitchFamily="34" charset="0"/>
+            </a:endParaRPr>
+          </a:p>
+        </p:txBody>
+      </p:sp>
+      <p:sp>
+        <p:nvSpPr>
+          <p:cNvPr id="60" name="Textfeld 59">
+            <a:extLst>
+              <a:ext uri="{FF2B5EF4-FFF2-40B4-BE49-F238E27FC236}">
+                <a16:creationId xmlns:a16="http://schemas.microsoft.com/office/drawing/2014/main" id="{297B18FD-0B57-72C2-AE64-C04B8065FA3C}"/>
+              </a:ext>
+            </a:extLst>
+          </p:cNvPr>
+          <p:cNvSpPr txBox="1"/>
+          <p:nvPr/>
+        </p:nvSpPr>
+        <p:spPr>
+          <a:xfrm>
+            <a:off x="15278100" y="25721725"/>
+            <a:ext cx="5267325" cy="707886"/>
+          </a:xfrm>
+          <a:prstGeom prst="rect">
+            <a:avLst/>
+          </a:prstGeom>
+          <a:noFill/>
+        </p:spPr>
+        <p:txBody>
+          <a:bodyPr wrap="square" rtlCol="0">
+            <a:spAutoFit/>
+          </a:bodyPr>
+          <a:lstStyle/>
+          <a:p>
+            <a:pPr marL="342900" indent="-342900">
+              <a:buFont typeface="Arial" panose="020B0604020202020204" pitchFamily="34" charset="0"/>
+              <a:buChar char="•"/>
+            </a:pPr>
+            <a:r>
+              <a:rPr lang="en-GB" sz="2000" dirty="0"/>
+              <a:t>Green districts: Threshold chosen at 20% green space =&gt; 12 vs. 11 districts</a:t>
+            </a:r>
+          </a:p>
+        </p:txBody>
+      </p:sp>
+      <p:sp>
+        <p:nvSpPr>
+          <p:cNvPr id="72" name="Textfeld 71">
+            <a:extLst>
+              <a:ext uri="{FF2B5EF4-FFF2-40B4-BE49-F238E27FC236}">
+                <a16:creationId xmlns:a16="http://schemas.microsoft.com/office/drawing/2014/main" id="{41984AF6-A041-5A34-0BF3-081AA87C7DA9}"/>
+              </a:ext>
+            </a:extLst>
+          </p:cNvPr>
+          <p:cNvSpPr txBox="1"/>
+          <p:nvPr/>
+        </p:nvSpPr>
+        <p:spPr>
+          <a:xfrm>
+            <a:off x="21617940" y="25672222"/>
+            <a:ext cx="5801137" cy="1631216"/>
+          </a:xfrm>
+          <a:prstGeom prst="rect">
+            <a:avLst/>
+          </a:prstGeom>
+          <a:noFill/>
+        </p:spPr>
+        <p:txBody>
+          <a:bodyPr wrap="square" rtlCol="0">
+            <a:spAutoFit/>
+          </a:bodyPr>
+          <a:lstStyle/>
+          <a:p>
+            <a:r>
+              <a:rPr lang="en-GB" sz="2000" b="1" dirty="0"/>
+              <a:t>Results:</a:t>
+            </a:r>
+          </a:p>
+          <a:p>
+            <a:pPr marL="342900" indent="-342900">
+              <a:buFont typeface="Arial" panose="020B0604020202020204" pitchFamily="34" charset="0"/>
+              <a:buChar char="•"/>
+            </a:pPr>
+            <a:r>
+              <a:rPr lang="en-GB" sz="2000" dirty="0"/>
+              <a:t>Slight shift of 1</a:t>
+            </a:r>
+            <a:r>
+              <a:rPr lang="en-GB" sz="2000" baseline="30000" dirty="0"/>
+              <a:t>st</a:t>
+            </a:r>
+            <a:r>
+              <a:rPr lang="en-GB" sz="2000" dirty="0"/>
+              <a:t>, 2</a:t>
+            </a:r>
+            <a:r>
+              <a:rPr lang="en-GB" sz="2000" baseline="30000" dirty="0"/>
+              <a:t>nd</a:t>
+            </a:r>
+            <a:r>
+              <a:rPr lang="en-GB" sz="2000" dirty="0"/>
+              <a:t> and 3</a:t>
+            </a:r>
+            <a:r>
+              <a:rPr lang="en-GB" sz="2000" baseline="30000" dirty="0"/>
+              <a:t>rd</a:t>
+            </a:r>
+            <a:r>
+              <a:rPr lang="en-GB" sz="2000" dirty="0"/>
+              <a:t> quartile to higher heights in greener districts</a:t>
+            </a:r>
+          </a:p>
+          <a:p>
+            <a:pPr marL="342900" indent="-342900">
+              <a:buFont typeface="Arial" panose="020B0604020202020204" pitchFamily="34" charset="0"/>
+              <a:buChar char="•"/>
+            </a:pPr>
+            <a:r>
+              <a:rPr lang="en-GB" sz="2000" dirty="0"/>
+              <a:t>Pearson-Coefficient: only 0.072 (!)</a:t>
+            </a:r>
+          </a:p>
+          <a:p>
+            <a:pPr marL="342900" indent="-342900">
+              <a:buFont typeface="Arial" panose="020B0604020202020204" pitchFamily="34" charset="0"/>
+              <a:buChar char="•"/>
+            </a:pPr>
+            <a:r>
+              <a:rPr lang="en-GB" sz="2000" dirty="0"/>
+              <a:t>But: Significant difference in abs. number of dogs</a:t>
+            </a:r>
+          </a:p>
+        </p:txBody>
+      </p:sp>
       <p:pic>
         <p:nvPicPr>
-          <p:cNvPr id="56" name="Grafik 55" descr="Ein Bild, das Text, Screenshot, Diagramm, Reihe enthält.&#10;&#10;Automatisch generierte Beschreibung">
-            <a:extLst>
-              <a:ext uri="{FF2B5EF4-FFF2-40B4-BE49-F238E27FC236}">
-                <a16:creationId xmlns:a16="http://schemas.microsoft.com/office/drawing/2014/main" id="{45049E61-8A38-C803-C776-963BF4A57F26}"/>
+          <p:cNvPr id="84" name="Grafik 83" descr="Ein Bild, das Text, Screenshot, Diagramm, Reihe enthält.&#10;&#10;Automatisch generierte Beschreibung">
+            <a:extLst>
+              <a:ext uri="{FF2B5EF4-FFF2-40B4-BE49-F238E27FC236}">
+                <a16:creationId xmlns:a16="http://schemas.microsoft.com/office/drawing/2014/main" id="{C4F4F30C-012A-3CD2-D609-280BC605E5E0}"/>
               </a:ext>
             </a:extLst>
           </p:cNvPr>
@@ -6003,7 +5963,7 @@
           </p:cNvPicPr>
           <p:nvPr/>
         </p:nvPicPr>
-        <p:blipFill rotWithShape="1">
+        <p:blipFill>
           <a:blip r:embed="rId46">
             <a:extLst>
               <a:ext uri="{28A0092B-C50C-407E-A947-70E740481C1C}">
@@ -6011,19 +5971,111 @@
               </a:ext>
             </a:extLst>
           </a:blip>
-          <a:srcRect l="1632" t="3529" b="3202"/>
-          <a:stretch/>
+          <a:stretch>
+            <a:fillRect/>
+          </a:stretch>
         </p:blipFill>
         <p:spPr>
           <a:xfrm>
-            <a:off x="28978190" y="6204917"/>
-            <a:ext cx="8235040" cy="6246468"/>
+            <a:off x="21397418" y="21188656"/>
+            <a:ext cx="6118183" cy="4268500"/>
           </a:xfrm>
           <a:prstGeom prst="rect">
             <a:avLst/>
           </a:prstGeom>
         </p:spPr>
       </p:pic>
+      <p:pic>
+        <p:nvPicPr>
+          <p:cNvPr id="86" name="Grafik 85" descr="Ein Bild, das Text, Screenshot, Reihe, Diagramm enthält.&#10;&#10;Automatisch generierte Beschreibung">
+            <a:extLst>
+              <a:ext uri="{FF2B5EF4-FFF2-40B4-BE49-F238E27FC236}">
+                <a16:creationId xmlns:a16="http://schemas.microsoft.com/office/drawing/2014/main" id="{E05B78D8-7931-F933-982C-73B48A0DB354}"/>
+              </a:ext>
+            </a:extLst>
+          </p:cNvPr>
+          <p:cNvPicPr>
+            <a:picLocks noChangeAspect="1"/>
+          </p:cNvPicPr>
+          <p:nvPr/>
+        </p:nvPicPr>
+        <p:blipFill>
+          <a:blip r:embed="rId47">
+            <a:extLst>
+              <a:ext uri="{28A0092B-C50C-407E-A947-70E740481C1C}">
+                <a14:useLocalDpi xmlns:a14="http://schemas.microsoft.com/office/drawing/2010/main" val="0"/>
+              </a:ext>
+            </a:extLst>
+          </a:blip>
+          <a:stretch>
+            <a:fillRect/>
+          </a:stretch>
+        </p:blipFill>
+        <p:spPr>
+          <a:xfrm>
+            <a:off x="15304074" y="20987831"/>
+            <a:ext cx="5977298" cy="4482974"/>
+          </a:xfrm>
+          <a:prstGeom prst="rect">
+            <a:avLst/>
+          </a:prstGeom>
+        </p:spPr>
+      </p:pic>
+      <p:sp>
+        <p:nvSpPr>
+          <p:cNvPr id="87" name="Textfeld 86">
+            <a:extLst>
+              <a:ext uri="{FF2B5EF4-FFF2-40B4-BE49-F238E27FC236}">
+                <a16:creationId xmlns:a16="http://schemas.microsoft.com/office/drawing/2014/main" id="{FF158A9A-90FD-E4C5-2089-7D71760187C1}"/>
+              </a:ext>
+            </a:extLst>
+          </p:cNvPr>
+          <p:cNvSpPr txBox="1"/>
+          <p:nvPr/>
+        </p:nvSpPr>
+        <p:spPr>
+          <a:xfrm>
+            <a:off x="21617940" y="27296566"/>
+            <a:ext cx="5801137" cy="1015663"/>
+          </a:xfrm>
+          <a:prstGeom prst="rect">
+            <a:avLst/>
+          </a:prstGeom>
+          <a:noFill/>
+        </p:spPr>
+        <p:txBody>
+          <a:bodyPr wrap="square" rtlCol="0">
+            <a:spAutoFit/>
+          </a:bodyPr>
+          <a:lstStyle/>
+          <a:p>
+            <a:r>
+              <a:rPr lang="en-GB" sz="2000" b="1" dirty="0"/>
+              <a:t>Conclusion:</a:t>
+            </a:r>
+          </a:p>
+          <a:p>
+            <a:pPr marL="342900" indent="-342900">
+              <a:buFont typeface="Arial" panose="020B0604020202020204" pitchFamily="34" charset="0"/>
+              <a:buChar char="•"/>
+            </a:pPr>
+            <a:r>
+              <a:rPr lang="en-GB" sz="2000" dirty="0"/>
+              <a:t>No significant correlation</a:t>
+            </a:r>
+          </a:p>
+          <a:p>
+            <a:pPr marL="342900" indent="-342900">
+              <a:buFont typeface="Arial" panose="020B0604020202020204" pitchFamily="34" charset="0"/>
+              <a:buChar char="•"/>
+            </a:pPr>
+            <a:r>
+              <a:rPr lang="en-GB" sz="2000" dirty="0"/>
+              <a:t>Deeper investigation necessary</a:t>
+            </a:r>
+          </a:p>
+        </p:txBody>
+      </p:sp>
     </p:spTree>
     <p:extLst>
       <p:ext uri="{BB962C8B-B14F-4D97-AF65-F5344CB8AC3E}">

</xml_diff>

<commit_message>
update plots in eda and H3
</commit_message>
<xml_diff>
--- a/poster-template/prj01-poster-template.pptx
+++ b/poster-template/prj01-poster-template.pptx
@@ -1624,10 +1624,10 @@
       </p:grpSpPr>
       <p:sp>
         <p:nvSpPr>
-          <p:cNvPr id="14" name="文本框 12">
-            <a:extLst>
-              <a:ext uri="{FF2B5EF4-FFF2-40B4-BE49-F238E27FC236}">
-                <a16:creationId xmlns:a16="http://schemas.microsoft.com/office/drawing/2014/main" id="{78CD0678-B7E3-9A3C-C7E2-4ADA3658F2C2}"/>
+          <p:cNvPr id="18" name="文本框 12">
+            <a:extLst>
+              <a:ext uri="{FF2B5EF4-FFF2-40B4-BE49-F238E27FC236}">
+                <a16:creationId xmlns:a16="http://schemas.microsoft.com/office/drawing/2014/main" id="{5EB90210-6FB6-4307-CBDA-CDA53E89F885}"/>
               </a:ext>
             </a:extLst>
           </p:cNvPr>
@@ -1635,6 +1635,208 @@
           <p:nvPr>
             <p:custDataLst>
               <p:tags r:id="rId1"/>
+            </p:custDataLst>
+          </p:nvPr>
+        </p:nvSpPr>
+        <p:spPr>
+          <a:xfrm>
+            <a:off x="1750408" y="13373938"/>
+            <a:ext cx="12099925" cy="9002323"/>
+          </a:xfrm>
+          <a:prstGeom prst="rect">
+            <a:avLst/>
+          </a:prstGeom>
+          <a:noFill/>
+        </p:spPr>
+        <p:txBody>
+          <a:bodyPr wrap="square" rtlCol="0">
+            <a:noAutofit/>
+          </a:bodyPr>
+          <a:lstStyle/>
+          <a:p>
+            <a:pPr algn="just">
+              <a:spcAft>
+                <a:spcPts val="1200"/>
+              </a:spcAft>
+            </a:pPr>
+            <a:r>
+              <a:rPr lang="en-US" sz="2400" b="1" dirty="0">
+                <a:latin typeface="Arial" panose="020B0604020202020204" pitchFamily="34" charset="0"/>
+                <a:ea typeface="思源黑体 CN Regular" panose="020B0500000000000000" charset="-122"/>
+                <a:cs typeface="Arial" panose="020B0604020202020204" pitchFamily="34" charset="0"/>
+                <a:sym typeface="+mn-ea"/>
+              </a:rPr>
+              <a:t>Dataset 2 &amp; 3</a:t>
+            </a:r>
+          </a:p>
+          <a:p>
+            <a:pPr algn="just">
+              <a:spcAft>
+                <a:spcPts val="1200"/>
+              </a:spcAft>
+            </a:pPr>
+            <a:endParaRPr lang="en-US" sz="2400" b="1" dirty="0">
+              <a:latin typeface="Arial" panose="020B0604020202020204" pitchFamily="34" charset="0"/>
+              <a:ea typeface="思源黑体 CN Regular" panose="020B0500000000000000" charset="-122"/>
+              <a:cs typeface="Arial" panose="020B0604020202020204" pitchFamily="34" charset="0"/>
+              <a:sym typeface="+mn-ea"/>
+            </a:endParaRPr>
+          </a:p>
+          <a:p>
+            <a:pPr algn="just">
+              <a:spcAft>
+                <a:spcPts val="1200"/>
+              </a:spcAft>
+            </a:pPr>
+            <a:endParaRPr lang="en-US" sz="2400" b="1" dirty="0">
+              <a:latin typeface="Arial" panose="020B0604020202020204" pitchFamily="34" charset="0"/>
+              <a:ea typeface="思源黑体 CN Regular" panose="020B0500000000000000" charset="-122"/>
+              <a:cs typeface="Arial" panose="020B0604020202020204" pitchFamily="34" charset="0"/>
+              <a:sym typeface="+mn-ea"/>
+            </a:endParaRPr>
+          </a:p>
+          <a:p>
+            <a:pPr algn="just">
+              <a:spcAft>
+                <a:spcPts val="1200"/>
+              </a:spcAft>
+            </a:pPr>
+            <a:endParaRPr lang="en-US" sz="2400" b="1" dirty="0">
+              <a:latin typeface="Arial" panose="020B0604020202020204" pitchFamily="34" charset="0"/>
+              <a:ea typeface="思源黑体 CN Regular" panose="020B0500000000000000" charset="-122"/>
+              <a:cs typeface="Arial" panose="020B0604020202020204" pitchFamily="34" charset="0"/>
+              <a:sym typeface="+mn-ea"/>
+            </a:endParaRPr>
+          </a:p>
+          <a:p>
+            <a:pPr algn="just">
+              <a:spcAft>
+                <a:spcPts val="1200"/>
+              </a:spcAft>
+            </a:pPr>
+            <a:endParaRPr lang="en-US" sz="2400" b="1" dirty="0">
+              <a:latin typeface="Arial" panose="020B0604020202020204" pitchFamily="34" charset="0"/>
+              <a:ea typeface="思源黑体 CN Regular" panose="020B0500000000000000" charset="-122"/>
+              <a:cs typeface="Arial" panose="020B0604020202020204" pitchFamily="34" charset="0"/>
+              <a:sym typeface="+mn-ea"/>
+            </a:endParaRPr>
+          </a:p>
+          <a:p>
+            <a:pPr algn="just">
+              <a:spcAft>
+                <a:spcPts val="1200"/>
+              </a:spcAft>
+            </a:pPr>
+            <a:endParaRPr lang="en-US" sz="2400" b="1" dirty="0">
+              <a:latin typeface="Arial" panose="020B0604020202020204" pitchFamily="34" charset="0"/>
+              <a:ea typeface="思源黑体 CN Regular" panose="020B0500000000000000" charset="-122"/>
+              <a:cs typeface="Arial" panose="020B0604020202020204" pitchFamily="34" charset="0"/>
+              <a:sym typeface="+mn-ea"/>
+            </a:endParaRPr>
+          </a:p>
+          <a:p>
+            <a:pPr algn="just">
+              <a:spcAft>
+                <a:spcPts val="1200"/>
+              </a:spcAft>
+            </a:pPr>
+            <a:endParaRPr lang="en-US" sz="2400" b="1" dirty="0">
+              <a:latin typeface="Arial" panose="020B0604020202020204" pitchFamily="34" charset="0"/>
+              <a:ea typeface="思源黑体 CN Regular" panose="020B0500000000000000" charset="-122"/>
+              <a:cs typeface="Arial" panose="020B0604020202020204" pitchFamily="34" charset="0"/>
+              <a:sym typeface="+mn-ea"/>
+            </a:endParaRPr>
+          </a:p>
+          <a:p>
+            <a:pPr algn="just">
+              <a:spcAft>
+                <a:spcPts val="1200"/>
+              </a:spcAft>
+            </a:pPr>
+            <a:endParaRPr lang="en-US" sz="2400" b="1" dirty="0">
+              <a:latin typeface="Arial" panose="020B0604020202020204" pitchFamily="34" charset="0"/>
+              <a:ea typeface="思源黑体 CN Regular" panose="020B0500000000000000" charset="-122"/>
+              <a:cs typeface="Arial" panose="020B0604020202020204" pitchFamily="34" charset="0"/>
+              <a:sym typeface="+mn-ea"/>
+            </a:endParaRPr>
+          </a:p>
+          <a:p>
+            <a:pPr algn="just">
+              <a:spcAft>
+                <a:spcPts val="1200"/>
+              </a:spcAft>
+            </a:pPr>
+            <a:endParaRPr lang="en-US" sz="2400" b="1" dirty="0">
+              <a:latin typeface="Arial" panose="020B0604020202020204" pitchFamily="34" charset="0"/>
+              <a:ea typeface="思源黑体 CN Regular" panose="020B0500000000000000" charset="-122"/>
+              <a:cs typeface="Arial" panose="020B0604020202020204" pitchFamily="34" charset="0"/>
+              <a:sym typeface="+mn-ea"/>
+            </a:endParaRPr>
+          </a:p>
+          <a:p>
+            <a:pPr algn="just">
+              <a:spcAft>
+                <a:spcPts val="1200"/>
+              </a:spcAft>
+            </a:pPr>
+            <a:endParaRPr lang="en-US" sz="2400" b="1" dirty="0">
+              <a:latin typeface="Arial" panose="020B0604020202020204" pitchFamily="34" charset="0"/>
+              <a:ea typeface="思源黑体 CN Regular" panose="020B0500000000000000" charset="-122"/>
+              <a:cs typeface="Arial" panose="020B0604020202020204" pitchFamily="34" charset="0"/>
+              <a:sym typeface="+mn-ea"/>
+            </a:endParaRPr>
+          </a:p>
+        </p:txBody>
+      </p:sp>
+      <p:pic>
+        <p:nvPicPr>
+          <p:cNvPr id="52" name="Grafik 51" descr="Ein Bild, das Text, Screenshot, Schrift, Diagramm enthält.&#10;&#10;Automatisch generierte Beschreibung">
+            <a:extLst>
+              <a:ext uri="{FF2B5EF4-FFF2-40B4-BE49-F238E27FC236}">
+                <a16:creationId xmlns:a16="http://schemas.microsoft.com/office/drawing/2014/main" id="{879F5284-9EA2-4801-01F2-8A757197F9B2}"/>
+              </a:ext>
+            </a:extLst>
+          </p:cNvPr>
+          <p:cNvPicPr>
+            <a:picLocks noChangeAspect="1"/>
+          </p:cNvPicPr>
+          <p:nvPr/>
+        </p:nvPicPr>
+        <p:blipFill>
+          <a:blip r:embed="rId17" cstate="print">
+            <a:extLst>
+              <a:ext uri="{28A0092B-C50C-407E-A947-70E740481C1C}">
+                <a14:useLocalDpi xmlns:a14="http://schemas.microsoft.com/office/drawing/2010/main" val="0"/>
+              </a:ext>
+            </a:extLst>
+          </a:blip>
+          <a:stretch>
+            <a:fillRect/>
+          </a:stretch>
+        </p:blipFill>
+        <p:spPr>
+          <a:xfrm>
+            <a:off x="1741575" y="14603906"/>
+            <a:ext cx="6391508" cy="5995786"/>
+          </a:xfrm>
+          <a:prstGeom prst="rect">
+            <a:avLst/>
+          </a:prstGeom>
+        </p:spPr>
+      </p:pic>
+      <p:sp>
+        <p:nvSpPr>
+          <p:cNvPr id="14" name="文本框 12">
+            <a:extLst>
+              <a:ext uri="{FF2B5EF4-FFF2-40B4-BE49-F238E27FC236}">
+                <a16:creationId xmlns:a16="http://schemas.microsoft.com/office/drawing/2014/main" id="{78CD0678-B7E3-9A3C-C7E2-4ADA3658F2C2}"/>
+              </a:ext>
+            </a:extLst>
+          </p:cNvPr>
+          <p:cNvSpPr txBox="1"/>
+          <p:nvPr>
+            <p:custDataLst>
+              <p:tags r:id="rId2"/>
             </p:custDataLst>
           </p:nvPr>
         </p:nvSpPr>
@@ -1770,7 +1972,7 @@
           <p:nvPr/>
         </p:nvPicPr>
         <p:blipFill>
-          <a:blip r:embed="rId17">
+          <a:blip r:embed="rId18">
             <a:extLst>
               <a:ext uri="{28A0092B-C50C-407E-A947-70E740481C1C}">
                 <a14:useLocalDpi xmlns:a14="http://schemas.microsoft.com/office/drawing/2010/main" val="0"/>
@@ -1784,208 +1986,6 @@
           <a:xfrm>
             <a:off x="7424985" y="9621597"/>
             <a:ext cx="6669235" cy="2864311"/>
-          </a:xfrm>
-          <a:prstGeom prst="rect">
-            <a:avLst/>
-          </a:prstGeom>
-        </p:spPr>
-      </p:pic>
-      <p:sp>
-        <p:nvSpPr>
-          <p:cNvPr id="18" name="文本框 12">
-            <a:extLst>
-              <a:ext uri="{FF2B5EF4-FFF2-40B4-BE49-F238E27FC236}">
-                <a16:creationId xmlns:a16="http://schemas.microsoft.com/office/drawing/2014/main" id="{5EB90210-6FB6-4307-CBDA-CDA53E89F885}"/>
-              </a:ext>
-            </a:extLst>
-          </p:cNvPr>
-          <p:cNvSpPr txBox="1"/>
-          <p:nvPr>
-            <p:custDataLst>
-              <p:tags r:id="rId2"/>
-            </p:custDataLst>
-          </p:nvPr>
-        </p:nvSpPr>
-        <p:spPr>
-          <a:xfrm>
-            <a:off x="1750408" y="13373938"/>
-            <a:ext cx="12099925" cy="9002323"/>
-          </a:xfrm>
-          <a:prstGeom prst="rect">
-            <a:avLst/>
-          </a:prstGeom>
-          <a:noFill/>
-        </p:spPr>
-        <p:txBody>
-          <a:bodyPr wrap="square" rtlCol="0">
-            <a:noAutofit/>
-          </a:bodyPr>
-          <a:lstStyle/>
-          <a:p>
-            <a:pPr algn="just">
-              <a:spcAft>
-                <a:spcPts val="1200"/>
-              </a:spcAft>
-            </a:pPr>
-            <a:r>
-              <a:rPr lang="en-US" sz="2400" b="1" dirty="0">
-                <a:latin typeface="Arial" panose="020B0604020202020204" pitchFamily="34" charset="0"/>
-                <a:ea typeface="思源黑体 CN Regular" panose="020B0500000000000000" charset="-122"/>
-                <a:cs typeface="Arial" panose="020B0604020202020204" pitchFamily="34" charset="0"/>
-                <a:sym typeface="+mn-ea"/>
-              </a:rPr>
-              <a:t>Dataset 2 &amp; 3</a:t>
-            </a:r>
-          </a:p>
-          <a:p>
-            <a:pPr algn="just">
-              <a:spcAft>
-                <a:spcPts val="1200"/>
-              </a:spcAft>
-            </a:pPr>
-            <a:endParaRPr lang="en-US" sz="2400" b="1" dirty="0">
-              <a:latin typeface="Arial" panose="020B0604020202020204" pitchFamily="34" charset="0"/>
-              <a:ea typeface="思源黑体 CN Regular" panose="020B0500000000000000" charset="-122"/>
-              <a:cs typeface="Arial" panose="020B0604020202020204" pitchFamily="34" charset="0"/>
-              <a:sym typeface="+mn-ea"/>
-            </a:endParaRPr>
-          </a:p>
-          <a:p>
-            <a:pPr algn="just">
-              <a:spcAft>
-                <a:spcPts val="1200"/>
-              </a:spcAft>
-            </a:pPr>
-            <a:endParaRPr lang="en-US" sz="2400" b="1" dirty="0">
-              <a:latin typeface="Arial" panose="020B0604020202020204" pitchFamily="34" charset="0"/>
-              <a:ea typeface="思源黑体 CN Regular" panose="020B0500000000000000" charset="-122"/>
-              <a:cs typeface="Arial" panose="020B0604020202020204" pitchFamily="34" charset="0"/>
-              <a:sym typeface="+mn-ea"/>
-            </a:endParaRPr>
-          </a:p>
-          <a:p>
-            <a:pPr algn="just">
-              <a:spcAft>
-                <a:spcPts val="1200"/>
-              </a:spcAft>
-            </a:pPr>
-            <a:endParaRPr lang="en-US" sz="2400" b="1" dirty="0">
-              <a:latin typeface="Arial" panose="020B0604020202020204" pitchFamily="34" charset="0"/>
-              <a:ea typeface="思源黑体 CN Regular" panose="020B0500000000000000" charset="-122"/>
-              <a:cs typeface="Arial" panose="020B0604020202020204" pitchFamily="34" charset="0"/>
-              <a:sym typeface="+mn-ea"/>
-            </a:endParaRPr>
-          </a:p>
-          <a:p>
-            <a:pPr algn="just">
-              <a:spcAft>
-                <a:spcPts val="1200"/>
-              </a:spcAft>
-            </a:pPr>
-            <a:endParaRPr lang="en-US" sz="2400" b="1" dirty="0">
-              <a:latin typeface="Arial" panose="020B0604020202020204" pitchFamily="34" charset="0"/>
-              <a:ea typeface="思源黑体 CN Regular" panose="020B0500000000000000" charset="-122"/>
-              <a:cs typeface="Arial" panose="020B0604020202020204" pitchFamily="34" charset="0"/>
-              <a:sym typeface="+mn-ea"/>
-            </a:endParaRPr>
-          </a:p>
-          <a:p>
-            <a:pPr algn="just">
-              <a:spcAft>
-                <a:spcPts val="1200"/>
-              </a:spcAft>
-            </a:pPr>
-            <a:endParaRPr lang="en-US" sz="2400" b="1" dirty="0">
-              <a:latin typeface="Arial" panose="020B0604020202020204" pitchFamily="34" charset="0"/>
-              <a:ea typeface="思源黑体 CN Regular" panose="020B0500000000000000" charset="-122"/>
-              <a:cs typeface="Arial" panose="020B0604020202020204" pitchFamily="34" charset="0"/>
-              <a:sym typeface="+mn-ea"/>
-            </a:endParaRPr>
-          </a:p>
-          <a:p>
-            <a:pPr algn="just">
-              <a:spcAft>
-                <a:spcPts val="1200"/>
-              </a:spcAft>
-            </a:pPr>
-            <a:endParaRPr lang="en-US" sz="2400" b="1" dirty="0">
-              <a:latin typeface="Arial" panose="020B0604020202020204" pitchFamily="34" charset="0"/>
-              <a:ea typeface="思源黑体 CN Regular" panose="020B0500000000000000" charset="-122"/>
-              <a:cs typeface="Arial" panose="020B0604020202020204" pitchFamily="34" charset="0"/>
-              <a:sym typeface="+mn-ea"/>
-            </a:endParaRPr>
-          </a:p>
-          <a:p>
-            <a:pPr algn="just">
-              <a:spcAft>
-                <a:spcPts val="1200"/>
-              </a:spcAft>
-            </a:pPr>
-            <a:endParaRPr lang="en-US" sz="2400" b="1" dirty="0">
-              <a:latin typeface="Arial" panose="020B0604020202020204" pitchFamily="34" charset="0"/>
-              <a:ea typeface="思源黑体 CN Regular" panose="020B0500000000000000" charset="-122"/>
-              <a:cs typeface="Arial" panose="020B0604020202020204" pitchFamily="34" charset="0"/>
-              <a:sym typeface="+mn-ea"/>
-            </a:endParaRPr>
-          </a:p>
-          <a:p>
-            <a:pPr algn="just">
-              <a:spcAft>
-                <a:spcPts val="1200"/>
-              </a:spcAft>
-            </a:pPr>
-            <a:endParaRPr lang="en-US" sz="2400" b="1" dirty="0">
-              <a:latin typeface="Arial" panose="020B0604020202020204" pitchFamily="34" charset="0"/>
-              <a:ea typeface="思源黑体 CN Regular" panose="020B0500000000000000" charset="-122"/>
-              <a:cs typeface="Arial" panose="020B0604020202020204" pitchFamily="34" charset="0"/>
-              <a:sym typeface="+mn-ea"/>
-            </a:endParaRPr>
-          </a:p>
-          <a:p>
-            <a:pPr algn="just">
-              <a:spcAft>
-                <a:spcPts val="1200"/>
-              </a:spcAft>
-            </a:pPr>
-            <a:endParaRPr lang="en-US" sz="2400" b="1" dirty="0">
-              <a:latin typeface="Arial" panose="020B0604020202020204" pitchFamily="34" charset="0"/>
-              <a:ea typeface="思源黑体 CN Regular" panose="020B0500000000000000" charset="-122"/>
-              <a:cs typeface="Arial" panose="020B0604020202020204" pitchFamily="34" charset="0"/>
-              <a:sym typeface="+mn-ea"/>
-            </a:endParaRPr>
-          </a:p>
-        </p:txBody>
-      </p:sp>
-      <p:pic>
-        <p:nvPicPr>
-          <p:cNvPr id="9" name="Picture 8" descr="A graph of different colored lines&#10;&#10;Description automatically generated">
-            <a:extLst>
-              <a:ext uri="{FF2B5EF4-FFF2-40B4-BE49-F238E27FC236}">
-                <a16:creationId xmlns:a16="http://schemas.microsoft.com/office/drawing/2014/main" id="{A674D4AE-AED4-3929-0E3B-C3647834C510}"/>
-              </a:ext>
-            </a:extLst>
-          </p:cNvPr>
-          <p:cNvPicPr>
-            <a:picLocks noChangeAspect="1"/>
-          </p:cNvPicPr>
-          <p:nvPr/>
-        </p:nvPicPr>
-        <p:blipFill>
-          <a:blip r:embed="rId18" cstate="print">
-            <a:extLst>
-              <a:ext uri="{28A0092B-C50C-407E-A947-70E740481C1C}">
-                <a14:useLocalDpi xmlns:a14="http://schemas.microsoft.com/office/drawing/2010/main" val="0"/>
-              </a:ext>
-            </a:extLst>
-          </a:blip>
-          <a:stretch>
-            <a:fillRect/>
-          </a:stretch>
-        </p:blipFill>
-        <p:spPr>
-          <a:xfrm>
-            <a:off x="1714347" y="14454470"/>
-            <a:ext cx="6564910" cy="6166164"/>
           </a:xfrm>
           <a:prstGeom prst="rect">
             <a:avLst/>
@@ -2541,89 +2541,12 @@
               <a:tabLst/>
               <a:defRPr/>
             </a:pPr>
-            <a:r>
-              <a:rPr lang="en-US" sz="2800" dirty="0">
-                <a:latin typeface="Arial" panose="020B0604020202020204" pitchFamily="34" charset="0"/>
-                <a:ea typeface="思源黑体 CN Regular" panose="020B0500000000000000" charset="-122"/>
-                <a:cs typeface="Arial" panose="020B0604020202020204" pitchFamily="34" charset="0"/>
-                <a:sym typeface="+mn-ea"/>
-              </a:rPr>
-              <a:t>We propose MO-MIX, a novel MOMARL method which aims to solve the multi-objective multi-agent cooperative decision-making problem with continuous state space. In the experiments, the MO-MIX algorithm clearly outperforms the baseline in all evaluation metrics, while requiring much fewer training steps.</a:t>
-            </a:r>
-          </a:p>
-          <a:p>
-            <a:pPr marL="457192" marR="0" lvl="0" indent="-457192" algn="just" defTabSz="3505524" rtl="0" eaLnBrk="1" fontAlgn="auto" latinLnBrk="0" hangingPunct="1">
-              <a:lnSpc>
-                <a:spcPct val="100000"/>
-              </a:lnSpc>
-              <a:spcBef>
-                <a:spcPts val="0"/>
-              </a:spcBef>
-              <a:spcAft>
-                <a:spcPts val="1200"/>
-              </a:spcAft>
-              <a:buClrTx/>
-              <a:buSzTx/>
-              <a:buFont typeface="Arial" panose="020B0604020202020204" pitchFamily="34" charset="0"/>
-              <a:buChar char="•"/>
-              <a:tabLst/>
-              <a:defRPr/>
-            </a:pPr>
-            <a:r>
-              <a:rPr lang="en-US" sz="2800" dirty="0">
-                <a:latin typeface="Arial" panose="020B0604020202020204" pitchFamily="34" charset="0"/>
-                <a:ea typeface="思源黑体 CN Regular" panose="020B0500000000000000" charset="-122"/>
-                <a:cs typeface="Arial" panose="020B0604020202020204" pitchFamily="34" charset="0"/>
-                <a:sym typeface="+mn-ea"/>
-              </a:rPr>
-              <a:t>Currently, our algorithm is tested in the case with two con- </a:t>
-            </a:r>
-            <a:r>
-              <a:rPr lang="en-US" sz="2800" dirty="0" err="1">
-                <a:latin typeface="Arial" panose="020B0604020202020204" pitchFamily="34" charset="0"/>
-                <a:ea typeface="思源黑体 CN Regular" panose="020B0500000000000000" charset="-122"/>
-                <a:cs typeface="Arial" panose="020B0604020202020204" pitchFamily="34" charset="0"/>
-                <a:sym typeface="+mn-ea"/>
-              </a:rPr>
-              <a:t>flicting</a:t>
-            </a:r>
-            <a:r>
-              <a:rPr lang="en-US" sz="2800" dirty="0">
-                <a:latin typeface="Arial" panose="020B0604020202020204" pitchFamily="34" charset="0"/>
-                <a:ea typeface="思源黑体 CN Regular" panose="020B0500000000000000" charset="-122"/>
-                <a:cs typeface="Arial" panose="020B0604020202020204" pitchFamily="34" charset="0"/>
-                <a:sym typeface="+mn-ea"/>
-              </a:rPr>
-              <a:t> objectives. For three or more objectives, the algorithm is theoretically able to be applied.</a:t>
-            </a:r>
-          </a:p>
-          <a:p>
-            <a:pPr marL="457192" marR="0" lvl="0" indent="-457192" algn="just" defTabSz="3505524" rtl="0" eaLnBrk="1" fontAlgn="auto" latinLnBrk="0" hangingPunct="1">
-              <a:lnSpc>
-                <a:spcPct val="100000"/>
-              </a:lnSpc>
-              <a:spcBef>
-                <a:spcPts val="0"/>
-              </a:spcBef>
-              <a:spcAft>
-                <a:spcPts val="1200"/>
-              </a:spcAft>
-              <a:buClrTx/>
-              <a:buSzTx/>
-              <a:buFont typeface="Arial" panose="020B0604020202020204" pitchFamily="34" charset="0"/>
-              <a:buChar char="•"/>
-              <a:tabLst/>
-              <a:defRPr/>
-            </a:pPr>
-            <a:r>
-              <a:rPr lang="en-US" sz="2800" dirty="0">
-                <a:latin typeface="Arial" panose="020B0604020202020204" pitchFamily="34" charset="0"/>
-                <a:ea typeface="思源黑体 CN Regular" panose="020B0500000000000000" charset="-122"/>
-                <a:cs typeface="Arial" panose="020B0604020202020204" pitchFamily="34" charset="0"/>
-                <a:sym typeface="+mn-ea"/>
-              </a:rPr>
-              <a:t>In future work, we aim to explore more complex multi-objective multi-agent problems with more difficult tasks or more diversity of objectives.</a:t>
-            </a:r>
+            <a:endParaRPr lang="en-US" sz="2800" dirty="0">
+              <a:latin typeface="Arial" panose="020B0604020202020204" pitchFamily="34" charset="0"/>
+              <a:ea typeface="思源黑体 CN Regular" panose="020B0500000000000000" charset="-122"/>
+              <a:cs typeface="Arial" panose="020B0604020202020204" pitchFamily="34" charset="0"/>
+              <a:sym typeface="+mn-ea"/>
+            </a:endParaRPr>
           </a:p>
         </p:txBody>
       </p:sp>
@@ -3984,41 +3907,6 @@
           </a:prstGeom>
         </p:spPr>
       </p:pic>
-      <p:pic>
-        <p:nvPicPr>
-          <p:cNvPr id="59" name="Picture 58" descr="A screenshot of a graph&#10;&#10;Description automatically generated">
-            <a:extLst>
-              <a:ext uri="{FF2B5EF4-FFF2-40B4-BE49-F238E27FC236}">
-                <a16:creationId xmlns:a16="http://schemas.microsoft.com/office/drawing/2014/main" id="{D56AB122-B29C-BD48-BDD5-3E880B6A0DC9}"/>
-              </a:ext>
-            </a:extLst>
-          </p:cNvPr>
-          <p:cNvPicPr>
-            <a:picLocks noChangeAspect="1"/>
-          </p:cNvPicPr>
-          <p:nvPr/>
-        </p:nvPicPr>
-        <p:blipFill>
-          <a:blip r:embed="rId23">
-            <a:extLst>
-              <a:ext uri="{28A0092B-C50C-407E-A947-70E740481C1C}">
-                <a14:useLocalDpi xmlns:a14="http://schemas.microsoft.com/office/drawing/2010/main" val="0"/>
-              </a:ext>
-            </a:extLst>
-          </a:blip>
-          <a:srcRect r="2487" b="31334"/>
-          <a:stretch/>
-        </p:blipFill>
-        <p:spPr>
-          <a:xfrm>
-            <a:off x="8494428" y="15944175"/>
-            <a:ext cx="4644073" cy="3270234"/>
-          </a:xfrm>
-          <a:prstGeom prst="rect">
-            <a:avLst/>
-          </a:prstGeom>
-        </p:spPr>
-      </p:pic>
       <p:sp>
         <p:nvSpPr>
           <p:cNvPr id="66" name="剪去对角的矩形 9">
@@ -4463,7 +4351,7 @@
           <p:nvPr/>
         </p:nvPicPr>
         <p:blipFill>
-          <a:blip r:embed="rId24"/>
+          <a:blip r:embed="rId23"/>
           <a:stretch>
             <a:fillRect/>
           </a:stretch>
@@ -4480,7 +4368,7 @@
       </p:pic>
       <mc:AlternateContent xmlns:mc="http://schemas.openxmlformats.org/markup-compatibility/2006" xmlns:p14="http://schemas.microsoft.com/office/powerpoint/2010/main">
         <mc:Choice Requires="p14">
-          <p:contentPart p14:bwMode="auto" r:id="rId25">
+          <p:contentPart p14:bwMode="auto" r:id="rId24">
             <p14:nvContentPartPr>
               <p14:cNvPr id="111" name="Ink 110">
                 <a:extLst>
@@ -5146,12 +5034,116 @@
           </a:prstGeom>
         </p:spPr>
       </p:pic>
+      <p:sp>
+        <p:nvSpPr>
+          <p:cNvPr id="20" name="TextBox 19">
+            <a:extLst>
+              <a:ext uri="{FF2B5EF4-FFF2-40B4-BE49-F238E27FC236}">
+                <a16:creationId xmlns:a16="http://schemas.microsoft.com/office/drawing/2014/main" id="{10E28791-B1C4-869F-FE2D-5955CF99BB6A}"/>
+              </a:ext>
+            </a:extLst>
+          </p:cNvPr>
+          <p:cNvSpPr txBox="1"/>
+          <p:nvPr/>
+        </p:nvSpPr>
+        <p:spPr>
+          <a:xfrm>
+            <a:off x="15114403" y="11210577"/>
+            <a:ext cx="7212198" cy="1938992"/>
+          </a:xfrm>
+          <a:prstGeom prst="rect">
+            <a:avLst/>
+          </a:prstGeom>
+          <a:noFill/>
+        </p:spPr>
+        <p:txBody>
+          <a:bodyPr wrap="square" rtlCol="0">
+            <a:spAutoFit/>
+          </a:bodyPr>
+          <a:lstStyle/>
+          <a:p>
+            <a:r>
+              <a:rPr lang="en-GB" sz="2400" b="1" i="1" u="sng" dirty="0">
+                <a:latin typeface="Arial" panose="020B0604020202020204" pitchFamily="34" charset="0"/>
+                <a:ea typeface="思源黑体 CN Regular" panose="020B0500000000000000" charset="-122"/>
+                <a:cs typeface="Arial" panose="020B0604020202020204" pitchFamily="34" charset="0"/>
+                <a:sym typeface="+mn-ea"/>
+              </a:rPr>
+              <a:t>Assumption</a:t>
+            </a:r>
+            <a:r>
+              <a:rPr lang="en-GB" sz="2400" b="1" dirty="0">
+                <a:latin typeface="Arial" panose="020B0604020202020204" pitchFamily="34" charset="0"/>
+                <a:ea typeface="思源黑体 CN Regular" panose="020B0500000000000000" charset="-122"/>
+                <a:cs typeface="Arial" panose="020B0604020202020204" pitchFamily="34" charset="0"/>
+                <a:sym typeface="+mn-ea"/>
+              </a:rPr>
+              <a:t>: </a:t>
+            </a:r>
+            <a:r>
+              <a:rPr lang="en-GB" sz="2400" dirty="0">
+                <a:latin typeface="Arial" panose="020B0604020202020204" pitchFamily="34" charset="0"/>
+                <a:ea typeface="思源黑体 CN Regular" panose="020B0500000000000000" charset="-122"/>
+                <a:cs typeface="Arial" panose="020B0604020202020204" pitchFamily="34" charset="0"/>
+                <a:sym typeface="+mn-ea"/>
+              </a:rPr>
+              <a:t>There is a positive correlation between the ownership of </a:t>
+            </a:r>
+            <a:r>
+              <a:rPr lang="en-GB" sz="2400" dirty="0" err="1">
+                <a:latin typeface="Arial" panose="020B0604020202020204" pitchFamily="34" charset="0"/>
+                <a:ea typeface="思源黑体 CN Regular" panose="020B0500000000000000" charset="-122"/>
+                <a:cs typeface="Arial" panose="020B0604020202020204" pitchFamily="34" charset="0"/>
+                <a:sym typeface="+mn-ea"/>
+              </a:rPr>
+              <a:t>Listenhunde</a:t>
+            </a:r>
+            <a:r>
+              <a:rPr lang="en-GB" sz="2400" dirty="0">
+                <a:latin typeface="Arial" panose="020B0604020202020204" pitchFamily="34" charset="0"/>
+                <a:ea typeface="思源黑体 CN Regular" panose="020B0500000000000000" charset="-122"/>
+                <a:cs typeface="Arial" panose="020B0604020202020204" pitchFamily="34" charset="0"/>
+                <a:sym typeface="+mn-ea"/>
+              </a:rPr>
+              <a:t> and district, with a higher prevalence of </a:t>
+            </a:r>
+            <a:r>
+              <a:rPr lang="en-GB" sz="2400" dirty="0" err="1">
+                <a:latin typeface="Arial" panose="020B0604020202020204" pitchFamily="34" charset="0"/>
+                <a:ea typeface="思源黑体 CN Regular" panose="020B0500000000000000" charset="-122"/>
+                <a:cs typeface="Arial" panose="020B0604020202020204" pitchFamily="34" charset="0"/>
+                <a:sym typeface="+mn-ea"/>
+              </a:rPr>
+              <a:t>Listenhunde</a:t>
+            </a:r>
+            <a:r>
+              <a:rPr lang="en-GB" sz="2400" dirty="0">
+                <a:latin typeface="Arial" panose="020B0604020202020204" pitchFamily="34" charset="0"/>
+                <a:ea typeface="思源黑体 CN Regular" panose="020B0500000000000000" charset="-122"/>
+                <a:cs typeface="Arial" panose="020B0604020202020204" pitchFamily="34" charset="0"/>
+                <a:sym typeface="+mn-ea"/>
+              </a:rPr>
+              <a:t> ownership in outer Viennese districts compared to inner districts.</a:t>
+            </a:r>
+            <a:r>
+              <a:rPr lang="en-GB" sz="2400" b="1" dirty="0">
+                <a:latin typeface="Arial" panose="020B0604020202020204" pitchFamily="34" charset="0"/>
+                <a:ea typeface="思源黑体 CN Regular" panose="020B0500000000000000" charset="-122"/>
+                <a:cs typeface="Arial" panose="020B0604020202020204" pitchFamily="34" charset="0"/>
+                <a:sym typeface="+mn-ea"/>
+              </a:rPr>
+              <a:t>	</a:t>
+            </a:r>
+            <a:endParaRPr lang="en-GB" sz="2400" dirty="0"/>
+          </a:p>
+        </p:txBody>
+      </p:sp>
       <p:pic>
         <p:nvPicPr>
-          <p:cNvPr id="57" name="Picture 56" descr="A graph of different colored squares&#10;&#10;Description automatically generated">
-            <a:extLst>
-              <a:ext uri="{FF2B5EF4-FFF2-40B4-BE49-F238E27FC236}">
-                <a16:creationId xmlns:a16="http://schemas.microsoft.com/office/drawing/2014/main" id="{D87B35BC-720C-EC80-6161-894D8F6EB9BB}"/>
+          <p:cNvPr id="19" name="Picture 18" descr="A graph with red dots and green dots&#10;&#10;Description automatically generated">
+            <a:extLst>
+              <a:ext uri="{FF2B5EF4-FFF2-40B4-BE49-F238E27FC236}">
+                <a16:creationId xmlns:a16="http://schemas.microsoft.com/office/drawing/2014/main" id="{081C592B-0C04-446E-04FC-50103FDEDF0A}"/>
               </a:ext>
             </a:extLst>
           </p:cNvPr>
@@ -5168,13 +5160,14 @@
               </a:ext>
             </a:extLst>
           </a:blip>
-          <a:srcRect l="2626" t="6834" r="10545" b="6229"/>
-          <a:stretch/>
+          <a:stretch>
+            <a:fillRect/>
+          </a:stretch>
         </p:blipFill>
         <p:spPr>
           <a:xfrm>
-            <a:off x="6146133" y="19680544"/>
-            <a:ext cx="7948087" cy="2981093"/>
+            <a:off x="15013442" y="13078976"/>
+            <a:ext cx="8280898" cy="4140449"/>
           </a:xfrm>
           <a:prstGeom prst="rect">
             <a:avLst/>
@@ -5183,10 +5176,10 @@
       </p:pic>
       <p:sp>
         <p:nvSpPr>
-          <p:cNvPr id="20" name="TextBox 19">
-            <a:extLst>
-              <a:ext uri="{FF2B5EF4-FFF2-40B4-BE49-F238E27FC236}">
-                <a16:creationId xmlns:a16="http://schemas.microsoft.com/office/drawing/2014/main" id="{10E28791-B1C4-869F-FE2D-5955CF99BB6A}"/>
+          <p:cNvPr id="116" name="TextBox 115">
+            <a:extLst>
+              <a:ext uri="{FF2B5EF4-FFF2-40B4-BE49-F238E27FC236}">
+                <a16:creationId xmlns:a16="http://schemas.microsoft.com/office/drawing/2014/main" id="{BC23514B-6B6B-F2FE-A09C-823661277C07}"/>
               </a:ext>
             </a:extLst>
           </p:cNvPr>
@@ -5195,8 +5188,8 @@
         </p:nvSpPr>
         <p:spPr>
           <a:xfrm>
-            <a:off x="15114403" y="11210577"/>
-            <a:ext cx="7212198" cy="1938992"/>
+            <a:off x="15123631" y="17180811"/>
+            <a:ext cx="3316409" cy="1077218"/>
           </a:xfrm>
           <a:prstGeom prst="rect">
             <a:avLst/>
@@ -5210,87 +5203,138 @@
           <a:lstStyle/>
           <a:p>
             <a:r>
-              <a:rPr lang="en-GB" sz="2400" b="1" i="1" u="sng" dirty="0">
-                <a:latin typeface="Arial" panose="020B0604020202020204" pitchFamily="34" charset="0"/>
-                <a:ea typeface="思源黑体 CN Regular" panose="020B0500000000000000" charset="-122"/>
-                <a:cs typeface="Arial" panose="020B0604020202020204" pitchFamily="34" charset="0"/>
-                <a:sym typeface="+mn-ea"/>
-              </a:rPr>
-              <a:t>Assumption</a:t>
-            </a:r>
-            <a:r>
-              <a:rPr lang="en-GB" sz="2400" b="1" dirty="0">
-                <a:latin typeface="Arial" panose="020B0604020202020204" pitchFamily="34" charset="0"/>
-                <a:ea typeface="思源黑体 CN Regular" panose="020B0500000000000000" charset="-122"/>
-                <a:cs typeface="Arial" panose="020B0604020202020204" pitchFamily="34" charset="0"/>
-                <a:sym typeface="+mn-ea"/>
-              </a:rPr>
-              <a:t>: </a:t>
-            </a:r>
-            <a:r>
-              <a:rPr lang="en-GB" sz="2400" dirty="0">
-                <a:latin typeface="Arial" panose="020B0604020202020204" pitchFamily="34" charset="0"/>
-                <a:ea typeface="思源黑体 CN Regular" panose="020B0500000000000000" charset="-122"/>
-                <a:cs typeface="Arial" panose="020B0604020202020204" pitchFamily="34" charset="0"/>
-                <a:sym typeface="+mn-ea"/>
-              </a:rPr>
-              <a:t>There is a positive correlation between the ownership of </a:t>
-            </a:r>
-            <a:r>
-              <a:rPr lang="en-GB" sz="2400" dirty="0" err="1">
-                <a:latin typeface="Arial" panose="020B0604020202020204" pitchFamily="34" charset="0"/>
-                <a:ea typeface="思源黑体 CN Regular" panose="020B0500000000000000" charset="-122"/>
-                <a:cs typeface="Arial" panose="020B0604020202020204" pitchFamily="34" charset="0"/>
-                <a:sym typeface="+mn-ea"/>
-              </a:rPr>
-              <a:t>Listenhunde</a:t>
-            </a:r>
-            <a:r>
-              <a:rPr lang="en-GB" sz="2400" dirty="0">
-                <a:latin typeface="Arial" panose="020B0604020202020204" pitchFamily="34" charset="0"/>
-                <a:ea typeface="思源黑体 CN Regular" panose="020B0500000000000000" charset="-122"/>
-                <a:cs typeface="Arial" panose="020B0604020202020204" pitchFamily="34" charset="0"/>
-                <a:sym typeface="+mn-ea"/>
-              </a:rPr>
-              <a:t> and district, with a higher prevalence of </a:t>
-            </a:r>
-            <a:r>
-              <a:rPr lang="en-GB" sz="2400" dirty="0" err="1">
-                <a:latin typeface="Arial" panose="020B0604020202020204" pitchFamily="34" charset="0"/>
-                <a:ea typeface="思源黑体 CN Regular" panose="020B0500000000000000" charset="-122"/>
-                <a:cs typeface="Arial" panose="020B0604020202020204" pitchFamily="34" charset="0"/>
-                <a:sym typeface="+mn-ea"/>
-              </a:rPr>
-              <a:t>Listenhunde</a:t>
-            </a:r>
-            <a:r>
-              <a:rPr lang="en-GB" sz="2400" dirty="0">
-                <a:latin typeface="Arial" panose="020B0604020202020204" pitchFamily="34" charset="0"/>
-                <a:ea typeface="思源黑体 CN Regular" panose="020B0500000000000000" charset="-122"/>
-                <a:cs typeface="Arial" panose="020B0604020202020204" pitchFamily="34" charset="0"/>
-                <a:sym typeface="+mn-ea"/>
-              </a:rPr>
-              <a:t> ownership in outer Viennese districts compared to inner districts.</a:t>
-            </a:r>
-            <a:r>
-              <a:rPr lang="en-GB" sz="2400" b="1" dirty="0">
-                <a:latin typeface="Arial" panose="020B0604020202020204" pitchFamily="34" charset="0"/>
-                <a:ea typeface="思源黑体 CN Regular" panose="020B0500000000000000" charset="-122"/>
-                <a:cs typeface="Arial" panose="020B0604020202020204" pitchFamily="34" charset="0"/>
-                <a:sym typeface="+mn-ea"/>
-              </a:rPr>
-              <a:t>	</a:t>
-            </a:r>
-            <a:endParaRPr lang="en-GB" sz="2400" dirty="0"/>
+              <a:rPr lang="de-DE" sz="1600" b="1" dirty="0"/>
+              <a:t>1) </a:t>
+            </a:r>
+            <a:r>
+              <a:rPr lang="de-DE" sz="1600" dirty="0" err="1"/>
+              <a:t>There</a:t>
+            </a:r>
+            <a:r>
+              <a:rPr lang="de-DE" sz="1600" dirty="0"/>
+              <a:t> </a:t>
+            </a:r>
+            <a:r>
+              <a:rPr lang="de-DE" sz="1600" dirty="0" err="1"/>
+              <a:t>is</a:t>
+            </a:r>
+            <a:r>
+              <a:rPr lang="de-DE" sz="1600" dirty="0"/>
+              <a:t> </a:t>
+            </a:r>
+            <a:r>
+              <a:rPr lang="de-DE" sz="1600" b="1" dirty="0" err="1"/>
+              <a:t>only</a:t>
+            </a:r>
+            <a:r>
+              <a:rPr lang="de-DE" sz="1600" b="1" dirty="0"/>
+              <a:t> a </a:t>
+            </a:r>
+            <a:r>
+              <a:rPr lang="de-DE" sz="1600" b="1" dirty="0" err="1"/>
+              <a:t>weak</a:t>
+            </a:r>
+            <a:r>
+              <a:rPr lang="de-DE" sz="1600" b="1" dirty="0"/>
+              <a:t> </a:t>
+            </a:r>
+            <a:r>
+              <a:rPr lang="de-DE" sz="1600" b="1" dirty="0" err="1"/>
+              <a:t>correlation</a:t>
+            </a:r>
+            <a:r>
+              <a:rPr lang="de-DE" sz="1600" b="1" dirty="0"/>
+              <a:t> </a:t>
+            </a:r>
+            <a:r>
+              <a:rPr lang="de-DE" sz="1600" dirty="0" err="1"/>
+              <a:t>between</a:t>
+            </a:r>
+            <a:r>
+              <a:rPr lang="de-DE" sz="1600" dirty="0"/>
+              <a:t> </a:t>
+            </a:r>
+            <a:r>
+              <a:rPr lang="de-DE" sz="1600" dirty="0" err="1"/>
+              <a:t>district</a:t>
+            </a:r>
+            <a:r>
+              <a:rPr lang="de-DE" sz="1600" dirty="0"/>
+              <a:t> and Listenhund </a:t>
+            </a:r>
+            <a:r>
+              <a:rPr lang="de-DE" sz="1600" dirty="0" err="1"/>
+              <a:t>for</a:t>
+            </a:r>
+            <a:r>
+              <a:rPr lang="de-DE" sz="1600" dirty="0"/>
+              <a:t> </a:t>
+            </a:r>
+            <a:r>
+              <a:rPr lang="de-DE" sz="1600" b="1" dirty="0" err="1"/>
+              <a:t>three</a:t>
+            </a:r>
+            <a:r>
+              <a:rPr lang="de-DE" sz="1600" dirty="0"/>
+              <a:t> Listenhund </a:t>
+            </a:r>
+            <a:r>
+              <a:rPr lang="de-DE" sz="1600" dirty="0" err="1"/>
+              <a:t>breeds</a:t>
+            </a:r>
+            <a:r>
+              <a:rPr lang="de-DE" sz="1600" dirty="0"/>
+              <a:t> (</a:t>
+            </a:r>
+            <a:r>
+              <a:rPr lang="de-DE" sz="1600" b="1" dirty="0"/>
+              <a:t>0.2 – 0.35</a:t>
+            </a:r>
+            <a:r>
+              <a:rPr lang="de-DE" sz="1600" dirty="0"/>
+              <a:t>) and </a:t>
+            </a:r>
+            <a:r>
+              <a:rPr lang="de-DE" sz="1600" b="1" dirty="0" err="1"/>
+              <a:t>less</a:t>
+            </a:r>
+            <a:r>
+              <a:rPr lang="de-DE" sz="1600" b="1" dirty="0"/>
+              <a:t> </a:t>
+            </a:r>
+            <a:r>
+              <a:rPr lang="de-DE" sz="1600" b="1" dirty="0" err="1"/>
+              <a:t>for</a:t>
+            </a:r>
+            <a:r>
+              <a:rPr lang="de-DE" sz="1600" b="1" dirty="0"/>
+              <a:t> </a:t>
+            </a:r>
+            <a:r>
+              <a:rPr lang="de-DE" sz="1600" b="1" dirty="0" err="1"/>
+              <a:t>the</a:t>
+            </a:r>
+            <a:r>
+              <a:rPr lang="de-DE" sz="1600" b="1" dirty="0"/>
+              <a:t> </a:t>
+            </a:r>
+            <a:r>
+              <a:rPr lang="de-DE" sz="1600" b="1" dirty="0" err="1"/>
+              <a:t>others</a:t>
+            </a:r>
+            <a:r>
+              <a:rPr lang="de-DE" sz="1600" dirty="0"/>
+              <a:t>. </a:t>
+            </a:r>
           </a:p>
         </p:txBody>
       </p:sp>
       <p:pic>
         <p:nvPicPr>
-          <p:cNvPr id="19" name="Picture 18" descr="A graph with red dots and green dots&#10;&#10;Description automatically generated">
-            <a:extLst>
-              <a:ext uri="{FF2B5EF4-FFF2-40B4-BE49-F238E27FC236}">
-                <a16:creationId xmlns:a16="http://schemas.microsoft.com/office/drawing/2014/main" id="{081C592B-0C04-446E-04FC-50103FDEDF0A}"/>
+          <p:cNvPr id="51" name="Picture 50" descr="A yellow circle with a number of percentages&#10;&#10;Description automatically generated with medium confidence">
+            <a:extLst>
+              <a:ext uri="{FF2B5EF4-FFF2-40B4-BE49-F238E27FC236}">
+                <a16:creationId xmlns:a16="http://schemas.microsoft.com/office/drawing/2014/main" id="{D014A30C-7AF6-6E44-9385-73ECE9FB4759}"/>
               </a:ext>
             </a:extLst>
           </p:cNvPr>
@@ -5300,21 +5344,55 @@
           <p:nvPr/>
         </p:nvPicPr>
         <p:blipFill>
-          <a:blip r:embed="rId40">
+          <a:blip r:embed="rId40" cstate="print">
             <a:extLst>
               <a:ext uri="{28A0092B-C50C-407E-A947-70E740481C1C}">
                 <a14:useLocalDpi xmlns:a14="http://schemas.microsoft.com/office/drawing/2010/main" val="0"/>
               </a:ext>
             </a:extLst>
           </a:blip>
-          <a:stretch>
-            <a:fillRect/>
-          </a:stretch>
+          <a:srcRect l="8954" r="9021"/>
+          <a:stretch/>
         </p:blipFill>
         <p:spPr>
           <a:xfrm>
-            <a:off x="15013442" y="13078976"/>
-            <a:ext cx="8280898" cy="4140449"/>
+            <a:off x="23710710" y="14760475"/>
+            <a:ext cx="3967059" cy="2417861"/>
+          </a:xfrm>
+          <a:prstGeom prst="rect">
+            <a:avLst/>
+          </a:prstGeom>
+        </p:spPr>
+      </p:pic>
+      <p:pic>
+        <p:nvPicPr>
+          <p:cNvPr id="17" name="Grafik 16" descr="Ein Bild, das Text, Screenshot, Diagramm, Reihe enthält.&#10;&#10;Automatisch generierte Beschreibung">
+            <a:extLst>
+              <a:ext uri="{FF2B5EF4-FFF2-40B4-BE49-F238E27FC236}">
+                <a16:creationId xmlns:a16="http://schemas.microsoft.com/office/drawing/2014/main" id="{8569264F-73B6-6125-7C59-4A193FC095A5}"/>
+              </a:ext>
+            </a:extLst>
+          </p:cNvPr>
+          <p:cNvPicPr>
+            <a:picLocks noChangeAspect="1"/>
+          </p:cNvPicPr>
+          <p:nvPr/>
+        </p:nvPicPr>
+        <p:blipFill rotWithShape="1">
+          <a:blip r:embed="rId41">
+            <a:extLst>
+              <a:ext uri="{28A0092B-C50C-407E-A947-70E740481C1C}">
+                <a14:useLocalDpi xmlns:a14="http://schemas.microsoft.com/office/drawing/2010/main" val="0"/>
+              </a:ext>
+            </a:extLst>
+          </a:blip>
+          <a:srcRect l="2674" t="3825" b="4039"/>
+          <a:stretch/>
+        </p:blipFill>
+        <p:spPr>
+          <a:xfrm>
+            <a:off x="29248109" y="6768674"/>
+            <a:ext cx="5793966" cy="4799268"/>
           </a:xfrm>
           <a:prstGeom prst="rect">
             <a:avLst/>
@@ -5323,10 +5401,10 @@
       </p:pic>
       <p:sp>
         <p:nvSpPr>
-          <p:cNvPr id="116" name="TextBox 115">
-            <a:extLst>
-              <a:ext uri="{FF2B5EF4-FFF2-40B4-BE49-F238E27FC236}">
-                <a16:creationId xmlns:a16="http://schemas.microsoft.com/office/drawing/2014/main" id="{BC23514B-6B6B-F2FE-A09C-823661277C07}"/>
+          <p:cNvPr id="34" name="Textfeld 33">
+            <a:extLst>
+              <a:ext uri="{FF2B5EF4-FFF2-40B4-BE49-F238E27FC236}">
+                <a16:creationId xmlns:a16="http://schemas.microsoft.com/office/drawing/2014/main" id="{54FDA58D-1FB2-7A95-020C-F1A4C3656F23}"/>
               </a:ext>
             </a:extLst>
           </p:cNvPr>
@@ -5335,8 +5413,8 @@
         </p:nvSpPr>
         <p:spPr>
           <a:xfrm>
-            <a:off x="15123631" y="17180811"/>
-            <a:ext cx="3316409" cy="1077218"/>
+            <a:off x="29092049" y="5273882"/>
+            <a:ext cx="11902598" cy="954107"/>
           </a:xfrm>
           <a:prstGeom prst="rect">
             <a:avLst/>
@@ -5350,173 +5428,37 @@
           <a:lstStyle/>
           <a:p>
             <a:r>
-              <a:rPr lang="de-DE" sz="1600" b="1" dirty="0"/>
-              <a:t>1) </a:t>
-            </a:r>
-            <a:r>
-              <a:rPr lang="de-DE" sz="1600" dirty="0" err="1"/>
-              <a:t>There</a:t>
-            </a:r>
-            <a:r>
-              <a:rPr lang="de-DE" sz="1600" dirty="0"/>
-              <a:t> </a:t>
-            </a:r>
-            <a:r>
-              <a:rPr lang="de-DE" sz="1600" dirty="0" err="1"/>
-              <a:t>is</a:t>
-            </a:r>
-            <a:r>
-              <a:rPr lang="de-DE" sz="1600" dirty="0"/>
-              <a:t> </a:t>
-            </a:r>
-            <a:r>
-              <a:rPr lang="de-DE" sz="1600" b="1" dirty="0" err="1"/>
-              <a:t>only</a:t>
-            </a:r>
-            <a:r>
-              <a:rPr lang="de-DE" sz="1600" b="1" dirty="0"/>
-              <a:t> a </a:t>
-            </a:r>
-            <a:r>
-              <a:rPr lang="de-DE" sz="1600" b="1" dirty="0" err="1"/>
-              <a:t>weak</a:t>
-            </a:r>
-            <a:r>
-              <a:rPr lang="de-DE" sz="1600" b="1" dirty="0"/>
-              <a:t> </a:t>
-            </a:r>
-            <a:r>
-              <a:rPr lang="de-DE" sz="1600" b="1" dirty="0" err="1"/>
-              <a:t>correlation</a:t>
-            </a:r>
-            <a:r>
-              <a:rPr lang="de-DE" sz="1600" b="1" dirty="0"/>
-              <a:t> </a:t>
-            </a:r>
-            <a:r>
-              <a:rPr lang="de-DE" sz="1600" dirty="0" err="1"/>
-              <a:t>between</a:t>
-            </a:r>
-            <a:r>
-              <a:rPr lang="de-DE" sz="1600" dirty="0"/>
-              <a:t> </a:t>
-            </a:r>
-            <a:r>
-              <a:rPr lang="de-DE" sz="1600" dirty="0" err="1"/>
-              <a:t>district</a:t>
-            </a:r>
-            <a:r>
-              <a:rPr lang="de-DE" sz="1600" dirty="0"/>
-              <a:t> and Listenhund </a:t>
-            </a:r>
-            <a:r>
-              <a:rPr lang="de-DE" sz="1600" dirty="0" err="1"/>
-              <a:t>for</a:t>
-            </a:r>
-            <a:r>
-              <a:rPr lang="de-DE" sz="1600" dirty="0"/>
-              <a:t> </a:t>
-            </a:r>
-            <a:r>
-              <a:rPr lang="de-DE" sz="1600" b="1" dirty="0" err="1"/>
-              <a:t>three</a:t>
-            </a:r>
-            <a:r>
-              <a:rPr lang="de-DE" sz="1600" dirty="0"/>
-              <a:t> Listenhund </a:t>
-            </a:r>
-            <a:r>
-              <a:rPr lang="de-DE" sz="1600" dirty="0" err="1"/>
-              <a:t>breeds</a:t>
-            </a:r>
-            <a:r>
-              <a:rPr lang="de-DE" sz="1600" dirty="0"/>
-              <a:t> (</a:t>
-            </a:r>
-            <a:r>
-              <a:rPr lang="de-DE" sz="1600" b="1" dirty="0"/>
-              <a:t>0.2 – 0.35</a:t>
-            </a:r>
-            <a:r>
-              <a:rPr lang="de-DE" sz="1600" dirty="0"/>
-              <a:t>) and </a:t>
-            </a:r>
-            <a:r>
-              <a:rPr lang="de-DE" sz="1600" b="1" dirty="0" err="1"/>
-              <a:t>less</a:t>
-            </a:r>
-            <a:r>
-              <a:rPr lang="de-DE" sz="1600" b="1" dirty="0"/>
-              <a:t> </a:t>
-            </a:r>
-            <a:r>
-              <a:rPr lang="de-DE" sz="1600" b="1" dirty="0" err="1"/>
-              <a:t>for</a:t>
-            </a:r>
-            <a:r>
-              <a:rPr lang="de-DE" sz="1600" b="1" dirty="0"/>
-              <a:t> </a:t>
-            </a:r>
-            <a:r>
-              <a:rPr lang="de-DE" sz="1600" b="1" dirty="0" err="1"/>
-              <a:t>the</a:t>
-            </a:r>
-            <a:r>
-              <a:rPr lang="de-DE" sz="1600" b="1" dirty="0"/>
-              <a:t> </a:t>
-            </a:r>
-            <a:r>
-              <a:rPr lang="de-DE" sz="1600" b="1" dirty="0" err="1"/>
-              <a:t>others</a:t>
-            </a:r>
-            <a:r>
-              <a:rPr lang="de-DE" sz="1600" dirty="0"/>
-              <a:t>. </a:t>
+              <a:rPr lang="en-US" sz="2800" b="1" dirty="0">
+                <a:effectLst/>
+                <a:latin typeface="Arial" panose="020B0604020202020204" pitchFamily="34" charset="0"/>
+                <a:cs typeface="Arial" panose="020B0604020202020204" pitchFamily="34" charset="0"/>
+              </a:rPr>
+              <a:t>Dog ownership is inversely correlated with population density </a:t>
+            </a:r>
+            <a:br>
+              <a:rPr lang="en-US" sz="2800" b="1" dirty="0">
+                <a:effectLst/>
+                <a:latin typeface="Arial" panose="020B0604020202020204" pitchFamily="34" charset="0"/>
+                <a:cs typeface="Arial" panose="020B0604020202020204" pitchFamily="34" charset="0"/>
+              </a:rPr>
+            </a:br>
+            <a:r>
+              <a:rPr lang="en-US" sz="2800" b="1" dirty="0">
+                <a:effectLst/>
+                <a:latin typeface="Arial" panose="020B0604020202020204" pitchFamily="34" charset="0"/>
+                <a:cs typeface="Arial" panose="020B0604020202020204" pitchFamily="34" charset="0"/>
+              </a:rPr>
+              <a:t>in Vienna districts</a:t>
             </a:r>
           </a:p>
         </p:txBody>
       </p:sp>
       <p:pic>
         <p:nvPicPr>
-          <p:cNvPr id="51" name="Picture 50" descr="A yellow circle with a number of percentages&#10;&#10;Description automatically generated with medium confidence">
-            <a:extLst>
-              <a:ext uri="{FF2B5EF4-FFF2-40B4-BE49-F238E27FC236}">
-                <a16:creationId xmlns:a16="http://schemas.microsoft.com/office/drawing/2014/main" id="{D014A30C-7AF6-6E44-9385-73ECE9FB4759}"/>
-              </a:ext>
-            </a:extLst>
-          </p:cNvPr>
-          <p:cNvPicPr>
-            <a:picLocks noChangeAspect="1"/>
-          </p:cNvPicPr>
-          <p:nvPr/>
-        </p:nvPicPr>
-        <p:blipFill>
-          <a:blip r:embed="rId41" cstate="print">
-            <a:extLst>
-              <a:ext uri="{28A0092B-C50C-407E-A947-70E740481C1C}">
-                <a14:useLocalDpi xmlns:a14="http://schemas.microsoft.com/office/drawing/2010/main" val="0"/>
-              </a:ext>
-            </a:extLst>
-          </a:blip>
-          <a:srcRect l="8954" r="9021"/>
-          <a:stretch/>
-        </p:blipFill>
-        <p:spPr>
-          <a:xfrm>
-            <a:off x="23710710" y="14760475"/>
-            <a:ext cx="3967059" cy="2417861"/>
-          </a:xfrm>
-          <a:prstGeom prst="rect">
-            <a:avLst/>
-          </a:prstGeom>
-        </p:spPr>
-      </p:pic>
-      <p:pic>
-        <p:nvPicPr>
-          <p:cNvPr id="17" name="Grafik 16" descr="Ein Bild, das Text, Screenshot, Diagramm, Reihe enthält.&#10;&#10;Automatisch generierte Beschreibung">
-            <a:extLst>
-              <a:ext uri="{FF2B5EF4-FFF2-40B4-BE49-F238E27FC236}">
-                <a16:creationId xmlns:a16="http://schemas.microsoft.com/office/drawing/2014/main" id="{8569264F-73B6-6125-7C59-4A193FC095A5}"/>
+          <p:cNvPr id="49" name="Grafik 48" descr="Ein Bild, das Text, Screenshot, Diagramm, Reihe enthält.&#10;&#10;Automatisch generierte Beschreibung">
+            <a:extLst>
+              <a:ext uri="{FF2B5EF4-FFF2-40B4-BE49-F238E27FC236}">
+                <a16:creationId xmlns:a16="http://schemas.microsoft.com/office/drawing/2014/main" id="{5F1745BB-8ED7-4A64-0E00-22E172187E20}"/>
               </a:ext>
             </a:extLst>
           </p:cNvPr>
@@ -5533,13 +5475,13 @@
               </a:ext>
             </a:extLst>
           </a:blip>
-          <a:srcRect l="2674" t="3825" b="4039"/>
+          <a:srcRect l="2583" t="3679" b="4213"/>
           <a:stretch/>
         </p:blipFill>
         <p:spPr>
           <a:xfrm>
-            <a:off x="29248109" y="6768674"/>
-            <a:ext cx="5793966" cy="4799268"/>
+            <a:off x="29874754" y="7112560"/>
+            <a:ext cx="6335905" cy="4193401"/>
           </a:xfrm>
           <a:prstGeom prst="rect">
             <a:avLst/>
@@ -5548,10 +5490,10 @@
       </p:pic>
       <p:sp>
         <p:nvSpPr>
-          <p:cNvPr id="34" name="Textfeld 33">
-            <a:extLst>
-              <a:ext uri="{FF2B5EF4-FFF2-40B4-BE49-F238E27FC236}">
-                <a16:creationId xmlns:a16="http://schemas.microsoft.com/office/drawing/2014/main" id="{54FDA58D-1FB2-7A95-020C-F1A4C3656F23}"/>
+          <p:cNvPr id="50" name="Textfeld 49">
+            <a:extLst>
+              <a:ext uri="{FF2B5EF4-FFF2-40B4-BE49-F238E27FC236}">
+                <a16:creationId xmlns:a16="http://schemas.microsoft.com/office/drawing/2014/main" id="{DD6E3136-57A1-C1C2-9B12-54651C3A5B30}"/>
               </a:ext>
             </a:extLst>
           </p:cNvPr>
@@ -5560,8 +5502,8 @@
         </p:nvSpPr>
         <p:spPr>
           <a:xfrm>
-            <a:off x="29092049" y="5273882"/>
-            <a:ext cx="11902598" cy="954107"/>
+            <a:off x="37199653" y="6760912"/>
+            <a:ext cx="3497105" cy="4893647"/>
           </a:xfrm>
           <a:prstGeom prst="rect">
             <a:avLst/>
@@ -5575,37 +5517,38 @@
           <a:lstStyle/>
           <a:p>
             <a:r>
-              <a:rPr lang="en-US" sz="2800" b="1" dirty="0">
-                <a:effectLst/>
-                <a:latin typeface="Arial" panose="020B0604020202020204" pitchFamily="34" charset="0"/>
-                <a:cs typeface="Arial" panose="020B0604020202020204" pitchFamily="34" charset="0"/>
-              </a:rPr>
-              <a:t>Dog ownership is inversely correlated with population density </a:t>
-            </a:r>
-            <a:br>
-              <a:rPr lang="en-US" sz="2800" b="1" dirty="0">
-                <a:effectLst/>
-                <a:latin typeface="Arial" panose="020B0604020202020204" pitchFamily="34" charset="0"/>
-                <a:cs typeface="Arial" panose="020B0604020202020204" pitchFamily="34" charset="0"/>
-              </a:rPr>
-            </a:br>
-            <a:r>
-              <a:rPr lang="en-US" sz="2800" b="1" dirty="0">
-                <a:effectLst/>
-                <a:latin typeface="Arial" panose="020B0604020202020204" pitchFamily="34" charset="0"/>
-                <a:cs typeface="Arial" panose="020B0604020202020204" pitchFamily="34" charset="0"/>
-              </a:rPr>
-              <a:t>in Vienna districts</a:t>
-            </a:r>
+              <a:rPr lang="en-US" sz="2400" dirty="0"/>
+              <a:t>To confirm the inverse correlation, the Pearson correlation coefficient was calculated, resulting in a value of -0.61.</a:t>
+            </a:r>
+          </a:p>
+          <a:p>
+            <a:endParaRPr lang="de-AT" sz="2400" b="1" dirty="0"/>
+          </a:p>
+          <a:p>
+            <a:r>
+              <a:rPr lang="de-AT" sz="2400" b="1" dirty="0" err="1"/>
+              <a:t>Conclusion</a:t>
+            </a:r>
+            <a:r>
+              <a:rPr lang="de-AT" sz="2400" b="1" dirty="0"/>
+              <a:t>:</a:t>
+            </a:r>
+          </a:p>
+          <a:p>
+            <a:r>
+              <a:rPr lang="en-US" sz="2400" dirty="0"/>
+              <a:t>The graph shows a negative correlation between the population density and the number of dogs in the districts of Vienna.</a:t>
+            </a:r>
+            <a:endParaRPr lang="de-AT" sz="2400" dirty="0"/>
           </a:p>
         </p:txBody>
       </p:sp>
       <p:pic>
         <p:nvPicPr>
-          <p:cNvPr id="49" name="Grafik 48" descr="Ein Bild, das Text, Screenshot, Diagramm, Reihe enthält.&#10;&#10;Automatisch generierte Beschreibung">
-            <a:extLst>
-              <a:ext uri="{FF2B5EF4-FFF2-40B4-BE49-F238E27FC236}">
-                <a16:creationId xmlns:a16="http://schemas.microsoft.com/office/drawing/2014/main" id="{5F1745BB-8ED7-4A64-0E00-22E172187E20}"/>
+          <p:cNvPr id="63" name="Grafik 62" descr="Ein Bild, das Text, Screenshot, Diagramm, Reihe enthält.&#10;&#10;Automatisch generierte Beschreibung">
+            <a:extLst>
+              <a:ext uri="{FF2B5EF4-FFF2-40B4-BE49-F238E27FC236}">
+                <a16:creationId xmlns:a16="http://schemas.microsoft.com/office/drawing/2014/main" id="{768307A2-261B-9BE3-F3F6-032F1014D798}"/>
               </a:ext>
             </a:extLst>
           </p:cNvPr>
@@ -5622,80 +5565,25 @@
               </a:ext>
             </a:extLst>
           </a:blip>
-          <a:srcRect l="2583" t="3679" b="4213"/>
+          <a:srcRect l="1628" t="2828" r="792" b="2527"/>
           <a:stretch/>
         </p:blipFill>
         <p:spPr>
           <a:xfrm>
-            <a:off x="29874754" y="7112560"/>
-            <a:ext cx="6335905" cy="4193401"/>
+            <a:off x="29271890" y="6821292"/>
+            <a:ext cx="7002062" cy="5433063"/>
           </a:xfrm>
           <a:prstGeom prst="rect">
             <a:avLst/>
           </a:prstGeom>
         </p:spPr>
       </p:pic>
-      <p:sp>
-        <p:nvSpPr>
-          <p:cNvPr id="50" name="Textfeld 49">
-            <a:extLst>
-              <a:ext uri="{FF2B5EF4-FFF2-40B4-BE49-F238E27FC236}">
-                <a16:creationId xmlns:a16="http://schemas.microsoft.com/office/drawing/2014/main" id="{DD6E3136-57A1-C1C2-9B12-54651C3A5B30}"/>
-              </a:ext>
-            </a:extLst>
-          </p:cNvPr>
-          <p:cNvSpPr txBox="1"/>
-          <p:nvPr/>
-        </p:nvSpPr>
-        <p:spPr>
-          <a:xfrm>
-            <a:off x="37199653" y="6760912"/>
-            <a:ext cx="3497105" cy="4893647"/>
-          </a:xfrm>
-          <a:prstGeom prst="rect">
-            <a:avLst/>
-          </a:prstGeom>
-          <a:noFill/>
-        </p:spPr>
-        <p:txBody>
-          <a:bodyPr wrap="square" rtlCol="0">
-            <a:spAutoFit/>
-          </a:bodyPr>
-          <a:lstStyle/>
-          <a:p>
-            <a:r>
-              <a:rPr lang="en-US" sz="2400" dirty="0"/>
-              <a:t>To confirm the inverse correlation, the Pearson correlation coefficient was calculated, resulting in a value of -0.61.</a:t>
-            </a:r>
-          </a:p>
-          <a:p>
-            <a:endParaRPr lang="de-AT" sz="2400" b="1" dirty="0"/>
-          </a:p>
-          <a:p>
-            <a:r>
-              <a:rPr lang="de-AT" sz="2400" b="1" dirty="0" err="1"/>
-              <a:t>Conclusion</a:t>
-            </a:r>
-            <a:r>
-              <a:rPr lang="de-AT" sz="2400" b="1" dirty="0"/>
-              <a:t>:</a:t>
-            </a:r>
-          </a:p>
-          <a:p>
-            <a:r>
-              <a:rPr lang="en-US" sz="2400" dirty="0"/>
-              <a:t>The graph shows a negative correlation between the population density and the number of dogs in the districts of Vienna.</a:t>
-            </a:r>
-            <a:endParaRPr lang="de-AT" sz="2400" dirty="0"/>
-          </a:p>
-        </p:txBody>
-      </p:sp>
       <p:pic>
         <p:nvPicPr>
-          <p:cNvPr id="63" name="Grafik 62" descr="Ein Bild, das Text, Screenshot, Diagramm, Reihe enthält.&#10;&#10;Automatisch generierte Beschreibung">
-            <a:extLst>
-              <a:ext uri="{FF2B5EF4-FFF2-40B4-BE49-F238E27FC236}">
-                <a16:creationId xmlns:a16="http://schemas.microsoft.com/office/drawing/2014/main" id="{768307A2-261B-9BE3-F3F6-032F1014D798}"/>
+          <p:cNvPr id="56" name="Grafik 55" descr="Ein Bild, das Text, Screenshot, Diagramm, Reihe enthält.&#10;&#10;Automatisch generierte Beschreibung">
+            <a:extLst>
+              <a:ext uri="{FF2B5EF4-FFF2-40B4-BE49-F238E27FC236}">
+                <a16:creationId xmlns:a16="http://schemas.microsoft.com/office/drawing/2014/main" id="{45049E61-8A38-C803-C776-963BF4A57F26}"/>
               </a:ext>
             </a:extLst>
           </p:cNvPr>
@@ -5712,41 +5600,6 @@
               </a:ext>
             </a:extLst>
           </a:blip>
-          <a:srcRect l="1628" t="2828" r="792" b="2527"/>
-          <a:stretch/>
-        </p:blipFill>
-        <p:spPr>
-          <a:xfrm>
-            <a:off x="29271890" y="6821292"/>
-            <a:ext cx="7002062" cy="5433063"/>
-          </a:xfrm>
-          <a:prstGeom prst="rect">
-            <a:avLst/>
-          </a:prstGeom>
-        </p:spPr>
-      </p:pic>
-      <p:pic>
-        <p:nvPicPr>
-          <p:cNvPr id="56" name="Grafik 55" descr="Ein Bild, das Text, Screenshot, Diagramm, Reihe enthält.&#10;&#10;Automatisch generierte Beschreibung">
-            <a:extLst>
-              <a:ext uri="{FF2B5EF4-FFF2-40B4-BE49-F238E27FC236}">
-                <a16:creationId xmlns:a16="http://schemas.microsoft.com/office/drawing/2014/main" id="{45049E61-8A38-C803-C776-963BF4A57F26}"/>
-              </a:ext>
-            </a:extLst>
-          </p:cNvPr>
-          <p:cNvPicPr>
-            <a:picLocks noChangeAspect="1"/>
-          </p:cNvPicPr>
-          <p:nvPr/>
-        </p:nvPicPr>
-        <p:blipFill rotWithShape="1">
-          <a:blip r:embed="rId45">
-            <a:extLst>
-              <a:ext uri="{28A0092B-C50C-407E-A947-70E740481C1C}">
-                <a14:useLocalDpi xmlns:a14="http://schemas.microsoft.com/office/drawing/2010/main" val="0"/>
-              </a:ext>
-            </a:extLst>
-          </a:blip>
           <a:srcRect l="1632" t="3529" b="3202"/>
           <a:stretch/>
         </p:blipFill>
@@ -5823,10 +5676,10 @@
       </p:sp>
       <p:sp>
         <p:nvSpPr>
-          <p:cNvPr id="60" name="Textfeld 59">
-            <a:extLst>
-              <a:ext uri="{FF2B5EF4-FFF2-40B4-BE49-F238E27FC236}">
-                <a16:creationId xmlns:a16="http://schemas.microsoft.com/office/drawing/2014/main" id="{297B18FD-0B57-72C2-AE64-C04B8065FA3C}"/>
+          <p:cNvPr id="72" name="Textfeld 71">
+            <a:extLst>
+              <a:ext uri="{FF2B5EF4-FFF2-40B4-BE49-F238E27FC236}">
+                <a16:creationId xmlns:a16="http://schemas.microsoft.com/office/drawing/2014/main" id="{41984AF6-A041-5A34-0BF3-081AA87C7DA9}"/>
               </a:ext>
             </a:extLst>
           </p:cNvPr>
@@ -5835,8 +5688,8 @@
         </p:nvSpPr>
         <p:spPr>
           <a:xfrm>
-            <a:off x="15278100" y="25721725"/>
-            <a:ext cx="5267325" cy="707886"/>
+            <a:off x="15143450" y="25330064"/>
+            <a:ext cx="7051446" cy="2554545"/>
           </a:xfrm>
           <a:prstGeom prst="rect">
             <a:avLst/>
@@ -5849,23 +5702,101 @@
           </a:bodyPr>
           <a:lstStyle/>
           <a:p>
+            <a:r>
+              <a:rPr lang="en-GB" sz="2000" b="1" dirty="0"/>
+              <a:t>Results:</a:t>
+            </a:r>
+          </a:p>
+          <a:p>
             <a:pPr marL="342900" indent="-342900">
               <a:buFont typeface="Arial" panose="020B0604020202020204" pitchFamily="34" charset="0"/>
               <a:buChar char="•"/>
             </a:pPr>
             <a:r>
               <a:rPr lang="en-GB" sz="2000" dirty="0"/>
-              <a:t>Green districts: Threshold chosen at 20% green space =&gt; 12 vs. 11 districts</a:t>
+              <a:t>Green districts: Threshold at 20% green space </a:t>
+            </a:r>
+          </a:p>
+          <a:p>
+            <a:r>
+              <a:rPr lang="en-GB" sz="2000" dirty="0"/>
+              <a:t>            =&gt; 12 vs. 11 districts</a:t>
+            </a:r>
+          </a:p>
+          <a:p>
+            <a:pPr marL="342900" indent="-342900">
+              <a:buFont typeface="Arial" panose="020B0604020202020204" pitchFamily="34" charset="0"/>
+              <a:buChar char="•"/>
+            </a:pPr>
+            <a:r>
+              <a:rPr lang="en-GB" sz="2000" dirty="0"/>
+              <a:t>Slight shift of 1</a:t>
+            </a:r>
+            <a:r>
+              <a:rPr lang="en-GB" sz="2000" baseline="30000" dirty="0"/>
+              <a:t>st</a:t>
+            </a:r>
+            <a:r>
+              <a:rPr lang="en-GB" sz="2000" dirty="0"/>
+              <a:t>, 2</a:t>
+            </a:r>
+            <a:r>
+              <a:rPr lang="en-GB" sz="2000" baseline="30000" dirty="0"/>
+              <a:t>nd</a:t>
+            </a:r>
+            <a:r>
+              <a:rPr lang="en-GB" sz="2000" dirty="0"/>
+              <a:t> and 3</a:t>
+            </a:r>
+            <a:r>
+              <a:rPr lang="en-GB" sz="2000" baseline="30000" dirty="0"/>
+              <a:t>rd</a:t>
+            </a:r>
+            <a:r>
+              <a:rPr lang="en-GB" sz="2000" dirty="0"/>
+              <a:t> quartile to higher heights</a:t>
+            </a:r>
+          </a:p>
+          <a:p>
+            <a:pPr marL="342900" indent="-342900">
+              <a:buFont typeface="Arial" panose="020B0604020202020204" pitchFamily="34" charset="0"/>
+              <a:buChar char="•"/>
+            </a:pPr>
+            <a:r>
+              <a:rPr lang="en-GB" sz="2000" dirty="0"/>
+              <a:t>Correlation-Coeff.:</a:t>
+            </a:r>
+          </a:p>
+          <a:p>
+            <a:r>
+              <a:rPr lang="en-GB" sz="2000" dirty="0"/>
+              <a:t>         - [Heights vs. Green Ratio]: only ~ 0.07 (!)</a:t>
+            </a:r>
+          </a:p>
+          <a:p>
+            <a:r>
+              <a:rPr lang="en-GB" sz="2000" dirty="0"/>
+              <a:t>         - [Mean of all Heights per District vs. Green Ratio]: ~ 0.68</a:t>
+            </a:r>
+          </a:p>
+          <a:p>
+            <a:pPr marL="342900" indent="-342900">
+              <a:buFont typeface="Arial" panose="020B0604020202020204" pitchFamily="34" charset="0"/>
+              <a:buChar char="•"/>
+            </a:pPr>
+            <a:r>
+              <a:rPr lang="en-GB" sz="2000" dirty="0"/>
+              <a:t>But: Significant difference in abs. number of dogs</a:t>
             </a:r>
           </a:p>
         </p:txBody>
       </p:sp>
       <p:sp>
         <p:nvSpPr>
-          <p:cNvPr id="72" name="Textfeld 71">
-            <a:extLst>
-              <a:ext uri="{FF2B5EF4-FFF2-40B4-BE49-F238E27FC236}">
-                <a16:creationId xmlns:a16="http://schemas.microsoft.com/office/drawing/2014/main" id="{41984AF6-A041-5A34-0BF3-081AA87C7DA9}"/>
+          <p:cNvPr id="87" name="Textfeld 86">
+            <a:extLst>
+              <a:ext uri="{FF2B5EF4-FFF2-40B4-BE49-F238E27FC236}">
+                <a16:creationId xmlns:a16="http://schemas.microsoft.com/office/drawing/2014/main" id="{FF158A9A-90FD-E4C5-2089-7D71760187C1}"/>
               </a:ext>
             </a:extLst>
           </p:cNvPr>
@@ -5874,8 +5805,8 @@
         </p:nvSpPr>
         <p:spPr>
           <a:xfrm>
-            <a:off x="21617940" y="25672222"/>
-            <a:ext cx="5801137" cy="1631216"/>
+            <a:off x="22194897" y="25536947"/>
+            <a:ext cx="5916668" cy="1323439"/>
           </a:xfrm>
           <a:prstGeom prst="rect">
             <a:avLst/>
@@ -5890,7 +5821,7 @@
           <a:p>
             <a:r>
               <a:rPr lang="en-GB" sz="2000" b="1" dirty="0"/>
-              <a:t>Results:</a:t>
+              <a:t>Conclusion:</a:t>
             </a:r>
           </a:p>
           <a:p>
@@ -5900,31 +5831,7 @@
             </a:pPr>
             <a:r>
               <a:rPr lang="en-GB" sz="2000" dirty="0"/>
-              <a:t>Slight shift of 1</a:t>
-            </a:r>
-            <a:r>
-              <a:rPr lang="en-GB" sz="2000" baseline="30000" dirty="0"/>
-              <a:t>st</a:t>
-            </a:r>
-            <a:r>
-              <a:rPr lang="en-GB" sz="2000" dirty="0"/>
-              <a:t>, 2</a:t>
-            </a:r>
-            <a:r>
-              <a:rPr lang="en-GB" sz="2000" baseline="30000" dirty="0"/>
-              <a:t>nd</a:t>
-            </a:r>
-            <a:r>
-              <a:rPr lang="en-GB" sz="2000" dirty="0"/>
-              <a:t> and 3</a:t>
-            </a:r>
-            <a:r>
-              <a:rPr lang="en-GB" sz="2000" baseline="30000" dirty="0"/>
-              <a:t>rd</a:t>
-            </a:r>
-            <a:r>
-              <a:rPr lang="en-GB" sz="2000" dirty="0"/>
-              <a:t> quartile to higher heights in greener districts</a:t>
+              <a:t>No linear relationship between all Heights and  Green Space Ratio</a:t>
             </a:r>
           </a:p>
           <a:p>
@@ -5934,27 +5841,53 @@
             </a:pPr>
             <a:r>
               <a:rPr lang="en-GB" sz="2000" dirty="0"/>
-              <a:t>Pearson-Coefficient: only 0.072 (!)</a:t>
-            </a:r>
-          </a:p>
-          <a:p>
-            <a:pPr marL="342900" indent="-342900">
-              <a:buFont typeface="Arial" panose="020B0604020202020204" pitchFamily="34" charset="0"/>
-              <a:buChar char="•"/>
-            </a:pPr>
-            <a:r>
-              <a:rPr lang="en-GB" sz="2000" dirty="0"/>
-              <a:t>But: Significant difference in abs. number of dogs</a:t>
+              <a:t>Upward trend when looking at mean of heights</a:t>
             </a:r>
           </a:p>
         </p:txBody>
       </p:sp>
       <p:pic>
         <p:nvPicPr>
-          <p:cNvPr id="84" name="Grafik 83" descr="Ein Bild, das Text, Screenshot, Diagramm, Reihe enthält.&#10;&#10;Automatisch generierte Beschreibung">
-            <a:extLst>
-              <a:ext uri="{FF2B5EF4-FFF2-40B4-BE49-F238E27FC236}">
-                <a16:creationId xmlns:a16="http://schemas.microsoft.com/office/drawing/2014/main" id="{C4F4F30C-012A-3CD2-D609-280BC605E5E0}"/>
+          <p:cNvPr id="54" name="Grafik 53" descr="Ein Bild, das Text, Screenshot, Schrift, Zahl enthält.&#10;&#10;Automatisch generierte Beschreibung">
+            <a:extLst>
+              <a:ext uri="{FF2B5EF4-FFF2-40B4-BE49-F238E27FC236}">
+                <a16:creationId xmlns:a16="http://schemas.microsoft.com/office/drawing/2014/main" id="{0497AC71-E033-324B-A55B-58F79D991CB3}"/>
+              </a:ext>
+            </a:extLst>
+          </p:cNvPr>
+          <p:cNvPicPr>
+            <a:picLocks noChangeAspect="1"/>
+          </p:cNvPicPr>
+          <p:nvPr/>
+        </p:nvPicPr>
+        <p:blipFill>
+          <a:blip r:embed="rId45">
+            <a:extLst>
+              <a:ext uri="{28A0092B-C50C-407E-A947-70E740481C1C}">
+                <a14:useLocalDpi xmlns:a14="http://schemas.microsoft.com/office/drawing/2010/main" val="0"/>
+              </a:ext>
+            </a:extLst>
+          </a:blip>
+          <a:stretch>
+            <a:fillRect/>
+          </a:stretch>
+        </p:blipFill>
+        <p:spPr>
+          <a:xfrm>
+            <a:off x="21830622" y="20940935"/>
+            <a:ext cx="5852172" cy="4389129"/>
+          </a:xfrm>
+          <a:prstGeom prst="rect">
+            <a:avLst/>
+          </a:prstGeom>
+        </p:spPr>
+      </p:pic>
+      <p:pic>
+        <p:nvPicPr>
+          <p:cNvPr id="64" name="Grafik 63" descr="Ein Bild, das Text, Screenshot, Diagramm, Reihe enthält.&#10;&#10;Automatisch generierte Beschreibung">
+            <a:extLst>
+              <a:ext uri="{FF2B5EF4-FFF2-40B4-BE49-F238E27FC236}">
+                <a16:creationId xmlns:a16="http://schemas.microsoft.com/office/drawing/2014/main" id="{B886F1E6-E85D-B3EE-D751-38807B5C91A8}"/>
               </a:ext>
             </a:extLst>
           </p:cNvPr>
@@ -5977,8 +5910,8 @@
         </p:blipFill>
         <p:spPr>
           <a:xfrm>
-            <a:off x="21397418" y="21188656"/>
-            <a:ext cx="6118183" cy="4268500"/>
+            <a:off x="15406668" y="21063305"/>
+            <a:ext cx="6016721" cy="4197713"/>
           </a:xfrm>
           <a:prstGeom prst="rect">
             <a:avLst/>
@@ -5987,10 +5920,10 @@
       </p:pic>
       <p:pic>
         <p:nvPicPr>
-          <p:cNvPr id="86" name="Grafik 85" descr="Ein Bild, das Text, Screenshot, Reihe, Diagramm enthält.&#10;&#10;Automatisch generierte Beschreibung">
-            <a:extLst>
-              <a:ext uri="{FF2B5EF4-FFF2-40B4-BE49-F238E27FC236}">
-                <a16:creationId xmlns:a16="http://schemas.microsoft.com/office/drawing/2014/main" id="{E05B78D8-7931-F933-982C-73B48A0DB354}"/>
+          <p:cNvPr id="77" name="Grafik 76" descr="Ein Bild, das Screenshot, Text, Reihe, Schrift enthält.&#10;&#10;Automatisch generierte Beschreibung">
+            <a:extLst>
+              <a:ext uri="{FF2B5EF4-FFF2-40B4-BE49-F238E27FC236}">
+                <a16:creationId xmlns:a16="http://schemas.microsoft.com/office/drawing/2014/main" id="{BEBE7A49-0CFD-D121-F543-ACD81D21E671}"/>
               </a:ext>
             </a:extLst>
           </p:cNvPr>
@@ -6013,69 +5946,50 @@
         </p:blipFill>
         <p:spPr>
           <a:xfrm>
-            <a:off x="15304074" y="20987831"/>
-            <a:ext cx="5977298" cy="4482974"/>
+            <a:off x="4335960" y="19962454"/>
+            <a:ext cx="9723985" cy="2701107"/>
           </a:xfrm>
           <a:prstGeom prst="rect">
             <a:avLst/>
           </a:prstGeom>
         </p:spPr>
       </p:pic>
-      <p:sp>
-        <p:nvSpPr>
-          <p:cNvPr id="87" name="Textfeld 86">
-            <a:extLst>
-              <a:ext uri="{FF2B5EF4-FFF2-40B4-BE49-F238E27FC236}">
-                <a16:creationId xmlns:a16="http://schemas.microsoft.com/office/drawing/2014/main" id="{FF158A9A-90FD-E4C5-2089-7D71760187C1}"/>
-              </a:ext>
-            </a:extLst>
-          </p:cNvPr>
-          <p:cNvSpPr txBox="1"/>
+      <p:pic>
+        <p:nvPicPr>
+          <p:cNvPr id="79" name="Grafik 78" descr="Ein Bild, das Text, Karte enthält.&#10;&#10;Automatisch generierte Beschreibung">
+            <a:extLst>
+              <a:ext uri="{FF2B5EF4-FFF2-40B4-BE49-F238E27FC236}">
+                <a16:creationId xmlns:a16="http://schemas.microsoft.com/office/drawing/2014/main" id="{15C7E4D7-2A26-1FB4-8603-688E1774AFB6}"/>
+              </a:ext>
+            </a:extLst>
+          </p:cNvPr>
+          <p:cNvPicPr>
+            <a:picLocks noChangeAspect="1"/>
+          </p:cNvPicPr>
           <p:nvPr/>
-        </p:nvSpPr>
-        <p:spPr>
-          <a:xfrm>
-            <a:off x="21617940" y="27296566"/>
-            <a:ext cx="5801137" cy="1015663"/>
+        </p:nvPicPr>
+        <p:blipFill>
+          <a:blip r:embed="rId48">
+            <a:extLst>
+              <a:ext uri="{28A0092B-C50C-407E-A947-70E740481C1C}">
+                <a14:useLocalDpi xmlns:a14="http://schemas.microsoft.com/office/drawing/2010/main" val="0"/>
+              </a:ext>
+            </a:extLst>
+          </a:blip>
+          <a:stretch>
+            <a:fillRect/>
+          </a:stretch>
+        </p:blipFill>
+        <p:spPr>
+          <a:xfrm>
+            <a:off x="8899072" y="16459200"/>
+            <a:ext cx="5108844" cy="3484231"/>
           </a:xfrm>
           <a:prstGeom prst="rect">
             <a:avLst/>
           </a:prstGeom>
-          <a:noFill/>
-        </p:spPr>
-        <p:txBody>
-          <a:bodyPr wrap="square" rtlCol="0">
-            <a:spAutoFit/>
-          </a:bodyPr>
-          <a:lstStyle/>
-          <a:p>
-            <a:r>
-              <a:rPr lang="en-GB" sz="2000" b="1" dirty="0"/>
-              <a:t>Conclusion:</a:t>
-            </a:r>
-          </a:p>
-          <a:p>
-            <a:pPr marL="342900" indent="-342900">
-              <a:buFont typeface="Arial" panose="020B0604020202020204" pitchFamily="34" charset="0"/>
-              <a:buChar char="•"/>
-            </a:pPr>
-            <a:r>
-              <a:rPr lang="en-GB" sz="2000" dirty="0"/>
-              <a:t>No significant correlation</a:t>
-            </a:r>
-          </a:p>
-          <a:p>
-            <a:pPr marL="342900" indent="-342900">
-              <a:buFont typeface="Arial" panose="020B0604020202020204" pitchFamily="34" charset="0"/>
-              <a:buChar char="•"/>
-            </a:pPr>
-            <a:r>
-              <a:rPr lang="en-GB" sz="2000" dirty="0"/>
-              <a:t>Deeper investigation necessary</a:t>
-            </a:r>
-          </a:p>
-        </p:txBody>
-      </p:sp>
+        </p:spPr>
+      </p:pic>
     </p:spTree>
     <p:extLst>
       <p:ext uri="{BB962C8B-B14F-4D97-AF65-F5344CB8AC3E}">

</xml_diff>

<commit_message>
add conclusion and reference
</commit_message>
<xml_diff>
--- a/poster-template/prj01-poster-template.pptx
+++ b/poster-template/prj01-poster-template.pptx
@@ -2511,7 +2511,7 @@
         <p:spPr>
           <a:xfrm>
             <a:off x="29114909" y="23620782"/>
-            <a:ext cx="12099925" cy="4472262"/>
+            <a:ext cx="12099925" cy="4836386"/>
           </a:xfrm>
           <a:prstGeom prst="rect">
             <a:avLst/>
@@ -2523,6 +2523,69 @@
             <a:noAutofit/>
           </a:bodyPr>
           <a:lstStyle/>
+          <a:p>
+            <a:pPr marR="0" lvl="0" algn="just" defTabSz="3505524" rtl="0" eaLnBrk="1" fontAlgn="auto" latinLnBrk="0" hangingPunct="1">
+              <a:lnSpc>
+                <a:spcPct val="100000"/>
+              </a:lnSpc>
+              <a:spcBef>
+                <a:spcPts val="0"/>
+              </a:spcBef>
+              <a:spcAft>
+                <a:spcPts val="1200"/>
+              </a:spcAft>
+              <a:buClrTx/>
+              <a:buSzTx/>
+              <a:tabLst/>
+              <a:defRPr/>
+            </a:pPr>
+            <a:r>
+              <a:rPr lang="en-US" sz="2800" b="1" dirty="0">
+                <a:latin typeface="Arial" panose="020B0604020202020204" pitchFamily="34" charset="0"/>
+                <a:ea typeface="思源黑体 CN Regular" panose="020B0500000000000000" charset="-122"/>
+                <a:cs typeface="Arial" panose="020B0604020202020204" pitchFamily="34" charset="0"/>
+                <a:sym typeface="+mn-ea"/>
+              </a:rPr>
+              <a:t>Results:</a:t>
+            </a:r>
+          </a:p>
+          <a:p>
+            <a:pPr marL="457200" marR="0" lvl="0" indent="-457200" algn="just" defTabSz="3505524" rtl="0" eaLnBrk="1" fontAlgn="auto" latinLnBrk="0" hangingPunct="1">
+              <a:lnSpc>
+                <a:spcPct val="100000"/>
+              </a:lnSpc>
+              <a:spcBef>
+                <a:spcPts val="0"/>
+              </a:spcBef>
+              <a:spcAft>
+                <a:spcPts val="1200"/>
+              </a:spcAft>
+              <a:buClrTx/>
+              <a:buSzTx/>
+              <a:buFont typeface="Arial" panose="020B0604020202020204" pitchFamily="34" charset="0"/>
+              <a:buChar char="•"/>
+              <a:tabLst/>
+              <a:defRPr/>
+            </a:pPr>
+            <a:r>
+              <a:rPr lang="en-US" sz="2800" b="1" dirty="0">
+                <a:latin typeface="Arial" panose="020B0604020202020204" pitchFamily="34" charset="0"/>
+                <a:ea typeface="思源黑体 CN Regular" panose="020B0500000000000000" charset="-122"/>
+                <a:cs typeface="Arial" panose="020B0604020202020204" pitchFamily="34" charset="0"/>
+                <a:sym typeface="+mn-ea"/>
+              </a:rPr>
+              <a:t>H1</a:t>
+            </a:r>
+            <a:r>
+              <a:rPr lang="en-US" sz="2800" dirty="0">
+                <a:latin typeface="Arial" panose="020B0604020202020204" pitchFamily="34" charset="0"/>
+                <a:ea typeface="思源黑体 CN Regular" panose="020B0500000000000000" charset="-122"/>
+                <a:cs typeface="Arial" panose="020B0604020202020204" pitchFamily="34" charset="0"/>
+                <a:sym typeface="+mn-ea"/>
+              </a:rPr>
+              <a:t>: real estate prices influence choice of dog breed</a:t>
+            </a:r>
+          </a:p>
           <a:p>
             <a:pPr marL="457192" marR="0" lvl="0" indent="-457192" algn="just" defTabSz="3505524" rtl="0" eaLnBrk="1" fontAlgn="auto" latinLnBrk="0" hangingPunct="1">
               <a:lnSpc>
@@ -2541,12 +2604,153 @@
               <a:tabLst/>
               <a:defRPr/>
             </a:pPr>
-            <a:endParaRPr lang="en-US" sz="2800" dirty="0">
-              <a:latin typeface="Arial" panose="020B0604020202020204" pitchFamily="34" charset="0"/>
-              <a:ea typeface="思源黑体 CN Regular" panose="020B0500000000000000" charset="-122"/>
-              <a:cs typeface="Arial" panose="020B0604020202020204" pitchFamily="34" charset="0"/>
-              <a:sym typeface="+mn-ea"/>
-            </a:endParaRPr>
+            <a:r>
+              <a:rPr lang="en-US" sz="2800" b="1" dirty="0">
+                <a:latin typeface="Arial" panose="020B0604020202020204" pitchFamily="34" charset="0"/>
+                <a:ea typeface="思源黑体 CN Regular" panose="020B0500000000000000" charset="-122"/>
+                <a:cs typeface="Arial" panose="020B0604020202020204" pitchFamily="34" charset="0"/>
+                <a:sym typeface="+mn-ea"/>
+              </a:rPr>
+              <a:t>H2</a:t>
+            </a:r>
+            <a:r>
+              <a:rPr lang="en-US" sz="2800" dirty="0">
+                <a:latin typeface="Arial" panose="020B0604020202020204" pitchFamily="34" charset="0"/>
+                <a:ea typeface="思源黑体 CN Regular" panose="020B0500000000000000" charset="-122"/>
+                <a:cs typeface="Arial" panose="020B0604020202020204" pitchFamily="34" charset="0"/>
+                <a:sym typeface="+mn-ea"/>
+              </a:rPr>
+              <a:t>: no correlation between ownership of </a:t>
+            </a:r>
+            <a:r>
+              <a:rPr lang="en-US" sz="2800" dirty="0" err="1">
+                <a:latin typeface="Arial" panose="020B0604020202020204" pitchFamily="34" charset="0"/>
+                <a:ea typeface="思源黑体 CN Regular" panose="020B0500000000000000" charset="-122"/>
+                <a:cs typeface="Arial" panose="020B0604020202020204" pitchFamily="34" charset="0"/>
+                <a:sym typeface="+mn-ea"/>
+              </a:rPr>
+              <a:t>Listenhunde</a:t>
+            </a:r>
+            <a:r>
+              <a:rPr lang="en-US" sz="2800" dirty="0">
+                <a:latin typeface="Arial" panose="020B0604020202020204" pitchFamily="34" charset="0"/>
+                <a:ea typeface="思源黑体 CN Regular" panose="020B0500000000000000" charset="-122"/>
+                <a:cs typeface="Arial" panose="020B0604020202020204" pitchFamily="34" charset="0"/>
+                <a:sym typeface="+mn-ea"/>
+              </a:rPr>
+              <a:t> and district</a:t>
+            </a:r>
+          </a:p>
+          <a:p>
+            <a:pPr marL="457192" marR="0" lvl="0" indent="-457192" algn="just" defTabSz="3505524" rtl="0" eaLnBrk="1" fontAlgn="auto" latinLnBrk="0" hangingPunct="1">
+              <a:lnSpc>
+                <a:spcPct val="100000"/>
+              </a:lnSpc>
+              <a:spcBef>
+                <a:spcPts val="0"/>
+              </a:spcBef>
+              <a:spcAft>
+                <a:spcPts val="1200"/>
+              </a:spcAft>
+              <a:buClrTx/>
+              <a:buSzTx/>
+              <a:buFont typeface="Arial" panose="020B0604020202020204" pitchFamily="34" charset="0"/>
+              <a:buChar char="•"/>
+              <a:tabLst/>
+              <a:defRPr/>
+            </a:pPr>
+            <a:r>
+              <a:rPr lang="en-US" sz="2800" b="1" dirty="0">
+                <a:latin typeface="Arial" panose="020B0604020202020204" pitchFamily="34" charset="0"/>
+                <a:ea typeface="思源黑体 CN Regular" panose="020B0500000000000000" charset="-122"/>
+                <a:cs typeface="Arial" panose="020B0604020202020204" pitchFamily="34" charset="0"/>
+                <a:sym typeface="+mn-ea"/>
+              </a:rPr>
+              <a:t>H3</a:t>
+            </a:r>
+            <a:r>
+              <a:rPr lang="en-US" sz="2800" dirty="0">
+                <a:latin typeface="Arial" panose="020B0604020202020204" pitchFamily="34" charset="0"/>
+                <a:ea typeface="思源黑体 CN Regular" panose="020B0500000000000000" charset="-122"/>
+                <a:cs typeface="Arial" panose="020B0604020202020204" pitchFamily="34" charset="0"/>
+                <a:sym typeface="+mn-ea"/>
+              </a:rPr>
+              <a:t>: only upward trend when looking at mean of all heights per district vs green space ratio </a:t>
+            </a:r>
+          </a:p>
+          <a:p>
+            <a:pPr marL="457192" marR="0" lvl="0" indent="-457192" algn="just" defTabSz="3505524" rtl="0" eaLnBrk="1" fontAlgn="auto" latinLnBrk="0" hangingPunct="1">
+              <a:lnSpc>
+                <a:spcPct val="100000"/>
+              </a:lnSpc>
+              <a:spcBef>
+                <a:spcPts val="0"/>
+              </a:spcBef>
+              <a:spcAft>
+                <a:spcPts val="1200"/>
+              </a:spcAft>
+              <a:buClrTx/>
+              <a:buSzTx/>
+              <a:buFont typeface="Arial" panose="020B0604020202020204" pitchFamily="34" charset="0"/>
+              <a:buChar char="•"/>
+              <a:tabLst/>
+              <a:defRPr/>
+            </a:pPr>
+            <a:r>
+              <a:rPr lang="en-US" sz="2800" b="1" dirty="0">
+                <a:latin typeface="Arial" panose="020B0604020202020204" pitchFamily="34" charset="0"/>
+                <a:ea typeface="思源黑体 CN Regular" panose="020B0500000000000000" charset="-122"/>
+                <a:cs typeface="Arial" panose="020B0604020202020204" pitchFamily="34" charset="0"/>
+                <a:sym typeface="+mn-ea"/>
+              </a:rPr>
+              <a:t>H4</a:t>
+            </a:r>
+            <a:r>
+              <a:rPr lang="en-US" sz="2800" dirty="0">
+                <a:latin typeface="Arial" panose="020B0604020202020204" pitchFamily="34" charset="0"/>
+                <a:ea typeface="思源黑体 CN Regular" panose="020B0500000000000000" charset="-122"/>
+                <a:cs typeface="Arial" panose="020B0604020202020204" pitchFamily="34" charset="0"/>
+                <a:sym typeface="+mn-ea"/>
+              </a:rPr>
+              <a:t>: negative correlation between dog ownership and population density on district level</a:t>
+            </a:r>
+          </a:p>
+          <a:p>
+            <a:pPr marL="457192" marR="0" lvl="0" indent="-457192" algn="just" defTabSz="3505524" rtl="0" eaLnBrk="1" fontAlgn="auto" latinLnBrk="0" hangingPunct="1">
+              <a:lnSpc>
+                <a:spcPct val="100000"/>
+              </a:lnSpc>
+              <a:spcBef>
+                <a:spcPts val="0"/>
+              </a:spcBef>
+              <a:spcAft>
+                <a:spcPts val="1200"/>
+              </a:spcAft>
+              <a:buClrTx/>
+              <a:buSzTx/>
+              <a:buFont typeface="Arial" panose="020B0604020202020204" pitchFamily="34" charset="0"/>
+              <a:buChar char="•"/>
+              <a:tabLst/>
+              <a:defRPr/>
+            </a:pPr>
+            <a:r>
+              <a:rPr lang="en-US" sz="2800" b="1" dirty="0">
+                <a:latin typeface="Arial" panose="020B0604020202020204" pitchFamily="34" charset="0"/>
+                <a:ea typeface="思源黑体 CN Regular" panose="020B0500000000000000" charset="-122"/>
+                <a:cs typeface="Arial" panose="020B0604020202020204" pitchFamily="34" charset="0"/>
+                <a:sym typeface="+mn-ea"/>
+              </a:rPr>
+              <a:t>H5</a:t>
+            </a:r>
+            <a:r>
+              <a:rPr lang="en-US" sz="2800" dirty="0">
+                <a:latin typeface="Arial" panose="020B0604020202020204" pitchFamily="34" charset="0"/>
+                <a:ea typeface="思源黑体 CN Regular" panose="020B0500000000000000" charset="-122"/>
+                <a:cs typeface="Arial" panose="020B0604020202020204" pitchFamily="34" charset="0"/>
+                <a:sym typeface="+mn-ea"/>
+              </a:rPr>
+              <a:t>: strong correlation between dog ownership and number of waste bag dispensers on district level</a:t>
+            </a:r>
           </a:p>
         </p:txBody>
       </p:sp>
@@ -2758,7 +2962,25 @@
                 <a:cs typeface="Arial" panose="020B0604020202020204" pitchFamily="34" charset="0"/>
                 <a:sym typeface="+mn-ea"/>
               </a:rPr>
-              <a:t>Dog ownership in Vienna is very popular. In order to explore this Group’s several hypotheses, three Datasets were explored: One containing the aggregated density of dogs per district as well as absolute number since 2002, the other two containing the count of individual dog breeds per district. The latter were combined to one dataset, since it contained the same info for different reference years. </a:t>
+              <a:t>Dog ownership in Vienna is very popular. In order to explore this Group’s several hypotheses, three Datasets</a:t>
+            </a:r>
+            <a:r>
+              <a:rPr lang="en-US" sz="2800" baseline="30000" dirty="0">
+                <a:latin typeface="Arial" panose="020B0604020202020204" pitchFamily="34" charset="0"/>
+                <a:ea typeface="思源黑体 CN Regular" panose="020B0500000000000000" charset="-122"/>
+                <a:cs typeface="Arial" panose="020B0604020202020204" pitchFamily="34" charset="0"/>
+                <a:sym typeface="+mn-ea"/>
+              </a:rPr>
+              <a:t>1</a:t>
+            </a:r>
+            <a:r>
+              <a:rPr lang="en-US" sz="2800" dirty="0">
+                <a:latin typeface="Arial" panose="020B0604020202020204" pitchFamily="34" charset="0"/>
+                <a:ea typeface="思源黑体 CN Regular" panose="020B0500000000000000" charset="-122"/>
+                <a:cs typeface="Arial" panose="020B0604020202020204" pitchFamily="34" charset="0"/>
+                <a:sym typeface="+mn-ea"/>
+              </a:rPr>
+              <a:t> were explored: One containing the aggregated density of dogs per district as well as absolute number since 2002, the other two containing the count of individual dog breeds per district. The latter were combined to one dataset, since it contained the same info for different reference years. </a:t>
             </a:r>
           </a:p>
         </p:txBody>
@@ -3303,7 +3525,7 @@
         </p:nvSpPr>
         <p:spPr>
           <a:xfrm>
-            <a:off x="14938106" y="21502441"/>
+            <a:off x="14998220" y="21502441"/>
             <a:ext cx="12099925" cy="5727307"/>
           </a:xfrm>
           <a:prstGeom prst="rect">
@@ -3832,8 +4054,8 @@
         </p:nvSpPr>
         <p:spPr>
           <a:xfrm>
-            <a:off x="1553526" y="28317671"/>
-            <a:ext cx="26363692" cy="954107"/>
+            <a:off x="1521454" y="28432048"/>
+            <a:ext cx="27616278" cy="954107"/>
           </a:xfrm>
           <a:prstGeom prst="rect">
             <a:avLst/>
@@ -3862,17 +4084,73 @@
             </a:pPr>
             <a:r>
               <a:rPr lang="en-US" sz="2800" dirty="0"/>
-              <a:t>Eurostat European Union. Healthy life years from birth. 2023. URL: </a:t>
+              <a:t>Cooperation OGD </a:t>
+            </a:r>
+            <a:r>
+              <a:rPr lang="en-US" sz="2800" dirty="0" err="1"/>
+              <a:t>Österreich</a:t>
+            </a:r>
+            <a:r>
+              <a:rPr lang="en-US" sz="2800" dirty="0"/>
+              <a:t>. </a:t>
+            </a:r>
+            <a:r>
+              <a:rPr lang="en-US" sz="2800" dirty="0" err="1"/>
+              <a:t>Hundebestand</a:t>
+            </a:r>
+            <a:r>
+              <a:rPr lang="en-US" sz="2800" dirty="0"/>
+              <a:t> </a:t>
+            </a:r>
+            <a:r>
+              <a:rPr lang="en-US" sz="2800" dirty="0" err="1"/>
+              <a:t>seit</a:t>
+            </a:r>
+            <a:r>
+              <a:rPr lang="en-US" sz="2800" dirty="0"/>
+              <a:t> 2002 – </a:t>
+            </a:r>
+            <a:r>
+              <a:rPr lang="en-US" sz="2800" dirty="0" err="1"/>
+              <a:t>Bezirke</a:t>
+            </a:r>
+            <a:r>
+              <a:rPr lang="en-US" sz="2800" dirty="0"/>
+              <a:t> Wien, </a:t>
+            </a:r>
+            <a:r>
+              <a:rPr lang="en-US" sz="2800" dirty="0" err="1"/>
+              <a:t>Hunde</a:t>
+            </a:r>
+            <a:r>
+              <a:rPr lang="en-US" sz="2800" dirty="0"/>
+              <a:t> pro </a:t>
+            </a:r>
+            <a:r>
+              <a:rPr lang="en-US" sz="2800" dirty="0" err="1"/>
+              <a:t>Bezirk</a:t>
+            </a:r>
+            <a:r>
+              <a:rPr lang="en-US" sz="2800" dirty="0"/>
+              <a:t> Wien, </a:t>
+            </a:r>
+            <a:r>
+              <a:rPr lang="en-US" sz="2800" dirty="0" err="1"/>
+              <a:t>Hunderassen</a:t>
+            </a:r>
+            <a:r>
+              <a:rPr lang="en-US" sz="2800" dirty="0"/>
+              <a:t> Wien. URL: </a:t>
             </a:r>
             <a:r>
               <a:rPr lang="en-US" sz="2800" dirty="0">
                 <a:hlinkClick r:id="rId19"/>
               </a:rPr>
-              <a:t>https://ec.europa.eu/eurostat/databrowser/view/HLTH_HLYE/default/table?lang=en</a:t>
+              <a:t>https://www.data.gv.at/katalog/dataset/</a:t>
             </a:r>
             <a:r>
               <a:rPr lang="en-US" sz="2800" dirty="0"/>
-              <a:t> (visited on 09/12/2023).</a:t>
+              <a:t> (visited on 24.09.2024).</a:t>
             </a:r>
             <a:endParaRPr lang="de-AT" sz="2800" dirty="0"/>
           </a:p>
@@ -5832,8 +6110,8 @@
         </p:nvSpPr>
         <p:spPr>
           <a:xfrm>
-            <a:off x="15143450" y="25330064"/>
-            <a:ext cx="7051446" cy="2554545"/>
+            <a:off x="21334963" y="21431274"/>
+            <a:ext cx="6818359" cy="1785104"/>
           </a:xfrm>
           <a:prstGeom prst="rect">
             <a:avLst/>
@@ -5847,7 +6125,7 @@
           <a:lstStyle/>
           <a:p>
             <a:r>
-              <a:rPr lang="en-GB" sz="2000" b="1" dirty="0"/>
+              <a:rPr lang="en-GB" sz="2200" b="1" dirty="0"/>
               <a:t>Results:</a:t>
             </a:r>
           </a:p>
@@ -5857,14 +6135,32 @@
               <a:buChar char="•"/>
             </a:pPr>
             <a:r>
-              <a:rPr lang="en-GB" sz="2000" dirty="0"/>
-              <a:t>Green districts: Threshold at 20% green space </a:t>
-            </a:r>
-          </a:p>
-          <a:p>
-            <a:r>
-              <a:rPr lang="en-GB" sz="2000" dirty="0"/>
-              <a:t>            =&gt; 12 vs. 11 districts</a:t>
+              <a:rPr lang="en-GB" sz="2200" dirty="0"/>
+              <a:t>Slight shift of 1</a:t>
+            </a:r>
+            <a:r>
+              <a:rPr lang="en-GB" sz="2200" baseline="30000" dirty="0"/>
+              <a:t>st</a:t>
+            </a:r>
+            <a:r>
+              <a:rPr lang="en-GB" sz="2200" dirty="0"/>
+              <a:t>, 2</a:t>
+            </a:r>
+            <a:r>
+              <a:rPr lang="en-GB" sz="2200" baseline="30000" dirty="0"/>
+              <a:t>nd</a:t>
+            </a:r>
+            <a:r>
+              <a:rPr lang="en-GB" sz="2200" dirty="0"/>
+              <a:t> and 3</a:t>
+            </a:r>
+            <a:r>
+              <a:rPr lang="en-GB" sz="2200" baseline="30000" dirty="0"/>
+              <a:t>rd</a:t>
+            </a:r>
+            <a:r>
+              <a:rPr lang="en-GB" sz="2200" dirty="0"/>
+              <a:t> quartile to higher heights</a:t>
             </a:r>
           </a:p>
           <a:p>
@@ -5873,64 +6169,20 @@
               <a:buChar char="•"/>
             </a:pPr>
             <a:r>
-              <a:rPr lang="en-GB" sz="2000" dirty="0"/>
-              <a:t>Slight shift of 1</a:t>
-            </a:r>
-            <a:r>
-              <a:rPr lang="en-GB" sz="2000" baseline="30000" dirty="0"/>
-              <a:t>st</a:t>
-            </a:r>
-            <a:r>
-              <a:rPr lang="en-GB" sz="2000" dirty="0"/>
-              <a:t>, 2</a:t>
-            </a:r>
-            <a:r>
-              <a:rPr lang="en-GB" sz="2000" baseline="30000" dirty="0"/>
-              <a:t>nd</a:t>
-            </a:r>
-            <a:r>
-              <a:rPr lang="en-GB" sz="2000" dirty="0"/>
-              <a:t> and 3</a:t>
-            </a:r>
-            <a:r>
-              <a:rPr lang="en-GB" sz="2000" baseline="30000" dirty="0"/>
-              <a:t>rd</a:t>
-            </a:r>
-            <a:r>
-              <a:rPr lang="en-GB" sz="2000" dirty="0"/>
-              <a:t> quartile to higher heights</a:t>
-            </a:r>
-          </a:p>
-          <a:p>
-            <a:pPr marL="342900" indent="-342900">
-              <a:buFont typeface="Arial" panose="020B0604020202020204" pitchFamily="34" charset="0"/>
-              <a:buChar char="•"/>
-            </a:pPr>
-            <a:r>
-              <a:rPr lang="en-GB" sz="2000" dirty="0"/>
+              <a:rPr lang="en-GB" sz="2200" dirty="0"/>
               <a:t>Correlation-Coeff.:</a:t>
             </a:r>
           </a:p>
           <a:p>
             <a:r>
-              <a:rPr lang="en-GB" sz="2000" dirty="0"/>
-              <a:t>         - [Heights vs. Green Ratio]: only ~ 0.07 (!)</a:t>
-            </a:r>
-          </a:p>
-          <a:p>
-            <a:r>
-              <a:rPr lang="en-GB" sz="2000" dirty="0"/>
-              <a:t>         - [Mean of all Heights per District vs. Green Ratio]: ~ 0.68</a:t>
-            </a:r>
-          </a:p>
-          <a:p>
-            <a:pPr marL="342900" indent="-342900">
-              <a:buFont typeface="Arial" panose="020B0604020202020204" pitchFamily="34" charset="0"/>
-              <a:buChar char="•"/>
-            </a:pPr>
-            <a:r>
-              <a:rPr lang="en-GB" sz="2000" dirty="0"/>
-              <a:t>But: Significant difference in abs. number of dogs</a:t>
+              <a:rPr lang="en-GB" sz="2200" dirty="0"/>
+              <a:t>      - [Heights vs. Green Ratio]: only 0.07</a:t>
+            </a:r>
+          </a:p>
+          <a:p>
+            <a:r>
+              <a:rPr lang="en-GB" sz="2200" dirty="0"/>
+              <a:t>      - [Mean of all Heights per District vs. Green Ratio]: 0.68</a:t>
             </a:r>
           </a:p>
         </p:txBody>
@@ -5949,8 +6201,8 @@
         </p:nvSpPr>
         <p:spPr>
           <a:xfrm>
-            <a:off x="22194897" y="25536947"/>
-            <a:ext cx="5916668" cy="1323439"/>
+            <a:off x="15589490" y="26528993"/>
+            <a:ext cx="5916668" cy="1446550"/>
           </a:xfrm>
           <a:prstGeom prst="rect">
             <a:avLst/>
@@ -5964,7 +6216,7 @@
           <a:lstStyle/>
           <a:p>
             <a:r>
-              <a:rPr lang="en-GB" sz="2000" b="1" dirty="0"/>
+              <a:rPr lang="en-GB" sz="2200" b="1" dirty="0"/>
               <a:t>Conclusion:</a:t>
             </a:r>
           </a:p>
@@ -5974,7 +6226,7 @@
               <a:buChar char="•"/>
             </a:pPr>
             <a:r>
-              <a:rPr lang="en-GB" sz="2000" dirty="0"/>
+              <a:rPr lang="en-GB" sz="2200" dirty="0"/>
               <a:t>No linear relationship between all Heights and  Green Space Ratio</a:t>
             </a:r>
           </a:p>
@@ -5984,7 +6236,7 @@
               <a:buChar char="•"/>
             </a:pPr>
             <a:r>
-              <a:rPr lang="en-GB" sz="2000" dirty="0"/>
+              <a:rPr lang="en-GB" sz="2200" dirty="0"/>
               <a:t>Upward trend when looking at mean of heights</a:t>
             </a:r>
           </a:p>
@@ -6018,7 +6270,7 @@
         </p:blipFill>
         <p:spPr>
           <a:xfrm>
-            <a:off x="21830622" y="20940935"/>
+            <a:off x="22111090" y="23997475"/>
             <a:ext cx="5852172" cy="4389129"/>
           </a:xfrm>
           <a:prstGeom prst="rect">
@@ -6054,7 +6306,7 @@
         </p:blipFill>
         <p:spPr>
           <a:xfrm>
-            <a:off x="15406668" y="21063305"/>
+            <a:off x="15072497" y="21291088"/>
             <a:ext cx="6016721" cy="4197713"/>
           </a:xfrm>
           <a:prstGeom prst="rect">

</xml_diff>

<commit_message>
update legend in eda
</commit_message>
<xml_diff>
--- a/poster-template/prj01-poster-template.pptx
+++ b/poster-template/prj01-poster-template.pptx
@@ -6110,8 +6110,8 @@
         </p:nvSpPr>
         <p:spPr>
           <a:xfrm>
-            <a:off x="21334963" y="21431274"/>
-            <a:ext cx="6818359" cy="1785104"/>
+            <a:off x="22111090" y="21502441"/>
+            <a:ext cx="6818359" cy="1477328"/>
           </a:xfrm>
           <a:prstGeom prst="rect">
             <a:avLst/>
@@ -6125,7 +6125,7 @@
           <a:lstStyle/>
           <a:p>
             <a:r>
-              <a:rPr lang="en-GB" sz="2200" b="1" dirty="0"/>
+              <a:rPr lang="en-GB" sz="1800" b="1" dirty="0"/>
               <a:t>Results:</a:t>
             </a:r>
           </a:p>
@@ -6135,31 +6135,31 @@
               <a:buChar char="•"/>
             </a:pPr>
             <a:r>
-              <a:rPr lang="en-GB" sz="2200" dirty="0"/>
+              <a:rPr lang="en-GB" sz="1800" dirty="0"/>
               <a:t>Slight shift of 1</a:t>
             </a:r>
             <a:r>
-              <a:rPr lang="en-GB" sz="2200" baseline="30000" dirty="0"/>
+              <a:rPr lang="en-GB" sz="1800" baseline="30000" dirty="0"/>
               <a:t>st</a:t>
             </a:r>
             <a:r>
-              <a:rPr lang="en-GB" sz="2200" dirty="0"/>
+              <a:rPr lang="en-GB" sz="1800" dirty="0"/>
               <a:t>, 2</a:t>
             </a:r>
             <a:r>
-              <a:rPr lang="en-GB" sz="2200" baseline="30000" dirty="0"/>
+              <a:rPr lang="en-GB" sz="1800" baseline="30000" dirty="0"/>
               <a:t>nd</a:t>
             </a:r>
             <a:r>
-              <a:rPr lang="en-GB" sz="2200" dirty="0"/>
+              <a:rPr lang="en-GB" sz="1800" dirty="0"/>
               <a:t> and 3</a:t>
             </a:r>
             <a:r>
-              <a:rPr lang="en-GB" sz="2200" baseline="30000" dirty="0"/>
+              <a:rPr lang="en-GB" sz="1800" baseline="30000" dirty="0"/>
               <a:t>rd</a:t>
             </a:r>
             <a:r>
-              <a:rPr lang="en-GB" sz="2200" dirty="0"/>
+              <a:rPr lang="en-GB" sz="1800" dirty="0"/>
               <a:t> quartile to higher heights</a:t>
             </a:r>
           </a:p>
@@ -6169,19 +6169,19 @@
               <a:buChar char="•"/>
             </a:pPr>
             <a:r>
-              <a:rPr lang="en-GB" sz="2200" dirty="0"/>
+              <a:rPr lang="en-GB" sz="1800" dirty="0"/>
               <a:t>Correlation-Coeff.:</a:t>
             </a:r>
           </a:p>
           <a:p>
             <a:r>
-              <a:rPr lang="en-GB" sz="2200" dirty="0"/>
+              <a:rPr lang="en-GB" sz="1800" dirty="0"/>
               <a:t>      - [Heights vs. Green Ratio]: only 0.07</a:t>
             </a:r>
           </a:p>
           <a:p>
             <a:r>
-              <a:rPr lang="en-GB" sz="2200" dirty="0"/>
+              <a:rPr lang="en-GB" sz="1800" dirty="0"/>
               <a:t>      - [Mean of all Heights per District vs. Green Ratio]: 0.68</a:t>
             </a:r>
           </a:p>
@@ -6201,8 +6201,8 @@
         </p:nvSpPr>
         <p:spPr>
           <a:xfrm>
-            <a:off x="15589490" y="26528993"/>
-            <a:ext cx="5916668" cy="1446550"/>
+            <a:off x="15526012" y="26652305"/>
+            <a:ext cx="5916668" cy="1200329"/>
           </a:xfrm>
           <a:prstGeom prst="rect">
             <a:avLst/>
@@ -6216,7 +6216,7 @@
           <a:lstStyle/>
           <a:p>
             <a:r>
-              <a:rPr lang="en-GB" sz="2200" b="1" dirty="0"/>
+              <a:rPr lang="en-GB" sz="1800" b="1" dirty="0"/>
               <a:t>Conclusion:</a:t>
             </a:r>
           </a:p>
@@ -6226,7 +6226,7 @@
               <a:buChar char="•"/>
             </a:pPr>
             <a:r>
-              <a:rPr lang="en-GB" sz="2200" dirty="0"/>
+              <a:rPr lang="en-GB" sz="1800" dirty="0"/>
               <a:t>No linear relationship between all Heights and  Green Space Ratio</a:t>
             </a:r>
           </a:p>
@@ -6236,7 +6236,7 @@
               <a:buChar char="•"/>
             </a:pPr>
             <a:r>
-              <a:rPr lang="en-GB" sz="2200" dirty="0"/>
+              <a:rPr lang="en-GB" sz="1800" dirty="0"/>
               <a:t>Upward trend when looking at mean of heights</a:t>
             </a:r>
           </a:p>
@@ -6270,8 +6270,8 @@
         </p:blipFill>
         <p:spPr>
           <a:xfrm>
-            <a:off x="22111090" y="23997475"/>
-            <a:ext cx="5852172" cy="4389129"/>
+            <a:off x="21420137" y="23479261"/>
+            <a:ext cx="6543125" cy="4907344"/>
           </a:xfrm>
           <a:prstGeom prst="rect">
             <a:avLst/>
@@ -6307,7 +6307,7 @@
         <p:spPr>
           <a:xfrm>
             <a:off x="15072497" y="21291088"/>
-            <a:ext cx="6016721" cy="4197713"/>
+            <a:ext cx="6406177" cy="4469427"/>
           </a:xfrm>
           <a:prstGeom prst="rect">
             <a:avLst/>
@@ -6328,7 +6328,7 @@
           </p:cNvPicPr>
           <p:nvPr/>
         </p:nvPicPr>
-        <p:blipFill>
+        <p:blipFill rotWithShape="1">
           <a:blip r:embed="rId47">
             <a:extLst>
               <a:ext uri="{28A0092B-C50C-407E-A947-70E740481C1C}">
@@ -6336,14 +6336,13 @@
               </a:ext>
             </a:extLst>
           </a:blip>
-          <a:stretch>
-            <a:fillRect/>
-          </a:stretch>
+          <a:srcRect l="1537" b="8339"/>
+          <a:stretch/>
         </p:blipFill>
         <p:spPr>
           <a:xfrm>
-            <a:off x="4335960" y="19962454"/>
-            <a:ext cx="9723985" cy="2701107"/>
+            <a:off x="4324350" y="20165356"/>
+            <a:ext cx="9748639" cy="2520876"/>
           </a:xfrm>
           <a:prstGeom prst="rect">
             <a:avLst/>
@@ -6470,6 +6469,42 @@
           <a:xfrm>
             <a:off x="36050450" y="15510247"/>
             <a:ext cx="5048250" cy="238125"/>
+          </a:xfrm>
+          <a:prstGeom prst="rect">
+            <a:avLst/>
+          </a:prstGeom>
+        </p:spPr>
+      </p:pic>
+      <p:pic>
+        <p:nvPicPr>
+          <p:cNvPr id="47" name="Grafik 46" descr="Ein Bild, das Text, Screenshot, Schrift, Zahl enthält.&#10;&#10;Automatisch generierte Beschreibung">
+            <a:extLst>
+              <a:ext uri="{FF2B5EF4-FFF2-40B4-BE49-F238E27FC236}">
+                <a16:creationId xmlns:a16="http://schemas.microsoft.com/office/drawing/2014/main" id="{518676E2-E73D-6524-C1CD-44506D8F83C2}"/>
+              </a:ext>
+            </a:extLst>
+          </p:cNvPr>
+          <p:cNvPicPr>
+            <a:picLocks noChangeAspect="1"/>
+          </p:cNvPicPr>
+          <p:nvPr/>
+        </p:nvPicPr>
+        <p:blipFill>
+          <a:blip r:embed="rId52" cstate="print">
+            <a:extLst>
+              <a:ext uri="{28A0092B-C50C-407E-A947-70E740481C1C}">
+                <a14:useLocalDpi xmlns:a14="http://schemas.microsoft.com/office/drawing/2010/main" val="0"/>
+              </a:ext>
+            </a:extLst>
+          </a:blip>
+          <a:stretch>
+            <a:fillRect/>
+          </a:stretch>
+        </p:blipFill>
+        <p:spPr>
+          <a:xfrm>
+            <a:off x="4889512" y="18825901"/>
+            <a:ext cx="1672145" cy="1127041"/>
           </a:xfrm>
           <a:prstGeom prst="rect">
             <a:avLst/>

</xml_diff>

<commit_message>
change titlefont of h2
</commit_message>
<xml_diff>
--- a/poster-template/prj01-poster-template.pptx
+++ b/poster-template/prj01-poster-template.pptx
@@ -5485,34 +5485,16 @@
           <a:lstStyle/>
           <a:p>
             <a:r>
-              <a:rPr lang="en-GB" sz="2400" b="1" i="1" u="sng" dirty="0">
-                <a:latin typeface="Arial" panose="020B0604020202020204" pitchFamily="34" charset="0"/>
-                <a:ea typeface="思源黑体 CN Regular" panose="020B0500000000000000" charset="-122"/>
-                <a:cs typeface="Arial" panose="020B0604020202020204" pitchFamily="34" charset="0"/>
-                <a:sym typeface="+mn-ea"/>
-              </a:rPr>
-              <a:t>Assumption</a:t>
-            </a:r>
-            <a:r>
               <a:rPr lang="en-GB" sz="2400" b="1" dirty="0">
                 <a:latin typeface="Arial" panose="020B0604020202020204" pitchFamily="34" charset="0"/>
                 <a:ea typeface="思源黑体 CN Regular" panose="020B0500000000000000" charset="-122"/>
                 <a:cs typeface="Arial" panose="020B0604020202020204" pitchFamily="34" charset="0"/>
                 <a:sym typeface="+mn-ea"/>
               </a:rPr>
-              <a:t>: </a:t>
-            </a:r>
-            <a:r>
-              <a:rPr lang="en-GB" sz="2400" dirty="0">
-                <a:latin typeface="Arial" panose="020B0604020202020204" pitchFamily="34" charset="0"/>
-                <a:ea typeface="思源黑体 CN Regular" panose="020B0500000000000000" charset="-122"/>
-                <a:cs typeface="Arial" panose="020B0604020202020204" pitchFamily="34" charset="0"/>
-                <a:sym typeface="+mn-ea"/>
-              </a:rPr>
               <a:t>There is a positive correlation between the ownership of </a:t>
             </a:r>
             <a:r>
-              <a:rPr lang="en-GB" sz="2400" dirty="0" err="1">
+              <a:rPr lang="en-GB" sz="2400" b="1" dirty="0" err="1">
                 <a:latin typeface="Arial" panose="020B0604020202020204" pitchFamily="34" charset="0"/>
                 <a:ea typeface="思源黑体 CN Regular" panose="020B0500000000000000" charset="-122"/>
                 <a:cs typeface="Arial" panose="020B0604020202020204" pitchFamily="34" charset="0"/>
@@ -5521,7 +5503,7 @@
               <a:t>Listenhunde</a:t>
             </a:r>
             <a:r>
-              <a:rPr lang="en-GB" sz="2400" dirty="0">
+              <a:rPr lang="en-GB" sz="2400" b="1" dirty="0">
                 <a:latin typeface="Arial" panose="020B0604020202020204" pitchFamily="34" charset="0"/>
                 <a:ea typeface="思源黑体 CN Regular" panose="020B0500000000000000" charset="-122"/>
                 <a:cs typeface="Arial" panose="020B0604020202020204" pitchFamily="34" charset="0"/>
@@ -5530,7 +5512,7 @@
               <a:t> and district, with a higher prevalence of </a:t>
             </a:r>
             <a:r>
-              <a:rPr lang="en-GB" sz="2400" dirty="0" err="1">
+              <a:rPr lang="en-GB" sz="2400" b="1" dirty="0" err="1">
                 <a:latin typeface="Arial" panose="020B0604020202020204" pitchFamily="34" charset="0"/>
                 <a:ea typeface="思源黑体 CN Regular" panose="020B0500000000000000" charset="-122"/>
                 <a:cs typeface="Arial" panose="020B0604020202020204" pitchFamily="34" charset="0"/>
@@ -5539,24 +5521,15 @@
               <a:t>Listenhunde</a:t>
             </a:r>
             <a:r>
-              <a:rPr lang="en-GB" sz="2400" dirty="0">
-                <a:latin typeface="Arial" panose="020B0604020202020204" pitchFamily="34" charset="0"/>
-                <a:ea typeface="思源黑体 CN Regular" panose="020B0500000000000000" charset="-122"/>
-                <a:cs typeface="Arial" panose="020B0604020202020204" pitchFamily="34" charset="0"/>
-                <a:sym typeface="+mn-ea"/>
-              </a:rPr>
-              <a:t> ownership in outer Viennese districts compared to inner districts.</a:t>
-            </a:r>
-            <a:r>
               <a:rPr lang="en-GB" sz="2400" b="1" dirty="0">
                 <a:latin typeface="Arial" panose="020B0604020202020204" pitchFamily="34" charset="0"/>
                 <a:ea typeface="思源黑体 CN Regular" panose="020B0500000000000000" charset="-122"/>
                 <a:cs typeface="Arial" panose="020B0604020202020204" pitchFamily="34" charset="0"/>
                 <a:sym typeface="+mn-ea"/>
               </a:rPr>
-              <a:t>	</a:t>
-            </a:r>
-            <a:endParaRPr lang="en-GB" sz="2400" dirty="0"/>
+              <a:t> ownership in outer Viennese districts compared to inner districts.	</a:t>
+            </a:r>
+            <a:endParaRPr lang="en-GB" sz="2400" b="1" dirty="0"/>
           </a:p>
         </p:txBody>
       </p:sp>

</xml_diff>